<commit_message>
modify: update paper (until experiment design)
</commit_message>
<xml_diff>
--- a/WPCN/for_final_paper.pptx
+++ b/WPCN/for_final_paper.pptx
@@ -10,6 +10,7 @@
     <p:sldId id="258" r:id="rId4"/>
     <p:sldId id="259" r:id="rId5"/>
     <p:sldId id="260" r:id="rId6"/>
+    <p:sldId id="261" r:id="rId7"/>
   </p:sldIdLst>
   <p:sldSz cx="12192000" cy="6858000"/>
   <p:notesSz cx="6858000" cy="9144000"/>
@@ -6860,8 +6861,8 @@
           </a:p>
         </p:txBody>
       </p:sp>
-      <mc:AlternateContent xmlns:mc="http://schemas.openxmlformats.org/markup-compatibility/2006">
-        <mc:Choice xmlns:a14="http://schemas.microsoft.com/office/drawing/2010/main" Requires="a14">
+      <mc:AlternateContent xmlns:mc="http://schemas.openxmlformats.org/markup-compatibility/2006" xmlns:a14="http://schemas.microsoft.com/office/drawing/2010/main">
+        <mc:Choice Requires="a14">
           <p:sp>
             <p:nvSpPr>
               <p:cNvPr id="3" name="Rectangle 2"/>
@@ -6883,6 +6884,7 @@
               </a:bodyPr>
               <a:lstStyle/>
               <a:p>
+                <a:pPr/>
                 <a14:m>
                   <m:oMathPara xmlns:m="http://schemas.openxmlformats.org/officeDocument/2006/math">
                     <m:oMathParaPr>
@@ -6892,7 +6894,7 @@
                       <m:sSubSup>
                         <m:sSubSupPr>
                           <m:ctrlPr>
-                            <a:rPr lang="ko-KR" altLang="en-US" sz="1600">
+                            <a:rPr lang="ko-KR" altLang="en-US" sz="1600" i="1">
                               <a:latin typeface="Cambria Math" panose="02040503050406030204" pitchFamily="18" charset="0"/>
                             </a:rPr>
                           </m:ctrlPr>
@@ -6986,7 +6988,7 @@
             </p:txBody>
           </p:sp>
         </mc:Choice>
-        <mc:Fallback>
+        <mc:Fallback xmlns="">
           <p:sp>
             <p:nvSpPr>
               <p:cNvPr id="3" name="Rectangle 2"/>
@@ -7025,8 +7027,8 @@
           </p:sp>
         </mc:Fallback>
       </mc:AlternateContent>
-      <mc:AlternateContent xmlns:mc="http://schemas.openxmlformats.org/markup-compatibility/2006">
-        <mc:Choice xmlns:a14="http://schemas.microsoft.com/office/drawing/2010/main" Requires="a14">
+      <mc:AlternateContent xmlns:mc="http://schemas.openxmlformats.org/markup-compatibility/2006" xmlns:a14="http://schemas.microsoft.com/office/drawing/2010/main">
+        <mc:Choice Requires="a14">
           <p:sp>
             <p:nvSpPr>
               <p:cNvPr id="8" name="Rectangle 7"/>
@@ -7048,6 +7050,7 @@
               </a:bodyPr>
               <a:lstStyle/>
               <a:p>
+                <a:pPr/>
                 <a14:m>
                   <m:oMathPara xmlns:m="http://schemas.openxmlformats.org/officeDocument/2006/math">
                     <m:oMathParaPr>
@@ -7057,7 +7060,7 @@
                       <m:sSubSup>
                         <m:sSubSupPr>
                           <m:ctrlPr>
-                            <a:rPr lang="ko-KR" altLang="en-US" sz="1600">
+                            <a:rPr lang="ko-KR" altLang="en-US" sz="1600" i="1">
                               <a:latin typeface="Cambria Math" panose="02040503050406030204" pitchFamily="18" charset="0"/>
                             </a:rPr>
                           </m:ctrlPr>
@@ -7151,7 +7154,7 @@
             </p:txBody>
           </p:sp>
         </mc:Choice>
-        <mc:Fallback>
+        <mc:Fallback xmlns="">
           <p:sp>
             <p:nvSpPr>
               <p:cNvPr id="8" name="Rectangle 7"/>
@@ -7190,8 +7193,8 @@
           </p:sp>
         </mc:Fallback>
       </mc:AlternateContent>
-      <mc:AlternateContent xmlns:mc="http://schemas.openxmlformats.org/markup-compatibility/2006">
-        <mc:Choice xmlns:a14="http://schemas.microsoft.com/office/drawing/2010/main" Requires="a14">
+      <mc:AlternateContent xmlns:mc="http://schemas.openxmlformats.org/markup-compatibility/2006" xmlns:a14="http://schemas.microsoft.com/office/drawing/2010/main">
+        <mc:Choice Requires="a14">
           <p:sp>
             <p:nvSpPr>
               <p:cNvPr id="10" name="Rectangle 9"/>
@@ -7213,6 +7216,7 @@
               </a:bodyPr>
               <a:lstStyle/>
               <a:p>
+                <a:pPr/>
                 <a14:m>
                   <m:oMathPara xmlns:m="http://schemas.openxmlformats.org/officeDocument/2006/math">
                     <m:oMathParaPr>
@@ -7222,7 +7226,7 @@
                       <m:sSubSup>
                         <m:sSubSupPr>
                           <m:ctrlPr>
-                            <a:rPr lang="ko-KR" altLang="en-US" sz="1600">
+                            <a:rPr lang="ko-KR" altLang="en-US" sz="1600" i="1">
                               <a:latin typeface="Cambria Math" panose="02040503050406030204" pitchFamily="18" charset="0"/>
                             </a:rPr>
                           </m:ctrlPr>
@@ -7316,7 +7320,7 @@
             </p:txBody>
           </p:sp>
         </mc:Choice>
-        <mc:Fallback>
+        <mc:Fallback xmlns="">
           <p:sp>
             <p:nvSpPr>
               <p:cNvPr id="10" name="Rectangle 9"/>
@@ -7355,8 +7359,8 @@
           </p:sp>
         </mc:Fallback>
       </mc:AlternateContent>
-      <mc:AlternateContent xmlns:mc="http://schemas.openxmlformats.org/markup-compatibility/2006">
-        <mc:Choice xmlns:a14="http://schemas.microsoft.com/office/drawing/2010/main" Requires="a14">
+      <mc:AlternateContent xmlns:mc="http://schemas.openxmlformats.org/markup-compatibility/2006" xmlns:a14="http://schemas.microsoft.com/office/drawing/2010/main">
+        <mc:Choice Requires="a14">
           <p:sp>
             <p:nvSpPr>
               <p:cNvPr id="11" name="Rectangle 10"/>
@@ -7365,8 +7369,8 @@
             </p:nvSpPr>
             <p:spPr>
               <a:xfrm>
-                <a:off x="1861741" y="3065765"/>
-                <a:ext cx="1354986" cy="374654"/>
+                <a:off x="1819207" y="3067620"/>
+                <a:ext cx="1406282" cy="383182"/>
               </a:xfrm>
               <a:prstGeom prst="rect">
                 <a:avLst/>
@@ -7378,6 +7382,7 @@
               </a:bodyPr>
               <a:lstStyle/>
               <a:p>
+                <a:pPr/>
                 <a14:m>
                   <m:oMathPara xmlns:m="http://schemas.openxmlformats.org/officeDocument/2006/math">
                     <m:oMathParaPr>
@@ -7387,7 +7392,7 @@
                       <m:sSubSup>
                         <m:sSubSupPr>
                           <m:ctrlPr>
-                            <a:rPr lang="ko-KR" altLang="en-US" sz="1600">
+                            <a:rPr lang="ko-KR" altLang="en-US" sz="1600" i="1" smtClean="0">
                               <a:latin typeface="Cambria Math" panose="02040503050406030204" pitchFamily="18" charset="0"/>
                             </a:rPr>
                           </m:ctrlPr>
@@ -7455,14 +7460,14 @@
                                 </a:rPr>
                                 <m:t>𝑀𝑎𝑥</m:t>
                               </m:r>
-                              <m:r>
-                                <a:rPr lang="ko-KR" altLang="en-US" sz="1600" i="0">
-                                  <a:latin typeface="Cambria Math" panose="02040503050406030204" pitchFamily="18" charset="0"/>
-                                </a:rPr>
-                                <m:t>−1</m:t>
-                              </m:r>
                             </m:sub>
                           </m:sSub>
+                          <m:r>
+                            <a:rPr lang="en-US" altLang="ko-KR" sz="1600" b="0" i="1" smtClean="0">
+                              <a:latin typeface="Cambria Math" panose="02040503050406030204" pitchFamily="18" charset="0"/>
+                            </a:rPr>
+                            <m:t>−1</m:t>
+                          </m:r>
                         </m:sub>
                         <m:sup>
                           <m:r>
@@ -7487,7 +7492,7 @@
             </p:txBody>
           </p:sp>
         </mc:Choice>
-        <mc:Fallback>
+        <mc:Fallback xmlns="">
           <p:sp>
             <p:nvSpPr>
               <p:cNvPr id="11" name="Rectangle 10"/>
@@ -7498,8 +7503,8 @@
             </p:nvSpPr>
             <p:spPr>
               <a:xfrm>
-                <a:off x="1861741" y="3065765"/>
-                <a:ext cx="1354986" cy="374654"/>
+                <a:off x="1819207" y="3067620"/>
+                <a:ext cx="1406282" cy="383182"/>
               </a:xfrm>
               <a:prstGeom prst="rect">
                 <a:avLst/>
@@ -7526,8 +7531,8 @@
           </p:sp>
         </mc:Fallback>
       </mc:AlternateContent>
-      <mc:AlternateContent xmlns:mc="http://schemas.openxmlformats.org/markup-compatibility/2006">
-        <mc:Choice xmlns:a14="http://schemas.microsoft.com/office/drawing/2010/main" Requires="a14">
+      <mc:AlternateContent xmlns:mc="http://schemas.openxmlformats.org/markup-compatibility/2006" xmlns:a14="http://schemas.microsoft.com/office/drawing/2010/main">
+        <mc:Choice Requires="a14">
           <p:sp>
             <p:nvSpPr>
               <p:cNvPr id="15" name="Rectangle 14"/>
@@ -7536,8 +7541,8 @@
             </p:nvSpPr>
             <p:spPr>
               <a:xfrm>
-                <a:off x="4470815" y="3078898"/>
-                <a:ext cx="1354986" cy="375552"/>
+                <a:off x="4428836" y="3078898"/>
+                <a:ext cx="1406282" cy="383182"/>
               </a:xfrm>
               <a:prstGeom prst="rect">
                 <a:avLst/>
@@ -7549,6 +7554,7 @@
               </a:bodyPr>
               <a:lstStyle/>
               <a:p>
+                <a:pPr/>
                 <a14:m>
                   <m:oMathPara xmlns:m="http://schemas.openxmlformats.org/officeDocument/2006/math">
                     <m:oMathParaPr>
@@ -7558,7 +7564,7 @@
                       <m:sSubSup>
                         <m:sSubSupPr>
                           <m:ctrlPr>
-                            <a:rPr lang="ko-KR" altLang="en-US" sz="1600">
+                            <a:rPr lang="ko-KR" altLang="en-US" sz="1600" i="1" smtClean="0">
                               <a:latin typeface="Cambria Math" panose="02040503050406030204" pitchFamily="18" charset="0"/>
                             </a:rPr>
                           </m:ctrlPr>
@@ -7626,14 +7632,14 @@
                                 </a:rPr>
                                 <m:t>𝑀𝑎𝑥</m:t>
                               </m:r>
-                              <m:r>
-                                <a:rPr lang="ko-KR" altLang="en-US" sz="1600" i="0">
-                                  <a:latin typeface="Cambria Math" panose="02040503050406030204" pitchFamily="18" charset="0"/>
-                                </a:rPr>
-                                <m:t>+1</m:t>
-                              </m:r>
                             </m:sub>
                           </m:sSub>
+                          <m:r>
+                            <a:rPr lang="en-US" altLang="ko-KR" sz="1600" b="0" i="1" smtClean="0">
+                              <a:latin typeface="Cambria Math" panose="02040503050406030204" pitchFamily="18" charset="0"/>
+                            </a:rPr>
+                            <m:t>+1</m:t>
+                          </m:r>
                         </m:sub>
                         <m:sup>
                           <m:r>
@@ -7658,7 +7664,7 @@
             </p:txBody>
           </p:sp>
         </mc:Choice>
-        <mc:Fallback>
+        <mc:Fallback xmlns="">
           <p:sp>
             <p:nvSpPr>
               <p:cNvPr id="15" name="Rectangle 14"/>
@@ -7669,8 +7675,8 @@
             </p:nvSpPr>
             <p:spPr>
               <a:xfrm>
-                <a:off x="4470815" y="3078898"/>
-                <a:ext cx="1354986" cy="375552"/>
+                <a:off x="4428836" y="3078898"/>
+                <a:ext cx="1406282" cy="383182"/>
               </a:xfrm>
               <a:prstGeom prst="rect">
                 <a:avLst/>
@@ -7697,8 +7703,8 @@
           </p:sp>
         </mc:Fallback>
       </mc:AlternateContent>
-      <mc:AlternateContent xmlns:mc="http://schemas.openxmlformats.org/markup-compatibility/2006">
-        <mc:Choice xmlns:a14="http://schemas.microsoft.com/office/drawing/2010/main" Requires="a14">
+      <mc:AlternateContent xmlns:mc="http://schemas.openxmlformats.org/markup-compatibility/2006" xmlns:a14="http://schemas.microsoft.com/office/drawing/2010/main">
+        <mc:Choice Requires="a14">
           <p:sp>
             <p:nvSpPr>
               <p:cNvPr id="16" name="Rectangle 15"/>
@@ -7720,6 +7726,7 @@
               </a:bodyPr>
               <a:lstStyle/>
               <a:p>
+                <a:pPr/>
                 <a14:m>
                   <m:oMathPara xmlns:m="http://schemas.openxmlformats.org/officeDocument/2006/math">
                     <m:oMathParaPr>
@@ -7759,7 +7766,7 @@
             </p:txBody>
           </p:sp>
         </mc:Choice>
-        <mc:Fallback>
+        <mc:Fallback xmlns="">
           <p:sp>
             <p:nvSpPr>
               <p:cNvPr id="16" name="Rectangle 15"/>
@@ -7798,8 +7805,8 @@
           </p:sp>
         </mc:Fallback>
       </mc:AlternateContent>
-      <mc:AlternateContent xmlns:mc="http://schemas.openxmlformats.org/markup-compatibility/2006">
-        <mc:Choice xmlns:a14="http://schemas.microsoft.com/office/drawing/2010/main" Requires="a14">
+      <mc:AlternateContent xmlns:mc="http://schemas.openxmlformats.org/markup-compatibility/2006" xmlns:a14="http://schemas.microsoft.com/office/drawing/2010/main">
+        <mc:Choice Requires="a14">
           <p:sp>
             <p:nvSpPr>
               <p:cNvPr id="17" name="Rectangle 16"/>
@@ -7821,6 +7828,7 @@
               </a:bodyPr>
               <a:lstStyle/>
               <a:p>
+                <a:pPr/>
                 <a14:m>
                   <m:oMathPara xmlns:m="http://schemas.openxmlformats.org/officeDocument/2006/math">
                     <m:oMathParaPr>
@@ -7866,7 +7874,7 @@
             </p:txBody>
           </p:sp>
         </mc:Choice>
-        <mc:Fallback>
+        <mc:Fallback xmlns="">
           <p:sp>
             <p:nvSpPr>
               <p:cNvPr id="17" name="Rectangle 16"/>
@@ -7905,8 +7913,8 @@
           </p:sp>
         </mc:Fallback>
       </mc:AlternateContent>
-      <mc:AlternateContent xmlns:mc="http://schemas.openxmlformats.org/markup-compatibility/2006">
-        <mc:Choice xmlns:a14="http://schemas.microsoft.com/office/drawing/2010/main" Requires="a14">
+      <mc:AlternateContent xmlns:mc="http://schemas.openxmlformats.org/markup-compatibility/2006" xmlns:a14="http://schemas.microsoft.com/office/drawing/2010/main">
+        <mc:Choice Requires="a14">
           <p:sp>
             <p:nvSpPr>
               <p:cNvPr id="45" name="Rectangle 44"/>
@@ -7928,6 +7936,7 @@
               </a:bodyPr>
               <a:lstStyle/>
               <a:p>
+                <a:pPr/>
                 <a14:m>
                   <m:oMathPara xmlns:m="http://schemas.openxmlformats.org/officeDocument/2006/math">
                     <m:oMathParaPr>
@@ -7979,7 +7988,7 @@
             </p:txBody>
           </p:sp>
         </mc:Choice>
-        <mc:Fallback>
+        <mc:Fallback xmlns="">
           <p:sp>
             <p:nvSpPr>
               <p:cNvPr id="45" name="Rectangle 44"/>
@@ -8018,8 +8027,8 @@
           </p:sp>
         </mc:Fallback>
       </mc:AlternateContent>
-      <mc:AlternateContent xmlns:mc="http://schemas.openxmlformats.org/markup-compatibility/2006">
-        <mc:Choice xmlns:a14="http://schemas.microsoft.com/office/drawing/2010/main" Requires="a14">
+      <mc:AlternateContent xmlns:mc="http://schemas.openxmlformats.org/markup-compatibility/2006" xmlns:a14="http://schemas.microsoft.com/office/drawing/2010/main">
+        <mc:Choice Requires="a14">
           <p:sp>
             <p:nvSpPr>
               <p:cNvPr id="18" name="Rectangle 17"/>
@@ -8041,6 +8050,7 @@
               </a:bodyPr>
               <a:lstStyle/>
               <a:p>
+                <a:pPr/>
                 <a14:m>
                   <m:oMathPara xmlns:m="http://schemas.openxmlformats.org/officeDocument/2006/math">
                     <m:oMathParaPr>
@@ -8080,7 +8090,7 @@
             </p:txBody>
           </p:sp>
         </mc:Choice>
-        <mc:Fallback>
+        <mc:Fallback xmlns="">
           <p:sp>
             <p:nvSpPr>
               <p:cNvPr id="18" name="Rectangle 17"/>
@@ -8119,8 +8129,8 @@
           </p:sp>
         </mc:Fallback>
       </mc:AlternateContent>
-      <mc:AlternateContent xmlns:mc="http://schemas.openxmlformats.org/markup-compatibility/2006">
-        <mc:Choice xmlns:a14="http://schemas.microsoft.com/office/drawing/2010/main" Requires="a14">
+      <mc:AlternateContent xmlns:mc="http://schemas.openxmlformats.org/markup-compatibility/2006" xmlns:a14="http://schemas.microsoft.com/office/drawing/2010/main">
+        <mc:Choice Requires="a14">
           <p:sp>
             <p:nvSpPr>
               <p:cNvPr id="20" name="Rectangle 19"/>
@@ -8129,8 +8139,8 @@
             </p:nvSpPr>
             <p:spPr>
               <a:xfrm>
-                <a:off x="1995173" y="916377"/>
-                <a:ext cx="1046697" cy="369332"/>
+                <a:off x="1922861" y="916377"/>
+                <a:ext cx="1231043" cy="369332"/>
               </a:xfrm>
               <a:prstGeom prst="rect">
                 <a:avLst/>
@@ -8142,113 +8152,7 @@
               </a:bodyPr>
               <a:lstStyle/>
               <a:p>
-                <a14:m>
-                  <m:oMathPara xmlns:m="http://schemas.openxmlformats.org/officeDocument/2006/math">
-                    <m:oMathParaPr>
-                      <m:jc m:val="centerGroup"/>
-                    </m:oMathParaPr>
-                    <m:oMath xmlns:m="http://schemas.openxmlformats.org/officeDocument/2006/math">
-                      <m:sSub>
-                        <m:sSubPr>
-                          <m:ctrlPr>
-                            <a:rPr lang="ko-KR" altLang="en-US" i="1">
-                              <a:latin typeface="Cambria Math" panose="02040503050406030204" pitchFamily="18" charset="0"/>
-                            </a:rPr>
-                          </m:ctrlPr>
-                        </m:sSubPr>
-                        <m:e>
-                          <m:r>
-                            <a:rPr lang="ko-KR" altLang="en-US" i="1">
-                              <a:latin typeface="Cambria Math" panose="02040503050406030204" pitchFamily="18" charset="0"/>
-                            </a:rPr>
-                            <m:t>𝑚</m:t>
-                          </m:r>
-                        </m:e>
-                        <m:sub>
-                          <m:r>
-                            <a:rPr lang="ko-KR" altLang="en-US" i="1">
-                              <a:latin typeface="Cambria Math" panose="02040503050406030204" pitchFamily="18" charset="0"/>
-                            </a:rPr>
-                            <m:t>𝑀𝑎𝑥</m:t>
-                          </m:r>
-                          <m:r>
-                            <a:rPr lang="ko-KR" altLang="en-US">
-                              <a:latin typeface="Cambria Math" panose="02040503050406030204" pitchFamily="18" charset="0"/>
-                            </a:rPr>
-                            <m:t>−1</m:t>
-                          </m:r>
-                        </m:sub>
-                      </m:sSub>
-                    </m:oMath>
-                  </m:oMathPara>
-                </a14:m>
-                <a:endParaRPr lang="ko-KR" altLang="en-US" dirty="0"/>
-              </a:p>
-            </p:txBody>
-          </p:sp>
-        </mc:Choice>
-        <mc:Fallback>
-          <p:sp>
-            <p:nvSpPr>
-              <p:cNvPr id="20" name="Rectangle 19"/>
-              <p:cNvSpPr>
-                <a:spLocks noRot="1" noChangeAspect="1" noMove="1" noResize="1" noEditPoints="1" noAdjustHandles="1" noChangeArrowheads="1" noChangeShapeType="1" noTextEdit="1"/>
-              </p:cNvSpPr>
-              <p:nvPr/>
-            </p:nvSpPr>
-            <p:spPr>
-              <a:xfrm>
-                <a:off x="1995173" y="916377"/>
-                <a:ext cx="1046697" cy="369332"/>
-              </a:xfrm>
-              <a:prstGeom prst="rect">
-                <a:avLst/>
-              </a:prstGeom>
-              <a:blipFill>
-                <a:blip r:embed="rId11"/>
-                <a:stretch>
-                  <a:fillRect b="-1639"/>
-                </a:stretch>
-              </a:blipFill>
-            </p:spPr>
-            <p:txBody>
-              <a:bodyPr/>
-              <a:lstStyle/>
-              <a:p>
-                <a:r>
-                  <a:rPr lang="ko-KR" altLang="en-US">
-                    <a:noFill/>
-                  </a:rPr>
-                  <a:t> </a:t>
-                </a:r>
-              </a:p>
-            </p:txBody>
-          </p:sp>
-        </mc:Fallback>
-      </mc:AlternateContent>
-      <mc:AlternateContent xmlns:mc="http://schemas.openxmlformats.org/markup-compatibility/2006">
-        <mc:Choice xmlns:a14="http://schemas.microsoft.com/office/drawing/2010/main" Requires="a14">
-          <p:sp>
-            <p:nvSpPr>
-              <p:cNvPr id="46" name="Rectangle 45"/>
-              <p:cNvSpPr/>
-              <p:nvPr/>
-            </p:nvSpPr>
-            <p:spPr>
-              <a:xfrm>
-                <a:off x="4603692" y="916377"/>
-                <a:ext cx="1046697" cy="369332"/>
-              </a:xfrm>
-              <a:prstGeom prst="rect">
-                <a:avLst/>
-              </a:prstGeom>
-            </p:spPr>
-            <p:txBody>
-              <a:bodyPr wrap="none">
-                <a:spAutoFit/>
-              </a:bodyPr>
-              <a:lstStyle/>
-              <a:p>
+                <a:pPr/>
                 <a14:m>
                   <m:oMathPara xmlns:m="http://schemas.openxmlformats.org/officeDocument/2006/math">
                     <m:oMathParaPr>
@@ -8278,20 +8182,14 @@
                             </a:rPr>
                             <m:t>𝑀𝑎𝑥</m:t>
                           </m:r>
-                          <m:r>
-                            <a:rPr lang="en-US" altLang="ko-KR" b="0" i="0" smtClean="0">
-                              <a:latin typeface="Cambria Math" panose="02040503050406030204" pitchFamily="18" charset="0"/>
-                            </a:rPr>
-                            <m:t>+</m:t>
-                          </m:r>
-                          <m:r>
-                            <a:rPr lang="ko-KR" altLang="en-US">
-                              <a:latin typeface="Cambria Math" panose="02040503050406030204" pitchFamily="18" charset="0"/>
-                            </a:rPr>
-                            <m:t>1</m:t>
-                          </m:r>
                         </m:sub>
                       </m:sSub>
+                      <m:r>
+                        <a:rPr lang="en-US" altLang="ko-KR" b="0" i="1" smtClean="0">
+                          <a:latin typeface="Cambria Math" panose="02040503050406030204" pitchFamily="18" charset="0"/>
+                        </a:rPr>
+                        <m:t>−1</m:t>
+                      </m:r>
                     </m:oMath>
                   </m:oMathPara>
                 </a14:m>
@@ -8300,7 +8198,115 @@
             </p:txBody>
           </p:sp>
         </mc:Choice>
-        <mc:Fallback>
+        <mc:Fallback xmlns="">
+          <p:sp>
+            <p:nvSpPr>
+              <p:cNvPr id="20" name="Rectangle 19"/>
+              <p:cNvSpPr>
+                <a:spLocks noRot="1" noChangeAspect="1" noMove="1" noResize="1" noEditPoints="1" noAdjustHandles="1" noChangeArrowheads="1" noChangeShapeType="1" noTextEdit="1"/>
+              </p:cNvSpPr>
+              <p:nvPr/>
+            </p:nvSpPr>
+            <p:spPr>
+              <a:xfrm>
+                <a:off x="1922861" y="916377"/>
+                <a:ext cx="1231043" cy="369332"/>
+              </a:xfrm>
+              <a:prstGeom prst="rect">
+                <a:avLst/>
+              </a:prstGeom>
+              <a:blipFill>
+                <a:blip r:embed="rId11"/>
+                <a:stretch>
+                  <a:fillRect b="-1639"/>
+                </a:stretch>
+              </a:blipFill>
+            </p:spPr>
+            <p:txBody>
+              <a:bodyPr/>
+              <a:lstStyle/>
+              <a:p>
+                <a:r>
+                  <a:rPr lang="ko-KR" altLang="en-US">
+                    <a:noFill/>
+                  </a:rPr>
+                  <a:t> </a:t>
+                </a:r>
+              </a:p>
+            </p:txBody>
+          </p:sp>
+        </mc:Fallback>
+      </mc:AlternateContent>
+      <mc:AlternateContent xmlns:mc="http://schemas.openxmlformats.org/markup-compatibility/2006" xmlns:a14="http://schemas.microsoft.com/office/drawing/2010/main">
+        <mc:Choice Requires="a14">
+          <p:sp>
+            <p:nvSpPr>
+              <p:cNvPr id="46" name="Rectangle 45"/>
+              <p:cNvSpPr/>
+              <p:nvPr/>
+            </p:nvSpPr>
+            <p:spPr>
+              <a:xfrm>
+                <a:off x="4518901" y="916377"/>
+                <a:ext cx="1231043" cy="369332"/>
+              </a:xfrm>
+              <a:prstGeom prst="rect">
+                <a:avLst/>
+              </a:prstGeom>
+            </p:spPr>
+            <p:txBody>
+              <a:bodyPr wrap="none">
+                <a:spAutoFit/>
+              </a:bodyPr>
+              <a:lstStyle/>
+              <a:p>
+                <a:pPr/>
+                <a14:m>
+                  <m:oMathPara xmlns:m="http://schemas.openxmlformats.org/officeDocument/2006/math">
+                    <m:oMathParaPr>
+                      <m:jc m:val="centerGroup"/>
+                    </m:oMathParaPr>
+                    <m:oMath xmlns:m="http://schemas.openxmlformats.org/officeDocument/2006/math">
+                      <m:sSub>
+                        <m:sSubPr>
+                          <m:ctrlPr>
+                            <a:rPr lang="ko-KR" altLang="en-US" i="1" smtClean="0">
+                              <a:latin typeface="Cambria Math" panose="02040503050406030204" pitchFamily="18" charset="0"/>
+                            </a:rPr>
+                          </m:ctrlPr>
+                        </m:sSubPr>
+                        <m:e>
+                          <m:r>
+                            <a:rPr lang="ko-KR" altLang="en-US" i="1">
+                              <a:latin typeface="Cambria Math" panose="02040503050406030204" pitchFamily="18" charset="0"/>
+                            </a:rPr>
+                            <m:t>𝑚</m:t>
+                          </m:r>
+                        </m:e>
+                        <m:sub>
+                          <m:r>
+                            <a:rPr lang="ko-KR" altLang="en-US" i="1">
+                              <a:latin typeface="Cambria Math" panose="02040503050406030204" pitchFamily="18" charset="0"/>
+                            </a:rPr>
+                            <m:t>𝑀𝑎𝑥</m:t>
+                          </m:r>
+                        </m:sub>
+                      </m:sSub>
+                      <m:r>
+                        <a:rPr lang="en-US" altLang="ko-KR" b="0" i="1" smtClean="0">
+                          <a:latin typeface="Cambria Math" panose="02040503050406030204" pitchFamily="18" charset="0"/>
+                        </a:rPr>
+                        <m:t>+1</m:t>
+                      </m:r>
+                    </m:oMath>
+                  </m:oMathPara>
+                </a14:m>
+                <a:endParaRPr lang="ko-KR" altLang="en-US" dirty="0"/>
+              </a:p>
+            </p:txBody>
+          </p:sp>
+        </mc:Choice>
+        <mc:Fallback xmlns="">
           <p:sp>
             <p:nvSpPr>
               <p:cNvPr id="46" name="Rectangle 45"/>
@@ -8311,8 +8317,8 @@
             </p:nvSpPr>
             <p:spPr>
               <a:xfrm>
-                <a:off x="4603692" y="916377"/>
-                <a:ext cx="1046697" cy="369332"/>
+                <a:off x="4518901" y="916377"/>
+                <a:ext cx="1231043" cy="369332"/>
               </a:xfrm>
               <a:prstGeom prst="rect">
                 <a:avLst/>
@@ -8590,8 +8596,8 @@
           </a:p>
         </p:txBody>
       </p:sp>
-      <mc:AlternateContent xmlns:mc="http://schemas.openxmlformats.org/markup-compatibility/2006">
-        <mc:Choice xmlns:a14="http://schemas.microsoft.com/office/drawing/2010/main" Requires="a14">
+      <mc:AlternateContent xmlns:mc="http://schemas.openxmlformats.org/markup-compatibility/2006" xmlns:a14="http://schemas.microsoft.com/office/drawing/2010/main">
+        <mc:Choice Requires="a14">
           <p:sp>
             <p:nvSpPr>
               <p:cNvPr id="52" name="Rectangle 51"/>
@@ -8613,6 +8619,7 @@
               </a:bodyPr>
               <a:lstStyle/>
               <a:p>
+                <a:pPr/>
                 <a14:m>
                   <m:oMathPara xmlns:m="http://schemas.openxmlformats.org/officeDocument/2006/math">
                     <m:oMathParaPr>
@@ -8622,7 +8629,7 @@
                       <m:sSubSup>
                         <m:sSubSupPr>
                           <m:ctrlPr>
-                            <a:rPr lang="ko-KR" altLang="en-US" sz="1600">
+                            <a:rPr lang="ko-KR" altLang="en-US" sz="1600" i="1">
                               <a:latin typeface="Cambria Math" panose="02040503050406030204" pitchFamily="18" charset="0"/>
                             </a:rPr>
                           </m:ctrlPr>
@@ -8716,7 +8723,7 @@
             </p:txBody>
           </p:sp>
         </mc:Choice>
-        <mc:Fallback>
+        <mc:Fallback xmlns="">
           <p:sp>
             <p:nvSpPr>
               <p:cNvPr id="52" name="Rectangle 51"/>
@@ -8755,8 +8762,8 @@
           </p:sp>
         </mc:Fallback>
       </mc:AlternateContent>
-      <mc:AlternateContent xmlns:mc="http://schemas.openxmlformats.org/markup-compatibility/2006">
-        <mc:Choice xmlns:a14="http://schemas.microsoft.com/office/drawing/2010/main" Requires="a14">
+      <mc:AlternateContent xmlns:mc="http://schemas.openxmlformats.org/markup-compatibility/2006" xmlns:a14="http://schemas.microsoft.com/office/drawing/2010/main">
+        <mc:Choice Requires="a14">
           <p:sp>
             <p:nvSpPr>
               <p:cNvPr id="53" name="Rectangle 52"/>
@@ -8778,6 +8785,7 @@
               </a:bodyPr>
               <a:lstStyle/>
               <a:p>
+                <a:pPr/>
                 <a14:m>
                   <m:oMathPara xmlns:m="http://schemas.openxmlformats.org/officeDocument/2006/math">
                     <m:oMathParaPr>
@@ -8787,7 +8795,7 @@
                       <m:sSubSup>
                         <m:sSubSupPr>
                           <m:ctrlPr>
-                            <a:rPr lang="ko-KR" altLang="en-US" sz="1600">
+                            <a:rPr lang="ko-KR" altLang="en-US" sz="1600" i="1">
                               <a:latin typeface="Cambria Math" panose="02040503050406030204" pitchFamily="18" charset="0"/>
                             </a:rPr>
                           </m:ctrlPr>
@@ -8881,7 +8889,7 @@
             </p:txBody>
           </p:sp>
         </mc:Choice>
-        <mc:Fallback>
+        <mc:Fallback xmlns="">
           <p:sp>
             <p:nvSpPr>
               <p:cNvPr id="53" name="Rectangle 52"/>
@@ -8920,8 +8928,8 @@
           </p:sp>
         </mc:Fallback>
       </mc:AlternateContent>
-      <mc:AlternateContent xmlns:mc="http://schemas.openxmlformats.org/markup-compatibility/2006">
-        <mc:Choice xmlns:a14="http://schemas.microsoft.com/office/drawing/2010/main" Requires="a14">
+      <mc:AlternateContent xmlns:mc="http://schemas.openxmlformats.org/markup-compatibility/2006" xmlns:a14="http://schemas.microsoft.com/office/drawing/2010/main">
+        <mc:Choice Requires="a14">
           <p:sp>
             <p:nvSpPr>
               <p:cNvPr id="54" name="Rectangle 53"/>
@@ -8943,6 +8951,7 @@
               </a:bodyPr>
               <a:lstStyle/>
               <a:p>
+                <a:pPr/>
                 <a14:m>
                   <m:oMathPara xmlns:m="http://schemas.openxmlformats.org/officeDocument/2006/math">
                     <m:oMathParaPr>
@@ -8952,7 +8961,7 @@
                       <m:sSubSup>
                         <m:sSubSupPr>
                           <m:ctrlPr>
-                            <a:rPr lang="ko-KR" altLang="en-US" sz="1600">
+                            <a:rPr lang="ko-KR" altLang="en-US" sz="1600" i="1">
                               <a:latin typeface="Cambria Math" panose="02040503050406030204" pitchFamily="18" charset="0"/>
                             </a:rPr>
                           </m:ctrlPr>
@@ -9046,7 +9055,7 @@
             </p:txBody>
           </p:sp>
         </mc:Choice>
-        <mc:Fallback>
+        <mc:Fallback xmlns="">
           <p:sp>
             <p:nvSpPr>
               <p:cNvPr id="54" name="Rectangle 53"/>
@@ -9085,8 +9094,8 @@
           </p:sp>
         </mc:Fallback>
       </mc:AlternateContent>
-      <mc:AlternateContent xmlns:mc="http://schemas.openxmlformats.org/markup-compatibility/2006">
-        <mc:Choice xmlns:a14="http://schemas.microsoft.com/office/drawing/2010/main" Requires="a14">
+      <mc:AlternateContent xmlns:mc="http://schemas.openxmlformats.org/markup-compatibility/2006" xmlns:a14="http://schemas.microsoft.com/office/drawing/2010/main">
+        <mc:Choice Requires="a14">
           <p:sp>
             <p:nvSpPr>
               <p:cNvPr id="55" name="Rectangle 54"/>
@@ -9095,8 +9104,8 @@
             </p:nvSpPr>
             <p:spPr>
               <a:xfrm>
-                <a:off x="7500541" y="3065765"/>
-                <a:ext cx="1354986" cy="374654"/>
+                <a:off x="7479553" y="3065187"/>
+                <a:ext cx="1406282" cy="383182"/>
               </a:xfrm>
               <a:prstGeom prst="rect">
                 <a:avLst/>
@@ -9108,6 +9117,7 @@
               </a:bodyPr>
               <a:lstStyle/>
               <a:p>
+                <a:pPr/>
                 <a14:m>
                   <m:oMathPara xmlns:m="http://schemas.openxmlformats.org/officeDocument/2006/math">
                     <m:oMathParaPr>
@@ -9117,7 +9127,7 @@
                       <m:sSubSup>
                         <m:sSubSupPr>
                           <m:ctrlPr>
-                            <a:rPr lang="ko-KR" altLang="en-US" sz="1600">
+                            <a:rPr lang="ko-KR" altLang="en-US" sz="1600" i="1" smtClean="0">
                               <a:latin typeface="Cambria Math" panose="02040503050406030204" pitchFamily="18" charset="0"/>
                             </a:rPr>
                           </m:ctrlPr>
@@ -9185,14 +9195,14 @@
                                 </a:rPr>
                                 <m:t>𝑀𝑎𝑥</m:t>
                               </m:r>
-                              <m:r>
-                                <a:rPr lang="ko-KR" altLang="en-US" sz="1600" i="0">
-                                  <a:latin typeface="Cambria Math" panose="02040503050406030204" pitchFamily="18" charset="0"/>
-                                </a:rPr>
-                                <m:t>−1</m:t>
-                              </m:r>
                             </m:sub>
                           </m:sSub>
+                          <m:r>
+                            <a:rPr lang="en-US" altLang="ko-KR" sz="1600" b="0" i="1" smtClean="0">
+                              <a:latin typeface="Cambria Math" panose="02040503050406030204" pitchFamily="18" charset="0"/>
+                            </a:rPr>
+                            <m:t>−1</m:t>
+                          </m:r>
                         </m:sub>
                         <m:sup>
                           <m:r>
@@ -9217,7 +9227,7 @@
             </p:txBody>
           </p:sp>
         </mc:Choice>
-        <mc:Fallback>
+        <mc:Fallback xmlns="">
           <p:sp>
             <p:nvSpPr>
               <p:cNvPr id="55" name="Rectangle 54"/>
@@ -9228,14 +9238,14 @@
             </p:nvSpPr>
             <p:spPr>
               <a:xfrm>
-                <a:off x="7500541" y="3065765"/>
-                <a:ext cx="1354986" cy="374654"/>
+                <a:off x="7479553" y="3065187"/>
+                <a:ext cx="1406282" cy="383182"/>
               </a:xfrm>
               <a:prstGeom prst="rect">
                 <a:avLst/>
               </a:prstGeom>
               <a:blipFill>
-                <a:blip r:embed="rId5"/>
+                <a:blip r:embed="rId13"/>
                 <a:stretch>
                   <a:fillRect/>
                 </a:stretch>
@@ -9256,8 +9266,8 @@
           </p:sp>
         </mc:Fallback>
       </mc:AlternateContent>
-      <mc:AlternateContent xmlns:mc="http://schemas.openxmlformats.org/markup-compatibility/2006">
-        <mc:Choice xmlns:a14="http://schemas.microsoft.com/office/drawing/2010/main" Requires="a14">
+      <mc:AlternateContent xmlns:mc="http://schemas.openxmlformats.org/markup-compatibility/2006" xmlns:a14="http://schemas.microsoft.com/office/drawing/2010/main">
+        <mc:Choice Requires="a14">
           <p:sp>
             <p:nvSpPr>
               <p:cNvPr id="56" name="Rectangle 55"/>
@@ -9266,8 +9276,8 @@
             </p:nvSpPr>
             <p:spPr>
               <a:xfrm>
-                <a:off x="10109615" y="3078898"/>
-                <a:ext cx="1354986" cy="375552"/>
+                <a:off x="10088349" y="3078898"/>
+                <a:ext cx="1406282" cy="383182"/>
               </a:xfrm>
               <a:prstGeom prst="rect">
                 <a:avLst/>
@@ -9279,6 +9289,7 @@
               </a:bodyPr>
               <a:lstStyle/>
               <a:p>
+                <a:pPr/>
                 <a14:m>
                   <m:oMathPara xmlns:m="http://schemas.openxmlformats.org/officeDocument/2006/math">
                     <m:oMathParaPr>
@@ -9288,7 +9299,7 @@
                       <m:sSubSup>
                         <m:sSubSupPr>
                           <m:ctrlPr>
-                            <a:rPr lang="ko-KR" altLang="en-US" sz="1600">
+                            <a:rPr lang="ko-KR" altLang="en-US" sz="1600" i="1" smtClean="0">
                               <a:latin typeface="Cambria Math" panose="02040503050406030204" pitchFamily="18" charset="0"/>
                             </a:rPr>
                           </m:ctrlPr>
@@ -9356,14 +9367,14 @@
                                 </a:rPr>
                                 <m:t>𝑀𝑎𝑥</m:t>
                               </m:r>
-                              <m:r>
-                                <a:rPr lang="ko-KR" altLang="en-US" sz="1600" i="0">
-                                  <a:latin typeface="Cambria Math" panose="02040503050406030204" pitchFamily="18" charset="0"/>
-                                </a:rPr>
-                                <m:t>+1</m:t>
-                              </m:r>
                             </m:sub>
                           </m:sSub>
+                          <m:r>
+                            <a:rPr lang="en-US" altLang="ko-KR" sz="1600" b="0" i="1" smtClean="0">
+                              <a:latin typeface="Cambria Math" panose="02040503050406030204" pitchFamily="18" charset="0"/>
+                            </a:rPr>
+                            <m:t>+1</m:t>
+                          </m:r>
                         </m:sub>
                         <m:sup>
                           <m:r>
@@ -9388,7 +9399,7 @@
             </p:txBody>
           </p:sp>
         </mc:Choice>
-        <mc:Fallback>
+        <mc:Fallback xmlns="">
           <p:sp>
             <p:nvSpPr>
               <p:cNvPr id="56" name="Rectangle 55"/>
@@ -9399,14 +9410,14 @@
             </p:nvSpPr>
             <p:spPr>
               <a:xfrm>
-                <a:off x="10109615" y="3078898"/>
-                <a:ext cx="1354986" cy="375552"/>
+                <a:off x="10088349" y="3078898"/>
+                <a:ext cx="1406282" cy="383182"/>
               </a:xfrm>
               <a:prstGeom prst="rect">
                 <a:avLst/>
               </a:prstGeom>
               <a:blipFill>
-                <a:blip r:embed="rId6"/>
+                <a:blip r:embed="rId14"/>
                 <a:stretch>
                   <a:fillRect/>
                 </a:stretch>
@@ -9427,8 +9438,8 @@
           </p:sp>
         </mc:Fallback>
       </mc:AlternateContent>
-      <mc:AlternateContent xmlns:mc="http://schemas.openxmlformats.org/markup-compatibility/2006">
-        <mc:Choice xmlns:a14="http://schemas.microsoft.com/office/drawing/2010/main" Requires="a14">
+      <mc:AlternateContent xmlns:mc="http://schemas.openxmlformats.org/markup-compatibility/2006" xmlns:a14="http://schemas.microsoft.com/office/drawing/2010/main">
+        <mc:Choice Requires="a14">
           <p:sp>
             <p:nvSpPr>
               <p:cNvPr id="57" name="Rectangle 56"/>
@@ -9450,6 +9461,7 @@
               </a:bodyPr>
               <a:lstStyle/>
               <a:p>
+                <a:pPr/>
                 <a14:m>
                   <m:oMathPara xmlns:m="http://schemas.openxmlformats.org/officeDocument/2006/math">
                     <m:oMathParaPr>
@@ -9489,7 +9501,7 @@
             </p:txBody>
           </p:sp>
         </mc:Choice>
-        <mc:Fallback>
+        <mc:Fallback xmlns="">
           <p:sp>
             <p:nvSpPr>
               <p:cNvPr id="57" name="Rectangle 56"/>
@@ -9528,8 +9540,8 @@
           </p:sp>
         </mc:Fallback>
       </mc:AlternateContent>
-      <mc:AlternateContent xmlns:mc="http://schemas.openxmlformats.org/markup-compatibility/2006">
-        <mc:Choice xmlns:a14="http://schemas.microsoft.com/office/drawing/2010/main" Requires="a14">
+      <mc:AlternateContent xmlns:mc="http://schemas.openxmlformats.org/markup-compatibility/2006" xmlns:a14="http://schemas.microsoft.com/office/drawing/2010/main">
+        <mc:Choice Requires="a14">
           <p:sp>
             <p:nvSpPr>
               <p:cNvPr id="58" name="Rectangle 57"/>
@@ -9551,6 +9563,7 @@
               </a:bodyPr>
               <a:lstStyle/>
               <a:p>
+                <a:pPr/>
                 <a14:m>
                   <m:oMathPara xmlns:m="http://schemas.openxmlformats.org/officeDocument/2006/math">
                     <m:oMathParaPr>
@@ -9596,7 +9609,7 @@
             </p:txBody>
           </p:sp>
         </mc:Choice>
-        <mc:Fallback>
+        <mc:Fallback xmlns="">
           <p:sp>
             <p:nvSpPr>
               <p:cNvPr id="58" name="Rectangle 57"/>
@@ -9635,8 +9648,8 @@
           </p:sp>
         </mc:Fallback>
       </mc:AlternateContent>
-      <mc:AlternateContent xmlns:mc="http://schemas.openxmlformats.org/markup-compatibility/2006">
-        <mc:Choice xmlns:a14="http://schemas.microsoft.com/office/drawing/2010/main" Requires="a14">
+      <mc:AlternateContent xmlns:mc="http://schemas.openxmlformats.org/markup-compatibility/2006" xmlns:a14="http://schemas.microsoft.com/office/drawing/2010/main">
+        <mc:Choice Requires="a14">
           <p:sp>
             <p:nvSpPr>
               <p:cNvPr id="59" name="Rectangle 58"/>
@@ -9658,6 +9671,7 @@
               </a:bodyPr>
               <a:lstStyle/>
               <a:p>
+                <a:pPr/>
                 <a14:m>
                   <m:oMathPara xmlns:m="http://schemas.openxmlformats.org/officeDocument/2006/math">
                     <m:oMathParaPr>
@@ -9709,7 +9723,7 @@
             </p:txBody>
           </p:sp>
         </mc:Choice>
-        <mc:Fallback>
+        <mc:Fallback xmlns="">
           <p:sp>
             <p:nvSpPr>
               <p:cNvPr id="59" name="Rectangle 58"/>
@@ -9748,8 +9762,8 @@
           </p:sp>
         </mc:Fallback>
       </mc:AlternateContent>
-      <mc:AlternateContent xmlns:mc="http://schemas.openxmlformats.org/markup-compatibility/2006">
-        <mc:Choice xmlns:a14="http://schemas.microsoft.com/office/drawing/2010/main" Requires="a14">
+      <mc:AlternateContent xmlns:mc="http://schemas.openxmlformats.org/markup-compatibility/2006" xmlns:a14="http://schemas.microsoft.com/office/drawing/2010/main">
+        <mc:Choice Requires="a14">
           <p:sp>
             <p:nvSpPr>
               <p:cNvPr id="60" name="Rectangle 59"/>
@@ -9771,6 +9785,7 @@
               </a:bodyPr>
               <a:lstStyle/>
               <a:p>
+                <a:pPr/>
                 <a14:m>
                   <m:oMathPara xmlns:m="http://schemas.openxmlformats.org/officeDocument/2006/math">
                     <m:oMathParaPr>
@@ -9810,7 +9825,7 @@
             </p:txBody>
           </p:sp>
         </mc:Choice>
-        <mc:Fallback>
+        <mc:Fallback xmlns="">
           <p:sp>
             <p:nvSpPr>
               <p:cNvPr id="60" name="Rectangle 59"/>
@@ -9849,8 +9864,8 @@
           </p:sp>
         </mc:Fallback>
       </mc:AlternateContent>
-      <mc:AlternateContent xmlns:mc="http://schemas.openxmlformats.org/markup-compatibility/2006">
-        <mc:Choice xmlns:a14="http://schemas.microsoft.com/office/drawing/2010/main" Requires="a14">
+      <mc:AlternateContent xmlns:mc="http://schemas.openxmlformats.org/markup-compatibility/2006" xmlns:a14="http://schemas.microsoft.com/office/drawing/2010/main">
+        <mc:Choice Requires="a14">
           <p:sp>
             <p:nvSpPr>
               <p:cNvPr id="61" name="Rectangle 60"/>
@@ -9859,8 +9874,8 @@
             </p:nvSpPr>
             <p:spPr>
               <a:xfrm>
-                <a:off x="7633973" y="916377"/>
-                <a:ext cx="1046697" cy="369332"/>
+                <a:off x="7550207" y="916377"/>
+                <a:ext cx="1231043" cy="369332"/>
               </a:xfrm>
               <a:prstGeom prst="rect">
                 <a:avLst/>
@@ -9872,113 +9887,7 @@
               </a:bodyPr>
               <a:lstStyle/>
               <a:p>
-                <a14:m>
-                  <m:oMathPara xmlns:m="http://schemas.openxmlformats.org/officeDocument/2006/math">
-                    <m:oMathParaPr>
-                      <m:jc m:val="centerGroup"/>
-                    </m:oMathParaPr>
-                    <m:oMath xmlns:m="http://schemas.openxmlformats.org/officeDocument/2006/math">
-                      <m:sSub>
-                        <m:sSubPr>
-                          <m:ctrlPr>
-                            <a:rPr lang="ko-KR" altLang="en-US" i="1">
-                              <a:latin typeface="Cambria Math" panose="02040503050406030204" pitchFamily="18" charset="0"/>
-                            </a:rPr>
-                          </m:ctrlPr>
-                        </m:sSubPr>
-                        <m:e>
-                          <m:r>
-                            <a:rPr lang="ko-KR" altLang="en-US" i="1">
-                              <a:latin typeface="Cambria Math" panose="02040503050406030204" pitchFamily="18" charset="0"/>
-                            </a:rPr>
-                            <m:t>𝑚</m:t>
-                          </m:r>
-                        </m:e>
-                        <m:sub>
-                          <m:r>
-                            <a:rPr lang="ko-KR" altLang="en-US" i="1">
-                              <a:latin typeface="Cambria Math" panose="02040503050406030204" pitchFamily="18" charset="0"/>
-                            </a:rPr>
-                            <m:t>𝑀𝑎𝑥</m:t>
-                          </m:r>
-                          <m:r>
-                            <a:rPr lang="ko-KR" altLang="en-US">
-                              <a:latin typeface="Cambria Math" panose="02040503050406030204" pitchFamily="18" charset="0"/>
-                            </a:rPr>
-                            <m:t>−1</m:t>
-                          </m:r>
-                        </m:sub>
-                      </m:sSub>
-                    </m:oMath>
-                  </m:oMathPara>
-                </a14:m>
-                <a:endParaRPr lang="ko-KR" altLang="en-US" dirty="0"/>
-              </a:p>
-            </p:txBody>
-          </p:sp>
-        </mc:Choice>
-        <mc:Fallback>
-          <p:sp>
-            <p:nvSpPr>
-              <p:cNvPr id="61" name="Rectangle 60"/>
-              <p:cNvSpPr>
-                <a:spLocks noRot="1" noChangeAspect="1" noMove="1" noResize="1" noEditPoints="1" noAdjustHandles="1" noChangeArrowheads="1" noChangeShapeType="1" noTextEdit="1"/>
-              </p:cNvSpPr>
-              <p:nvPr/>
-            </p:nvSpPr>
-            <p:spPr>
-              <a:xfrm>
-                <a:off x="7633973" y="916377"/>
-                <a:ext cx="1046697" cy="369332"/>
-              </a:xfrm>
-              <a:prstGeom prst="rect">
-                <a:avLst/>
-              </a:prstGeom>
-              <a:blipFill>
-                <a:blip r:embed="rId11"/>
-                <a:stretch>
-                  <a:fillRect b="-1639"/>
-                </a:stretch>
-              </a:blipFill>
-            </p:spPr>
-            <p:txBody>
-              <a:bodyPr/>
-              <a:lstStyle/>
-              <a:p>
-                <a:r>
-                  <a:rPr lang="ko-KR" altLang="en-US">
-                    <a:noFill/>
-                  </a:rPr>
-                  <a:t> </a:t>
-                </a:r>
-              </a:p>
-            </p:txBody>
-          </p:sp>
-        </mc:Fallback>
-      </mc:AlternateContent>
-      <mc:AlternateContent xmlns:mc="http://schemas.openxmlformats.org/markup-compatibility/2006">
-        <mc:Choice xmlns:a14="http://schemas.microsoft.com/office/drawing/2010/main" Requires="a14">
-          <p:sp>
-            <p:nvSpPr>
-              <p:cNvPr id="62" name="Rectangle 61"/>
-              <p:cNvSpPr/>
-              <p:nvPr/>
-            </p:nvSpPr>
-            <p:spPr>
-              <a:xfrm>
-                <a:off x="10242492" y="916377"/>
-                <a:ext cx="1046697" cy="369332"/>
-              </a:xfrm>
-              <a:prstGeom prst="rect">
-                <a:avLst/>
-              </a:prstGeom>
-            </p:spPr>
-            <p:txBody>
-              <a:bodyPr wrap="none">
-                <a:spAutoFit/>
-              </a:bodyPr>
-              <a:lstStyle/>
-              <a:p>
+                <a:pPr/>
                 <a14:m>
                   <m:oMathPara xmlns:m="http://schemas.openxmlformats.org/officeDocument/2006/math">
                     <m:oMathParaPr>
@@ -10008,20 +9917,14 @@
                             </a:rPr>
                             <m:t>𝑀𝑎𝑥</m:t>
                           </m:r>
-                          <m:r>
-                            <a:rPr lang="en-US" altLang="ko-KR" b="0" i="0" smtClean="0">
-                              <a:latin typeface="Cambria Math" panose="02040503050406030204" pitchFamily="18" charset="0"/>
-                            </a:rPr>
-                            <m:t>+</m:t>
-                          </m:r>
-                          <m:r>
-                            <a:rPr lang="ko-KR" altLang="en-US">
-                              <a:latin typeface="Cambria Math" panose="02040503050406030204" pitchFamily="18" charset="0"/>
-                            </a:rPr>
-                            <m:t>1</m:t>
-                          </m:r>
                         </m:sub>
                       </m:sSub>
+                      <m:r>
+                        <a:rPr lang="en-US" altLang="ko-KR" b="0" i="1" smtClean="0">
+                          <a:latin typeface="Cambria Math" panose="02040503050406030204" pitchFamily="18" charset="0"/>
+                        </a:rPr>
+                        <m:t>−1</m:t>
+                      </m:r>
                     </m:oMath>
                   </m:oMathPara>
                 </a14:m>
@@ -10030,7 +9933,115 @@
             </p:txBody>
           </p:sp>
         </mc:Choice>
-        <mc:Fallback>
+        <mc:Fallback xmlns="">
+          <p:sp>
+            <p:nvSpPr>
+              <p:cNvPr id="61" name="Rectangle 60"/>
+              <p:cNvSpPr>
+                <a:spLocks noRot="1" noChangeAspect="1" noMove="1" noResize="1" noEditPoints="1" noAdjustHandles="1" noChangeArrowheads="1" noChangeShapeType="1" noTextEdit="1"/>
+              </p:cNvSpPr>
+              <p:nvPr/>
+            </p:nvSpPr>
+            <p:spPr>
+              <a:xfrm>
+                <a:off x="7550207" y="916377"/>
+                <a:ext cx="1231043" cy="369332"/>
+              </a:xfrm>
+              <a:prstGeom prst="rect">
+                <a:avLst/>
+              </a:prstGeom>
+              <a:blipFill>
+                <a:blip r:embed="rId15"/>
+                <a:stretch>
+                  <a:fillRect b="-1639"/>
+                </a:stretch>
+              </a:blipFill>
+            </p:spPr>
+            <p:txBody>
+              <a:bodyPr/>
+              <a:lstStyle/>
+              <a:p>
+                <a:r>
+                  <a:rPr lang="ko-KR" altLang="en-US">
+                    <a:noFill/>
+                  </a:rPr>
+                  <a:t> </a:t>
+                </a:r>
+              </a:p>
+            </p:txBody>
+          </p:sp>
+        </mc:Fallback>
+      </mc:AlternateContent>
+      <mc:AlternateContent xmlns:mc="http://schemas.openxmlformats.org/markup-compatibility/2006" xmlns:a14="http://schemas.microsoft.com/office/drawing/2010/main">
+        <mc:Choice Requires="a14">
+          <p:sp>
+            <p:nvSpPr>
+              <p:cNvPr id="62" name="Rectangle 61"/>
+              <p:cNvSpPr/>
+              <p:nvPr/>
+            </p:nvSpPr>
+            <p:spPr>
+              <a:xfrm>
+                <a:off x="10242492" y="916377"/>
+                <a:ext cx="1231043" cy="369332"/>
+              </a:xfrm>
+              <a:prstGeom prst="rect">
+                <a:avLst/>
+              </a:prstGeom>
+            </p:spPr>
+            <p:txBody>
+              <a:bodyPr wrap="none">
+                <a:spAutoFit/>
+              </a:bodyPr>
+              <a:lstStyle/>
+              <a:p>
+                <a:pPr/>
+                <a14:m>
+                  <m:oMathPara xmlns:m="http://schemas.openxmlformats.org/officeDocument/2006/math">
+                    <m:oMathParaPr>
+                      <m:jc m:val="centerGroup"/>
+                    </m:oMathParaPr>
+                    <m:oMath xmlns:m="http://schemas.openxmlformats.org/officeDocument/2006/math">
+                      <m:sSub>
+                        <m:sSubPr>
+                          <m:ctrlPr>
+                            <a:rPr lang="ko-KR" altLang="en-US" i="1" smtClean="0">
+                              <a:latin typeface="Cambria Math" panose="02040503050406030204" pitchFamily="18" charset="0"/>
+                            </a:rPr>
+                          </m:ctrlPr>
+                        </m:sSubPr>
+                        <m:e>
+                          <m:r>
+                            <a:rPr lang="ko-KR" altLang="en-US" i="1">
+                              <a:latin typeface="Cambria Math" panose="02040503050406030204" pitchFamily="18" charset="0"/>
+                            </a:rPr>
+                            <m:t>𝑚</m:t>
+                          </m:r>
+                        </m:e>
+                        <m:sub>
+                          <m:r>
+                            <a:rPr lang="ko-KR" altLang="en-US" i="1">
+                              <a:latin typeface="Cambria Math" panose="02040503050406030204" pitchFamily="18" charset="0"/>
+                            </a:rPr>
+                            <m:t>𝑀𝑎𝑥</m:t>
+                          </m:r>
+                        </m:sub>
+                      </m:sSub>
+                      <m:r>
+                        <a:rPr lang="en-US" altLang="ko-KR" b="0" i="1" smtClean="0">
+                          <a:latin typeface="Cambria Math" panose="02040503050406030204" pitchFamily="18" charset="0"/>
+                        </a:rPr>
+                        <m:t>+1</m:t>
+                      </m:r>
+                    </m:oMath>
+                  </m:oMathPara>
+                </a14:m>
+                <a:endParaRPr lang="ko-KR" altLang="en-US" dirty="0"/>
+              </a:p>
+            </p:txBody>
+          </p:sp>
+        </mc:Choice>
+        <mc:Fallback xmlns="">
           <p:sp>
             <p:nvSpPr>
               <p:cNvPr id="62" name="Rectangle 61"/>
@@ -10042,13 +10053,13 @@
             <p:spPr>
               <a:xfrm>
                 <a:off x="10242492" y="916377"/>
-                <a:ext cx="1046697" cy="369332"/>
+                <a:ext cx="1231043" cy="369332"/>
               </a:xfrm>
               <a:prstGeom prst="rect">
                 <a:avLst/>
               </a:prstGeom>
               <a:blipFill>
-                <a:blip r:embed="rId12"/>
+                <a:blip r:embed="rId16"/>
                 <a:stretch>
                   <a:fillRect b="-1639"/>
                 </a:stretch>
@@ -10278,8 +10289,8 @@
         </p:nvCxnSpPr>
         <p:spPr>
           <a:xfrm flipH="1">
-            <a:off x="8144640" y="1285709"/>
-            <a:ext cx="12682" cy="4041203"/>
+            <a:off x="8133259" y="1285709"/>
+            <a:ext cx="32470" cy="4041203"/>
           </a:xfrm>
           <a:prstGeom prst="line">
             <a:avLst/>
@@ -10354,8 +10365,8 @@
         </p:nvCxnSpPr>
         <p:spPr>
           <a:xfrm flipH="1">
-            <a:off x="10746962" y="1285709"/>
-            <a:ext cx="18879" cy="4041203"/>
+            <a:off x="10849991" y="1285709"/>
+            <a:ext cx="8023" cy="4041203"/>
           </a:xfrm>
           <a:prstGeom prst="line">
             <a:avLst/>
@@ -10420,8 +10431,8 @@
           </a:fontRef>
         </p:style>
       </p:cxnSp>
-      <mc:AlternateContent xmlns:mc="http://schemas.openxmlformats.org/markup-compatibility/2006">
-        <mc:Choice xmlns:a14="http://schemas.microsoft.com/office/drawing/2010/main" Requires="a14">
+      <mc:AlternateContent xmlns:mc="http://schemas.openxmlformats.org/markup-compatibility/2006" xmlns:a14="http://schemas.microsoft.com/office/drawing/2010/main">
+        <mc:Choice Requires="a14">
           <p:sp>
             <p:nvSpPr>
               <p:cNvPr id="86" name="Rectangle 85"/>
@@ -10443,6 +10454,7 @@
               </a:bodyPr>
               <a:lstStyle/>
               <a:p>
+                <a:pPr/>
                 <a14:m>
                   <m:oMathPara xmlns:m="http://schemas.openxmlformats.org/officeDocument/2006/math">
                     <m:oMathParaPr>
@@ -10452,7 +10464,7 @@
                       <m:sSub>
                         <m:sSubPr>
                           <m:ctrlPr>
-                            <a:rPr lang="ko-KR" altLang="en-US" b="1">
+                            <a:rPr lang="ko-KR" altLang="en-US" b="1" i="1">
                               <a:latin typeface="Cambria Math" panose="02040503050406030204" pitchFamily="18" charset="0"/>
                             </a:rPr>
                           </m:ctrlPr>
@@ -10482,7 +10494,7 @@
             </p:txBody>
           </p:sp>
         </mc:Choice>
-        <mc:Fallback>
+        <mc:Fallback xmlns="">
           <p:sp>
             <p:nvSpPr>
               <p:cNvPr id="86" name="Rectangle 85"/>
@@ -10500,7 +10512,7 @@
                 <a:avLst/>
               </a:prstGeom>
               <a:blipFill>
-                <a:blip r:embed="rId13"/>
+                <a:blip r:embed="rId17"/>
                 <a:stretch>
                   <a:fillRect b="-10769"/>
                 </a:stretch>
@@ -10521,8 +10533,8 @@
           </p:sp>
         </mc:Fallback>
       </mc:AlternateContent>
-      <mc:AlternateContent xmlns:mc="http://schemas.openxmlformats.org/markup-compatibility/2006">
-        <mc:Choice xmlns:a14="http://schemas.microsoft.com/office/drawing/2010/main" Requires="a14">
+      <mc:AlternateContent xmlns:mc="http://schemas.openxmlformats.org/markup-compatibility/2006" xmlns:a14="http://schemas.microsoft.com/office/drawing/2010/main">
+        <mc:Choice Requires="a14">
           <p:sp>
             <p:nvSpPr>
               <p:cNvPr id="87" name="Rectangle 86"/>
@@ -10544,6 +10556,7 @@
               </a:bodyPr>
               <a:lstStyle/>
               <a:p>
+                <a:pPr/>
                 <a14:m>
                   <m:oMathPara xmlns:m="http://schemas.openxmlformats.org/officeDocument/2006/math">
                     <m:oMathParaPr>
@@ -10553,7 +10566,7 @@
                       <m:sSub>
                         <m:sSubPr>
                           <m:ctrlPr>
-                            <a:rPr lang="ko-KR" altLang="en-US" b="1">
+                            <a:rPr lang="ko-KR" altLang="en-US" b="1" i="1">
                               <a:latin typeface="Cambria Math" panose="02040503050406030204" pitchFamily="18" charset="0"/>
                             </a:rPr>
                           </m:ctrlPr>
@@ -10583,7 +10596,7 @@
             </p:txBody>
           </p:sp>
         </mc:Choice>
-        <mc:Fallback>
+        <mc:Fallback xmlns="">
           <p:sp>
             <p:nvSpPr>
               <p:cNvPr id="87" name="Rectangle 86"/>
@@ -10601,7 +10614,7 @@
                 <a:avLst/>
               </a:prstGeom>
               <a:blipFill>
-                <a:blip r:embed="rId14"/>
+                <a:blip r:embed="rId18"/>
                 <a:stretch>
                   <a:fillRect b="-10769"/>
                 </a:stretch>
@@ -10698,8 +10711,8 @@
           </a:fontRef>
         </p:style>
       </p:cxnSp>
-      <mc:AlternateContent xmlns:mc="http://schemas.openxmlformats.org/markup-compatibility/2006">
-        <mc:Choice xmlns:a14="http://schemas.microsoft.com/office/drawing/2010/main" Requires="a14">
+      <mc:AlternateContent xmlns:mc="http://schemas.openxmlformats.org/markup-compatibility/2006" xmlns:a14="http://schemas.microsoft.com/office/drawing/2010/main">
+        <mc:Choice Requires="a14">
           <p:sp>
             <p:nvSpPr>
               <p:cNvPr id="99" name="Rectangle 98"/>
@@ -10733,14 +10746,7 @@
                     <a:latin typeface="맑은 고딕" panose="020B0503020000020004" pitchFamily="50" charset="-127"/>
                     <a:cs typeface="Times New Roman" panose="02020603050405020304" pitchFamily="18" charset="0"/>
                   </a:rPr>
-                  <a:t>3. </a:t>
-                </a:r>
-                <a:r>
-                  <a:rPr lang="en-US" altLang="ko-KR" b="1" dirty="0" smtClean="0">
-                    <a:latin typeface="맑은 고딕" panose="020B0503020000020004" pitchFamily="50" charset="-127"/>
-                    <a:cs typeface="Times New Roman" panose="02020603050405020304" pitchFamily="18" charset="0"/>
-                  </a:rPr>
-                  <a:t>Decision algorithm for </a:t>
+                  <a:t>3. Decision algorithm for </a:t>
                 </a:r>
                 <a14:m>
                   <m:oMath xmlns:m="http://schemas.openxmlformats.org/officeDocument/2006/math">
@@ -10813,7 +10819,7 @@
             </p:txBody>
           </p:sp>
         </mc:Choice>
-        <mc:Fallback>
+        <mc:Fallback xmlns="">
           <p:sp>
             <p:nvSpPr>
               <p:cNvPr id="99" name="Rectangle 98"/>
@@ -10831,9 +10837,146 @@
                 <a:avLst/>
               </a:prstGeom>
               <a:blipFill>
-                <a:blip r:embed="rId15"/>
+                <a:blip r:embed="rId19"/>
                 <a:stretch>
                   <a:fillRect l="-806" t="-10938" b="-17188"/>
+                </a:stretch>
+              </a:blipFill>
+            </p:spPr>
+            <p:txBody>
+              <a:bodyPr/>
+              <a:lstStyle/>
+              <a:p>
+                <a:r>
+                  <a:rPr lang="ko-KR" altLang="en-US">
+                    <a:noFill/>
+                  </a:rPr>
+                  <a:t> </a:t>
+                </a:r>
+              </a:p>
+            </p:txBody>
+          </p:sp>
+        </mc:Fallback>
+      </mc:AlternateContent>
+      <mc:AlternateContent xmlns:mc="http://schemas.openxmlformats.org/markup-compatibility/2006" xmlns:a14="http://schemas.microsoft.com/office/drawing/2010/main">
+        <mc:Choice Requires="a14">
+          <p:sp>
+            <p:nvSpPr>
+              <p:cNvPr id="4" name="Rectangle 3"/>
+              <p:cNvSpPr/>
+              <p:nvPr/>
+            </p:nvSpPr>
+            <p:spPr>
+              <a:xfrm>
+                <a:off x="8857676" y="3586260"/>
+                <a:ext cx="1471044" cy="369332"/>
+              </a:xfrm>
+              <a:prstGeom prst="rect">
+                <a:avLst/>
+              </a:prstGeom>
+            </p:spPr>
+            <p:txBody>
+              <a:bodyPr wrap="none">
+                <a:spAutoFit/>
+              </a:bodyPr>
+              <a:lstStyle/>
+              <a:p>
+                <a:pPr/>
+                <a14:m>
+                  <m:oMathPara xmlns:m="http://schemas.openxmlformats.org/officeDocument/2006/math">
+                    <m:oMathParaPr>
+                      <m:jc m:val="centerGroup"/>
+                    </m:oMathParaPr>
+                    <m:oMath xmlns:m="http://schemas.openxmlformats.org/officeDocument/2006/math">
+                      <m:r>
+                        <a:rPr lang="ko-KR" altLang="en-US" b="1" i="1">
+                          <a:latin typeface="Cambria Math" panose="02040503050406030204" pitchFamily="18" charset="0"/>
+                        </a:rPr>
+                        <m:t>𝑩𝑻</m:t>
+                      </m:r>
+                      <m:sSub>
+                        <m:sSubPr>
+                          <m:ctrlPr>
+                            <a:rPr lang="ko-KR" altLang="en-US" b="1" i="1">
+                              <a:latin typeface="Cambria Math" panose="02040503050406030204" pitchFamily="18" charset="0"/>
+                            </a:rPr>
+                          </m:ctrlPr>
+                        </m:sSubPr>
+                        <m:e>
+                          <m:r>
+                            <a:rPr lang="ko-KR" altLang="en-US" b="1" i="1">
+                              <a:latin typeface="Cambria Math" panose="02040503050406030204" pitchFamily="18" charset="0"/>
+                            </a:rPr>
+                            <m:t>𝑷</m:t>
+                          </m:r>
+                        </m:e>
+                        <m:sub>
+                          <m:r>
+                            <a:rPr lang="ko-KR" altLang="en-US" b="1" i="1">
+                              <a:latin typeface="Cambria Math" panose="02040503050406030204" pitchFamily="18" charset="0"/>
+                            </a:rPr>
+                            <m:t>𝒊</m:t>
+                          </m:r>
+                        </m:sub>
+                      </m:sSub>
+                      <m:d>
+                        <m:dPr>
+                          <m:ctrlPr>
+                            <a:rPr lang="ko-KR" altLang="en-US" b="1" i="1">
+                              <a:latin typeface="Cambria Math" panose="02040503050406030204" pitchFamily="18" charset="0"/>
+                            </a:rPr>
+                          </m:ctrlPr>
+                        </m:dPr>
+                        <m:e>
+                          <m:r>
+                            <a:rPr lang="ko-KR" altLang="en-US" b="1" i="1">
+                              <a:latin typeface="Cambria Math" panose="02040503050406030204" pitchFamily="18" charset="0"/>
+                            </a:rPr>
+                            <m:t>𝑵</m:t>
+                          </m:r>
+                          <m:r>
+                            <a:rPr lang="ko-KR" altLang="en-US" b="1" i="0">
+                              <a:latin typeface="Cambria Math" panose="02040503050406030204" pitchFamily="18" charset="0"/>
+                            </a:rPr>
+                            <m:t>, </m:t>
+                          </m:r>
+                          <m:r>
+                            <a:rPr lang="ko-KR" altLang="en-US" b="1" i="1">
+                              <a:latin typeface="Cambria Math" panose="02040503050406030204" pitchFamily="18" charset="0"/>
+                            </a:rPr>
+                            <m:t>𝑴</m:t>
+                          </m:r>
+                        </m:e>
+                      </m:d>
+                    </m:oMath>
+                  </m:oMathPara>
+                </a14:m>
+                <a:endParaRPr lang="ko-KR" altLang="en-US" b="1" dirty="0"/>
+              </a:p>
+            </p:txBody>
+          </p:sp>
+        </mc:Choice>
+        <mc:Fallback xmlns="">
+          <p:sp>
+            <p:nvSpPr>
+              <p:cNvPr id="4" name="Rectangle 3"/>
+              <p:cNvSpPr>
+                <a:spLocks noRot="1" noChangeAspect="1" noMove="1" noResize="1" noEditPoints="1" noAdjustHandles="1" noChangeArrowheads="1" noChangeShapeType="1" noTextEdit="1"/>
+              </p:cNvSpPr>
+              <p:nvPr/>
+            </p:nvSpPr>
+            <p:spPr>
+              <a:xfrm>
+                <a:off x="8857676" y="3586260"/>
+                <a:ext cx="1471044" cy="369332"/>
+              </a:xfrm>
+              <a:prstGeom prst="rect">
+                <a:avLst/>
+              </a:prstGeom>
+              <a:blipFill>
+                <a:blip r:embed="rId20"/>
+                <a:stretch>
+                  <a:fillRect b="-3279"/>
                 </a:stretch>
               </a:blipFill>
             </p:spPr>
@@ -10856,6 +10999,1112 @@
     <p:extLst>
       <p:ext uri="{BB962C8B-B14F-4D97-AF65-F5344CB8AC3E}">
         <p14:creationId xmlns:p14="http://schemas.microsoft.com/office/powerpoint/2010/main" val="367557477"/>
+      </p:ext>
+    </p:extLst>
+  </p:cSld>
+  <p:clrMapOvr>
+    <a:masterClrMapping/>
+  </p:clrMapOvr>
+</p:sld>
+</file>
+
+<file path=ppt/slides/slide6.xml><?xml version="1.0" encoding="utf-8"?>
+<p:sld xmlns:a="http://schemas.openxmlformats.org/drawingml/2006/main" xmlns:r="http://schemas.openxmlformats.org/officeDocument/2006/relationships" xmlns:p="http://schemas.openxmlformats.org/presentationml/2006/main">
+  <p:cSld>
+    <p:spTree>
+      <p:nvGrpSpPr>
+        <p:cNvPr id="1" name=""/>
+        <p:cNvGrpSpPr/>
+        <p:nvPr/>
+      </p:nvGrpSpPr>
+      <p:grpSpPr>
+        <a:xfrm>
+          <a:off x="0" y="0"/>
+          <a:ext cx="0" cy="0"/>
+          <a:chOff x="0" y="0"/>
+          <a:chExt cx="0" cy="0"/>
+        </a:xfrm>
+      </p:grpSpPr>
+      <p:sp>
+        <p:nvSpPr>
+          <p:cNvPr id="4" name="Rounded Rectangle 3"/>
+          <p:cNvSpPr/>
+          <p:nvPr/>
+        </p:nvSpPr>
+        <p:spPr>
+          <a:xfrm>
+            <a:off x="3716081" y="87626"/>
+            <a:ext cx="1435396" cy="457200"/>
+          </a:xfrm>
+          <a:prstGeom prst="roundRect">
+            <a:avLst>
+              <a:gd name="adj" fmla="val 50000"/>
+            </a:avLst>
+          </a:prstGeom>
+          <a:solidFill>
+            <a:schemeClr val="bg1">
+              <a:lumMod val="75000"/>
+            </a:schemeClr>
+          </a:solidFill>
+          <a:ln>
+            <a:solidFill>
+              <a:schemeClr val="tx1"/>
+            </a:solidFill>
+          </a:ln>
+        </p:spPr>
+        <p:style>
+          <a:lnRef idx="2">
+            <a:schemeClr val="accent1">
+              <a:shade val="50000"/>
+            </a:schemeClr>
+          </a:lnRef>
+          <a:fillRef idx="1">
+            <a:schemeClr val="accent1"/>
+          </a:fillRef>
+          <a:effectRef idx="0">
+            <a:schemeClr val="accent1"/>
+          </a:effectRef>
+          <a:fontRef idx="minor">
+            <a:schemeClr val="lt1"/>
+          </a:fontRef>
+        </p:style>
+        <p:txBody>
+          <a:bodyPr rtlCol="0" anchor="ctr"/>
+          <a:lstStyle/>
+          <a:p>
+            <a:pPr algn="ctr"/>
+            <a:r>
+              <a:rPr lang="en-US" altLang="ko-KR" dirty="0" smtClean="0">
+                <a:solidFill>
+                  <a:schemeClr val="tx1"/>
+                </a:solidFill>
+              </a:rPr>
+              <a:t>START</a:t>
+            </a:r>
+            <a:endParaRPr lang="ko-KR" altLang="en-US" dirty="0">
+              <a:solidFill>
+                <a:schemeClr val="tx1"/>
+              </a:solidFill>
+            </a:endParaRPr>
+          </a:p>
+        </p:txBody>
+      </p:sp>
+      <p:sp>
+        <p:nvSpPr>
+          <p:cNvPr id="5" name="Rectangle 4"/>
+          <p:cNvSpPr/>
+          <p:nvPr/>
+        </p:nvSpPr>
+        <p:spPr>
+          <a:xfrm>
+            <a:off x="2894717" y="927598"/>
+            <a:ext cx="3078124" cy="765544"/>
+          </a:xfrm>
+          <a:prstGeom prst="rect">
+            <a:avLst/>
+          </a:prstGeom>
+          <a:solidFill>
+            <a:schemeClr val="bg1">
+              <a:lumMod val="95000"/>
+            </a:schemeClr>
+          </a:solidFill>
+          <a:ln>
+            <a:solidFill>
+              <a:schemeClr val="tx1"/>
+            </a:solidFill>
+          </a:ln>
+        </p:spPr>
+        <p:style>
+          <a:lnRef idx="2">
+            <a:schemeClr val="accent1">
+              <a:shade val="50000"/>
+            </a:schemeClr>
+          </a:lnRef>
+          <a:fillRef idx="1">
+            <a:schemeClr val="accent1"/>
+          </a:fillRef>
+          <a:effectRef idx="0">
+            <a:schemeClr val="accent1"/>
+          </a:effectRef>
+          <a:fontRef idx="minor">
+            <a:schemeClr val="lt1"/>
+          </a:fontRef>
+        </p:style>
+        <p:txBody>
+          <a:bodyPr rtlCol="0" anchor="ctr"/>
+          <a:lstStyle/>
+          <a:p>
+            <a:pPr algn="ctr"/>
+            <a:r>
+              <a:rPr lang="en-US" altLang="ko-KR" b="1" dirty="0" smtClean="0">
+                <a:solidFill>
+                  <a:schemeClr val="tx1"/>
+                </a:solidFill>
+              </a:rPr>
+              <a:t>1. </a:t>
+            </a:r>
+            <a:r>
+              <a:rPr lang="en-US" altLang="ko-KR" dirty="0" smtClean="0">
+                <a:solidFill>
+                  <a:schemeClr val="tx1"/>
+                </a:solidFill>
+              </a:rPr>
+              <a:t>Input Test Input Data into deep learning model</a:t>
+            </a:r>
+            <a:endParaRPr lang="ko-KR" altLang="en-US" dirty="0">
+              <a:solidFill>
+                <a:schemeClr val="tx1"/>
+              </a:solidFill>
+            </a:endParaRPr>
+          </a:p>
+        </p:txBody>
+      </p:sp>
+      <p:sp>
+        <p:nvSpPr>
+          <p:cNvPr id="6" name="Rectangle 5"/>
+          <p:cNvSpPr/>
+          <p:nvPr/>
+        </p:nvSpPr>
+        <p:spPr>
+          <a:xfrm>
+            <a:off x="2812314" y="2363695"/>
+            <a:ext cx="3242930" cy="765544"/>
+          </a:xfrm>
+          <a:prstGeom prst="rect">
+            <a:avLst/>
+          </a:prstGeom>
+          <a:solidFill>
+            <a:schemeClr val="bg1">
+              <a:lumMod val="95000"/>
+            </a:schemeClr>
+          </a:solidFill>
+          <a:ln>
+            <a:solidFill>
+              <a:schemeClr val="tx1"/>
+            </a:solidFill>
+          </a:ln>
+        </p:spPr>
+        <p:style>
+          <a:lnRef idx="2">
+            <a:schemeClr val="accent1">
+              <a:shade val="50000"/>
+            </a:schemeClr>
+          </a:lnRef>
+          <a:fillRef idx="1">
+            <a:schemeClr val="accent1"/>
+          </a:fillRef>
+          <a:effectRef idx="0">
+            <a:schemeClr val="accent1"/>
+          </a:effectRef>
+          <a:fontRef idx="minor">
+            <a:schemeClr val="lt1"/>
+          </a:fontRef>
+        </p:style>
+        <p:txBody>
+          <a:bodyPr rtlCol="0" anchor="ctr"/>
+          <a:lstStyle/>
+          <a:p>
+            <a:pPr algn="ctr"/>
+            <a:r>
+              <a:rPr lang="en-US" altLang="ko-KR" b="1" dirty="0" smtClean="0">
+                <a:solidFill>
+                  <a:schemeClr val="tx1"/>
+                </a:solidFill>
+              </a:rPr>
+              <a:t>2-1. </a:t>
+            </a:r>
+            <a:r>
+              <a:rPr lang="en-US" altLang="ko-KR" dirty="0" smtClean="0">
+                <a:solidFill>
+                  <a:schemeClr val="tx1"/>
+                </a:solidFill>
+              </a:rPr>
+              <a:t>Get throughput map as output of model</a:t>
+            </a:r>
+            <a:r>
+              <a:rPr lang="en-US" altLang="ko-KR" sz="1200" b="1" dirty="0" smtClean="0">
+                <a:solidFill>
+                  <a:srgbClr val="FF0000"/>
+                </a:solidFill>
+              </a:rPr>
+              <a:t>1</a:t>
+            </a:r>
+            <a:endParaRPr lang="ko-KR" altLang="en-US" sz="1200" b="1" dirty="0">
+              <a:solidFill>
+                <a:srgbClr val="FF0000"/>
+              </a:solidFill>
+            </a:endParaRPr>
+          </a:p>
+        </p:txBody>
+      </p:sp>
+      <p:sp>
+        <p:nvSpPr>
+          <p:cNvPr id="7" name="Rectangle 6"/>
+          <p:cNvSpPr/>
+          <p:nvPr/>
+        </p:nvSpPr>
+        <p:spPr>
+          <a:xfrm>
+            <a:off x="2812314" y="3639878"/>
+            <a:ext cx="3242930" cy="765544"/>
+          </a:xfrm>
+          <a:prstGeom prst="rect">
+            <a:avLst/>
+          </a:prstGeom>
+          <a:solidFill>
+            <a:schemeClr val="bg1">
+              <a:lumMod val="95000"/>
+            </a:schemeClr>
+          </a:solidFill>
+          <a:ln>
+            <a:solidFill>
+              <a:schemeClr val="tx1"/>
+            </a:solidFill>
+          </a:ln>
+        </p:spPr>
+        <p:style>
+          <a:lnRef idx="2">
+            <a:schemeClr val="accent1">
+              <a:shade val="50000"/>
+            </a:schemeClr>
+          </a:lnRef>
+          <a:fillRef idx="1">
+            <a:schemeClr val="accent1"/>
+          </a:fillRef>
+          <a:effectRef idx="0">
+            <a:schemeClr val="accent1"/>
+          </a:effectRef>
+          <a:fontRef idx="minor">
+            <a:schemeClr val="lt1"/>
+          </a:fontRef>
+        </p:style>
+        <p:txBody>
+          <a:bodyPr rtlCol="0" anchor="ctr"/>
+          <a:lstStyle/>
+          <a:p>
+            <a:pPr algn="ctr"/>
+            <a:r>
+              <a:rPr lang="en-US" altLang="ko-KR" b="1" dirty="0" smtClean="0">
+                <a:solidFill>
+                  <a:schemeClr val="tx1"/>
+                </a:solidFill>
+              </a:rPr>
+              <a:t>2-2</a:t>
+            </a:r>
+            <a:r>
+              <a:rPr lang="en-US" altLang="ko-KR" b="1" dirty="0" smtClean="0">
+                <a:solidFill>
+                  <a:schemeClr val="tx1"/>
+                </a:solidFill>
+              </a:rPr>
+              <a:t>. </a:t>
+            </a:r>
+            <a:r>
+              <a:rPr lang="en-US" altLang="ko-KR" dirty="0" smtClean="0">
+                <a:solidFill>
+                  <a:schemeClr val="tx1"/>
+                </a:solidFill>
+              </a:rPr>
+              <a:t>Find optimal point from the throughput map</a:t>
+            </a:r>
+            <a:r>
+              <a:rPr lang="en-US" altLang="ko-KR" sz="1200" b="1" dirty="0" smtClean="0">
+                <a:solidFill>
+                  <a:srgbClr val="FF0000"/>
+                </a:solidFill>
+              </a:rPr>
+              <a:t>2-1</a:t>
+            </a:r>
+            <a:endParaRPr lang="ko-KR" altLang="en-US" sz="1200" b="1" dirty="0">
+              <a:solidFill>
+                <a:srgbClr val="FF0000"/>
+              </a:solidFill>
+            </a:endParaRPr>
+          </a:p>
+        </p:txBody>
+      </p:sp>
+      <p:sp>
+        <p:nvSpPr>
+          <p:cNvPr id="8" name="Rectangle 7"/>
+          <p:cNvSpPr/>
+          <p:nvPr/>
+        </p:nvSpPr>
+        <p:spPr>
+          <a:xfrm>
+            <a:off x="6820124" y="2275962"/>
+            <a:ext cx="4195871" cy="765544"/>
+          </a:xfrm>
+          <a:prstGeom prst="rect">
+            <a:avLst/>
+          </a:prstGeom>
+          <a:solidFill>
+            <a:schemeClr val="bg1">
+              <a:lumMod val="95000"/>
+            </a:schemeClr>
+          </a:solidFill>
+          <a:ln>
+            <a:solidFill>
+              <a:schemeClr val="tx1"/>
+            </a:solidFill>
+          </a:ln>
+        </p:spPr>
+        <p:style>
+          <a:lnRef idx="2">
+            <a:schemeClr val="accent1">
+              <a:shade val="50000"/>
+            </a:schemeClr>
+          </a:lnRef>
+          <a:fillRef idx="1">
+            <a:schemeClr val="accent1"/>
+          </a:fillRef>
+          <a:effectRef idx="0">
+            <a:schemeClr val="accent1"/>
+          </a:effectRef>
+          <a:fontRef idx="minor">
+            <a:schemeClr val="lt1"/>
+          </a:fontRef>
+        </p:style>
+        <p:txBody>
+          <a:bodyPr rtlCol="0" anchor="ctr"/>
+          <a:lstStyle/>
+          <a:p>
+            <a:pPr algn="ctr"/>
+            <a:r>
+              <a:rPr lang="en-US" altLang="ko-KR" b="1" dirty="0" smtClean="0">
+                <a:solidFill>
+                  <a:schemeClr val="tx1"/>
+                </a:solidFill>
+              </a:rPr>
+              <a:t>2-3</a:t>
+            </a:r>
+            <a:r>
+              <a:rPr lang="en-US" altLang="ko-KR" b="1" dirty="0" smtClean="0">
+                <a:solidFill>
+                  <a:schemeClr val="tx1"/>
+                </a:solidFill>
+              </a:rPr>
+              <a:t>. </a:t>
+            </a:r>
+            <a:r>
+              <a:rPr lang="en-US" altLang="ko-KR" dirty="0" smtClean="0">
+                <a:solidFill>
+                  <a:schemeClr val="tx1"/>
+                </a:solidFill>
+              </a:rPr>
+              <a:t>Compute</a:t>
+            </a:r>
+            <a:r>
+              <a:rPr lang="en-US" altLang="ko-KR" dirty="0" smtClean="0">
+                <a:solidFill>
+                  <a:schemeClr val="tx1"/>
+                </a:solidFill>
+              </a:rPr>
+              <a:t> throughput for this optimal point</a:t>
+            </a:r>
+            <a:r>
+              <a:rPr lang="en-US" altLang="ko-KR" sz="1200" b="1" dirty="0" smtClean="0">
+                <a:solidFill>
+                  <a:srgbClr val="FF0000"/>
+                </a:solidFill>
+              </a:rPr>
+              <a:t>2-2</a:t>
+            </a:r>
+            <a:endParaRPr lang="ko-KR" altLang="en-US" sz="1200" b="1" dirty="0">
+              <a:solidFill>
+                <a:srgbClr val="FF0000"/>
+              </a:solidFill>
+            </a:endParaRPr>
+          </a:p>
+        </p:txBody>
+      </p:sp>
+      <p:cxnSp>
+        <p:nvCxnSpPr>
+          <p:cNvPr id="17" name="Straight Arrow Connector 16"/>
+          <p:cNvCxnSpPr>
+            <a:stCxn id="4" idx="2"/>
+            <a:endCxn id="5" idx="0"/>
+          </p:cNvCxnSpPr>
+          <p:nvPr/>
+        </p:nvCxnSpPr>
+        <p:spPr>
+          <a:xfrm>
+            <a:off x="4433779" y="544826"/>
+            <a:ext cx="0" cy="382772"/>
+          </a:xfrm>
+          <a:prstGeom prst="straightConnector1">
+            <a:avLst/>
+          </a:prstGeom>
+          <a:ln w="38100">
+            <a:solidFill>
+              <a:schemeClr val="tx1"/>
+            </a:solidFill>
+            <a:tailEnd type="triangle" w="lg" len="lg"/>
+          </a:ln>
+        </p:spPr>
+        <p:style>
+          <a:lnRef idx="1">
+            <a:schemeClr val="accent1"/>
+          </a:lnRef>
+          <a:fillRef idx="0">
+            <a:schemeClr val="accent1"/>
+          </a:fillRef>
+          <a:effectRef idx="0">
+            <a:schemeClr val="accent1"/>
+          </a:effectRef>
+          <a:fontRef idx="minor">
+            <a:schemeClr val="tx1"/>
+          </a:fontRef>
+        </p:style>
+      </p:cxnSp>
+      <p:cxnSp>
+        <p:nvCxnSpPr>
+          <p:cNvPr id="18" name="Straight Arrow Connector 17"/>
+          <p:cNvCxnSpPr>
+            <a:stCxn id="5" idx="2"/>
+            <a:endCxn id="6" idx="0"/>
+          </p:cNvCxnSpPr>
+          <p:nvPr/>
+        </p:nvCxnSpPr>
+        <p:spPr>
+          <a:xfrm>
+            <a:off x="4433779" y="1693142"/>
+            <a:ext cx="0" cy="670553"/>
+          </a:xfrm>
+          <a:prstGeom prst="straightConnector1">
+            <a:avLst/>
+          </a:prstGeom>
+          <a:ln w="38100">
+            <a:solidFill>
+              <a:schemeClr val="tx1"/>
+            </a:solidFill>
+            <a:tailEnd type="triangle" w="lg" len="lg"/>
+          </a:ln>
+        </p:spPr>
+        <p:style>
+          <a:lnRef idx="1">
+            <a:schemeClr val="accent1"/>
+          </a:lnRef>
+          <a:fillRef idx="0">
+            <a:schemeClr val="accent1"/>
+          </a:fillRef>
+          <a:effectRef idx="0">
+            <a:schemeClr val="accent1"/>
+          </a:effectRef>
+          <a:fontRef idx="minor">
+            <a:schemeClr val="tx1"/>
+          </a:fontRef>
+        </p:style>
+      </p:cxnSp>
+      <p:cxnSp>
+        <p:nvCxnSpPr>
+          <p:cNvPr id="19" name="Straight Arrow Connector 18"/>
+          <p:cNvCxnSpPr>
+            <a:stCxn id="6" idx="2"/>
+            <a:endCxn id="7" idx="0"/>
+          </p:cNvCxnSpPr>
+          <p:nvPr/>
+        </p:nvCxnSpPr>
+        <p:spPr>
+          <a:xfrm>
+            <a:off x="4433779" y="3129239"/>
+            <a:ext cx="0" cy="510639"/>
+          </a:xfrm>
+          <a:prstGeom prst="straightConnector1">
+            <a:avLst/>
+          </a:prstGeom>
+          <a:ln w="38100">
+            <a:solidFill>
+              <a:schemeClr val="tx1"/>
+            </a:solidFill>
+            <a:tailEnd type="triangle" w="lg" len="lg"/>
+          </a:ln>
+        </p:spPr>
+        <p:style>
+          <a:lnRef idx="1">
+            <a:schemeClr val="accent1"/>
+          </a:lnRef>
+          <a:fillRef idx="0">
+            <a:schemeClr val="accent1"/>
+          </a:fillRef>
+          <a:effectRef idx="0">
+            <a:schemeClr val="accent1"/>
+          </a:effectRef>
+          <a:fontRef idx="minor">
+            <a:schemeClr val="tx1"/>
+          </a:fontRef>
+        </p:style>
+      </p:cxnSp>
+      <p:sp>
+        <p:nvSpPr>
+          <p:cNvPr id="34" name="Rectangle 33"/>
+          <p:cNvSpPr/>
+          <p:nvPr/>
+        </p:nvSpPr>
+        <p:spPr>
+          <a:xfrm>
+            <a:off x="3408897" y="5755144"/>
+            <a:ext cx="4652684" cy="369332"/>
+          </a:xfrm>
+          <a:prstGeom prst="rect">
+            <a:avLst/>
+          </a:prstGeom>
+        </p:spPr>
+        <p:txBody>
+          <a:bodyPr wrap="none">
+            <a:spAutoFit/>
+          </a:bodyPr>
+          <a:lstStyle/>
+          <a:p>
+            <a:r>
+              <a:rPr lang="en-US" altLang="ko-KR" b="1" dirty="0">
+                <a:latin typeface="맑은 고딕" panose="020B0503020000020004" pitchFamily="50" charset="-127"/>
+                <a:cs typeface="Times New Roman" panose="02020603050405020304" pitchFamily="18" charset="0"/>
+              </a:rPr>
+              <a:t>Figure </a:t>
+            </a:r>
+            <a:r>
+              <a:rPr lang="en-US" altLang="ko-KR" b="1" dirty="0" smtClean="0">
+                <a:latin typeface="맑은 고딕" panose="020B0503020000020004" pitchFamily="50" charset="-127"/>
+                <a:cs typeface="Times New Roman" panose="02020603050405020304" pitchFamily="18" charset="0"/>
+              </a:rPr>
+              <a:t>4. </a:t>
+            </a:r>
+            <a:r>
+              <a:rPr lang="en-US" altLang="ko-KR" b="1" dirty="0">
+                <a:latin typeface="맑은 고딕" panose="020B0503020000020004" pitchFamily="50" charset="-127"/>
+                <a:cs typeface="Times New Roman" panose="02020603050405020304" pitchFamily="18" charset="0"/>
+              </a:rPr>
+              <a:t>Flow chart of </a:t>
+            </a:r>
+            <a:r>
+              <a:rPr lang="en-US" altLang="ko-KR" b="1" dirty="0" smtClean="0">
+                <a:latin typeface="맑은 고딕" panose="020B0503020000020004" pitchFamily="50" charset="-127"/>
+                <a:cs typeface="Times New Roman" panose="02020603050405020304" pitchFamily="18" charset="0"/>
+              </a:rPr>
+              <a:t>design of testing</a:t>
+            </a:r>
+            <a:endParaRPr lang="ko-KR" altLang="en-US" dirty="0"/>
+          </a:p>
+        </p:txBody>
+      </p:sp>
+      <p:sp>
+        <p:nvSpPr>
+          <p:cNvPr id="49" name="Rectangle 48"/>
+          <p:cNvSpPr/>
+          <p:nvPr/>
+        </p:nvSpPr>
+        <p:spPr>
+          <a:xfrm>
+            <a:off x="6820124" y="3639878"/>
+            <a:ext cx="4195871" cy="1209347"/>
+          </a:xfrm>
+          <a:prstGeom prst="rect">
+            <a:avLst/>
+          </a:prstGeom>
+          <a:solidFill>
+            <a:schemeClr val="bg1">
+              <a:lumMod val="95000"/>
+            </a:schemeClr>
+          </a:solidFill>
+          <a:ln>
+            <a:solidFill>
+              <a:schemeClr val="tx1"/>
+            </a:solidFill>
+          </a:ln>
+        </p:spPr>
+        <p:style>
+          <a:lnRef idx="2">
+            <a:schemeClr val="accent1">
+              <a:shade val="50000"/>
+            </a:schemeClr>
+          </a:lnRef>
+          <a:fillRef idx="1">
+            <a:schemeClr val="accent1"/>
+          </a:fillRef>
+          <a:effectRef idx="0">
+            <a:schemeClr val="accent1"/>
+          </a:effectRef>
+          <a:fontRef idx="minor">
+            <a:schemeClr val="lt1"/>
+          </a:fontRef>
+        </p:style>
+        <p:txBody>
+          <a:bodyPr rtlCol="0" anchor="ctr"/>
+          <a:lstStyle/>
+          <a:p>
+            <a:pPr algn="ctr"/>
+            <a:r>
+              <a:rPr lang="en-US" altLang="ko-KR" b="1" dirty="0" smtClean="0">
+                <a:solidFill>
+                  <a:schemeClr val="tx1"/>
+                </a:solidFill>
+              </a:rPr>
+              <a:t>2-4</a:t>
+            </a:r>
+            <a:r>
+              <a:rPr lang="en-US" altLang="ko-KR" b="1" dirty="0" smtClean="0">
+                <a:solidFill>
+                  <a:schemeClr val="tx1"/>
+                </a:solidFill>
+              </a:rPr>
+              <a:t>. </a:t>
+            </a:r>
+            <a:r>
+              <a:rPr lang="en-US" altLang="ko-KR" dirty="0" smtClean="0">
+                <a:solidFill>
+                  <a:schemeClr val="tx1"/>
+                </a:solidFill>
+              </a:rPr>
+              <a:t>Compare the throughput</a:t>
+            </a:r>
+            <a:r>
+              <a:rPr lang="en-US" altLang="ko-KR" sz="1200" b="1" dirty="0" smtClean="0">
+                <a:solidFill>
+                  <a:srgbClr val="FF0000"/>
+                </a:solidFill>
+              </a:rPr>
+              <a:t>2-3</a:t>
+            </a:r>
+            <a:r>
+              <a:rPr lang="en-US" altLang="ko-KR" dirty="0" smtClean="0">
+                <a:solidFill>
+                  <a:schemeClr val="tx1"/>
+                </a:solidFill>
+              </a:rPr>
+              <a:t> with </a:t>
+            </a:r>
+            <a:r>
+              <a:rPr lang="en-US" altLang="ko-KR" dirty="0">
+                <a:solidFill>
+                  <a:schemeClr val="tx1"/>
+                </a:solidFill>
+              </a:rPr>
+              <a:t>sum of best throughput of </a:t>
+            </a:r>
+            <a:r>
+              <a:rPr lang="en-US" altLang="ko-KR" dirty="0" smtClean="0">
+                <a:solidFill>
+                  <a:schemeClr val="tx1"/>
+                </a:solidFill>
+              </a:rPr>
+              <a:t>throughput map about test input</a:t>
+            </a:r>
+            <a:endParaRPr lang="ko-KR" altLang="en-US" sz="1200" b="1" dirty="0">
+              <a:solidFill>
+                <a:srgbClr val="FF0000"/>
+              </a:solidFill>
+            </a:endParaRPr>
+          </a:p>
+        </p:txBody>
+      </p:sp>
+      <p:cxnSp>
+        <p:nvCxnSpPr>
+          <p:cNvPr id="50" name="Elbow Connector 49"/>
+          <p:cNvCxnSpPr>
+            <a:stCxn id="7" idx="3"/>
+            <a:endCxn id="8" idx="1"/>
+          </p:cNvCxnSpPr>
+          <p:nvPr/>
+        </p:nvCxnSpPr>
+        <p:spPr>
+          <a:xfrm flipV="1">
+            <a:off x="6055244" y="2658734"/>
+            <a:ext cx="764880" cy="1363916"/>
+          </a:xfrm>
+          <a:prstGeom prst="bentConnector3">
+            <a:avLst>
+              <a:gd name="adj1" fmla="val 50000"/>
+            </a:avLst>
+          </a:prstGeom>
+          <a:ln w="38100">
+            <a:solidFill>
+              <a:schemeClr val="tx1"/>
+            </a:solidFill>
+            <a:tailEnd type="triangle" w="lg" len="lg"/>
+          </a:ln>
+        </p:spPr>
+        <p:style>
+          <a:lnRef idx="1">
+            <a:schemeClr val="accent1"/>
+          </a:lnRef>
+          <a:fillRef idx="0">
+            <a:schemeClr val="accent1"/>
+          </a:fillRef>
+          <a:effectRef idx="0">
+            <a:schemeClr val="accent1"/>
+          </a:effectRef>
+          <a:fontRef idx="minor">
+            <a:schemeClr val="tx1"/>
+          </a:fontRef>
+        </p:style>
+      </p:cxnSp>
+      <p:cxnSp>
+        <p:nvCxnSpPr>
+          <p:cNvPr id="54" name="Straight Arrow Connector 53"/>
+          <p:cNvCxnSpPr>
+            <a:stCxn id="8" idx="2"/>
+            <a:endCxn id="49" idx="0"/>
+          </p:cNvCxnSpPr>
+          <p:nvPr/>
+        </p:nvCxnSpPr>
+        <p:spPr>
+          <a:xfrm>
+            <a:off x="8918060" y="3041506"/>
+            <a:ext cx="0" cy="598372"/>
+          </a:xfrm>
+          <a:prstGeom prst="straightConnector1">
+            <a:avLst/>
+          </a:prstGeom>
+          <a:ln w="38100">
+            <a:solidFill>
+              <a:schemeClr val="tx1"/>
+            </a:solidFill>
+            <a:tailEnd type="triangle" w="lg" len="lg"/>
+          </a:ln>
+        </p:spPr>
+        <p:style>
+          <a:lnRef idx="1">
+            <a:schemeClr val="accent1"/>
+          </a:lnRef>
+          <a:fillRef idx="0">
+            <a:schemeClr val="accent1"/>
+          </a:fillRef>
+          <a:effectRef idx="0">
+            <a:schemeClr val="accent1"/>
+          </a:effectRef>
+          <a:fontRef idx="minor">
+            <a:schemeClr val="tx1"/>
+          </a:fontRef>
+        </p:style>
+      </p:cxnSp>
+      <p:cxnSp>
+        <p:nvCxnSpPr>
+          <p:cNvPr id="58" name="Elbow Connector 57"/>
+          <p:cNvCxnSpPr>
+            <a:stCxn id="49" idx="3"/>
+          </p:cNvCxnSpPr>
+          <p:nvPr/>
+        </p:nvCxnSpPr>
+        <p:spPr>
+          <a:xfrm flipH="1" flipV="1">
+            <a:off x="4433779" y="1999698"/>
+            <a:ext cx="6582216" cy="2244854"/>
+          </a:xfrm>
+          <a:prstGeom prst="bentConnector3">
+            <a:avLst>
+              <a:gd name="adj1" fmla="val -3473"/>
+            </a:avLst>
+          </a:prstGeom>
+          <a:ln w="38100">
+            <a:solidFill>
+              <a:schemeClr val="tx1"/>
+            </a:solidFill>
+            <a:tailEnd type="triangle" w="lg" len="lg"/>
+          </a:ln>
+        </p:spPr>
+        <p:style>
+          <a:lnRef idx="1">
+            <a:schemeClr val="accent1"/>
+          </a:lnRef>
+          <a:fillRef idx="0">
+            <a:schemeClr val="accent1"/>
+          </a:fillRef>
+          <a:effectRef idx="0">
+            <a:schemeClr val="accent1"/>
+          </a:effectRef>
+          <a:fontRef idx="minor">
+            <a:schemeClr val="tx1"/>
+          </a:fontRef>
+        </p:style>
+      </p:cxnSp>
+      <p:sp>
+        <p:nvSpPr>
+          <p:cNvPr id="71" name="Rectangle 70"/>
+          <p:cNvSpPr/>
+          <p:nvPr/>
+        </p:nvSpPr>
+        <p:spPr>
+          <a:xfrm>
+            <a:off x="6421412" y="1630366"/>
+            <a:ext cx="2180982" cy="369332"/>
+          </a:xfrm>
+          <a:prstGeom prst="rect">
+            <a:avLst/>
+          </a:prstGeom>
+        </p:spPr>
+        <p:txBody>
+          <a:bodyPr wrap="none">
+            <a:spAutoFit/>
+          </a:bodyPr>
+          <a:lstStyle/>
+          <a:p>
+            <a:r>
+              <a:rPr lang="en-US" altLang="ko-KR" b="1" dirty="0" smtClean="0">
+                <a:latin typeface="맑은 고딕" panose="020B0503020000020004" pitchFamily="50" charset="-127"/>
+                <a:cs typeface="Times New Roman" panose="02020603050405020304" pitchFamily="18" charset="0"/>
+              </a:rPr>
+              <a:t>For each test data</a:t>
+            </a:r>
+            <a:endParaRPr lang="ko-KR" altLang="en-US" b="1" dirty="0"/>
+          </a:p>
+        </p:txBody>
+      </p:sp>
+      <p:sp>
+        <p:nvSpPr>
+          <p:cNvPr id="72" name="Rectangle 71"/>
+          <p:cNvSpPr/>
+          <p:nvPr/>
+        </p:nvSpPr>
+        <p:spPr>
+          <a:xfrm>
+            <a:off x="2338835" y="4651426"/>
+            <a:ext cx="4098849" cy="1042380"/>
+          </a:xfrm>
+          <a:prstGeom prst="rect">
+            <a:avLst/>
+          </a:prstGeom>
+          <a:solidFill>
+            <a:schemeClr val="bg1">
+              <a:lumMod val="95000"/>
+            </a:schemeClr>
+          </a:solidFill>
+          <a:ln>
+            <a:solidFill>
+              <a:schemeClr val="tx1"/>
+            </a:solidFill>
+          </a:ln>
+        </p:spPr>
+        <p:style>
+          <a:lnRef idx="2">
+            <a:schemeClr val="accent1">
+              <a:shade val="50000"/>
+            </a:schemeClr>
+          </a:lnRef>
+          <a:fillRef idx="1">
+            <a:schemeClr val="accent1"/>
+          </a:fillRef>
+          <a:effectRef idx="0">
+            <a:schemeClr val="accent1"/>
+          </a:effectRef>
+          <a:fontRef idx="minor">
+            <a:schemeClr val="lt1"/>
+          </a:fontRef>
+        </p:style>
+        <p:txBody>
+          <a:bodyPr rtlCol="0" anchor="ctr"/>
+          <a:lstStyle/>
+          <a:p>
+            <a:pPr algn="ctr"/>
+            <a:r>
+              <a:rPr lang="en-US" altLang="ko-KR" b="1" dirty="0" smtClean="0">
+                <a:solidFill>
+                  <a:schemeClr val="tx1"/>
+                </a:solidFill>
+              </a:rPr>
+              <a:t>3</a:t>
+            </a:r>
+            <a:r>
+              <a:rPr lang="en-US" altLang="ko-KR" b="1" dirty="0" smtClean="0">
+                <a:solidFill>
+                  <a:schemeClr val="tx1"/>
+                </a:solidFill>
+              </a:rPr>
+              <a:t>. </a:t>
+            </a:r>
+            <a:r>
+              <a:rPr lang="en-US" altLang="ko-KR" dirty="0" smtClean="0">
+                <a:solidFill>
+                  <a:schemeClr val="tx1"/>
+                </a:solidFill>
+              </a:rPr>
+              <a:t>Compare the </a:t>
+            </a:r>
+            <a:r>
+              <a:rPr lang="en-US" altLang="ko-KR" b="1" dirty="0" smtClean="0">
+                <a:solidFill>
+                  <a:schemeClr val="tx1"/>
+                </a:solidFill>
+              </a:rPr>
+              <a:t>sum of </a:t>
+            </a:r>
+            <a:r>
+              <a:rPr lang="en-US" altLang="ko-KR" dirty="0" smtClean="0">
+                <a:solidFill>
+                  <a:schemeClr val="tx1"/>
+                </a:solidFill>
+              </a:rPr>
+              <a:t>throughput with </a:t>
+            </a:r>
+            <a:r>
+              <a:rPr lang="en-US" altLang="ko-KR" b="1" dirty="0" smtClean="0">
+                <a:solidFill>
+                  <a:schemeClr val="tx1"/>
+                </a:solidFill>
+              </a:rPr>
+              <a:t>sum of </a:t>
+            </a:r>
+            <a:r>
+              <a:rPr lang="en-US" altLang="ko-KR" dirty="0" smtClean="0">
+                <a:solidFill>
+                  <a:schemeClr val="tx1"/>
+                </a:solidFill>
+              </a:rPr>
+              <a:t>best throughput of throughput map about test input</a:t>
+            </a:r>
+            <a:endParaRPr lang="ko-KR" altLang="en-US" sz="1200" b="1" dirty="0">
+              <a:solidFill>
+                <a:srgbClr val="FF0000"/>
+              </a:solidFill>
+            </a:endParaRPr>
+          </a:p>
+        </p:txBody>
+      </p:sp>
+      <p:cxnSp>
+        <p:nvCxnSpPr>
+          <p:cNvPr id="107" name="Elbow Connector 106"/>
+          <p:cNvCxnSpPr>
+            <a:stCxn id="49" idx="2"/>
+            <a:endCxn id="72" idx="3"/>
+          </p:cNvCxnSpPr>
+          <p:nvPr/>
+        </p:nvCxnSpPr>
+        <p:spPr>
+          <a:xfrm rot="5400000">
+            <a:off x="7516177" y="3770732"/>
+            <a:ext cx="323391" cy="2480376"/>
+          </a:xfrm>
+          <a:prstGeom prst="bentConnector2">
+            <a:avLst/>
+          </a:prstGeom>
+          <a:ln w="38100">
+            <a:solidFill>
+              <a:schemeClr val="tx1"/>
+            </a:solidFill>
+            <a:tailEnd type="triangle" w="lg" len="lg"/>
+          </a:ln>
+        </p:spPr>
+        <p:style>
+          <a:lnRef idx="1">
+            <a:schemeClr val="accent1"/>
+          </a:lnRef>
+          <a:fillRef idx="0">
+            <a:schemeClr val="accent1"/>
+          </a:fillRef>
+          <a:effectRef idx="0">
+            <a:schemeClr val="accent1"/>
+          </a:effectRef>
+          <a:fontRef idx="minor">
+            <a:schemeClr val="tx1"/>
+          </a:fontRef>
+        </p:style>
+      </p:cxnSp>
+      <p:sp>
+        <p:nvSpPr>
+          <p:cNvPr id="110" name="Rounded Rectangle 109"/>
+          <p:cNvSpPr/>
+          <p:nvPr/>
+        </p:nvSpPr>
+        <p:spPr>
+          <a:xfrm>
+            <a:off x="391635" y="4944016"/>
+            <a:ext cx="1435396" cy="457200"/>
+          </a:xfrm>
+          <a:prstGeom prst="roundRect">
+            <a:avLst>
+              <a:gd name="adj" fmla="val 50000"/>
+            </a:avLst>
+          </a:prstGeom>
+          <a:solidFill>
+            <a:schemeClr val="bg1">
+              <a:lumMod val="75000"/>
+            </a:schemeClr>
+          </a:solidFill>
+          <a:ln>
+            <a:solidFill>
+              <a:schemeClr val="tx1"/>
+            </a:solidFill>
+          </a:ln>
+        </p:spPr>
+        <p:style>
+          <a:lnRef idx="2">
+            <a:schemeClr val="accent1">
+              <a:shade val="50000"/>
+            </a:schemeClr>
+          </a:lnRef>
+          <a:fillRef idx="1">
+            <a:schemeClr val="accent1"/>
+          </a:fillRef>
+          <a:effectRef idx="0">
+            <a:schemeClr val="accent1"/>
+          </a:effectRef>
+          <a:fontRef idx="minor">
+            <a:schemeClr val="lt1"/>
+          </a:fontRef>
+        </p:style>
+        <p:txBody>
+          <a:bodyPr rtlCol="0" anchor="ctr"/>
+          <a:lstStyle/>
+          <a:p>
+            <a:pPr algn="ctr"/>
+            <a:r>
+              <a:rPr lang="en-US" altLang="ko-KR" dirty="0" smtClean="0">
+                <a:solidFill>
+                  <a:schemeClr val="tx1"/>
+                </a:solidFill>
+              </a:rPr>
+              <a:t>END</a:t>
+            </a:r>
+            <a:endParaRPr lang="ko-KR" altLang="en-US" dirty="0">
+              <a:solidFill>
+                <a:schemeClr val="tx1"/>
+              </a:solidFill>
+            </a:endParaRPr>
+          </a:p>
+        </p:txBody>
+      </p:sp>
+      <p:cxnSp>
+        <p:nvCxnSpPr>
+          <p:cNvPr id="111" name="Straight Arrow Connector 110"/>
+          <p:cNvCxnSpPr>
+            <a:stCxn id="72" idx="1"/>
+            <a:endCxn id="110" idx="3"/>
+          </p:cNvCxnSpPr>
+          <p:nvPr/>
+        </p:nvCxnSpPr>
+        <p:spPr>
+          <a:xfrm flipH="1">
+            <a:off x="1827031" y="5172616"/>
+            <a:ext cx="511804" cy="0"/>
+          </a:xfrm>
+          <a:prstGeom prst="straightConnector1">
+            <a:avLst/>
+          </a:prstGeom>
+          <a:ln w="38100">
+            <a:solidFill>
+              <a:schemeClr val="tx1"/>
+            </a:solidFill>
+            <a:tailEnd type="triangle" w="lg" len="lg"/>
+          </a:ln>
+        </p:spPr>
+        <p:style>
+          <a:lnRef idx="1">
+            <a:schemeClr val="accent1"/>
+          </a:lnRef>
+          <a:fillRef idx="0">
+            <a:schemeClr val="accent1"/>
+          </a:fillRef>
+          <a:effectRef idx="0">
+            <a:schemeClr val="accent1"/>
+          </a:effectRef>
+          <a:fontRef idx="minor">
+            <a:schemeClr val="tx1"/>
+          </a:fontRef>
+        </p:style>
+      </p:cxnSp>
+    </p:spTree>
+    <p:extLst>
+      <p:ext uri="{BB962C8B-B14F-4D97-AF65-F5344CB8AC3E}">
+        <p14:creationId xmlns:p14="http://schemas.microsoft.com/office/powerpoint/2010/main" val="4060369094"/>
       </p:ext>
     </p:extLst>
   </p:cSld>

</xml_diff>

<commit_message>
update: upload draft for the paper
</commit_message>
<xml_diff>
--- a/WPCN/for_final_paper.pptx
+++ b/WPCN/for_final_paper.pptx
@@ -11,6 +11,7 @@
     <p:sldId id="259" r:id="rId5"/>
     <p:sldId id="260" r:id="rId6"/>
     <p:sldId id="261" r:id="rId7"/>
+    <p:sldId id="262" r:id="rId8"/>
   </p:sldIdLst>
   <p:sldSz cx="12192000" cy="6858000"/>
   <p:notesSz cx="6858000" cy="9144000"/>
@@ -248,7 +249,7 @@
           <a:p>
             <a:fld id="{7DEA4731-64EB-4CE7-B59A-17BBA9BDC1E6}" type="datetimeFigureOut">
               <a:rPr lang="ko-KR" altLang="en-US" smtClean="0"/>
-              <a:t>2020-06-25</a:t>
+              <a:t>2020-06-29</a:t>
             </a:fld>
             <a:endParaRPr lang="ko-KR" altLang="en-US"/>
           </a:p>
@@ -418,7 +419,7 @@
           <a:p>
             <a:fld id="{7DEA4731-64EB-4CE7-B59A-17BBA9BDC1E6}" type="datetimeFigureOut">
               <a:rPr lang="ko-KR" altLang="en-US" smtClean="0"/>
-              <a:t>2020-06-25</a:t>
+              <a:t>2020-06-29</a:t>
             </a:fld>
             <a:endParaRPr lang="ko-KR" altLang="en-US"/>
           </a:p>
@@ -598,7 +599,7 @@
           <a:p>
             <a:fld id="{7DEA4731-64EB-4CE7-B59A-17BBA9BDC1E6}" type="datetimeFigureOut">
               <a:rPr lang="ko-KR" altLang="en-US" smtClean="0"/>
-              <a:t>2020-06-25</a:t>
+              <a:t>2020-06-29</a:t>
             </a:fld>
             <a:endParaRPr lang="ko-KR" altLang="en-US"/>
           </a:p>
@@ -768,7 +769,7 @@
           <a:p>
             <a:fld id="{7DEA4731-64EB-4CE7-B59A-17BBA9BDC1E6}" type="datetimeFigureOut">
               <a:rPr lang="ko-KR" altLang="en-US" smtClean="0"/>
-              <a:t>2020-06-25</a:t>
+              <a:t>2020-06-29</a:t>
             </a:fld>
             <a:endParaRPr lang="ko-KR" altLang="en-US"/>
           </a:p>
@@ -1014,7 +1015,7 @@
           <a:p>
             <a:fld id="{7DEA4731-64EB-4CE7-B59A-17BBA9BDC1E6}" type="datetimeFigureOut">
               <a:rPr lang="ko-KR" altLang="en-US" smtClean="0"/>
-              <a:t>2020-06-25</a:t>
+              <a:t>2020-06-29</a:t>
             </a:fld>
             <a:endParaRPr lang="ko-KR" altLang="en-US"/>
           </a:p>
@@ -1246,7 +1247,7 @@
           <a:p>
             <a:fld id="{7DEA4731-64EB-4CE7-B59A-17BBA9BDC1E6}" type="datetimeFigureOut">
               <a:rPr lang="ko-KR" altLang="en-US" smtClean="0"/>
-              <a:t>2020-06-25</a:t>
+              <a:t>2020-06-29</a:t>
             </a:fld>
             <a:endParaRPr lang="ko-KR" altLang="en-US"/>
           </a:p>
@@ -1613,7 +1614,7 @@
           <a:p>
             <a:fld id="{7DEA4731-64EB-4CE7-B59A-17BBA9BDC1E6}" type="datetimeFigureOut">
               <a:rPr lang="ko-KR" altLang="en-US" smtClean="0"/>
-              <a:t>2020-06-25</a:t>
+              <a:t>2020-06-29</a:t>
             </a:fld>
             <a:endParaRPr lang="ko-KR" altLang="en-US"/>
           </a:p>
@@ -1731,7 +1732,7 @@
           <a:p>
             <a:fld id="{7DEA4731-64EB-4CE7-B59A-17BBA9BDC1E6}" type="datetimeFigureOut">
               <a:rPr lang="ko-KR" altLang="en-US" smtClean="0"/>
-              <a:t>2020-06-25</a:t>
+              <a:t>2020-06-29</a:t>
             </a:fld>
             <a:endParaRPr lang="ko-KR" altLang="en-US"/>
           </a:p>
@@ -1826,7 +1827,7 @@
           <a:p>
             <a:fld id="{7DEA4731-64EB-4CE7-B59A-17BBA9BDC1E6}" type="datetimeFigureOut">
               <a:rPr lang="ko-KR" altLang="en-US" smtClean="0"/>
-              <a:t>2020-06-25</a:t>
+              <a:t>2020-06-29</a:t>
             </a:fld>
             <a:endParaRPr lang="ko-KR" altLang="en-US"/>
           </a:p>
@@ -2103,7 +2104,7 @@
           <a:p>
             <a:fld id="{7DEA4731-64EB-4CE7-B59A-17BBA9BDC1E6}" type="datetimeFigureOut">
               <a:rPr lang="ko-KR" altLang="en-US" smtClean="0"/>
-              <a:t>2020-06-25</a:t>
+              <a:t>2020-06-29</a:t>
             </a:fld>
             <a:endParaRPr lang="ko-KR" altLang="en-US"/>
           </a:p>
@@ -2356,7 +2357,7 @@
           <a:p>
             <a:fld id="{7DEA4731-64EB-4CE7-B59A-17BBA9BDC1E6}" type="datetimeFigureOut">
               <a:rPr lang="ko-KR" altLang="en-US" smtClean="0"/>
-              <a:t>2020-06-25</a:t>
+              <a:t>2020-06-29</a:t>
             </a:fld>
             <a:endParaRPr lang="ko-KR" altLang="en-US"/>
           </a:p>
@@ -2569,7 +2570,7 @@
           <a:p>
             <a:fld id="{7DEA4731-64EB-4CE7-B59A-17BBA9BDC1E6}" type="datetimeFigureOut">
               <a:rPr lang="ko-KR" altLang="en-US" smtClean="0"/>
-              <a:t>2020-06-25</a:t>
+              <a:t>2020-06-29</a:t>
             </a:fld>
             <a:endParaRPr lang="ko-KR" altLang="en-US"/>
           </a:p>
@@ -4684,14 +4685,14 @@
           <p:nvPr>
             <p:extLst>
               <p:ext uri="{D42A27DB-BD31-4B8C-83A1-F6EECF244321}">
-                <p14:modId xmlns:p14="http://schemas.microsoft.com/office/powerpoint/2010/main" val="3845576202"/>
+                <p14:modId xmlns:p14="http://schemas.microsoft.com/office/powerpoint/2010/main" val="755955362"/>
               </p:ext>
             </p:extLst>
           </p:nvPr>
         </p:nvGraphicFramePr>
         <p:xfrm>
-          <a:off x="942288" y="946298"/>
-          <a:ext cx="10455535" cy="5029200"/>
+          <a:off x="942288" y="765544"/>
+          <a:ext cx="10455535" cy="5362354"/>
         </p:xfrm>
         <a:graphic>
           <a:graphicData uri="http://schemas.openxmlformats.org/drawingml/2006/table">
@@ -4708,7 +4709,7 @@
                   </a:extLst>
                 </a:gridCol>
               </a:tblGrid>
-              <a:tr h="5029200">
+              <a:tr h="5362354">
                 <a:tc>
                   <a:txBody>
                     <a:bodyPr/>
@@ -4751,6 +4752,20 @@
                         <a:rPr lang="en-US" altLang="ko-KR" sz="1400" baseline="0" dirty="0" smtClean="0"/>
                         <a:t>// list of allocated time, number of elements is (1+number of WDs)</a:t>
                       </a:r>
+                    </a:p>
+                    <a:p>
+                      <a:pPr marL="0" indent="0" algn="l" latinLnBrk="1">
+                        <a:buNone/>
+                      </a:pPr>
+                      <a:r>
+                        <a:rPr lang="en-US" altLang="ko-KR" sz="1800" baseline="0" dirty="0" smtClean="0"/>
+                        <a:t>HAPpoint := (location of HAP)</a:t>
+                      </a:r>
+                      <a:r>
+                        <a:rPr lang="en-US" altLang="ko-KR" sz="1400" baseline="0" dirty="0" smtClean="0"/>
+                        <a:t> // the location (y-axis and x-axis) of HAP</a:t>
+                      </a:r>
+                      <a:endParaRPr lang="en-US" altLang="ko-KR" sz="1800" baseline="0" dirty="0" smtClean="0"/>
                     </a:p>
                     <a:p>
                       <a:pPr marL="0" indent="0" algn="l" latinLnBrk="1">
@@ -4961,7 +4976,7 @@
         </p:nvSpPr>
         <p:spPr>
           <a:xfrm>
-            <a:off x="2032000" y="6074365"/>
+            <a:off x="2031999" y="6255119"/>
             <a:ext cx="8276112" cy="369332"/>
           </a:xfrm>
           <a:prstGeom prst="rect">
@@ -5024,7 +5039,7 @@
           <p:nvPr>
             <p:extLst>
               <p:ext uri="{D42A27DB-BD31-4B8C-83A1-F6EECF244321}">
-                <p14:modId xmlns:p14="http://schemas.microsoft.com/office/powerpoint/2010/main" val="4001251803"/>
+                <p14:modId xmlns:p14="http://schemas.microsoft.com/office/powerpoint/2010/main" val="898586290"/>
               </p:ext>
             </p:extLst>
           </p:nvPr>
@@ -5068,7 +5083,7 @@
                       </a:pPr>
                       <a:r>
                         <a:rPr lang="en-US" altLang="ko-KR" sz="1800" b="0" baseline="0" dirty="0" smtClean="0"/>
-                        <a:t>    (HAP_y, HAP_x) := (Y axis of HAP, X axis of HAP)</a:t>
+                        <a:t>    (HAP_y, HAP_x) := (Y axis of HAPpoint, X axis of HAPpoint)</a:t>
                       </a:r>
                       <a:r>
                         <a:rPr lang="en-US" altLang="ko-KR" sz="1400" b="0" baseline="0" dirty="0" smtClean="0"/>
@@ -5587,36 +5602,6 @@
           </a:fontRef>
         </p:style>
       </p:cxnSp>
-      <p:sp>
-        <p:nvSpPr>
-          <p:cNvPr id="12" name="TextBox 11"/>
-          <p:cNvSpPr txBox="1"/>
-          <p:nvPr/>
-        </p:nvSpPr>
-        <p:spPr>
-          <a:xfrm>
-            <a:off x="1517843" y="2338459"/>
-            <a:ext cx="891270" cy="369332"/>
-          </a:xfrm>
-          <a:prstGeom prst="rect">
-            <a:avLst/>
-          </a:prstGeom>
-          <a:noFill/>
-        </p:spPr>
-        <p:txBody>
-          <a:bodyPr wrap="none" rtlCol="0">
-            <a:spAutoFit/>
-          </a:bodyPr>
-          <a:lstStyle/>
-          <a:p>
-            <a:r>
-              <a:rPr lang="en-US" altLang="ko-KR" dirty="0" smtClean="0"/>
-              <a:t>Flatten</a:t>
-            </a:r>
-            <a:endParaRPr lang="ko-KR" altLang="en-US" dirty="0"/>
-          </a:p>
-        </p:txBody>
-      </p:sp>
       <p:sp>
         <p:nvSpPr>
           <p:cNvPr id="13" name="Rectangle 12"/>
@@ -11033,7 +11018,7 @@
         </p:nvSpPr>
         <p:spPr>
           <a:xfrm>
-            <a:off x="3716081" y="87626"/>
+            <a:off x="3631021" y="173134"/>
             <a:ext cx="1435396" cy="457200"/>
           </a:xfrm>
           <a:prstGeom prst="roundRect">
@@ -11091,14 +11076,14 @@
       </p:sp>
       <p:sp>
         <p:nvSpPr>
-          <p:cNvPr id="5" name="Rectangle 4"/>
+          <p:cNvPr id="8" name="Rectangle 7"/>
           <p:cNvSpPr/>
           <p:nvPr/>
         </p:nvSpPr>
         <p:spPr>
           <a:xfrm>
-            <a:off x="2894717" y="927598"/>
-            <a:ext cx="3078124" cy="765544"/>
+            <a:off x="2250783" y="1705029"/>
+            <a:ext cx="4195871" cy="1226776"/>
           </a:xfrm>
           <a:prstGeom prst="rect">
             <a:avLst/>
@@ -11141,7 +11126,7 @@
                   <a:schemeClr val="tx1"/>
                 </a:solidFill>
               </a:rPr>
-              <a:t>1. </a:t>
+              <a:t>1-1. </a:t>
             </a:r>
             <a:r>
               <a:rPr lang="en-US" altLang="ko-KR" dirty="0" smtClean="0">
@@ -11149,85 +11134,7 @@
                   <a:schemeClr val="tx1"/>
                 </a:solidFill>
               </a:rPr>
-              <a:t>Input Test Input Data into deep learning model</a:t>
-            </a:r>
-            <a:endParaRPr lang="ko-KR" altLang="en-US" dirty="0">
-              <a:solidFill>
-                <a:schemeClr val="tx1"/>
-              </a:solidFill>
-            </a:endParaRPr>
-          </a:p>
-        </p:txBody>
-      </p:sp>
-      <p:sp>
-        <p:nvSpPr>
-          <p:cNvPr id="6" name="Rectangle 5"/>
-          <p:cNvSpPr/>
-          <p:nvPr/>
-        </p:nvSpPr>
-        <p:spPr>
-          <a:xfrm>
-            <a:off x="2812314" y="2363695"/>
-            <a:ext cx="3242930" cy="765544"/>
-          </a:xfrm>
-          <a:prstGeom prst="rect">
-            <a:avLst/>
-          </a:prstGeom>
-          <a:solidFill>
-            <a:schemeClr val="bg1">
-              <a:lumMod val="95000"/>
-            </a:schemeClr>
-          </a:solidFill>
-          <a:ln>
-            <a:solidFill>
-              <a:schemeClr val="tx1"/>
-            </a:solidFill>
-          </a:ln>
-        </p:spPr>
-        <p:style>
-          <a:lnRef idx="2">
-            <a:schemeClr val="accent1">
-              <a:shade val="50000"/>
-            </a:schemeClr>
-          </a:lnRef>
-          <a:fillRef idx="1">
-            <a:schemeClr val="accent1"/>
-          </a:fillRef>
-          <a:effectRef idx="0">
-            <a:schemeClr val="accent1"/>
-          </a:effectRef>
-          <a:fontRef idx="minor">
-            <a:schemeClr val="lt1"/>
-          </a:fontRef>
-        </p:style>
-        <p:txBody>
-          <a:bodyPr rtlCol="0" anchor="ctr"/>
-          <a:lstStyle/>
-          <a:p>
-            <a:pPr algn="ctr"/>
-            <a:r>
-              <a:rPr lang="en-US" altLang="ko-KR" b="1" dirty="0" smtClean="0">
-                <a:solidFill>
-                  <a:schemeClr val="tx1"/>
-                </a:solidFill>
-              </a:rPr>
-              <a:t>2-1. </a:t>
-            </a:r>
-            <a:r>
-              <a:rPr lang="en-US" altLang="ko-KR" dirty="0" smtClean="0">
-                <a:solidFill>
-                  <a:schemeClr val="tx1"/>
-                </a:solidFill>
-              </a:rPr>
-              <a:t>Get throughput map as output of model</a:t>
-            </a:r>
-            <a:r>
-              <a:rPr lang="en-US" altLang="ko-KR" sz="1200" b="1" dirty="0" smtClean="0">
-                <a:solidFill>
-                  <a:srgbClr val="FF0000"/>
-                </a:solidFill>
-              </a:rPr>
-              <a:t>1</a:t>
+              <a:t>Compute throughput for the optimal HAP point of each test output throughput map</a:t>
             </a:r>
             <a:endParaRPr lang="ko-KR" altLang="en-US" sz="1200" b="1" dirty="0">
               <a:solidFill>
@@ -11237,199 +11144,19 @@
           </a:p>
         </p:txBody>
       </p:sp>
-      <p:sp>
-        <p:nvSpPr>
-          <p:cNvPr id="7" name="Rectangle 6"/>
-          <p:cNvSpPr/>
-          <p:nvPr/>
-        </p:nvSpPr>
-        <p:spPr>
-          <a:xfrm>
-            <a:off x="2812314" y="3639878"/>
-            <a:ext cx="3242930" cy="765544"/>
-          </a:xfrm>
-          <a:prstGeom prst="rect">
-            <a:avLst/>
-          </a:prstGeom>
-          <a:solidFill>
-            <a:schemeClr val="bg1">
-              <a:lumMod val="95000"/>
-            </a:schemeClr>
-          </a:solidFill>
-          <a:ln>
-            <a:solidFill>
-              <a:schemeClr val="tx1"/>
-            </a:solidFill>
-          </a:ln>
-        </p:spPr>
-        <p:style>
-          <a:lnRef idx="2">
-            <a:schemeClr val="accent1">
-              <a:shade val="50000"/>
-            </a:schemeClr>
-          </a:lnRef>
-          <a:fillRef idx="1">
-            <a:schemeClr val="accent1"/>
-          </a:fillRef>
-          <a:effectRef idx="0">
-            <a:schemeClr val="accent1"/>
-          </a:effectRef>
-          <a:fontRef idx="minor">
-            <a:schemeClr val="lt1"/>
-          </a:fontRef>
-        </p:style>
-        <p:txBody>
-          <a:bodyPr rtlCol="0" anchor="ctr"/>
-          <a:lstStyle/>
-          <a:p>
-            <a:pPr algn="ctr"/>
-            <a:r>
-              <a:rPr lang="en-US" altLang="ko-KR" b="1" dirty="0" smtClean="0">
-                <a:solidFill>
-                  <a:schemeClr val="tx1"/>
-                </a:solidFill>
-              </a:rPr>
-              <a:t>2-2</a:t>
-            </a:r>
-            <a:r>
-              <a:rPr lang="en-US" altLang="ko-KR" b="1" dirty="0" smtClean="0">
-                <a:solidFill>
-                  <a:schemeClr val="tx1"/>
-                </a:solidFill>
-              </a:rPr>
-              <a:t>. </a:t>
-            </a:r>
-            <a:r>
-              <a:rPr lang="en-US" altLang="ko-KR" dirty="0" smtClean="0">
-                <a:solidFill>
-                  <a:schemeClr val="tx1"/>
-                </a:solidFill>
-              </a:rPr>
-              <a:t>Find optimal point from the throughput map</a:t>
-            </a:r>
-            <a:r>
-              <a:rPr lang="en-US" altLang="ko-KR" sz="1200" b="1" dirty="0" smtClean="0">
-                <a:solidFill>
-                  <a:srgbClr val="FF0000"/>
-                </a:solidFill>
-              </a:rPr>
-              <a:t>2-1</a:t>
-            </a:r>
-            <a:endParaRPr lang="ko-KR" altLang="en-US" sz="1200" b="1" dirty="0">
-              <a:solidFill>
-                <a:srgbClr val="FF0000"/>
-              </a:solidFill>
-            </a:endParaRPr>
-          </a:p>
-        </p:txBody>
-      </p:sp>
-      <p:sp>
-        <p:nvSpPr>
-          <p:cNvPr id="8" name="Rectangle 7"/>
-          <p:cNvSpPr/>
-          <p:nvPr/>
-        </p:nvSpPr>
-        <p:spPr>
-          <a:xfrm>
-            <a:off x="6820124" y="2275962"/>
-            <a:ext cx="4195871" cy="765544"/>
-          </a:xfrm>
-          <a:prstGeom prst="rect">
-            <a:avLst/>
-          </a:prstGeom>
-          <a:solidFill>
-            <a:schemeClr val="bg1">
-              <a:lumMod val="95000"/>
-            </a:schemeClr>
-          </a:solidFill>
-          <a:ln>
-            <a:solidFill>
-              <a:schemeClr val="tx1"/>
-            </a:solidFill>
-          </a:ln>
-        </p:spPr>
-        <p:style>
-          <a:lnRef idx="2">
-            <a:schemeClr val="accent1">
-              <a:shade val="50000"/>
-            </a:schemeClr>
-          </a:lnRef>
-          <a:fillRef idx="1">
-            <a:schemeClr val="accent1"/>
-          </a:fillRef>
-          <a:effectRef idx="0">
-            <a:schemeClr val="accent1"/>
-          </a:effectRef>
-          <a:fontRef idx="minor">
-            <a:schemeClr val="lt1"/>
-          </a:fontRef>
-        </p:style>
-        <p:txBody>
-          <a:bodyPr rtlCol="0" anchor="ctr"/>
-          <a:lstStyle/>
-          <a:p>
-            <a:pPr algn="ctr"/>
-            <a:r>
-              <a:rPr lang="en-US" altLang="ko-KR" b="1" dirty="0" smtClean="0">
-                <a:solidFill>
-                  <a:schemeClr val="tx1"/>
-                </a:solidFill>
-              </a:rPr>
-              <a:t>2-3</a:t>
-            </a:r>
-            <a:r>
-              <a:rPr lang="en-US" altLang="ko-KR" b="1" dirty="0" smtClean="0">
-                <a:solidFill>
-                  <a:schemeClr val="tx1"/>
-                </a:solidFill>
-              </a:rPr>
-              <a:t>. </a:t>
-            </a:r>
-            <a:r>
-              <a:rPr lang="en-US" altLang="ko-KR" dirty="0" smtClean="0">
-                <a:solidFill>
-                  <a:schemeClr val="tx1"/>
-                </a:solidFill>
-              </a:rPr>
-              <a:t>Compute</a:t>
-            </a:r>
-            <a:r>
-              <a:rPr lang="en-US" altLang="ko-KR" dirty="0" smtClean="0">
-                <a:solidFill>
-                  <a:schemeClr val="tx1"/>
-                </a:solidFill>
-              </a:rPr>
-              <a:t> throughput for this optimal point</a:t>
-            </a:r>
-            <a:r>
-              <a:rPr lang="en-US" altLang="ko-KR" sz="1200" b="1" dirty="0" smtClean="0">
-                <a:solidFill>
-                  <a:srgbClr val="FF0000"/>
-                </a:solidFill>
-              </a:rPr>
-              <a:t>2-2</a:t>
-            </a:r>
-            <a:endParaRPr lang="ko-KR" altLang="en-US" sz="1200" b="1" dirty="0">
-              <a:solidFill>
-                <a:srgbClr val="FF0000"/>
-              </a:solidFill>
-            </a:endParaRPr>
-          </a:p>
-        </p:txBody>
-      </p:sp>
       <p:cxnSp>
         <p:nvCxnSpPr>
           <p:cNvPr id="17" name="Straight Arrow Connector 16"/>
           <p:cNvCxnSpPr>
             <a:stCxn id="4" idx="2"/>
-            <a:endCxn id="5" idx="0"/>
+            <a:endCxn id="8" idx="0"/>
           </p:cNvCxnSpPr>
           <p:nvPr/>
         </p:nvCxnSpPr>
         <p:spPr>
           <a:xfrm>
-            <a:off x="4433779" y="544826"/>
-            <a:ext cx="0" cy="382772"/>
+            <a:off x="4348719" y="630334"/>
+            <a:ext cx="0" cy="1074695"/>
           </a:xfrm>
           <a:prstGeom prst="straightConnector1">
             <a:avLst/>
@@ -11456,84 +11183,6 @@
           </a:fontRef>
         </p:style>
       </p:cxnSp>
-      <p:cxnSp>
-        <p:nvCxnSpPr>
-          <p:cNvPr id="18" name="Straight Arrow Connector 17"/>
-          <p:cNvCxnSpPr>
-            <a:stCxn id="5" idx="2"/>
-            <a:endCxn id="6" idx="0"/>
-          </p:cNvCxnSpPr>
-          <p:nvPr/>
-        </p:nvCxnSpPr>
-        <p:spPr>
-          <a:xfrm>
-            <a:off x="4433779" y="1693142"/>
-            <a:ext cx="0" cy="670553"/>
-          </a:xfrm>
-          <a:prstGeom prst="straightConnector1">
-            <a:avLst/>
-          </a:prstGeom>
-          <a:ln w="38100">
-            <a:solidFill>
-              <a:schemeClr val="tx1"/>
-            </a:solidFill>
-            <a:tailEnd type="triangle" w="lg" len="lg"/>
-          </a:ln>
-        </p:spPr>
-        <p:style>
-          <a:lnRef idx="1">
-            <a:schemeClr val="accent1"/>
-          </a:lnRef>
-          <a:fillRef idx="0">
-            <a:schemeClr val="accent1"/>
-          </a:fillRef>
-          <a:effectRef idx="0">
-            <a:schemeClr val="accent1"/>
-          </a:effectRef>
-          <a:fontRef idx="minor">
-            <a:schemeClr val="tx1"/>
-          </a:fontRef>
-        </p:style>
-      </p:cxnSp>
-      <p:cxnSp>
-        <p:nvCxnSpPr>
-          <p:cNvPr id="19" name="Straight Arrow Connector 18"/>
-          <p:cNvCxnSpPr>
-            <a:stCxn id="6" idx="2"/>
-            <a:endCxn id="7" idx="0"/>
-          </p:cNvCxnSpPr>
-          <p:nvPr/>
-        </p:nvCxnSpPr>
-        <p:spPr>
-          <a:xfrm>
-            <a:off x="4433779" y="3129239"/>
-            <a:ext cx="0" cy="510639"/>
-          </a:xfrm>
-          <a:prstGeom prst="straightConnector1">
-            <a:avLst/>
-          </a:prstGeom>
-          <a:ln w="38100">
-            <a:solidFill>
-              <a:schemeClr val="tx1"/>
-            </a:solidFill>
-            <a:tailEnd type="triangle" w="lg" len="lg"/>
-          </a:ln>
-        </p:spPr>
-        <p:style>
-          <a:lnRef idx="1">
-            <a:schemeClr val="accent1"/>
-          </a:lnRef>
-          <a:fillRef idx="0">
-            <a:schemeClr val="accent1"/>
-          </a:fillRef>
-          <a:effectRef idx="0">
-            <a:schemeClr val="accent1"/>
-          </a:effectRef>
-          <a:fontRef idx="minor">
-            <a:schemeClr val="tx1"/>
-          </a:fontRef>
-        </p:style>
-      </p:cxnSp>
       <p:sp>
         <p:nvSpPr>
           <p:cNvPr id="34" name="Rectangle 33"/>
@@ -11542,7 +11191,7 @@
         </p:nvSpPr>
         <p:spPr>
           <a:xfrm>
-            <a:off x="3408897" y="5755144"/>
+            <a:off x="4433779" y="4453145"/>
             <a:ext cx="4652684" cy="369332"/>
           </a:xfrm>
           <a:prstGeom prst="rect">
@@ -11595,7 +11244,7 @@
         </p:nvSpPr>
         <p:spPr>
           <a:xfrm>
-            <a:off x="6820124" y="3639878"/>
+            <a:off x="6895604" y="1713744"/>
             <a:ext cx="4195871" cy="1209347"/>
           </a:xfrm>
           <a:prstGeom prst="rect">
@@ -11639,15 +11288,7 @@
                   <a:schemeClr val="tx1"/>
                 </a:solidFill>
               </a:rPr>
-              <a:t>2-4</a:t>
-            </a:r>
-            <a:r>
-              <a:rPr lang="en-US" altLang="ko-KR" b="1" dirty="0" smtClean="0">
-                <a:solidFill>
-                  <a:schemeClr val="tx1"/>
-                </a:solidFill>
-              </a:rPr>
-              <a:t>. </a:t>
+              <a:t>1-2. </a:t>
             </a:r>
             <a:r>
               <a:rPr lang="en-US" altLang="ko-KR" dirty="0" smtClean="0">
@@ -11663,7 +11304,7 @@
                   <a:srgbClr val="FF0000"/>
                 </a:solidFill>
               </a:rPr>
-              <a:t>2-3</a:t>
+              <a:t>1-1</a:t>
             </a:r>
             <a:r>
               <a:rPr lang="en-US" altLang="ko-KR" dirty="0" smtClean="0">
@@ -11671,7 +11312,7 @@
                   <a:schemeClr val="tx1"/>
                 </a:solidFill>
               </a:rPr>
-              <a:t> with </a:t>
+              <a:t> with best </a:t>
             </a:r>
             <a:r>
               <a:rPr lang="en-US" altLang="ko-KR" dirty="0">
@@ -11679,7 +11320,7 @@
                   <a:schemeClr val="tx1"/>
                 </a:solidFill>
               </a:rPr>
-              <a:t>sum of best throughput of </a:t>
+              <a:t>throughput </a:t>
             </a:r>
             <a:r>
               <a:rPr lang="en-US" altLang="ko-KR" dirty="0" smtClean="0">
@@ -11687,7 +11328,7 @@
                   <a:schemeClr val="tx1"/>
                 </a:solidFill>
               </a:rPr>
-              <a:t>throughput map about test input</a:t>
+              <a:t>from the throughput map about test input</a:t>
             </a:r>
             <a:endParaRPr lang="ko-KR" altLang="en-US" sz="1200" b="1" dirty="0">
               <a:solidFill>
@@ -11699,21 +11340,20 @@
       </p:sp>
       <p:cxnSp>
         <p:nvCxnSpPr>
-          <p:cNvPr id="50" name="Elbow Connector 49"/>
+          <p:cNvPr id="58" name="Elbow Connector 57"/>
           <p:cNvCxnSpPr>
-            <a:stCxn id="7" idx="3"/>
-            <a:endCxn id="8" idx="1"/>
+            <a:stCxn id="49" idx="3"/>
           </p:cNvCxnSpPr>
           <p:nvPr/>
         </p:nvCxnSpPr>
         <p:spPr>
-          <a:xfrm flipV="1">
-            <a:off x="6055244" y="2658734"/>
-            <a:ext cx="764880" cy="1363916"/>
+          <a:xfrm flipH="1" flipV="1">
+            <a:off x="4348719" y="906976"/>
+            <a:ext cx="6742756" cy="1411442"/>
           </a:xfrm>
           <a:prstGeom prst="bentConnector3">
             <a:avLst>
-              <a:gd name="adj1" fmla="val 50000"/>
+              <a:gd name="adj1" fmla="val -3390"/>
             </a:avLst>
           </a:prstGeom>
           <a:ln w="38100">
@@ -11738,85 +11378,6 @@
           </a:fontRef>
         </p:style>
       </p:cxnSp>
-      <p:cxnSp>
-        <p:nvCxnSpPr>
-          <p:cNvPr id="54" name="Straight Arrow Connector 53"/>
-          <p:cNvCxnSpPr>
-            <a:stCxn id="8" idx="2"/>
-            <a:endCxn id="49" idx="0"/>
-          </p:cNvCxnSpPr>
-          <p:nvPr/>
-        </p:nvCxnSpPr>
-        <p:spPr>
-          <a:xfrm>
-            <a:off x="8918060" y="3041506"/>
-            <a:ext cx="0" cy="598372"/>
-          </a:xfrm>
-          <a:prstGeom prst="straightConnector1">
-            <a:avLst/>
-          </a:prstGeom>
-          <a:ln w="38100">
-            <a:solidFill>
-              <a:schemeClr val="tx1"/>
-            </a:solidFill>
-            <a:tailEnd type="triangle" w="lg" len="lg"/>
-          </a:ln>
-        </p:spPr>
-        <p:style>
-          <a:lnRef idx="1">
-            <a:schemeClr val="accent1"/>
-          </a:lnRef>
-          <a:fillRef idx="0">
-            <a:schemeClr val="accent1"/>
-          </a:fillRef>
-          <a:effectRef idx="0">
-            <a:schemeClr val="accent1"/>
-          </a:effectRef>
-          <a:fontRef idx="minor">
-            <a:schemeClr val="tx1"/>
-          </a:fontRef>
-        </p:style>
-      </p:cxnSp>
-      <p:cxnSp>
-        <p:nvCxnSpPr>
-          <p:cNvPr id="58" name="Elbow Connector 57"/>
-          <p:cNvCxnSpPr>
-            <a:stCxn id="49" idx="3"/>
-          </p:cNvCxnSpPr>
-          <p:nvPr/>
-        </p:nvCxnSpPr>
-        <p:spPr>
-          <a:xfrm flipH="1" flipV="1">
-            <a:off x="4433779" y="1999698"/>
-            <a:ext cx="6582216" cy="2244854"/>
-          </a:xfrm>
-          <a:prstGeom prst="bentConnector3">
-            <a:avLst>
-              <a:gd name="adj1" fmla="val -3473"/>
-            </a:avLst>
-          </a:prstGeom>
-          <a:ln w="38100">
-            <a:solidFill>
-              <a:schemeClr val="tx1"/>
-            </a:solidFill>
-            <a:tailEnd type="triangle" w="lg" len="lg"/>
-          </a:ln>
-        </p:spPr>
-        <p:style>
-          <a:lnRef idx="1">
-            <a:schemeClr val="accent1"/>
-          </a:lnRef>
-          <a:fillRef idx="0">
-            <a:schemeClr val="accent1"/>
-          </a:fillRef>
-          <a:effectRef idx="0">
-            <a:schemeClr val="accent1"/>
-          </a:effectRef>
-          <a:fontRef idx="minor">
-            <a:schemeClr val="tx1"/>
-          </a:fontRef>
-        </p:style>
-      </p:cxnSp>
       <p:sp>
         <p:nvSpPr>
           <p:cNvPr id="71" name="Rectangle 70"/>
@@ -11825,8 +11386,8 @@
         </p:nvSpPr>
         <p:spPr>
           <a:xfrm>
-            <a:off x="6421412" y="1630366"/>
-            <a:ext cx="2180982" cy="369332"/>
+            <a:off x="5877619" y="906976"/>
+            <a:ext cx="4348691" cy="369332"/>
           </a:xfrm>
           <a:prstGeom prst="rect">
             <a:avLst/>
@@ -11843,7 +11404,7 @@
                 <a:latin typeface="맑은 고딕" panose="020B0503020000020004" pitchFamily="50" charset="-127"/>
                 <a:cs typeface="Times New Roman" panose="02020603050405020304" pitchFamily="18" charset="0"/>
               </a:rPr>
-              <a:t>For each test data</a:t>
+              <a:t>For each test output throughput map</a:t>
             </a:r>
             <a:endParaRPr lang="ko-KR" altLang="en-US" b="1" dirty="0"/>
           </a:p>
@@ -11857,7 +11418,7 @@
         </p:nvSpPr>
         <p:spPr>
           <a:xfrm>
-            <a:off x="2338835" y="4651426"/>
+            <a:off x="3440795" y="3309853"/>
             <a:ext cx="4098849" cy="1042380"/>
           </a:xfrm>
           <a:prstGeom prst="rect">
@@ -11901,15 +11462,7 @@
                   <a:schemeClr val="tx1"/>
                 </a:solidFill>
               </a:rPr>
-              <a:t>3</a:t>
-            </a:r>
-            <a:r>
-              <a:rPr lang="en-US" altLang="ko-KR" b="1" dirty="0" smtClean="0">
-                <a:solidFill>
-                  <a:schemeClr val="tx1"/>
-                </a:solidFill>
-              </a:rPr>
-              <a:t>. </a:t>
+              <a:t>2. </a:t>
             </a:r>
             <a:r>
               <a:rPr lang="en-US" altLang="ko-KR" dirty="0" smtClean="0">
@@ -11949,7 +11502,7 @@
                   <a:schemeClr val="tx1"/>
                 </a:solidFill>
               </a:rPr>
-              <a:t>best throughput of throughput map about test input</a:t>
+              <a:t>best throughput from the throughput map about test input</a:t>
             </a:r>
             <a:endParaRPr lang="ko-KR" altLang="en-US" sz="1200" b="1" dirty="0">
               <a:solidFill>
@@ -11970,8 +11523,8 @@
         </p:nvCxnSpPr>
         <p:spPr>
           <a:xfrm rot="5400000">
-            <a:off x="7516177" y="3770732"/>
-            <a:ext cx="323391" cy="2480376"/>
+            <a:off x="7812616" y="2650119"/>
+            <a:ext cx="907952" cy="1453896"/>
           </a:xfrm>
           <a:prstGeom prst="bentConnector2">
             <a:avLst/>
@@ -12006,7 +11559,7 @@
         </p:nvSpPr>
         <p:spPr>
           <a:xfrm>
-            <a:off x="391635" y="4944016"/>
+            <a:off x="1493595" y="3602443"/>
             <a:ext cx="1435396" cy="457200"/>
           </a:xfrm>
           <a:prstGeom prst="roundRect">
@@ -12073,7 +11626,7 @@
         </p:nvCxnSpPr>
         <p:spPr>
           <a:xfrm flipH="1">
-            <a:off x="1827031" y="5172616"/>
+            <a:off x="2928991" y="3831043"/>
             <a:ext cx="511804" cy="0"/>
           </a:xfrm>
           <a:prstGeom prst="straightConnector1">
@@ -12101,10 +11654,245 @@
           </a:fontRef>
         </p:style>
       </p:cxnSp>
+      <p:cxnSp>
+        <p:nvCxnSpPr>
+          <p:cNvPr id="30" name="Straight Arrow Connector 29"/>
+          <p:cNvCxnSpPr>
+            <a:stCxn id="8" idx="3"/>
+            <a:endCxn id="49" idx="1"/>
+          </p:cNvCxnSpPr>
+          <p:nvPr/>
+        </p:nvCxnSpPr>
+        <p:spPr>
+          <a:xfrm>
+            <a:off x="6446654" y="2318417"/>
+            <a:ext cx="448950" cy="1"/>
+          </a:xfrm>
+          <a:prstGeom prst="straightConnector1">
+            <a:avLst/>
+          </a:prstGeom>
+          <a:ln w="38100">
+            <a:solidFill>
+              <a:schemeClr val="tx1"/>
+            </a:solidFill>
+            <a:tailEnd type="triangle" w="lg" len="lg"/>
+          </a:ln>
+        </p:spPr>
+        <p:style>
+          <a:lnRef idx="1">
+            <a:schemeClr val="accent1"/>
+          </a:lnRef>
+          <a:fillRef idx="0">
+            <a:schemeClr val="accent1"/>
+          </a:fillRef>
+          <a:effectRef idx="0">
+            <a:schemeClr val="accent1"/>
+          </a:effectRef>
+          <a:fontRef idx="minor">
+            <a:schemeClr val="tx1"/>
+          </a:fontRef>
+        </p:style>
+      </p:cxnSp>
     </p:spTree>
     <p:extLst>
       <p:ext uri="{BB962C8B-B14F-4D97-AF65-F5344CB8AC3E}">
         <p14:creationId xmlns:p14="http://schemas.microsoft.com/office/powerpoint/2010/main" val="4060369094"/>
+      </p:ext>
+    </p:extLst>
+  </p:cSld>
+  <p:clrMapOvr>
+    <a:masterClrMapping/>
+  </p:clrMapOvr>
+</p:sld>
+</file>
+
+<file path=ppt/slides/slide7.xml><?xml version="1.0" encoding="utf-8"?>
+<p:sld xmlns:a="http://schemas.openxmlformats.org/drawingml/2006/main" xmlns:r="http://schemas.openxmlformats.org/officeDocument/2006/relationships" xmlns:p="http://schemas.openxmlformats.org/presentationml/2006/main">
+  <p:cSld>
+    <p:spTree>
+      <p:nvGrpSpPr>
+        <p:cNvPr id="1" name=""/>
+        <p:cNvGrpSpPr/>
+        <p:nvPr/>
+      </p:nvGrpSpPr>
+      <p:grpSpPr>
+        <a:xfrm>
+          <a:off x="0" y="0"/>
+          <a:ext cx="0" cy="0"/>
+          <a:chOff x="0" y="0"/>
+          <a:chExt cx="0" cy="0"/>
+        </a:xfrm>
+      </p:grpSpPr>
+      <p:pic>
+        <p:nvPicPr>
+          <p:cNvPr id="4" name="Picture 3"/>
+          <p:cNvPicPr>
+            <a:picLocks noChangeAspect="1"/>
+          </p:cNvPicPr>
+          <p:nvPr/>
+        </p:nvPicPr>
+        <p:blipFill>
+          <a:blip r:embed="rId2"/>
+          <a:stretch>
+            <a:fillRect/>
+          </a:stretch>
+        </p:blipFill>
+        <p:spPr>
+          <a:xfrm>
+            <a:off x="142480" y="420113"/>
+            <a:ext cx="7188345" cy="3425266"/>
+          </a:xfrm>
+          <a:prstGeom prst="rect">
+            <a:avLst/>
+          </a:prstGeom>
+        </p:spPr>
+      </p:pic>
+      <p:sp>
+        <p:nvSpPr>
+          <p:cNvPr id="5" name="Rectangle 4"/>
+          <p:cNvSpPr/>
+          <p:nvPr/>
+        </p:nvSpPr>
+        <p:spPr>
+          <a:xfrm>
+            <a:off x="181229" y="3910693"/>
+            <a:ext cx="7113037" cy="646331"/>
+          </a:xfrm>
+          <a:prstGeom prst="rect">
+            <a:avLst/>
+          </a:prstGeom>
+        </p:spPr>
+        <p:txBody>
+          <a:bodyPr wrap="none">
+            <a:spAutoFit/>
+          </a:bodyPr>
+          <a:lstStyle/>
+          <a:p>
+            <a:pPr algn="ctr"/>
+            <a:r>
+              <a:rPr lang="en-US" altLang="ko-KR" b="1" dirty="0">
+                <a:latin typeface="맑은 고딕" panose="020B0503020000020004" pitchFamily="50" charset="-127"/>
+                <a:cs typeface="Times New Roman" panose="02020603050405020304" pitchFamily="18" charset="0"/>
+              </a:rPr>
+              <a:t>Figure </a:t>
+            </a:r>
+            <a:r>
+              <a:rPr lang="en-US" altLang="ko-KR" b="1" dirty="0">
+                <a:latin typeface="맑은 고딕" panose="020B0503020000020004" pitchFamily="50" charset="-127"/>
+                <a:cs typeface="Times New Roman" panose="02020603050405020304" pitchFamily="18" charset="0"/>
+              </a:rPr>
+              <a:t>5</a:t>
+            </a:r>
+            <a:r>
+              <a:rPr lang="en-US" altLang="ko-KR" b="1" dirty="0" smtClean="0">
+                <a:latin typeface="맑은 고딕" panose="020B0503020000020004" pitchFamily="50" charset="-127"/>
+                <a:cs typeface="Times New Roman" panose="02020603050405020304" pitchFamily="18" charset="0"/>
+              </a:rPr>
+              <a:t>. </a:t>
+            </a:r>
+            <a:r>
+              <a:rPr lang="en-US" altLang="ko-KR" b="1" dirty="0" smtClean="0">
+                <a:latin typeface="맑은 고딕" panose="020B0503020000020004" pitchFamily="50" charset="-127"/>
+                <a:cs typeface="Times New Roman" panose="02020603050405020304" pitchFamily="18" charset="0"/>
+              </a:rPr>
+              <a:t>CT.RATE and CT.AVERAGE values of our methodology</a:t>
+            </a:r>
+          </a:p>
+          <a:p>
+            <a:pPr algn="ctr"/>
+            <a:r>
+              <a:rPr lang="en-US" altLang="ko-KR" b="1" dirty="0" smtClean="0">
+                <a:latin typeface="맑은 고딕" panose="020B0503020000020004" pitchFamily="50" charset="-127"/>
+                <a:cs typeface="Times New Roman" panose="02020603050405020304" pitchFamily="18" charset="0"/>
+              </a:rPr>
+              <a:t>and methodology in the original paper</a:t>
+            </a:r>
+            <a:endParaRPr lang="ko-KR" altLang="en-US" dirty="0"/>
+          </a:p>
+        </p:txBody>
+      </p:sp>
+      <p:pic>
+        <p:nvPicPr>
+          <p:cNvPr id="6" name="Picture 5"/>
+          <p:cNvPicPr>
+            <a:picLocks noChangeAspect="1"/>
+          </p:cNvPicPr>
+          <p:nvPr/>
+        </p:nvPicPr>
+        <p:blipFill>
+          <a:blip r:embed="rId3"/>
+          <a:stretch>
+            <a:fillRect/>
+          </a:stretch>
+        </p:blipFill>
+        <p:spPr>
+          <a:xfrm>
+            <a:off x="7763369" y="447683"/>
+            <a:ext cx="4241519" cy="3397696"/>
+          </a:xfrm>
+          <a:prstGeom prst="rect">
+            <a:avLst/>
+          </a:prstGeom>
+        </p:spPr>
+      </p:pic>
+      <p:sp>
+        <p:nvSpPr>
+          <p:cNvPr id="7" name="Rectangle 6"/>
+          <p:cNvSpPr/>
+          <p:nvPr/>
+        </p:nvSpPr>
+        <p:spPr>
+          <a:xfrm>
+            <a:off x="7778084" y="3910693"/>
+            <a:ext cx="4184351" cy="369332"/>
+          </a:xfrm>
+          <a:prstGeom prst="rect">
+            <a:avLst/>
+          </a:prstGeom>
+        </p:spPr>
+        <p:txBody>
+          <a:bodyPr wrap="none">
+            <a:spAutoFit/>
+          </a:bodyPr>
+          <a:lstStyle/>
+          <a:p>
+            <a:pPr algn="ctr"/>
+            <a:r>
+              <a:rPr lang="en-US" altLang="ko-KR" b="1" dirty="0">
+                <a:latin typeface="맑은 고딕" panose="020B0503020000020004" pitchFamily="50" charset="-127"/>
+                <a:cs typeface="Times New Roman" panose="02020603050405020304" pitchFamily="18" charset="0"/>
+              </a:rPr>
+              <a:t>Figure </a:t>
+            </a:r>
+            <a:r>
+              <a:rPr lang="en-US" altLang="ko-KR" b="1" dirty="0" smtClean="0">
+                <a:latin typeface="맑은 고딕" panose="020B0503020000020004" pitchFamily="50" charset="-127"/>
+                <a:cs typeface="Times New Roman" panose="02020603050405020304" pitchFamily="18" charset="0"/>
+              </a:rPr>
+              <a:t>6</a:t>
+            </a:r>
+            <a:r>
+              <a:rPr lang="en-US" altLang="ko-KR" b="1" dirty="0" smtClean="0">
+                <a:latin typeface="맑은 고딕" panose="020B0503020000020004" pitchFamily="50" charset="-127"/>
+                <a:cs typeface="Times New Roman" panose="02020603050405020304" pitchFamily="18" charset="0"/>
+              </a:rPr>
+              <a:t>. </a:t>
+            </a:r>
+            <a:r>
+              <a:rPr lang="en-US" altLang="ko-KR" b="1" dirty="0" smtClean="0">
+                <a:latin typeface="맑은 고딕" panose="020B0503020000020004" pitchFamily="50" charset="-127"/>
+                <a:cs typeface="Times New Roman" panose="02020603050405020304" pitchFamily="18" charset="0"/>
+              </a:rPr>
+              <a:t>CT.AVGMAX and PR values</a:t>
+            </a:r>
+            <a:endParaRPr lang="ko-KR" altLang="en-US" dirty="0"/>
+          </a:p>
+        </p:txBody>
+      </p:sp>
+    </p:spTree>
+    <p:extLst>
+      <p:ext uri="{BB962C8B-B14F-4D97-AF65-F5344CB8AC3E}">
+        <p14:creationId xmlns:p14="http://schemas.microsoft.com/office/powerpoint/2010/main" val="2508721355"/>
       </p:ext>
     </p:extLst>
   </p:cSld>

</xml_diff>

<commit_message>
update: modify errors from the draft
</commit_message>
<xml_diff>
--- a/WPCN/for_final_paper.pptx
+++ b/WPCN/for_final_paper.pptx
@@ -11723,6 +11723,96 @@
           <a:chExt cx="0" cy="0"/>
         </a:xfrm>
       </p:grpSpPr>
+      <p:sp>
+        <p:nvSpPr>
+          <p:cNvPr id="5" name="Rectangle 4"/>
+          <p:cNvSpPr/>
+          <p:nvPr/>
+        </p:nvSpPr>
+        <p:spPr>
+          <a:xfrm>
+            <a:off x="181229" y="3910693"/>
+            <a:ext cx="7113037" cy="646331"/>
+          </a:xfrm>
+          <a:prstGeom prst="rect">
+            <a:avLst/>
+          </a:prstGeom>
+        </p:spPr>
+        <p:txBody>
+          <a:bodyPr wrap="none">
+            <a:spAutoFit/>
+          </a:bodyPr>
+          <a:lstStyle/>
+          <a:p>
+            <a:pPr algn="ctr"/>
+            <a:r>
+              <a:rPr lang="en-US" altLang="ko-KR" b="1" dirty="0">
+                <a:latin typeface="맑은 고딕" panose="020B0503020000020004" pitchFamily="50" charset="-127"/>
+                <a:cs typeface="Times New Roman" panose="02020603050405020304" pitchFamily="18" charset="0"/>
+              </a:rPr>
+              <a:t>Figure 5</a:t>
+            </a:r>
+            <a:r>
+              <a:rPr lang="en-US" altLang="ko-KR" b="1" dirty="0" smtClean="0">
+                <a:latin typeface="맑은 고딕" panose="020B0503020000020004" pitchFamily="50" charset="-127"/>
+                <a:cs typeface="Times New Roman" panose="02020603050405020304" pitchFamily="18" charset="0"/>
+              </a:rPr>
+              <a:t>. CT.RATE and CT.AVERAGE values of our methodology</a:t>
+            </a:r>
+          </a:p>
+          <a:p>
+            <a:pPr algn="ctr"/>
+            <a:r>
+              <a:rPr lang="en-US" altLang="ko-KR" b="1" dirty="0" smtClean="0">
+                <a:latin typeface="맑은 고딕" panose="020B0503020000020004" pitchFamily="50" charset="-127"/>
+                <a:cs typeface="Times New Roman" panose="02020603050405020304" pitchFamily="18" charset="0"/>
+              </a:rPr>
+              <a:t>and methodology in the original paper</a:t>
+            </a:r>
+            <a:endParaRPr lang="ko-KR" altLang="en-US" dirty="0"/>
+          </a:p>
+        </p:txBody>
+      </p:sp>
+      <p:sp>
+        <p:nvSpPr>
+          <p:cNvPr id="7" name="Rectangle 6"/>
+          <p:cNvSpPr/>
+          <p:nvPr/>
+        </p:nvSpPr>
+        <p:spPr>
+          <a:xfrm>
+            <a:off x="7362713" y="3930681"/>
+            <a:ext cx="4184351" cy="369332"/>
+          </a:xfrm>
+          <a:prstGeom prst="rect">
+            <a:avLst/>
+          </a:prstGeom>
+        </p:spPr>
+        <p:txBody>
+          <a:bodyPr wrap="none">
+            <a:spAutoFit/>
+          </a:bodyPr>
+          <a:lstStyle/>
+          <a:p>
+            <a:pPr algn="ctr"/>
+            <a:r>
+              <a:rPr lang="en-US" altLang="ko-KR" b="1" dirty="0">
+                <a:latin typeface="맑은 고딕" panose="020B0503020000020004" pitchFamily="50" charset="-127"/>
+                <a:cs typeface="Times New Roman" panose="02020603050405020304" pitchFamily="18" charset="0"/>
+              </a:rPr>
+              <a:t>Figure </a:t>
+            </a:r>
+            <a:r>
+              <a:rPr lang="en-US" altLang="ko-KR" b="1" dirty="0" smtClean="0">
+                <a:latin typeface="맑은 고딕" panose="020B0503020000020004" pitchFamily="50" charset="-127"/>
+                <a:cs typeface="Times New Roman" panose="02020603050405020304" pitchFamily="18" charset="0"/>
+              </a:rPr>
+              <a:t>6. CT.AVGMAX and PR values</a:t>
+            </a:r>
+            <a:endParaRPr lang="ko-KR" altLang="en-US" dirty="0"/>
+          </a:p>
+        </p:txBody>
+      </p:sp>
       <p:pic>
         <p:nvPicPr>
           <p:cNvPr id="4" name="Picture 3"/>
@@ -11739,78 +11829,14 @@
         </p:blipFill>
         <p:spPr>
           <a:xfrm>
-            <a:off x="142480" y="420113"/>
-            <a:ext cx="7188345" cy="3425266"/>
+            <a:off x="338666" y="687193"/>
+            <a:ext cx="6633633" cy="3158186"/>
           </a:xfrm>
           <a:prstGeom prst="rect">
             <a:avLst/>
           </a:prstGeom>
         </p:spPr>
       </p:pic>
-      <p:sp>
-        <p:nvSpPr>
-          <p:cNvPr id="5" name="Rectangle 4"/>
-          <p:cNvSpPr/>
-          <p:nvPr/>
-        </p:nvSpPr>
-        <p:spPr>
-          <a:xfrm>
-            <a:off x="181229" y="3910693"/>
-            <a:ext cx="7113037" cy="646331"/>
-          </a:xfrm>
-          <a:prstGeom prst="rect">
-            <a:avLst/>
-          </a:prstGeom>
-        </p:spPr>
-        <p:txBody>
-          <a:bodyPr wrap="none">
-            <a:spAutoFit/>
-          </a:bodyPr>
-          <a:lstStyle/>
-          <a:p>
-            <a:pPr algn="ctr"/>
-            <a:r>
-              <a:rPr lang="en-US" altLang="ko-KR" b="1" dirty="0">
-                <a:latin typeface="맑은 고딕" panose="020B0503020000020004" pitchFamily="50" charset="-127"/>
-                <a:cs typeface="Times New Roman" panose="02020603050405020304" pitchFamily="18" charset="0"/>
-              </a:rPr>
-              <a:t>Figure </a:t>
-            </a:r>
-            <a:r>
-              <a:rPr lang="en-US" altLang="ko-KR" b="1" dirty="0">
-                <a:latin typeface="맑은 고딕" panose="020B0503020000020004" pitchFamily="50" charset="-127"/>
-                <a:cs typeface="Times New Roman" panose="02020603050405020304" pitchFamily="18" charset="0"/>
-              </a:rPr>
-              <a:t>5</a:t>
-            </a:r>
-            <a:r>
-              <a:rPr lang="en-US" altLang="ko-KR" b="1" dirty="0" smtClean="0">
-                <a:latin typeface="맑은 고딕" panose="020B0503020000020004" pitchFamily="50" charset="-127"/>
-                <a:cs typeface="Times New Roman" panose="02020603050405020304" pitchFamily="18" charset="0"/>
-              </a:rPr>
-              <a:t>. </a:t>
-            </a:r>
-            <a:r>
-              <a:rPr lang="en-US" altLang="ko-KR" b="1" dirty="0" smtClean="0">
-                <a:latin typeface="맑은 고딕" panose="020B0503020000020004" pitchFamily="50" charset="-127"/>
-                <a:cs typeface="Times New Roman" panose="02020603050405020304" pitchFamily="18" charset="0"/>
-              </a:rPr>
-              <a:t>CT.RATE and CT.AVERAGE values of our methodology</a:t>
-            </a:r>
-          </a:p>
-          <a:p>
-            <a:pPr algn="ctr"/>
-            <a:r>
-              <a:rPr lang="en-US" altLang="ko-KR" b="1" dirty="0" smtClean="0">
-                <a:latin typeface="맑은 고딕" panose="020B0503020000020004" pitchFamily="50" charset="-127"/>
-                <a:cs typeface="Times New Roman" panose="02020603050405020304" pitchFamily="18" charset="0"/>
-              </a:rPr>
-              <a:t>and methodology in the original paper</a:t>
-            </a:r>
-            <a:endParaRPr lang="ko-KR" altLang="en-US" dirty="0"/>
-          </a:p>
-        </p:txBody>
-      </p:sp>
       <p:pic>
         <p:nvPicPr>
           <p:cNvPr id="6" name="Picture 5"/>
@@ -11827,68 +11853,14 @@
         </p:blipFill>
         <p:spPr>
           <a:xfrm>
-            <a:off x="7763369" y="447683"/>
-            <a:ext cx="4241519" cy="3397696"/>
+            <a:off x="7439417" y="667205"/>
+            <a:ext cx="4030944" cy="3198162"/>
           </a:xfrm>
           <a:prstGeom prst="rect">
             <a:avLst/>
           </a:prstGeom>
         </p:spPr>
       </p:pic>
-      <p:sp>
-        <p:nvSpPr>
-          <p:cNvPr id="7" name="Rectangle 6"/>
-          <p:cNvSpPr/>
-          <p:nvPr/>
-        </p:nvSpPr>
-        <p:spPr>
-          <a:xfrm>
-            <a:off x="7778084" y="3910693"/>
-            <a:ext cx="4184351" cy="369332"/>
-          </a:xfrm>
-          <a:prstGeom prst="rect">
-            <a:avLst/>
-          </a:prstGeom>
-        </p:spPr>
-        <p:txBody>
-          <a:bodyPr wrap="none">
-            <a:spAutoFit/>
-          </a:bodyPr>
-          <a:lstStyle/>
-          <a:p>
-            <a:pPr algn="ctr"/>
-            <a:r>
-              <a:rPr lang="en-US" altLang="ko-KR" b="1" dirty="0">
-                <a:latin typeface="맑은 고딕" panose="020B0503020000020004" pitchFamily="50" charset="-127"/>
-                <a:cs typeface="Times New Roman" panose="02020603050405020304" pitchFamily="18" charset="0"/>
-              </a:rPr>
-              <a:t>Figure </a:t>
-            </a:r>
-            <a:r>
-              <a:rPr lang="en-US" altLang="ko-KR" b="1" dirty="0" smtClean="0">
-                <a:latin typeface="맑은 고딕" panose="020B0503020000020004" pitchFamily="50" charset="-127"/>
-                <a:cs typeface="Times New Roman" panose="02020603050405020304" pitchFamily="18" charset="0"/>
-              </a:rPr>
-              <a:t>6</a:t>
-            </a:r>
-            <a:r>
-              <a:rPr lang="en-US" altLang="ko-KR" b="1" dirty="0" smtClean="0">
-                <a:latin typeface="맑은 고딕" panose="020B0503020000020004" pitchFamily="50" charset="-127"/>
-                <a:cs typeface="Times New Roman" panose="02020603050405020304" pitchFamily="18" charset="0"/>
-              </a:rPr>
-              <a:t>. </a:t>
-            </a:r>
-            <a:r>
-              <a:rPr lang="en-US" altLang="ko-KR" b="1" dirty="0" smtClean="0">
-                <a:latin typeface="맑은 고딕" panose="020B0503020000020004" pitchFamily="50" charset="-127"/>
-                <a:cs typeface="Times New Roman" panose="02020603050405020304" pitchFamily="18" charset="0"/>
-              </a:rPr>
-              <a:t>CT.AVGMAX and PR values</a:t>
-            </a:r>
-            <a:endParaRPr lang="ko-KR" altLang="en-US" dirty="0"/>
-          </a:p>
-        </p:txBody>
-      </p:sp>
     </p:spTree>
     <p:extLst>
       <p:ext uri="{BB962C8B-B14F-4D97-AF65-F5344CB8AC3E}">

</xml_diff>

<commit_message>
add: update final report
</commit_message>
<xml_diff>
--- a/WPCN/for_final_paper.pptx
+++ b/WPCN/for_final_paper.pptx
@@ -6,12 +6,14 @@
   </p:sldMasterIdLst>
   <p:sldIdLst>
     <p:sldId id="256" r:id="rId2"/>
-    <p:sldId id="257" r:id="rId3"/>
-    <p:sldId id="258" r:id="rId4"/>
-    <p:sldId id="259" r:id="rId5"/>
-    <p:sldId id="260" r:id="rId6"/>
-    <p:sldId id="261" r:id="rId7"/>
-    <p:sldId id="262" r:id="rId8"/>
+    <p:sldId id="263" r:id="rId3"/>
+    <p:sldId id="257" r:id="rId4"/>
+    <p:sldId id="258" r:id="rId5"/>
+    <p:sldId id="259" r:id="rId6"/>
+    <p:sldId id="260" r:id="rId7"/>
+    <p:sldId id="261" r:id="rId8"/>
+    <p:sldId id="264" r:id="rId9"/>
+    <p:sldId id="265" r:id="rId10"/>
   </p:sldIdLst>
   <p:sldSz cx="12192000" cy="6858000"/>
   <p:notesSz cx="6858000" cy="9144000"/>
@@ -249,7 +251,7 @@
           <a:p>
             <a:fld id="{7DEA4731-64EB-4CE7-B59A-17BBA9BDC1E6}" type="datetimeFigureOut">
               <a:rPr lang="ko-KR" altLang="en-US" smtClean="0"/>
-              <a:t>2020-06-29</a:t>
+              <a:t>2020-07-01</a:t>
             </a:fld>
             <a:endParaRPr lang="ko-KR" altLang="en-US"/>
           </a:p>
@@ -419,7 +421,7 @@
           <a:p>
             <a:fld id="{7DEA4731-64EB-4CE7-B59A-17BBA9BDC1E6}" type="datetimeFigureOut">
               <a:rPr lang="ko-KR" altLang="en-US" smtClean="0"/>
-              <a:t>2020-06-29</a:t>
+              <a:t>2020-07-01</a:t>
             </a:fld>
             <a:endParaRPr lang="ko-KR" altLang="en-US"/>
           </a:p>
@@ -599,7 +601,7 @@
           <a:p>
             <a:fld id="{7DEA4731-64EB-4CE7-B59A-17BBA9BDC1E6}" type="datetimeFigureOut">
               <a:rPr lang="ko-KR" altLang="en-US" smtClean="0"/>
-              <a:t>2020-06-29</a:t>
+              <a:t>2020-07-01</a:t>
             </a:fld>
             <a:endParaRPr lang="ko-KR" altLang="en-US"/>
           </a:p>
@@ -769,7 +771,7 @@
           <a:p>
             <a:fld id="{7DEA4731-64EB-4CE7-B59A-17BBA9BDC1E6}" type="datetimeFigureOut">
               <a:rPr lang="ko-KR" altLang="en-US" smtClean="0"/>
-              <a:t>2020-06-29</a:t>
+              <a:t>2020-07-01</a:t>
             </a:fld>
             <a:endParaRPr lang="ko-KR" altLang="en-US"/>
           </a:p>
@@ -1015,7 +1017,7 @@
           <a:p>
             <a:fld id="{7DEA4731-64EB-4CE7-B59A-17BBA9BDC1E6}" type="datetimeFigureOut">
               <a:rPr lang="ko-KR" altLang="en-US" smtClean="0"/>
-              <a:t>2020-06-29</a:t>
+              <a:t>2020-07-01</a:t>
             </a:fld>
             <a:endParaRPr lang="ko-KR" altLang="en-US"/>
           </a:p>
@@ -1247,7 +1249,7 @@
           <a:p>
             <a:fld id="{7DEA4731-64EB-4CE7-B59A-17BBA9BDC1E6}" type="datetimeFigureOut">
               <a:rPr lang="ko-KR" altLang="en-US" smtClean="0"/>
-              <a:t>2020-06-29</a:t>
+              <a:t>2020-07-01</a:t>
             </a:fld>
             <a:endParaRPr lang="ko-KR" altLang="en-US"/>
           </a:p>
@@ -1614,7 +1616,7 @@
           <a:p>
             <a:fld id="{7DEA4731-64EB-4CE7-B59A-17BBA9BDC1E6}" type="datetimeFigureOut">
               <a:rPr lang="ko-KR" altLang="en-US" smtClean="0"/>
-              <a:t>2020-06-29</a:t>
+              <a:t>2020-07-01</a:t>
             </a:fld>
             <a:endParaRPr lang="ko-KR" altLang="en-US"/>
           </a:p>
@@ -1732,7 +1734,7 @@
           <a:p>
             <a:fld id="{7DEA4731-64EB-4CE7-B59A-17BBA9BDC1E6}" type="datetimeFigureOut">
               <a:rPr lang="ko-KR" altLang="en-US" smtClean="0"/>
-              <a:t>2020-06-29</a:t>
+              <a:t>2020-07-01</a:t>
             </a:fld>
             <a:endParaRPr lang="ko-KR" altLang="en-US"/>
           </a:p>
@@ -1827,7 +1829,7 @@
           <a:p>
             <a:fld id="{7DEA4731-64EB-4CE7-B59A-17BBA9BDC1E6}" type="datetimeFigureOut">
               <a:rPr lang="ko-KR" altLang="en-US" smtClean="0"/>
-              <a:t>2020-06-29</a:t>
+              <a:t>2020-07-01</a:t>
             </a:fld>
             <a:endParaRPr lang="ko-KR" altLang="en-US"/>
           </a:p>
@@ -2104,7 +2106,7 @@
           <a:p>
             <a:fld id="{7DEA4731-64EB-4CE7-B59A-17BBA9BDC1E6}" type="datetimeFigureOut">
               <a:rPr lang="ko-KR" altLang="en-US" smtClean="0"/>
-              <a:t>2020-06-29</a:t>
+              <a:t>2020-07-01</a:t>
             </a:fld>
             <a:endParaRPr lang="ko-KR" altLang="en-US"/>
           </a:p>
@@ -2357,7 +2359,7 @@
           <a:p>
             <a:fld id="{7DEA4731-64EB-4CE7-B59A-17BBA9BDC1E6}" type="datetimeFigureOut">
               <a:rPr lang="ko-KR" altLang="en-US" smtClean="0"/>
-              <a:t>2020-06-29</a:t>
+              <a:t>2020-07-01</a:t>
             </a:fld>
             <a:endParaRPr lang="ko-KR" altLang="en-US"/>
           </a:p>
@@ -2570,7 +2572,7 @@
           <a:p>
             <a:fld id="{7DEA4731-64EB-4CE7-B59A-17BBA9BDC1E6}" type="datetimeFigureOut">
               <a:rPr lang="ko-KR" altLang="en-US" smtClean="0"/>
-              <a:t>2020-06-29</a:t>
+              <a:t>2020-07-01</a:t>
             </a:fld>
             <a:endParaRPr lang="ko-KR" altLang="en-US"/>
           </a:p>
@@ -4676,6 +4678,2539 @@
           <a:chExt cx="0" cy="0"/>
         </a:xfrm>
       </p:grpSpPr>
+      <p:sp>
+        <p:nvSpPr>
+          <p:cNvPr id="2" name="Donut 1"/>
+          <p:cNvSpPr/>
+          <p:nvPr/>
+        </p:nvSpPr>
+        <p:spPr>
+          <a:xfrm>
+            <a:off x="2180774" y="1666309"/>
+            <a:ext cx="457200" cy="457200"/>
+          </a:xfrm>
+          <a:prstGeom prst="donut">
+            <a:avLst>
+              <a:gd name="adj" fmla="val 9384"/>
+            </a:avLst>
+          </a:prstGeom>
+          <a:solidFill>
+            <a:schemeClr val="tx1"/>
+          </a:solidFill>
+          <a:ln>
+            <a:noFill/>
+          </a:ln>
+        </p:spPr>
+        <p:style>
+          <a:lnRef idx="2">
+            <a:schemeClr val="accent1">
+              <a:shade val="50000"/>
+            </a:schemeClr>
+          </a:lnRef>
+          <a:fillRef idx="1">
+            <a:schemeClr val="accent1"/>
+          </a:fillRef>
+          <a:effectRef idx="0">
+            <a:schemeClr val="accent1"/>
+          </a:effectRef>
+          <a:fontRef idx="minor">
+            <a:schemeClr val="lt1"/>
+          </a:fontRef>
+        </p:style>
+        <p:txBody>
+          <a:bodyPr rtlCol="0" anchor="ctr"/>
+          <a:lstStyle/>
+          <a:p>
+            <a:pPr algn="ctr"/>
+            <a:endParaRPr lang="ko-KR" altLang="en-US">
+              <a:solidFill>
+                <a:schemeClr val="tx1"/>
+              </a:solidFill>
+            </a:endParaRPr>
+          </a:p>
+        </p:txBody>
+      </p:sp>
+      <p:sp>
+        <p:nvSpPr>
+          <p:cNvPr id="3" name="Rectangle 2"/>
+          <p:cNvSpPr/>
+          <p:nvPr/>
+        </p:nvSpPr>
+        <p:spPr>
+          <a:xfrm>
+            <a:off x="4615038" y="2096204"/>
+            <a:ext cx="315672" cy="213360"/>
+          </a:xfrm>
+          <a:prstGeom prst="rect">
+            <a:avLst/>
+          </a:prstGeom>
+          <a:noFill/>
+          <a:ln w="38100">
+            <a:solidFill>
+              <a:schemeClr val="tx1"/>
+            </a:solidFill>
+          </a:ln>
+        </p:spPr>
+        <p:style>
+          <a:lnRef idx="2">
+            <a:schemeClr val="accent1">
+              <a:shade val="50000"/>
+            </a:schemeClr>
+          </a:lnRef>
+          <a:fillRef idx="1">
+            <a:schemeClr val="accent1"/>
+          </a:fillRef>
+          <a:effectRef idx="0">
+            <a:schemeClr val="accent1"/>
+          </a:effectRef>
+          <a:fontRef idx="minor">
+            <a:schemeClr val="lt1"/>
+          </a:fontRef>
+        </p:style>
+        <p:txBody>
+          <a:bodyPr rtlCol="0" anchor="ctr"/>
+          <a:lstStyle/>
+          <a:p>
+            <a:pPr algn="ctr"/>
+            <a:endParaRPr lang="ko-KR" altLang="en-US"/>
+          </a:p>
+        </p:txBody>
+      </p:sp>
+      <p:sp>
+        <p:nvSpPr>
+          <p:cNvPr id="8" name="Isosceles Triangle 7"/>
+          <p:cNvSpPr/>
+          <p:nvPr/>
+        </p:nvSpPr>
+        <p:spPr>
+          <a:xfrm flipV="1">
+            <a:off x="4665126" y="1791404"/>
+            <a:ext cx="213360" cy="152400"/>
+          </a:xfrm>
+          <a:prstGeom prst="triangle">
+            <a:avLst/>
+          </a:prstGeom>
+          <a:noFill/>
+          <a:ln w="38100">
+            <a:solidFill>
+              <a:schemeClr val="tx1"/>
+            </a:solidFill>
+          </a:ln>
+        </p:spPr>
+        <p:style>
+          <a:lnRef idx="2">
+            <a:schemeClr val="accent1">
+              <a:shade val="50000"/>
+            </a:schemeClr>
+          </a:lnRef>
+          <a:fillRef idx="1">
+            <a:schemeClr val="accent1"/>
+          </a:fillRef>
+          <a:effectRef idx="0">
+            <a:schemeClr val="accent1"/>
+          </a:effectRef>
+          <a:fontRef idx="minor">
+            <a:schemeClr val="lt1"/>
+          </a:fontRef>
+        </p:style>
+        <p:txBody>
+          <a:bodyPr rtlCol="0" anchor="ctr"/>
+          <a:lstStyle/>
+          <a:p>
+            <a:pPr algn="ctr"/>
+            <a:endParaRPr lang="ko-KR" altLang="en-US"/>
+          </a:p>
+        </p:txBody>
+      </p:sp>
+      <p:cxnSp>
+        <p:nvCxnSpPr>
+          <p:cNvPr id="18" name="Straight Connector 17"/>
+          <p:cNvCxnSpPr>
+            <a:stCxn id="8" idx="0"/>
+            <a:endCxn id="3" idx="0"/>
+          </p:cNvCxnSpPr>
+          <p:nvPr/>
+        </p:nvCxnSpPr>
+        <p:spPr>
+          <a:xfrm>
+            <a:off x="4771806" y="1943804"/>
+            <a:ext cx="1068" cy="152400"/>
+          </a:xfrm>
+          <a:prstGeom prst="line">
+            <a:avLst/>
+          </a:prstGeom>
+          <a:ln w="38100">
+            <a:solidFill>
+              <a:schemeClr val="tx1"/>
+            </a:solidFill>
+          </a:ln>
+        </p:spPr>
+        <p:style>
+          <a:lnRef idx="1">
+            <a:schemeClr val="accent1"/>
+          </a:lnRef>
+          <a:fillRef idx="0">
+            <a:schemeClr val="accent1"/>
+          </a:fillRef>
+          <a:effectRef idx="0">
+            <a:schemeClr val="accent1"/>
+          </a:effectRef>
+          <a:fontRef idx="minor">
+            <a:schemeClr val="tx1"/>
+          </a:fontRef>
+        </p:style>
+      </p:cxnSp>
+      <p:sp>
+        <p:nvSpPr>
+          <p:cNvPr id="38" name="Donut 37"/>
+          <p:cNvSpPr/>
+          <p:nvPr/>
+        </p:nvSpPr>
+        <p:spPr>
+          <a:xfrm>
+            <a:off x="1232238" y="4320280"/>
+            <a:ext cx="457200" cy="457200"/>
+          </a:xfrm>
+          <a:prstGeom prst="donut">
+            <a:avLst>
+              <a:gd name="adj" fmla="val 9384"/>
+            </a:avLst>
+          </a:prstGeom>
+          <a:solidFill>
+            <a:schemeClr val="tx1"/>
+          </a:solidFill>
+          <a:ln>
+            <a:noFill/>
+          </a:ln>
+        </p:spPr>
+        <p:style>
+          <a:lnRef idx="2">
+            <a:schemeClr val="accent1">
+              <a:shade val="50000"/>
+            </a:schemeClr>
+          </a:lnRef>
+          <a:fillRef idx="1">
+            <a:schemeClr val="accent1"/>
+          </a:fillRef>
+          <a:effectRef idx="0">
+            <a:schemeClr val="accent1"/>
+          </a:effectRef>
+          <a:fontRef idx="minor">
+            <a:schemeClr val="lt1"/>
+          </a:fontRef>
+        </p:style>
+        <p:txBody>
+          <a:bodyPr rtlCol="0" anchor="ctr"/>
+          <a:lstStyle/>
+          <a:p>
+            <a:pPr algn="ctr"/>
+            <a:endParaRPr lang="ko-KR" altLang="en-US">
+              <a:solidFill>
+                <a:schemeClr val="tx1"/>
+              </a:solidFill>
+            </a:endParaRPr>
+          </a:p>
+        </p:txBody>
+      </p:sp>
+      <p:sp>
+        <p:nvSpPr>
+          <p:cNvPr id="20" name="TextBox 19"/>
+          <p:cNvSpPr txBox="1"/>
+          <p:nvPr/>
+        </p:nvSpPr>
+        <p:spPr>
+          <a:xfrm>
+            <a:off x="1776537" y="4348825"/>
+            <a:ext cx="2100575" cy="400110"/>
+          </a:xfrm>
+          <a:prstGeom prst="rect">
+            <a:avLst/>
+          </a:prstGeom>
+          <a:noFill/>
+        </p:spPr>
+        <p:txBody>
+          <a:bodyPr wrap="none" rtlCol="0">
+            <a:spAutoFit/>
+          </a:bodyPr>
+          <a:lstStyle/>
+          <a:p>
+            <a:r>
+              <a:rPr lang="en-US" altLang="ko-KR" sz="2000" b="1" dirty="0" smtClean="0"/>
+              <a:t>Wireless Device</a:t>
+            </a:r>
+            <a:endParaRPr lang="ko-KR" altLang="en-US" sz="2000" b="1" dirty="0"/>
+          </a:p>
+        </p:txBody>
+      </p:sp>
+      <p:sp>
+        <p:nvSpPr>
+          <p:cNvPr id="49" name="Rectangle 48"/>
+          <p:cNvSpPr/>
+          <p:nvPr/>
+        </p:nvSpPr>
+        <p:spPr>
+          <a:xfrm>
+            <a:off x="1460865" y="5247657"/>
+            <a:ext cx="315672" cy="213360"/>
+          </a:xfrm>
+          <a:prstGeom prst="rect">
+            <a:avLst/>
+          </a:prstGeom>
+          <a:noFill/>
+          <a:ln w="38100">
+            <a:solidFill>
+              <a:schemeClr val="tx1"/>
+            </a:solidFill>
+          </a:ln>
+        </p:spPr>
+        <p:style>
+          <a:lnRef idx="2">
+            <a:schemeClr val="accent1">
+              <a:shade val="50000"/>
+            </a:schemeClr>
+          </a:lnRef>
+          <a:fillRef idx="1">
+            <a:schemeClr val="accent1"/>
+          </a:fillRef>
+          <a:effectRef idx="0">
+            <a:schemeClr val="accent1"/>
+          </a:effectRef>
+          <a:fontRef idx="minor">
+            <a:schemeClr val="lt1"/>
+          </a:fontRef>
+        </p:style>
+        <p:txBody>
+          <a:bodyPr rtlCol="0" anchor="ctr"/>
+          <a:lstStyle/>
+          <a:p>
+            <a:pPr algn="ctr"/>
+            <a:endParaRPr lang="ko-KR" altLang="en-US"/>
+          </a:p>
+        </p:txBody>
+      </p:sp>
+      <p:sp>
+        <p:nvSpPr>
+          <p:cNvPr id="50" name="Isosceles Triangle 49"/>
+          <p:cNvSpPr/>
+          <p:nvPr/>
+        </p:nvSpPr>
+        <p:spPr>
+          <a:xfrm flipV="1">
+            <a:off x="1510953" y="4942857"/>
+            <a:ext cx="213360" cy="152400"/>
+          </a:xfrm>
+          <a:prstGeom prst="triangle">
+            <a:avLst/>
+          </a:prstGeom>
+          <a:noFill/>
+          <a:ln w="38100">
+            <a:solidFill>
+              <a:schemeClr val="tx1"/>
+            </a:solidFill>
+          </a:ln>
+        </p:spPr>
+        <p:style>
+          <a:lnRef idx="2">
+            <a:schemeClr val="accent1">
+              <a:shade val="50000"/>
+            </a:schemeClr>
+          </a:lnRef>
+          <a:fillRef idx="1">
+            <a:schemeClr val="accent1"/>
+          </a:fillRef>
+          <a:effectRef idx="0">
+            <a:schemeClr val="accent1"/>
+          </a:effectRef>
+          <a:fontRef idx="minor">
+            <a:schemeClr val="lt1"/>
+          </a:fontRef>
+        </p:style>
+        <p:txBody>
+          <a:bodyPr rtlCol="0" anchor="ctr"/>
+          <a:lstStyle/>
+          <a:p>
+            <a:pPr algn="ctr"/>
+            <a:endParaRPr lang="ko-KR" altLang="en-US"/>
+          </a:p>
+        </p:txBody>
+      </p:sp>
+      <p:cxnSp>
+        <p:nvCxnSpPr>
+          <p:cNvPr id="52" name="Straight Connector 51"/>
+          <p:cNvCxnSpPr>
+            <a:stCxn id="50" idx="0"/>
+            <a:endCxn id="49" idx="0"/>
+          </p:cNvCxnSpPr>
+          <p:nvPr/>
+        </p:nvCxnSpPr>
+        <p:spPr>
+          <a:xfrm>
+            <a:off x="1617633" y="5095257"/>
+            <a:ext cx="1068" cy="152400"/>
+          </a:xfrm>
+          <a:prstGeom prst="line">
+            <a:avLst/>
+          </a:prstGeom>
+          <a:ln w="38100">
+            <a:solidFill>
+              <a:schemeClr val="tx1"/>
+            </a:solidFill>
+          </a:ln>
+        </p:spPr>
+        <p:style>
+          <a:lnRef idx="1">
+            <a:schemeClr val="accent1"/>
+          </a:lnRef>
+          <a:fillRef idx="0">
+            <a:schemeClr val="accent1"/>
+          </a:fillRef>
+          <a:effectRef idx="0">
+            <a:schemeClr val="accent1"/>
+          </a:effectRef>
+          <a:fontRef idx="minor">
+            <a:schemeClr val="tx1"/>
+          </a:fontRef>
+        </p:style>
+      </p:cxnSp>
+      <p:sp>
+        <p:nvSpPr>
+          <p:cNvPr id="53" name="TextBox 52"/>
+          <p:cNvSpPr txBox="1"/>
+          <p:nvPr/>
+        </p:nvSpPr>
+        <p:spPr>
+          <a:xfrm>
+            <a:off x="1892541" y="4969269"/>
+            <a:ext cx="1657826" cy="400110"/>
+          </a:xfrm>
+          <a:prstGeom prst="rect">
+            <a:avLst/>
+          </a:prstGeom>
+          <a:noFill/>
+        </p:spPr>
+        <p:txBody>
+          <a:bodyPr wrap="none" rtlCol="0">
+            <a:spAutoFit/>
+          </a:bodyPr>
+          <a:lstStyle/>
+          <a:p>
+            <a:r>
+              <a:rPr lang="en-US" altLang="ko-KR" sz="2000" b="1" dirty="0" smtClean="0"/>
+              <a:t>Mobile HAP</a:t>
+            </a:r>
+            <a:endParaRPr lang="ko-KR" altLang="en-US" sz="2000" b="1" dirty="0"/>
+          </a:p>
+        </p:txBody>
+      </p:sp>
+      <p:sp>
+        <p:nvSpPr>
+          <p:cNvPr id="54" name="Donut 53"/>
+          <p:cNvSpPr/>
+          <p:nvPr/>
+        </p:nvSpPr>
+        <p:spPr>
+          <a:xfrm>
+            <a:off x="1398454" y="2687389"/>
+            <a:ext cx="457200" cy="457200"/>
+          </a:xfrm>
+          <a:prstGeom prst="donut">
+            <a:avLst>
+              <a:gd name="adj" fmla="val 9384"/>
+            </a:avLst>
+          </a:prstGeom>
+          <a:solidFill>
+            <a:schemeClr val="tx1"/>
+          </a:solidFill>
+          <a:ln>
+            <a:noFill/>
+          </a:ln>
+        </p:spPr>
+        <p:style>
+          <a:lnRef idx="2">
+            <a:schemeClr val="accent1">
+              <a:shade val="50000"/>
+            </a:schemeClr>
+          </a:lnRef>
+          <a:fillRef idx="1">
+            <a:schemeClr val="accent1"/>
+          </a:fillRef>
+          <a:effectRef idx="0">
+            <a:schemeClr val="accent1"/>
+          </a:effectRef>
+          <a:fontRef idx="minor">
+            <a:schemeClr val="lt1"/>
+          </a:fontRef>
+        </p:style>
+        <p:txBody>
+          <a:bodyPr rtlCol="0" anchor="ctr"/>
+          <a:lstStyle/>
+          <a:p>
+            <a:pPr algn="ctr"/>
+            <a:endParaRPr lang="ko-KR" altLang="en-US">
+              <a:solidFill>
+                <a:schemeClr val="tx1"/>
+              </a:solidFill>
+            </a:endParaRPr>
+          </a:p>
+        </p:txBody>
+      </p:sp>
+      <p:sp>
+        <p:nvSpPr>
+          <p:cNvPr id="55" name="Donut 54"/>
+          <p:cNvSpPr/>
+          <p:nvPr/>
+        </p:nvSpPr>
+        <p:spPr>
+          <a:xfrm>
+            <a:off x="1855654" y="3581469"/>
+            <a:ext cx="457200" cy="457200"/>
+          </a:xfrm>
+          <a:prstGeom prst="donut">
+            <a:avLst>
+              <a:gd name="adj" fmla="val 9384"/>
+            </a:avLst>
+          </a:prstGeom>
+          <a:solidFill>
+            <a:schemeClr val="tx1"/>
+          </a:solidFill>
+          <a:ln>
+            <a:noFill/>
+          </a:ln>
+        </p:spPr>
+        <p:style>
+          <a:lnRef idx="2">
+            <a:schemeClr val="accent1">
+              <a:shade val="50000"/>
+            </a:schemeClr>
+          </a:lnRef>
+          <a:fillRef idx="1">
+            <a:schemeClr val="accent1"/>
+          </a:fillRef>
+          <a:effectRef idx="0">
+            <a:schemeClr val="accent1"/>
+          </a:effectRef>
+          <a:fontRef idx="minor">
+            <a:schemeClr val="lt1"/>
+          </a:fontRef>
+        </p:style>
+        <p:txBody>
+          <a:bodyPr rtlCol="0" anchor="ctr"/>
+          <a:lstStyle/>
+          <a:p>
+            <a:pPr algn="ctr"/>
+            <a:endParaRPr lang="ko-KR" altLang="en-US">
+              <a:solidFill>
+                <a:schemeClr val="tx1"/>
+              </a:solidFill>
+            </a:endParaRPr>
+          </a:p>
+        </p:txBody>
+      </p:sp>
+      <p:sp>
+        <p:nvSpPr>
+          <p:cNvPr id="56" name="Donut 55"/>
+          <p:cNvSpPr/>
+          <p:nvPr/>
+        </p:nvSpPr>
+        <p:spPr>
+          <a:xfrm>
+            <a:off x="3034214" y="3347789"/>
+            <a:ext cx="457200" cy="457200"/>
+          </a:xfrm>
+          <a:prstGeom prst="donut">
+            <a:avLst>
+              <a:gd name="adj" fmla="val 9384"/>
+            </a:avLst>
+          </a:prstGeom>
+          <a:solidFill>
+            <a:schemeClr val="tx1"/>
+          </a:solidFill>
+          <a:ln>
+            <a:noFill/>
+          </a:ln>
+        </p:spPr>
+        <p:style>
+          <a:lnRef idx="2">
+            <a:schemeClr val="accent1">
+              <a:shade val="50000"/>
+            </a:schemeClr>
+          </a:lnRef>
+          <a:fillRef idx="1">
+            <a:schemeClr val="accent1"/>
+          </a:fillRef>
+          <a:effectRef idx="0">
+            <a:schemeClr val="accent1"/>
+          </a:effectRef>
+          <a:fontRef idx="minor">
+            <a:schemeClr val="lt1"/>
+          </a:fontRef>
+        </p:style>
+        <p:txBody>
+          <a:bodyPr rtlCol="0" anchor="ctr"/>
+          <a:lstStyle/>
+          <a:p>
+            <a:pPr algn="ctr"/>
+            <a:endParaRPr lang="ko-KR" altLang="en-US">
+              <a:solidFill>
+                <a:schemeClr val="tx1"/>
+              </a:solidFill>
+            </a:endParaRPr>
+          </a:p>
+        </p:txBody>
+      </p:sp>
+      <p:sp>
+        <p:nvSpPr>
+          <p:cNvPr id="57" name="Donut 56"/>
+          <p:cNvSpPr/>
+          <p:nvPr/>
+        </p:nvSpPr>
+        <p:spPr>
+          <a:xfrm>
+            <a:off x="3486308" y="2637294"/>
+            <a:ext cx="457200" cy="457200"/>
+          </a:xfrm>
+          <a:prstGeom prst="donut">
+            <a:avLst>
+              <a:gd name="adj" fmla="val 9384"/>
+            </a:avLst>
+          </a:prstGeom>
+          <a:solidFill>
+            <a:schemeClr val="tx1"/>
+          </a:solidFill>
+          <a:ln>
+            <a:noFill/>
+          </a:ln>
+        </p:spPr>
+        <p:style>
+          <a:lnRef idx="2">
+            <a:schemeClr val="accent1">
+              <a:shade val="50000"/>
+            </a:schemeClr>
+          </a:lnRef>
+          <a:fillRef idx="1">
+            <a:schemeClr val="accent1"/>
+          </a:fillRef>
+          <a:effectRef idx="0">
+            <a:schemeClr val="accent1"/>
+          </a:effectRef>
+          <a:fontRef idx="minor">
+            <a:schemeClr val="lt1"/>
+          </a:fontRef>
+        </p:style>
+        <p:txBody>
+          <a:bodyPr rtlCol="0" anchor="ctr"/>
+          <a:lstStyle/>
+          <a:p>
+            <a:pPr algn="ctr"/>
+            <a:endParaRPr lang="ko-KR" altLang="en-US">
+              <a:solidFill>
+                <a:schemeClr val="tx1"/>
+              </a:solidFill>
+            </a:endParaRPr>
+          </a:p>
+        </p:txBody>
+      </p:sp>
+      <p:sp>
+        <p:nvSpPr>
+          <p:cNvPr id="58" name="Donut 57"/>
+          <p:cNvSpPr/>
+          <p:nvPr/>
+        </p:nvSpPr>
+        <p:spPr>
+          <a:xfrm>
+            <a:off x="3069952" y="1515179"/>
+            <a:ext cx="457200" cy="457200"/>
+          </a:xfrm>
+          <a:prstGeom prst="donut">
+            <a:avLst>
+              <a:gd name="adj" fmla="val 9384"/>
+            </a:avLst>
+          </a:prstGeom>
+          <a:solidFill>
+            <a:schemeClr val="tx1"/>
+          </a:solidFill>
+          <a:ln>
+            <a:noFill/>
+          </a:ln>
+        </p:spPr>
+        <p:style>
+          <a:lnRef idx="2">
+            <a:schemeClr val="accent1">
+              <a:shade val="50000"/>
+            </a:schemeClr>
+          </a:lnRef>
+          <a:fillRef idx="1">
+            <a:schemeClr val="accent1"/>
+          </a:fillRef>
+          <a:effectRef idx="0">
+            <a:schemeClr val="accent1"/>
+          </a:effectRef>
+          <a:fontRef idx="minor">
+            <a:schemeClr val="lt1"/>
+          </a:fontRef>
+        </p:style>
+        <p:txBody>
+          <a:bodyPr rtlCol="0" anchor="ctr"/>
+          <a:lstStyle/>
+          <a:p>
+            <a:pPr algn="ctr"/>
+            <a:endParaRPr lang="ko-KR" altLang="en-US">
+              <a:solidFill>
+                <a:schemeClr val="tx1"/>
+              </a:solidFill>
+            </a:endParaRPr>
+          </a:p>
+        </p:txBody>
+      </p:sp>
+      <p:sp>
+        <p:nvSpPr>
+          <p:cNvPr id="31" name="Rectangle 30"/>
+          <p:cNvSpPr/>
+          <p:nvPr/>
+        </p:nvSpPr>
+        <p:spPr>
+          <a:xfrm>
+            <a:off x="1134294" y="1394529"/>
+            <a:ext cx="3007360" cy="2763520"/>
+          </a:xfrm>
+          <a:prstGeom prst="rect">
+            <a:avLst/>
+          </a:prstGeom>
+          <a:noFill/>
+          <a:ln w="38100">
+            <a:solidFill>
+              <a:schemeClr val="tx1"/>
+            </a:solidFill>
+            <a:prstDash val="sysDot"/>
+          </a:ln>
+        </p:spPr>
+        <p:style>
+          <a:lnRef idx="2">
+            <a:schemeClr val="accent1">
+              <a:shade val="50000"/>
+            </a:schemeClr>
+          </a:lnRef>
+          <a:fillRef idx="1">
+            <a:schemeClr val="accent1"/>
+          </a:fillRef>
+          <a:effectRef idx="0">
+            <a:schemeClr val="accent1"/>
+          </a:effectRef>
+          <a:fontRef idx="minor">
+            <a:schemeClr val="lt1"/>
+          </a:fontRef>
+        </p:style>
+        <p:txBody>
+          <a:bodyPr rtlCol="0" anchor="ctr"/>
+          <a:lstStyle/>
+          <a:p>
+            <a:pPr algn="ctr"/>
+            <a:endParaRPr lang="ko-KR" altLang="en-US"/>
+          </a:p>
+        </p:txBody>
+      </p:sp>
+      <p:sp>
+        <p:nvSpPr>
+          <p:cNvPr id="34" name="Left Arrow 33"/>
+          <p:cNvSpPr/>
+          <p:nvPr/>
+        </p:nvSpPr>
+        <p:spPr>
+          <a:xfrm rot="19999392">
+            <a:off x="2586169" y="2299379"/>
+            <a:ext cx="1957686" cy="417830"/>
+          </a:xfrm>
+          <a:prstGeom prst="leftArrow">
+            <a:avLst>
+              <a:gd name="adj1" fmla="val 23646"/>
+              <a:gd name="adj2" fmla="val 50000"/>
+            </a:avLst>
+          </a:prstGeom>
+          <a:solidFill>
+            <a:schemeClr val="tx1"/>
+          </a:solidFill>
+          <a:ln>
+            <a:noFill/>
+          </a:ln>
+        </p:spPr>
+        <p:style>
+          <a:lnRef idx="2">
+            <a:schemeClr val="accent1">
+              <a:shade val="50000"/>
+            </a:schemeClr>
+          </a:lnRef>
+          <a:fillRef idx="1">
+            <a:schemeClr val="accent1"/>
+          </a:fillRef>
+          <a:effectRef idx="0">
+            <a:schemeClr val="accent1"/>
+          </a:effectRef>
+          <a:fontRef idx="minor">
+            <a:schemeClr val="lt1"/>
+          </a:fontRef>
+        </p:style>
+        <p:txBody>
+          <a:bodyPr rtlCol="0" anchor="ctr"/>
+          <a:lstStyle/>
+          <a:p>
+            <a:pPr algn="ctr"/>
+            <a:endParaRPr lang="ko-KR" altLang="en-US"/>
+          </a:p>
+        </p:txBody>
+      </p:sp>
+      <p:sp>
+        <p:nvSpPr>
+          <p:cNvPr id="60" name="Rectangle 59"/>
+          <p:cNvSpPr/>
+          <p:nvPr/>
+        </p:nvSpPr>
+        <p:spPr>
+          <a:xfrm>
+            <a:off x="2251538" y="3116649"/>
+            <a:ext cx="315672" cy="213360"/>
+          </a:xfrm>
+          <a:prstGeom prst="rect">
+            <a:avLst/>
+          </a:prstGeom>
+          <a:noFill/>
+          <a:ln w="38100">
+            <a:solidFill>
+              <a:schemeClr val="tx1"/>
+            </a:solidFill>
+            <a:prstDash val="sysDot"/>
+          </a:ln>
+        </p:spPr>
+        <p:style>
+          <a:lnRef idx="2">
+            <a:schemeClr val="accent1">
+              <a:shade val="50000"/>
+            </a:schemeClr>
+          </a:lnRef>
+          <a:fillRef idx="1">
+            <a:schemeClr val="accent1"/>
+          </a:fillRef>
+          <a:effectRef idx="0">
+            <a:schemeClr val="accent1"/>
+          </a:effectRef>
+          <a:fontRef idx="minor">
+            <a:schemeClr val="lt1"/>
+          </a:fontRef>
+        </p:style>
+        <p:txBody>
+          <a:bodyPr rtlCol="0" anchor="ctr"/>
+          <a:lstStyle/>
+          <a:p>
+            <a:pPr algn="ctr"/>
+            <a:endParaRPr lang="ko-KR" altLang="en-US"/>
+          </a:p>
+        </p:txBody>
+      </p:sp>
+      <p:sp>
+        <p:nvSpPr>
+          <p:cNvPr id="61" name="Isosceles Triangle 60"/>
+          <p:cNvSpPr/>
+          <p:nvPr/>
+        </p:nvSpPr>
+        <p:spPr>
+          <a:xfrm flipV="1">
+            <a:off x="2301626" y="2811849"/>
+            <a:ext cx="213360" cy="152400"/>
+          </a:xfrm>
+          <a:prstGeom prst="triangle">
+            <a:avLst/>
+          </a:prstGeom>
+          <a:noFill/>
+          <a:ln w="38100">
+            <a:solidFill>
+              <a:schemeClr val="tx1"/>
+            </a:solidFill>
+            <a:prstDash val="sysDot"/>
+          </a:ln>
+        </p:spPr>
+        <p:style>
+          <a:lnRef idx="2">
+            <a:schemeClr val="accent1">
+              <a:shade val="50000"/>
+            </a:schemeClr>
+          </a:lnRef>
+          <a:fillRef idx="1">
+            <a:schemeClr val="accent1"/>
+          </a:fillRef>
+          <a:effectRef idx="0">
+            <a:schemeClr val="accent1"/>
+          </a:effectRef>
+          <a:fontRef idx="minor">
+            <a:schemeClr val="lt1"/>
+          </a:fontRef>
+        </p:style>
+        <p:txBody>
+          <a:bodyPr rtlCol="0" anchor="ctr"/>
+          <a:lstStyle/>
+          <a:p>
+            <a:pPr algn="ctr"/>
+            <a:endParaRPr lang="ko-KR" altLang="en-US"/>
+          </a:p>
+        </p:txBody>
+      </p:sp>
+      <p:cxnSp>
+        <p:nvCxnSpPr>
+          <p:cNvPr id="62" name="Straight Connector 61"/>
+          <p:cNvCxnSpPr>
+            <a:stCxn id="61" idx="0"/>
+            <a:endCxn id="60" idx="0"/>
+          </p:cNvCxnSpPr>
+          <p:nvPr/>
+        </p:nvCxnSpPr>
+        <p:spPr>
+          <a:xfrm>
+            <a:off x="2408306" y="2964249"/>
+            <a:ext cx="1068" cy="152400"/>
+          </a:xfrm>
+          <a:prstGeom prst="line">
+            <a:avLst/>
+          </a:prstGeom>
+          <a:ln w="38100">
+            <a:solidFill>
+              <a:schemeClr val="tx1"/>
+            </a:solidFill>
+            <a:prstDash val="sysDot"/>
+          </a:ln>
+        </p:spPr>
+        <p:style>
+          <a:lnRef idx="1">
+            <a:schemeClr val="accent1"/>
+          </a:lnRef>
+          <a:fillRef idx="0">
+            <a:schemeClr val="accent1"/>
+          </a:fillRef>
+          <a:effectRef idx="0">
+            <a:schemeClr val="accent1"/>
+          </a:effectRef>
+          <a:fontRef idx="minor">
+            <a:schemeClr val="tx1"/>
+          </a:fontRef>
+        </p:style>
+      </p:cxnSp>
+      <p:sp>
+        <p:nvSpPr>
+          <p:cNvPr id="63" name="Rectangle 62"/>
+          <p:cNvSpPr/>
+          <p:nvPr/>
+        </p:nvSpPr>
+        <p:spPr>
+          <a:xfrm>
+            <a:off x="3743578" y="5711361"/>
+            <a:ext cx="4942635" cy="369332"/>
+          </a:xfrm>
+          <a:prstGeom prst="rect">
+            <a:avLst/>
+          </a:prstGeom>
+        </p:spPr>
+        <p:txBody>
+          <a:bodyPr wrap="none">
+            <a:spAutoFit/>
+          </a:bodyPr>
+          <a:lstStyle/>
+          <a:p>
+            <a:r>
+              <a:rPr lang="en-US" altLang="ko-KR" b="1" dirty="0">
+                <a:latin typeface="맑은 고딕" panose="020B0503020000020004" pitchFamily="50" charset="-127"/>
+                <a:cs typeface="Times New Roman" panose="02020603050405020304" pitchFamily="18" charset="0"/>
+              </a:rPr>
+              <a:t>Figure </a:t>
+            </a:r>
+            <a:r>
+              <a:rPr lang="en-US" altLang="ko-KR" b="1" dirty="0" smtClean="0">
+                <a:latin typeface="맑은 고딕" panose="020B0503020000020004" pitchFamily="50" charset="-127"/>
+                <a:cs typeface="Times New Roman" panose="02020603050405020304" pitchFamily="18" charset="0"/>
+              </a:rPr>
+              <a:t>2. The system architecture of model</a:t>
+            </a:r>
+            <a:endParaRPr lang="ko-KR" altLang="en-US" dirty="0"/>
+          </a:p>
+        </p:txBody>
+      </p:sp>
+      <p:graphicFrame>
+        <p:nvGraphicFramePr>
+          <p:cNvPr id="35" name="Table 34"/>
+          <p:cNvGraphicFramePr>
+            <a:graphicFrameLocks noGrp="1"/>
+          </p:cNvGraphicFramePr>
+          <p:nvPr>
+            <p:extLst>
+              <p:ext uri="{D42A27DB-BD31-4B8C-83A1-F6EECF244321}">
+                <p14:modId xmlns:p14="http://schemas.microsoft.com/office/powerpoint/2010/main" val="3440148597"/>
+              </p:ext>
+            </p:extLst>
+          </p:nvPr>
+        </p:nvGraphicFramePr>
+        <p:xfrm>
+          <a:off x="5478957" y="1635554"/>
+          <a:ext cx="2848350" cy="2880882"/>
+        </p:xfrm>
+        <a:graphic>
+          <a:graphicData uri="http://schemas.openxmlformats.org/drawingml/2006/table">
+            <a:tbl>
+              <a:tblPr firstRow="1" bandRow="1">
+                <a:tableStyleId>{5940675A-B579-460E-94D1-54222C63F5DA}</a:tableStyleId>
+              </a:tblPr>
+              <a:tblGrid>
+                <a:gridCol w="474725">
+                  <a:extLst>
+                    <a:ext uri="{9D8B030D-6E8A-4147-A177-3AD203B41FA5}">
+                      <a16:colId xmlns:a16="http://schemas.microsoft.com/office/drawing/2014/main" val="1904995103"/>
+                    </a:ext>
+                  </a:extLst>
+                </a:gridCol>
+                <a:gridCol w="474725">
+                  <a:extLst>
+                    <a:ext uri="{9D8B030D-6E8A-4147-A177-3AD203B41FA5}">
+                      <a16:colId xmlns:a16="http://schemas.microsoft.com/office/drawing/2014/main" val="3434043226"/>
+                    </a:ext>
+                  </a:extLst>
+                </a:gridCol>
+                <a:gridCol w="474725">
+                  <a:extLst>
+                    <a:ext uri="{9D8B030D-6E8A-4147-A177-3AD203B41FA5}">
+                      <a16:colId xmlns:a16="http://schemas.microsoft.com/office/drawing/2014/main" val="1177439085"/>
+                    </a:ext>
+                  </a:extLst>
+                </a:gridCol>
+                <a:gridCol w="474725">
+                  <a:extLst>
+                    <a:ext uri="{9D8B030D-6E8A-4147-A177-3AD203B41FA5}">
+                      <a16:colId xmlns:a16="http://schemas.microsoft.com/office/drawing/2014/main" val="3090069396"/>
+                    </a:ext>
+                  </a:extLst>
+                </a:gridCol>
+                <a:gridCol w="474725">
+                  <a:extLst>
+                    <a:ext uri="{9D8B030D-6E8A-4147-A177-3AD203B41FA5}">
+                      <a16:colId xmlns:a16="http://schemas.microsoft.com/office/drawing/2014/main" val="3362313772"/>
+                    </a:ext>
+                  </a:extLst>
+                </a:gridCol>
+                <a:gridCol w="474725">
+                  <a:extLst>
+                    <a:ext uri="{9D8B030D-6E8A-4147-A177-3AD203B41FA5}">
+                      <a16:colId xmlns:a16="http://schemas.microsoft.com/office/drawing/2014/main" val="1016487651"/>
+                    </a:ext>
+                  </a:extLst>
+                </a:gridCol>
+              </a:tblGrid>
+              <a:tr h="480147">
+                <a:tc>
+                  <a:txBody>
+                    <a:bodyPr/>
+                    <a:lstStyle/>
+                    <a:p>
+                      <a:pPr algn="ctr" latinLnBrk="1"/>
+                      <a:endParaRPr lang="ko-KR" altLang="en-US" dirty="0"/>
+                    </a:p>
+                  </a:txBody>
+                  <a:tcPr anchor="ctr"/>
+                </a:tc>
+                <a:tc>
+                  <a:txBody>
+                    <a:bodyPr/>
+                    <a:lstStyle/>
+                    <a:p>
+                      <a:pPr algn="ctr" latinLnBrk="1"/>
+                      <a:endParaRPr lang="ko-KR" altLang="en-US" dirty="0"/>
+                    </a:p>
+                  </a:txBody>
+                  <a:tcPr anchor="ctr"/>
+                </a:tc>
+                <a:tc>
+                  <a:txBody>
+                    <a:bodyPr/>
+                    <a:lstStyle/>
+                    <a:p>
+                      <a:pPr algn="ctr" latinLnBrk="1"/>
+                      <a:endParaRPr lang="ko-KR" altLang="en-US" dirty="0"/>
+                    </a:p>
+                  </a:txBody>
+                  <a:tcPr anchor="ctr">
+                    <a:solidFill>
+                      <a:schemeClr val="bg1">
+                        <a:lumMod val="65000"/>
+                      </a:schemeClr>
+                    </a:solidFill>
+                  </a:tcPr>
+                </a:tc>
+                <a:tc>
+                  <a:txBody>
+                    <a:bodyPr/>
+                    <a:lstStyle/>
+                    <a:p>
+                      <a:pPr algn="ctr" latinLnBrk="1"/>
+                      <a:endParaRPr lang="ko-KR" altLang="en-US"/>
+                    </a:p>
+                  </a:txBody>
+                  <a:tcPr anchor="ctr"/>
+                </a:tc>
+                <a:tc>
+                  <a:txBody>
+                    <a:bodyPr/>
+                    <a:lstStyle/>
+                    <a:p>
+                      <a:pPr algn="ctr" latinLnBrk="1"/>
+                      <a:endParaRPr lang="ko-KR" altLang="en-US" dirty="0"/>
+                    </a:p>
+                  </a:txBody>
+                  <a:tcPr anchor="ctr">
+                    <a:solidFill>
+                      <a:schemeClr val="bg1">
+                        <a:lumMod val="65000"/>
+                      </a:schemeClr>
+                    </a:solidFill>
+                  </a:tcPr>
+                </a:tc>
+                <a:tc>
+                  <a:txBody>
+                    <a:bodyPr/>
+                    <a:lstStyle/>
+                    <a:p>
+                      <a:pPr algn="ctr" latinLnBrk="1"/>
+                      <a:endParaRPr lang="ko-KR" altLang="en-US"/>
+                    </a:p>
+                  </a:txBody>
+                  <a:tcPr anchor="ctr"/>
+                </a:tc>
+                <a:extLst>
+                  <a:ext uri="{0D108BD9-81ED-4DB2-BD59-A6C34878D82A}">
+                    <a16:rowId xmlns:a16="http://schemas.microsoft.com/office/drawing/2014/main" val="608566166"/>
+                  </a:ext>
+                </a:extLst>
+              </a:tr>
+              <a:tr h="480147">
+                <a:tc>
+                  <a:txBody>
+                    <a:bodyPr/>
+                    <a:lstStyle/>
+                    <a:p>
+                      <a:pPr algn="ctr" latinLnBrk="1"/>
+                      <a:endParaRPr lang="ko-KR" altLang="en-US"/>
+                    </a:p>
+                  </a:txBody>
+                  <a:tcPr anchor="ctr"/>
+                </a:tc>
+                <a:tc>
+                  <a:txBody>
+                    <a:bodyPr/>
+                    <a:lstStyle/>
+                    <a:p>
+                      <a:pPr algn="ctr" latinLnBrk="1"/>
+                      <a:endParaRPr lang="ko-KR" altLang="en-US" dirty="0"/>
+                    </a:p>
+                  </a:txBody>
+                  <a:tcPr anchor="ctr"/>
+                </a:tc>
+                <a:tc>
+                  <a:txBody>
+                    <a:bodyPr/>
+                    <a:lstStyle/>
+                    <a:p>
+                      <a:pPr algn="ctr" latinLnBrk="1"/>
+                      <a:endParaRPr lang="ko-KR" altLang="en-US" dirty="0"/>
+                    </a:p>
+                  </a:txBody>
+                  <a:tcPr anchor="ctr"/>
+                </a:tc>
+                <a:tc>
+                  <a:txBody>
+                    <a:bodyPr/>
+                    <a:lstStyle/>
+                    <a:p>
+                      <a:pPr algn="ctr" latinLnBrk="1"/>
+                      <a:endParaRPr lang="ko-KR" altLang="en-US" dirty="0"/>
+                    </a:p>
+                  </a:txBody>
+                  <a:tcPr anchor="ctr"/>
+                </a:tc>
+                <a:tc>
+                  <a:txBody>
+                    <a:bodyPr/>
+                    <a:lstStyle/>
+                    <a:p>
+                      <a:pPr algn="ctr" latinLnBrk="1"/>
+                      <a:endParaRPr lang="ko-KR" altLang="en-US"/>
+                    </a:p>
+                  </a:txBody>
+                  <a:tcPr anchor="ctr"/>
+                </a:tc>
+                <a:tc>
+                  <a:txBody>
+                    <a:bodyPr/>
+                    <a:lstStyle/>
+                    <a:p>
+                      <a:pPr algn="ctr" latinLnBrk="1"/>
+                      <a:endParaRPr lang="ko-KR" altLang="en-US"/>
+                    </a:p>
+                  </a:txBody>
+                  <a:tcPr anchor="ctr"/>
+                </a:tc>
+                <a:extLst>
+                  <a:ext uri="{0D108BD9-81ED-4DB2-BD59-A6C34878D82A}">
+                    <a16:rowId xmlns:a16="http://schemas.microsoft.com/office/drawing/2014/main" val="1189179238"/>
+                  </a:ext>
+                </a:extLst>
+              </a:tr>
+              <a:tr h="480147">
+                <a:tc>
+                  <a:txBody>
+                    <a:bodyPr/>
+                    <a:lstStyle/>
+                    <a:p>
+                      <a:pPr algn="ctr" latinLnBrk="1"/>
+                      <a:endParaRPr lang="ko-KR" altLang="en-US"/>
+                    </a:p>
+                  </a:txBody>
+                  <a:tcPr anchor="ctr"/>
+                </a:tc>
+                <a:tc>
+                  <a:txBody>
+                    <a:bodyPr/>
+                    <a:lstStyle/>
+                    <a:p>
+                      <a:pPr algn="ctr" latinLnBrk="1"/>
+                      <a:endParaRPr lang="ko-KR" altLang="en-US"/>
+                    </a:p>
+                  </a:txBody>
+                  <a:tcPr anchor="ctr"/>
+                </a:tc>
+                <a:tc>
+                  <a:txBody>
+                    <a:bodyPr/>
+                    <a:lstStyle/>
+                    <a:p>
+                      <a:pPr algn="ctr" latinLnBrk="1"/>
+                      <a:endParaRPr lang="ko-KR" altLang="en-US"/>
+                    </a:p>
+                  </a:txBody>
+                  <a:tcPr anchor="ctr"/>
+                </a:tc>
+                <a:tc>
+                  <a:txBody>
+                    <a:bodyPr/>
+                    <a:lstStyle/>
+                    <a:p>
+                      <a:pPr algn="ctr" latinLnBrk="1"/>
+                      <a:endParaRPr lang="ko-KR" altLang="en-US"/>
+                    </a:p>
+                  </a:txBody>
+                  <a:tcPr anchor="ctr"/>
+                </a:tc>
+                <a:tc>
+                  <a:txBody>
+                    <a:bodyPr/>
+                    <a:lstStyle/>
+                    <a:p>
+                      <a:pPr algn="ctr" latinLnBrk="1"/>
+                      <a:endParaRPr lang="ko-KR" altLang="en-US" dirty="0"/>
+                    </a:p>
+                  </a:txBody>
+                  <a:tcPr anchor="ctr"/>
+                </a:tc>
+                <a:tc>
+                  <a:txBody>
+                    <a:bodyPr/>
+                    <a:lstStyle/>
+                    <a:p>
+                      <a:pPr algn="ctr" latinLnBrk="1"/>
+                      <a:endParaRPr lang="ko-KR" altLang="en-US" dirty="0"/>
+                    </a:p>
+                  </a:txBody>
+                  <a:tcPr anchor="ctr">
+                    <a:solidFill>
+                      <a:schemeClr val="bg1">
+                        <a:lumMod val="65000"/>
+                      </a:schemeClr>
+                    </a:solidFill>
+                  </a:tcPr>
+                </a:tc>
+                <a:extLst>
+                  <a:ext uri="{0D108BD9-81ED-4DB2-BD59-A6C34878D82A}">
+                    <a16:rowId xmlns:a16="http://schemas.microsoft.com/office/drawing/2014/main" val="4224554795"/>
+                  </a:ext>
+                </a:extLst>
+              </a:tr>
+              <a:tr h="480147">
+                <a:tc>
+                  <a:txBody>
+                    <a:bodyPr/>
+                    <a:lstStyle/>
+                    <a:p>
+                      <a:pPr algn="ctr" latinLnBrk="1"/>
+                      <a:endParaRPr lang="ko-KR" altLang="en-US" dirty="0"/>
+                    </a:p>
+                  </a:txBody>
+                  <a:tcPr anchor="ctr">
+                    <a:solidFill>
+                      <a:schemeClr val="bg1">
+                        <a:lumMod val="65000"/>
+                      </a:schemeClr>
+                    </a:solidFill>
+                  </a:tcPr>
+                </a:tc>
+                <a:tc>
+                  <a:txBody>
+                    <a:bodyPr/>
+                    <a:lstStyle/>
+                    <a:p>
+                      <a:pPr algn="ctr" latinLnBrk="1"/>
+                      <a:endParaRPr lang="ko-KR" altLang="en-US"/>
+                    </a:p>
+                  </a:txBody>
+                  <a:tcPr anchor="ctr"/>
+                </a:tc>
+                <a:tc>
+                  <a:txBody>
+                    <a:bodyPr/>
+                    <a:lstStyle/>
+                    <a:p>
+                      <a:pPr algn="ctr" latinLnBrk="1"/>
+                      <a:endParaRPr lang="ko-KR" altLang="en-US"/>
+                    </a:p>
+                  </a:txBody>
+                  <a:tcPr anchor="ctr"/>
+                </a:tc>
+                <a:tc>
+                  <a:txBody>
+                    <a:bodyPr/>
+                    <a:lstStyle/>
+                    <a:p>
+                      <a:pPr algn="ctr" latinLnBrk="1"/>
+                      <a:endParaRPr lang="ko-KR" altLang="en-US"/>
+                    </a:p>
+                  </a:txBody>
+                  <a:tcPr anchor="ctr"/>
+                </a:tc>
+                <a:tc>
+                  <a:txBody>
+                    <a:bodyPr/>
+                    <a:lstStyle/>
+                    <a:p>
+                      <a:pPr algn="ctr" latinLnBrk="1"/>
+                      <a:endParaRPr lang="ko-KR" altLang="en-US"/>
+                    </a:p>
+                  </a:txBody>
+                  <a:tcPr anchor="ctr"/>
+                </a:tc>
+                <a:tc>
+                  <a:txBody>
+                    <a:bodyPr/>
+                    <a:lstStyle/>
+                    <a:p>
+                      <a:pPr algn="ctr" latinLnBrk="1"/>
+                      <a:endParaRPr lang="ko-KR" altLang="en-US" dirty="0"/>
+                    </a:p>
+                  </a:txBody>
+                  <a:tcPr anchor="ctr"/>
+                </a:tc>
+                <a:extLst>
+                  <a:ext uri="{0D108BD9-81ED-4DB2-BD59-A6C34878D82A}">
+                    <a16:rowId xmlns:a16="http://schemas.microsoft.com/office/drawing/2014/main" val="1316205491"/>
+                  </a:ext>
+                </a:extLst>
+              </a:tr>
+              <a:tr h="480147">
+                <a:tc>
+                  <a:txBody>
+                    <a:bodyPr/>
+                    <a:lstStyle/>
+                    <a:p>
+                      <a:pPr algn="ctr" latinLnBrk="1"/>
+                      <a:endParaRPr lang="ko-KR" altLang="en-US" dirty="0"/>
+                    </a:p>
+                  </a:txBody>
+                  <a:tcPr anchor="ctr"/>
+                </a:tc>
+                <a:tc>
+                  <a:txBody>
+                    <a:bodyPr/>
+                    <a:lstStyle/>
+                    <a:p>
+                      <a:pPr algn="ctr" latinLnBrk="1"/>
+                      <a:endParaRPr lang="ko-KR" altLang="en-US"/>
+                    </a:p>
+                  </a:txBody>
+                  <a:tcPr anchor="ctr"/>
+                </a:tc>
+                <a:tc>
+                  <a:txBody>
+                    <a:bodyPr/>
+                    <a:lstStyle/>
+                    <a:p>
+                      <a:pPr algn="ctr" latinLnBrk="1"/>
+                      <a:endParaRPr lang="ko-KR" altLang="en-US"/>
+                    </a:p>
+                  </a:txBody>
+                  <a:tcPr anchor="ctr"/>
+                </a:tc>
+                <a:tc>
+                  <a:txBody>
+                    <a:bodyPr/>
+                    <a:lstStyle/>
+                    <a:p>
+                      <a:pPr algn="ctr" latinLnBrk="1"/>
+                      <a:endParaRPr lang="ko-KR" altLang="en-US"/>
+                    </a:p>
+                  </a:txBody>
+                  <a:tcPr anchor="ctr"/>
+                </a:tc>
+                <a:tc>
+                  <a:txBody>
+                    <a:bodyPr/>
+                    <a:lstStyle/>
+                    <a:p>
+                      <a:pPr algn="ctr" latinLnBrk="1"/>
+                      <a:endParaRPr lang="ko-KR" altLang="en-US" dirty="0"/>
+                    </a:p>
+                  </a:txBody>
+                  <a:tcPr anchor="ctr">
+                    <a:solidFill>
+                      <a:schemeClr val="bg1">
+                        <a:lumMod val="65000"/>
+                      </a:schemeClr>
+                    </a:solidFill>
+                  </a:tcPr>
+                </a:tc>
+                <a:tc>
+                  <a:txBody>
+                    <a:bodyPr/>
+                    <a:lstStyle/>
+                    <a:p>
+                      <a:pPr algn="ctr" latinLnBrk="1"/>
+                      <a:endParaRPr lang="ko-KR" altLang="en-US" dirty="0"/>
+                    </a:p>
+                  </a:txBody>
+                  <a:tcPr anchor="ctr"/>
+                </a:tc>
+                <a:extLst>
+                  <a:ext uri="{0D108BD9-81ED-4DB2-BD59-A6C34878D82A}">
+                    <a16:rowId xmlns:a16="http://schemas.microsoft.com/office/drawing/2014/main" val="2005323836"/>
+                  </a:ext>
+                </a:extLst>
+              </a:tr>
+              <a:tr h="480147">
+                <a:tc>
+                  <a:txBody>
+                    <a:bodyPr/>
+                    <a:lstStyle/>
+                    <a:p>
+                      <a:pPr algn="ctr" latinLnBrk="1"/>
+                      <a:endParaRPr lang="ko-KR" altLang="en-US"/>
+                    </a:p>
+                  </a:txBody>
+                  <a:tcPr anchor="ctr"/>
+                </a:tc>
+                <a:tc>
+                  <a:txBody>
+                    <a:bodyPr/>
+                    <a:lstStyle/>
+                    <a:p>
+                      <a:pPr algn="ctr" latinLnBrk="1"/>
+                      <a:endParaRPr lang="ko-KR" altLang="en-US" dirty="0"/>
+                    </a:p>
+                  </a:txBody>
+                  <a:tcPr anchor="ctr">
+                    <a:solidFill>
+                      <a:schemeClr val="bg1">
+                        <a:lumMod val="65000"/>
+                      </a:schemeClr>
+                    </a:solidFill>
+                  </a:tcPr>
+                </a:tc>
+                <a:tc>
+                  <a:txBody>
+                    <a:bodyPr/>
+                    <a:lstStyle/>
+                    <a:p>
+                      <a:pPr algn="ctr" latinLnBrk="1"/>
+                      <a:endParaRPr lang="ko-KR" altLang="en-US" dirty="0"/>
+                    </a:p>
+                  </a:txBody>
+                  <a:tcPr anchor="ctr"/>
+                </a:tc>
+                <a:tc>
+                  <a:txBody>
+                    <a:bodyPr/>
+                    <a:lstStyle/>
+                    <a:p>
+                      <a:pPr algn="ctr" latinLnBrk="1"/>
+                      <a:endParaRPr lang="ko-KR" altLang="en-US"/>
+                    </a:p>
+                  </a:txBody>
+                  <a:tcPr anchor="ctr"/>
+                </a:tc>
+                <a:tc>
+                  <a:txBody>
+                    <a:bodyPr/>
+                    <a:lstStyle/>
+                    <a:p>
+                      <a:pPr algn="ctr" latinLnBrk="1"/>
+                      <a:endParaRPr lang="ko-KR" altLang="en-US"/>
+                    </a:p>
+                  </a:txBody>
+                  <a:tcPr anchor="ctr"/>
+                </a:tc>
+                <a:tc>
+                  <a:txBody>
+                    <a:bodyPr/>
+                    <a:lstStyle/>
+                    <a:p>
+                      <a:pPr algn="ctr" latinLnBrk="1"/>
+                      <a:endParaRPr lang="ko-KR" altLang="en-US" dirty="0"/>
+                    </a:p>
+                  </a:txBody>
+                  <a:tcPr anchor="ctr"/>
+                </a:tc>
+                <a:extLst>
+                  <a:ext uri="{0D108BD9-81ED-4DB2-BD59-A6C34878D82A}">
+                    <a16:rowId xmlns:a16="http://schemas.microsoft.com/office/drawing/2014/main" val="1229779854"/>
+                  </a:ext>
+                </a:extLst>
+              </a:tr>
+            </a:tbl>
+          </a:graphicData>
+        </a:graphic>
+      </p:graphicFrame>
+      <p:graphicFrame>
+        <p:nvGraphicFramePr>
+          <p:cNvPr id="66" name="Table 65"/>
+          <p:cNvGraphicFramePr>
+            <a:graphicFrameLocks noGrp="1"/>
+          </p:cNvGraphicFramePr>
+          <p:nvPr>
+            <p:extLst>
+              <p:ext uri="{D42A27DB-BD31-4B8C-83A1-F6EECF244321}">
+                <p14:modId xmlns:p14="http://schemas.microsoft.com/office/powerpoint/2010/main" val="1730370760"/>
+              </p:ext>
+            </p:extLst>
+          </p:nvPr>
+        </p:nvGraphicFramePr>
+        <p:xfrm>
+          <a:off x="8846884" y="1635554"/>
+          <a:ext cx="2848350" cy="2880882"/>
+        </p:xfrm>
+        <a:graphic>
+          <a:graphicData uri="http://schemas.openxmlformats.org/drawingml/2006/table">
+            <a:tbl>
+              <a:tblPr firstRow="1" bandRow="1">
+                <a:tableStyleId>{5940675A-B579-460E-94D1-54222C63F5DA}</a:tableStyleId>
+              </a:tblPr>
+              <a:tblGrid>
+                <a:gridCol w="474725">
+                  <a:extLst>
+                    <a:ext uri="{9D8B030D-6E8A-4147-A177-3AD203B41FA5}">
+                      <a16:colId xmlns:a16="http://schemas.microsoft.com/office/drawing/2014/main" val="1904995103"/>
+                    </a:ext>
+                  </a:extLst>
+                </a:gridCol>
+                <a:gridCol w="474725">
+                  <a:extLst>
+                    <a:ext uri="{9D8B030D-6E8A-4147-A177-3AD203B41FA5}">
+                      <a16:colId xmlns:a16="http://schemas.microsoft.com/office/drawing/2014/main" val="3434043226"/>
+                    </a:ext>
+                  </a:extLst>
+                </a:gridCol>
+                <a:gridCol w="474725">
+                  <a:extLst>
+                    <a:ext uri="{9D8B030D-6E8A-4147-A177-3AD203B41FA5}">
+                      <a16:colId xmlns:a16="http://schemas.microsoft.com/office/drawing/2014/main" val="1177439085"/>
+                    </a:ext>
+                  </a:extLst>
+                </a:gridCol>
+                <a:gridCol w="474725">
+                  <a:extLst>
+                    <a:ext uri="{9D8B030D-6E8A-4147-A177-3AD203B41FA5}">
+                      <a16:colId xmlns:a16="http://schemas.microsoft.com/office/drawing/2014/main" val="3090069396"/>
+                    </a:ext>
+                  </a:extLst>
+                </a:gridCol>
+                <a:gridCol w="474725">
+                  <a:extLst>
+                    <a:ext uri="{9D8B030D-6E8A-4147-A177-3AD203B41FA5}">
+                      <a16:colId xmlns:a16="http://schemas.microsoft.com/office/drawing/2014/main" val="3362313772"/>
+                    </a:ext>
+                  </a:extLst>
+                </a:gridCol>
+                <a:gridCol w="474725">
+                  <a:extLst>
+                    <a:ext uri="{9D8B030D-6E8A-4147-A177-3AD203B41FA5}">
+                      <a16:colId xmlns:a16="http://schemas.microsoft.com/office/drawing/2014/main" val="1016487651"/>
+                    </a:ext>
+                  </a:extLst>
+                </a:gridCol>
+              </a:tblGrid>
+              <a:tr h="480147">
+                <a:tc>
+                  <a:txBody>
+                    <a:bodyPr/>
+                    <a:lstStyle/>
+                    <a:p>
+                      <a:pPr algn="ctr" latinLnBrk="1"/>
+                      <a:endParaRPr lang="ko-KR" altLang="en-US" dirty="0"/>
+                    </a:p>
+                  </a:txBody>
+                  <a:tcPr anchor="ctr">
+                    <a:solidFill>
+                      <a:schemeClr val="bg1">
+                        <a:lumMod val="95000"/>
+                      </a:schemeClr>
+                    </a:solidFill>
+                  </a:tcPr>
+                </a:tc>
+                <a:tc>
+                  <a:txBody>
+                    <a:bodyPr/>
+                    <a:lstStyle/>
+                    <a:p>
+                      <a:pPr algn="ctr" latinLnBrk="1"/>
+                      <a:endParaRPr lang="ko-KR" altLang="en-US" dirty="0"/>
+                    </a:p>
+                  </a:txBody>
+                  <a:tcPr anchor="ctr">
+                    <a:solidFill>
+                      <a:schemeClr val="bg1">
+                        <a:lumMod val="85000"/>
+                      </a:schemeClr>
+                    </a:solidFill>
+                  </a:tcPr>
+                </a:tc>
+                <a:tc>
+                  <a:txBody>
+                    <a:bodyPr/>
+                    <a:lstStyle/>
+                    <a:p>
+                      <a:pPr algn="ctr" latinLnBrk="1"/>
+                      <a:endParaRPr lang="ko-KR" altLang="en-US" dirty="0"/>
+                    </a:p>
+                  </a:txBody>
+                  <a:tcPr anchor="ctr">
+                    <a:solidFill>
+                      <a:schemeClr val="bg1">
+                        <a:lumMod val="85000"/>
+                      </a:schemeClr>
+                    </a:solidFill>
+                  </a:tcPr>
+                </a:tc>
+                <a:tc>
+                  <a:txBody>
+                    <a:bodyPr/>
+                    <a:lstStyle/>
+                    <a:p>
+                      <a:pPr algn="ctr" latinLnBrk="1"/>
+                      <a:endParaRPr lang="ko-KR" altLang="en-US" dirty="0"/>
+                    </a:p>
+                  </a:txBody>
+                  <a:tcPr anchor="ctr">
+                    <a:solidFill>
+                      <a:schemeClr val="bg1">
+                        <a:lumMod val="85000"/>
+                      </a:schemeClr>
+                    </a:solidFill>
+                  </a:tcPr>
+                </a:tc>
+                <a:tc>
+                  <a:txBody>
+                    <a:bodyPr/>
+                    <a:lstStyle/>
+                    <a:p>
+                      <a:pPr algn="ctr" latinLnBrk="1"/>
+                      <a:endParaRPr lang="ko-KR" altLang="en-US" dirty="0"/>
+                    </a:p>
+                  </a:txBody>
+                  <a:tcPr anchor="ctr">
+                    <a:solidFill>
+                      <a:schemeClr val="bg1">
+                        <a:lumMod val="85000"/>
+                      </a:schemeClr>
+                    </a:solidFill>
+                  </a:tcPr>
+                </a:tc>
+                <a:tc>
+                  <a:txBody>
+                    <a:bodyPr/>
+                    <a:lstStyle/>
+                    <a:p>
+                      <a:pPr algn="ctr" latinLnBrk="1"/>
+                      <a:endParaRPr lang="ko-KR" altLang="en-US" dirty="0"/>
+                    </a:p>
+                  </a:txBody>
+                  <a:tcPr anchor="ctr">
+                    <a:solidFill>
+                      <a:schemeClr val="bg1">
+                        <a:lumMod val="95000"/>
+                      </a:schemeClr>
+                    </a:solidFill>
+                  </a:tcPr>
+                </a:tc>
+                <a:extLst>
+                  <a:ext uri="{0D108BD9-81ED-4DB2-BD59-A6C34878D82A}">
+                    <a16:rowId xmlns:a16="http://schemas.microsoft.com/office/drawing/2014/main" val="608566166"/>
+                  </a:ext>
+                </a:extLst>
+              </a:tr>
+              <a:tr h="480147">
+                <a:tc>
+                  <a:txBody>
+                    <a:bodyPr/>
+                    <a:lstStyle/>
+                    <a:p>
+                      <a:pPr algn="ctr" latinLnBrk="1"/>
+                      <a:endParaRPr lang="ko-KR" altLang="en-US" dirty="0"/>
+                    </a:p>
+                  </a:txBody>
+                  <a:tcPr anchor="ctr">
+                    <a:solidFill>
+                      <a:schemeClr val="bg1">
+                        <a:lumMod val="85000"/>
+                      </a:schemeClr>
+                    </a:solidFill>
+                  </a:tcPr>
+                </a:tc>
+                <a:tc>
+                  <a:txBody>
+                    <a:bodyPr/>
+                    <a:lstStyle/>
+                    <a:p>
+                      <a:pPr algn="ctr" latinLnBrk="1"/>
+                      <a:endParaRPr lang="ko-KR" altLang="en-US" dirty="0"/>
+                    </a:p>
+                  </a:txBody>
+                  <a:tcPr anchor="ctr">
+                    <a:solidFill>
+                      <a:schemeClr val="bg1">
+                        <a:lumMod val="75000"/>
+                      </a:schemeClr>
+                    </a:solidFill>
+                  </a:tcPr>
+                </a:tc>
+                <a:tc>
+                  <a:txBody>
+                    <a:bodyPr/>
+                    <a:lstStyle/>
+                    <a:p>
+                      <a:pPr algn="ctr" latinLnBrk="1"/>
+                      <a:endParaRPr lang="ko-KR" altLang="en-US" dirty="0"/>
+                    </a:p>
+                  </a:txBody>
+                  <a:tcPr anchor="ctr">
+                    <a:solidFill>
+                      <a:schemeClr val="tx1">
+                        <a:lumMod val="50000"/>
+                        <a:lumOff val="50000"/>
+                      </a:schemeClr>
+                    </a:solidFill>
+                  </a:tcPr>
+                </a:tc>
+                <a:tc>
+                  <a:txBody>
+                    <a:bodyPr/>
+                    <a:lstStyle/>
+                    <a:p>
+                      <a:pPr algn="ctr" latinLnBrk="1"/>
+                      <a:endParaRPr lang="ko-KR" altLang="en-US" dirty="0"/>
+                    </a:p>
+                  </a:txBody>
+                  <a:tcPr anchor="ctr">
+                    <a:solidFill>
+                      <a:schemeClr val="bg1">
+                        <a:lumMod val="65000"/>
+                      </a:schemeClr>
+                    </a:solidFill>
+                  </a:tcPr>
+                </a:tc>
+                <a:tc>
+                  <a:txBody>
+                    <a:bodyPr/>
+                    <a:lstStyle/>
+                    <a:p>
+                      <a:pPr algn="ctr" latinLnBrk="1"/>
+                      <a:endParaRPr lang="ko-KR" altLang="en-US" dirty="0"/>
+                    </a:p>
+                  </a:txBody>
+                  <a:tcPr anchor="ctr">
+                    <a:solidFill>
+                      <a:schemeClr val="bg1">
+                        <a:lumMod val="75000"/>
+                      </a:schemeClr>
+                    </a:solidFill>
+                  </a:tcPr>
+                </a:tc>
+                <a:tc>
+                  <a:txBody>
+                    <a:bodyPr/>
+                    <a:lstStyle/>
+                    <a:p>
+                      <a:pPr algn="ctr" latinLnBrk="1"/>
+                      <a:endParaRPr lang="ko-KR" altLang="en-US" dirty="0"/>
+                    </a:p>
+                  </a:txBody>
+                  <a:tcPr anchor="ctr">
+                    <a:solidFill>
+                      <a:schemeClr val="bg1">
+                        <a:lumMod val="85000"/>
+                      </a:schemeClr>
+                    </a:solidFill>
+                  </a:tcPr>
+                </a:tc>
+                <a:extLst>
+                  <a:ext uri="{0D108BD9-81ED-4DB2-BD59-A6C34878D82A}">
+                    <a16:rowId xmlns:a16="http://schemas.microsoft.com/office/drawing/2014/main" val="1189179238"/>
+                  </a:ext>
+                </a:extLst>
+              </a:tr>
+              <a:tr h="480147">
+                <a:tc>
+                  <a:txBody>
+                    <a:bodyPr/>
+                    <a:lstStyle/>
+                    <a:p>
+                      <a:pPr algn="ctr" latinLnBrk="1"/>
+                      <a:endParaRPr lang="ko-KR" altLang="en-US" dirty="0"/>
+                    </a:p>
+                  </a:txBody>
+                  <a:tcPr anchor="ctr">
+                    <a:solidFill>
+                      <a:schemeClr val="bg1">
+                        <a:lumMod val="85000"/>
+                      </a:schemeClr>
+                    </a:solidFill>
+                  </a:tcPr>
+                </a:tc>
+                <a:tc>
+                  <a:txBody>
+                    <a:bodyPr/>
+                    <a:lstStyle/>
+                    <a:p>
+                      <a:pPr algn="ctr" latinLnBrk="1"/>
+                      <a:endParaRPr lang="ko-KR" altLang="en-US" dirty="0"/>
+                    </a:p>
+                  </a:txBody>
+                  <a:tcPr anchor="ctr">
+                    <a:solidFill>
+                      <a:schemeClr val="tx1">
+                        <a:lumMod val="50000"/>
+                        <a:lumOff val="50000"/>
+                      </a:schemeClr>
+                    </a:solidFill>
+                  </a:tcPr>
+                </a:tc>
+                <a:tc>
+                  <a:txBody>
+                    <a:bodyPr/>
+                    <a:lstStyle/>
+                    <a:p>
+                      <a:pPr algn="ctr" latinLnBrk="1"/>
+                      <a:endParaRPr lang="ko-KR" altLang="en-US" dirty="0"/>
+                    </a:p>
+                  </a:txBody>
+                  <a:tcPr anchor="ctr">
+                    <a:solidFill>
+                      <a:schemeClr val="tx1">
+                        <a:lumMod val="75000"/>
+                        <a:lumOff val="25000"/>
+                      </a:schemeClr>
+                    </a:solidFill>
+                  </a:tcPr>
+                </a:tc>
+                <a:tc>
+                  <a:txBody>
+                    <a:bodyPr/>
+                    <a:lstStyle/>
+                    <a:p>
+                      <a:pPr algn="ctr" latinLnBrk="1"/>
+                      <a:endParaRPr lang="ko-KR" altLang="en-US" dirty="0"/>
+                    </a:p>
+                  </a:txBody>
+                  <a:tcPr anchor="ctr">
+                    <a:solidFill>
+                      <a:schemeClr val="tx1">
+                        <a:lumMod val="65000"/>
+                        <a:lumOff val="35000"/>
+                      </a:schemeClr>
+                    </a:solidFill>
+                  </a:tcPr>
+                </a:tc>
+                <a:tc>
+                  <a:txBody>
+                    <a:bodyPr/>
+                    <a:lstStyle/>
+                    <a:p>
+                      <a:pPr algn="ctr" latinLnBrk="1"/>
+                      <a:endParaRPr lang="ko-KR" altLang="en-US" dirty="0"/>
+                    </a:p>
+                  </a:txBody>
+                  <a:tcPr anchor="ctr">
+                    <a:solidFill>
+                      <a:schemeClr val="bg1">
+                        <a:lumMod val="65000"/>
+                      </a:schemeClr>
+                    </a:solidFill>
+                  </a:tcPr>
+                </a:tc>
+                <a:tc>
+                  <a:txBody>
+                    <a:bodyPr/>
+                    <a:lstStyle/>
+                    <a:p>
+                      <a:pPr algn="ctr" latinLnBrk="1"/>
+                      <a:endParaRPr lang="ko-KR" altLang="en-US" dirty="0"/>
+                    </a:p>
+                  </a:txBody>
+                  <a:tcPr anchor="ctr">
+                    <a:solidFill>
+                      <a:schemeClr val="bg1">
+                        <a:lumMod val="85000"/>
+                      </a:schemeClr>
+                    </a:solidFill>
+                  </a:tcPr>
+                </a:tc>
+                <a:extLst>
+                  <a:ext uri="{0D108BD9-81ED-4DB2-BD59-A6C34878D82A}">
+                    <a16:rowId xmlns:a16="http://schemas.microsoft.com/office/drawing/2014/main" val="4224554795"/>
+                  </a:ext>
+                </a:extLst>
+              </a:tr>
+              <a:tr h="480147">
+                <a:tc>
+                  <a:txBody>
+                    <a:bodyPr/>
+                    <a:lstStyle/>
+                    <a:p>
+                      <a:pPr algn="ctr" latinLnBrk="1"/>
+                      <a:endParaRPr lang="ko-KR" altLang="en-US" dirty="0"/>
+                    </a:p>
+                  </a:txBody>
+                  <a:tcPr anchor="ctr">
+                    <a:solidFill>
+                      <a:schemeClr val="bg1">
+                        <a:lumMod val="85000"/>
+                      </a:schemeClr>
+                    </a:solidFill>
+                  </a:tcPr>
+                </a:tc>
+                <a:tc>
+                  <a:txBody>
+                    <a:bodyPr/>
+                    <a:lstStyle/>
+                    <a:p>
+                      <a:pPr algn="ctr" latinLnBrk="1"/>
+                      <a:endParaRPr lang="ko-KR" altLang="en-US" dirty="0"/>
+                    </a:p>
+                  </a:txBody>
+                  <a:tcPr anchor="ctr">
+                    <a:solidFill>
+                      <a:schemeClr val="bg1">
+                        <a:lumMod val="65000"/>
+                      </a:schemeClr>
+                    </a:solidFill>
+                  </a:tcPr>
+                </a:tc>
+                <a:tc>
+                  <a:txBody>
+                    <a:bodyPr/>
+                    <a:lstStyle/>
+                    <a:p>
+                      <a:pPr algn="ctr" latinLnBrk="1"/>
+                      <a:endParaRPr lang="ko-KR" altLang="en-US" dirty="0"/>
+                    </a:p>
+                  </a:txBody>
+                  <a:tcPr anchor="ctr">
+                    <a:solidFill>
+                      <a:schemeClr val="tx1">
+                        <a:lumMod val="65000"/>
+                        <a:lumOff val="35000"/>
+                      </a:schemeClr>
+                    </a:solidFill>
+                  </a:tcPr>
+                </a:tc>
+                <a:tc>
+                  <a:txBody>
+                    <a:bodyPr/>
+                    <a:lstStyle/>
+                    <a:p>
+                      <a:pPr algn="ctr" latinLnBrk="1"/>
+                      <a:endParaRPr lang="ko-KR" altLang="en-US" dirty="0"/>
+                    </a:p>
+                  </a:txBody>
+                  <a:tcPr anchor="ctr">
+                    <a:solidFill>
+                      <a:schemeClr val="tx1">
+                        <a:lumMod val="65000"/>
+                        <a:lumOff val="35000"/>
+                      </a:schemeClr>
+                    </a:solidFill>
+                  </a:tcPr>
+                </a:tc>
+                <a:tc>
+                  <a:txBody>
+                    <a:bodyPr/>
+                    <a:lstStyle/>
+                    <a:p>
+                      <a:pPr algn="ctr" latinLnBrk="1"/>
+                      <a:endParaRPr lang="ko-KR" altLang="en-US" dirty="0"/>
+                    </a:p>
+                  </a:txBody>
+                  <a:tcPr anchor="ctr">
+                    <a:solidFill>
+                      <a:schemeClr val="bg1">
+                        <a:lumMod val="65000"/>
+                      </a:schemeClr>
+                    </a:solidFill>
+                  </a:tcPr>
+                </a:tc>
+                <a:tc>
+                  <a:txBody>
+                    <a:bodyPr/>
+                    <a:lstStyle/>
+                    <a:p>
+                      <a:pPr algn="ctr" latinLnBrk="1"/>
+                      <a:endParaRPr lang="ko-KR" altLang="en-US" dirty="0"/>
+                    </a:p>
+                  </a:txBody>
+                  <a:tcPr anchor="ctr">
+                    <a:solidFill>
+                      <a:schemeClr val="bg1">
+                        <a:lumMod val="85000"/>
+                      </a:schemeClr>
+                    </a:solidFill>
+                  </a:tcPr>
+                </a:tc>
+                <a:extLst>
+                  <a:ext uri="{0D108BD9-81ED-4DB2-BD59-A6C34878D82A}">
+                    <a16:rowId xmlns:a16="http://schemas.microsoft.com/office/drawing/2014/main" val="1316205491"/>
+                  </a:ext>
+                </a:extLst>
+              </a:tr>
+              <a:tr h="480147">
+                <a:tc>
+                  <a:txBody>
+                    <a:bodyPr/>
+                    <a:lstStyle/>
+                    <a:p>
+                      <a:pPr algn="ctr" latinLnBrk="1"/>
+                      <a:endParaRPr lang="ko-KR" altLang="en-US" dirty="0"/>
+                    </a:p>
+                  </a:txBody>
+                  <a:tcPr anchor="ctr">
+                    <a:solidFill>
+                      <a:schemeClr val="bg1">
+                        <a:lumMod val="85000"/>
+                      </a:schemeClr>
+                    </a:solidFill>
+                  </a:tcPr>
+                </a:tc>
+                <a:tc>
+                  <a:txBody>
+                    <a:bodyPr/>
+                    <a:lstStyle/>
+                    <a:p>
+                      <a:pPr algn="ctr" latinLnBrk="1"/>
+                      <a:endParaRPr lang="ko-KR" altLang="en-US" dirty="0"/>
+                    </a:p>
+                  </a:txBody>
+                  <a:tcPr anchor="ctr">
+                    <a:solidFill>
+                      <a:schemeClr val="bg1">
+                        <a:lumMod val="75000"/>
+                      </a:schemeClr>
+                    </a:solidFill>
+                  </a:tcPr>
+                </a:tc>
+                <a:tc>
+                  <a:txBody>
+                    <a:bodyPr/>
+                    <a:lstStyle/>
+                    <a:p>
+                      <a:pPr algn="ctr" latinLnBrk="1"/>
+                      <a:endParaRPr lang="ko-KR" altLang="en-US" dirty="0"/>
+                    </a:p>
+                  </a:txBody>
+                  <a:tcPr anchor="ctr">
+                    <a:solidFill>
+                      <a:schemeClr val="bg1">
+                        <a:lumMod val="65000"/>
+                      </a:schemeClr>
+                    </a:solidFill>
+                  </a:tcPr>
+                </a:tc>
+                <a:tc>
+                  <a:txBody>
+                    <a:bodyPr/>
+                    <a:lstStyle/>
+                    <a:p>
+                      <a:pPr algn="ctr" latinLnBrk="1"/>
+                      <a:endParaRPr lang="ko-KR" altLang="en-US" dirty="0"/>
+                    </a:p>
+                  </a:txBody>
+                  <a:tcPr anchor="ctr">
+                    <a:solidFill>
+                      <a:schemeClr val="bg1">
+                        <a:lumMod val="65000"/>
+                      </a:schemeClr>
+                    </a:solidFill>
+                  </a:tcPr>
+                </a:tc>
+                <a:tc>
+                  <a:txBody>
+                    <a:bodyPr/>
+                    <a:lstStyle/>
+                    <a:p>
+                      <a:pPr algn="ctr" latinLnBrk="1"/>
+                      <a:endParaRPr lang="ko-KR" altLang="en-US" dirty="0"/>
+                    </a:p>
+                  </a:txBody>
+                  <a:tcPr anchor="ctr">
+                    <a:solidFill>
+                      <a:schemeClr val="bg1">
+                        <a:lumMod val="75000"/>
+                      </a:schemeClr>
+                    </a:solidFill>
+                  </a:tcPr>
+                </a:tc>
+                <a:tc>
+                  <a:txBody>
+                    <a:bodyPr/>
+                    <a:lstStyle/>
+                    <a:p>
+                      <a:pPr algn="ctr" latinLnBrk="1"/>
+                      <a:endParaRPr lang="ko-KR" altLang="en-US" dirty="0"/>
+                    </a:p>
+                  </a:txBody>
+                  <a:tcPr anchor="ctr">
+                    <a:solidFill>
+                      <a:schemeClr val="bg1">
+                        <a:lumMod val="85000"/>
+                      </a:schemeClr>
+                    </a:solidFill>
+                  </a:tcPr>
+                </a:tc>
+                <a:extLst>
+                  <a:ext uri="{0D108BD9-81ED-4DB2-BD59-A6C34878D82A}">
+                    <a16:rowId xmlns:a16="http://schemas.microsoft.com/office/drawing/2014/main" val="2005323836"/>
+                  </a:ext>
+                </a:extLst>
+              </a:tr>
+              <a:tr h="480147">
+                <a:tc>
+                  <a:txBody>
+                    <a:bodyPr/>
+                    <a:lstStyle/>
+                    <a:p>
+                      <a:pPr algn="ctr" latinLnBrk="1"/>
+                      <a:endParaRPr lang="ko-KR" altLang="en-US" dirty="0"/>
+                    </a:p>
+                  </a:txBody>
+                  <a:tcPr anchor="ctr">
+                    <a:solidFill>
+                      <a:schemeClr val="bg1">
+                        <a:lumMod val="95000"/>
+                      </a:schemeClr>
+                    </a:solidFill>
+                  </a:tcPr>
+                </a:tc>
+                <a:tc>
+                  <a:txBody>
+                    <a:bodyPr/>
+                    <a:lstStyle/>
+                    <a:p>
+                      <a:pPr algn="ctr" latinLnBrk="1"/>
+                      <a:endParaRPr lang="ko-KR" altLang="en-US" dirty="0"/>
+                    </a:p>
+                  </a:txBody>
+                  <a:tcPr anchor="ctr">
+                    <a:solidFill>
+                      <a:schemeClr val="bg1">
+                        <a:lumMod val="85000"/>
+                      </a:schemeClr>
+                    </a:solidFill>
+                  </a:tcPr>
+                </a:tc>
+                <a:tc>
+                  <a:txBody>
+                    <a:bodyPr/>
+                    <a:lstStyle/>
+                    <a:p>
+                      <a:pPr algn="ctr" latinLnBrk="1"/>
+                      <a:endParaRPr lang="ko-KR" altLang="en-US" dirty="0"/>
+                    </a:p>
+                  </a:txBody>
+                  <a:tcPr anchor="ctr">
+                    <a:solidFill>
+                      <a:schemeClr val="bg1">
+                        <a:lumMod val="85000"/>
+                      </a:schemeClr>
+                    </a:solidFill>
+                  </a:tcPr>
+                </a:tc>
+                <a:tc>
+                  <a:txBody>
+                    <a:bodyPr/>
+                    <a:lstStyle/>
+                    <a:p>
+                      <a:pPr algn="ctr" latinLnBrk="1"/>
+                      <a:endParaRPr lang="ko-KR" altLang="en-US" dirty="0"/>
+                    </a:p>
+                  </a:txBody>
+                  <a:tcPr anchor="ctr">
+                    <a:solidFill>
+                      <a:schemeClr val="bg1">
+                        <a:lumMod val="85000"/>
+                      </a:schemeClr>
+                    </a:solidFill>
+                  </a:tcPr>
+                </a:tc>
+                <a:tc>
+                  <a:txBody>
+                    <a:bodyPr/>
+                    <a:lstStyle/>
+                    <a:p>
+                      <a:pPr algn="ctr" latinLnBrk="1"/>
+                      <a:endParaRPr lang="ko-KR" altLang="en-US" dirty="0"/>
+                    </a:p>
+                  </a:txBody>
+                  <a:tcPr anchor="ctr">
+                    <a:solidFill>
+                      <a:schemeClr val="bg1">
+                        <a:lumMod val="85000"/>
+                      </a:schemeClr>
+                    </a:solidFill>
+                  </a:tcPr>
+                </a:tc>
+                <a:tc>
+                  <a:txBody>
+                    <a:bodyPr/>
+                    <a:lstStyle/>
+                    <a:p>
+                      <a:pPr algn="ctr" latinLnBrk="1"/>
+                      <a:endParaRPr lang="ko-KR" altLang="en-US" dirty="0"/>
+                    </a:p>
+                  </a:txBody>
+                  <a:tcPr anchor="ctr">
+                    <a:solidFill>
+                      <a:schemeClr val="bg1">
+                        <a:lumMod val="95000"/>
+                      </a:schemeClr>
+                    </a:solidFill>
+                  </a:tcPr>
+                </a:tc>
+                <a:extLst>
+                  <a:ext uri="{0D108BD9-81ED-4DB2-BD59-A6C34878D82A}">
+                    <a16:rowId xmlns:a16="http://schemas.microsoft.com/office/drawing/2014/main" val="1229779854"/>
+                  </a:ext>
+                </a:extLst>
+              </a:tr>
+            </a:tbl>
+          </a:graphicData>
+        </a:graphic>
+      </p:graphicFrame>
+      <p:sp>
+        <p:nvSpPr>
+          <p:cNvPr id="67" name="TextBox 66"/>
+          <p:cNvSpPr txBox="1"/>
+          <p:nvPr/>
+        </p:nvSpPr>
+        <p:spPr>
+          <a:xfrm>
+            <a:off x="9294325" y="4594877"/>
+            <a:ext cx="2268891" cy="400110"/>
+          </a:xfrm>
+          <a:prstGeom prst="rect">
+            <a:avLst/>
+          </a:prstGeom>
+          <a:noFill/>
+        </p:spPr>
+        <p:txBody>
+          <a:bodyPr wrap="none" rtlCol="0">
+            <a:spAutoFit/>
+          </a:bodyPr>
+          <a:lstStyle/>
+          <a:p>
+            <a:r>
+              <a:rPr lang="en-US" altLang="ko-KR" sz="2000" b="1" dirty="0" smtClean="0"/>
+              <a:t>Throughput Map</a:t>
+            </a:r>
+            <a:endParaRPr lang="ko-KR" altLang="en-US" sz="2000" b="1" dirty="0"/>
+          </a:p>
+        </p:txBody>
+      </p:sp>
+      <p:sp>
+        <p:nvSpPr>
+          <p:cNvPr id="68" name="TextBox 67"/>
+          <p:cNvSpPr txBox="1"/>
+          <p:nvPr/>
+        </p:nvSpPr>
+        <p:spPr>
+          <a:xfrm>
+            <a:off x="5534007" y="4594877"/>
+            <a:ext cx="2738250" cy="400110"/>
+          </a:xfrm>
+          <a:prstGeom prst="rect">
+            <a:avLst/>
+          </a:prstGeom>
+          <a:noFill/>
+        </p:spPr>
+        <p:txBody>
+          <a:bodyPr wrap="none" rtlCol="0">
+            <a:spAutoFit/>
+          </a:bodyPr>
+          <a:lstStyle/>
+          <a:p>
+            <a:r>
+              <a:rPr lang="en-US" altLang="ko-KR" sz="2000" b="1" dirty="0" smtClean="0"/>
+              <a:t>WDs placement map</a:t>
+            </a:r>
+            <a:endParaRPr lang="ko-KR" altLang="en-US" sz="2000" b="1" dirty="0"/>
+          </a:p>
+        </p:txBody>
+      </p:sp>
+      <p:sp>
+        <p:nvSpPr>
+          <p:cNvPr id="69" name="TextBox 68"/>
+          <p:cNvSpPr txBox="1"/>
+          <p:nvPr/>
+        </p:nvSpPr>
+        <p:spPr>
+          <a:xfrm>
+            <a:off x="6105982" y="1130280"/>
+            <a:ext cx="1962397" cy="307777"/>
+          </a:xfrm>
+          <a:prstGeom prst="rect">
+            <a:avLst/>
+          </a:prstGeom>
+          <a:noFill/>
+        </p:spPr>
+        <p:txBody>
+          <a:bodyPr wrap="none" rtlCol="0">
+            <a:spAutoFit/>
+          </a:bodyPr>
+          <a:lstStyle/>
+          <a:p>
+            <a:r>
+              <a:rPr lang="en-US" altLang="ko-KR" sz="1400" b="1" dirty="0" smtClean="0"/>
+              <a:t>block contains a WD</a:t>
+            </a:r>
+            <a:endParaRPr lang="ko-KR" altLang="en-US" sz="1400" b="1" dirty="0"/>
+          </a:p>
+        </p:txBody>
+      </p:sp>
+      <p:sp>
+        <p:nvSpPr>
+          <p:cNvPr id="44" name="Rectangle 43"/>
+          <p:cNvSpPr/>
+          <p:nvPr/>
+        </p:nvSpPr>
+        <p:spPr>
+          <a:xfrm>
+            <a:off x="5672295" y="1130280"/>
+            <a:ext cx="283959" cy="264249"/>
+          </a:xfrm>
+          <a:prstGeom prst="rect">
+            <a:avLst/>
+          </a:prstGeom>
+          <a:solidFill>
+            <a:schemeClr val="bg1">
+              <a:lumMod val="65000"/>
+            </a:schemeClr>
+          </a:solidFill>
+          <a:ln>
+            <a:noFill/>
+          </a:ln>
+        </p:spPr>
+        <p:style>
+          <a:lnRef idx="2">
+            <a:schemeClr val="accent1">
+              <a:shade val="50000"/>
+            </a:schemeClr>
+          </a:lnRef>
+          <a:fillRef idx="1">
+            <a:schemeClr val="accent1"/>
+          </a:fillRef>
+          <a:effectRef idx="0">
+            <a:schemeClr val="accent1"/>
+          </a:effectRef>
+          <a:fontRef idx="minor">
+            <a:schemeClr val="lt1"/>
+          </a:fontRef>
+        </p:style>
+        <p:txBody>
+          <a:bodyPr rtlCol="0" anchor="ctr"/>
+          <a:lstStyle/>
+          <a:p>
+            <a:pPr algn="ctr"/>
+            <a:endParaRPr lang="ko-KR" altLang="en-US"/>
+          </a:p>
+        </p:txBody>
+      </p:sp>
+      <p:sp>
+        <p:nvSpPr>
+          <p:cNvPr id="71" name="TextBox 70"/>
+          <p:cNvSpPr txBox="1"/>
+          <p:nvPr/>
+        </p:nvSpPr>
+        <p:spPr>
+          <a:xfrm>
+            <a:off x="9068741" y="1033893"/>
+            <a:ext cx="2404633" cy="523220"/>
+          </a:xfrm>
+          <a:prstGeom prst="rect">
+            <a:avLst/>
+          </a:prstGeom>
+          <a:noFill/>
+        </p:spPr>
+        <p:txBody>
+          <a:bodyPr wrap="none" rtlCol="0">
+            <a:spAutoFit/>
+          </a:bodyPr>
+          <a:lstStyle/>
+          <a:p>
+            <a:pPr algn="ctr"/>
+            <a:r>
+              <a:rPr lang="en-US" altLang="ko-KR" sz="1400" b="1" dirty="0" smtClean="0"/>
+              <a:t>The darker,</a:t>
+            </a:r>
+          </a:p>
+          <a:p>
+            <a:pPr algn="ctr"/>
+            <a:r>
+              <a:rPr lang="en-US" altLang="ko-KR" sz="1400" b="1" dirty="0" smtClean="0"/>
+              <a:t>the larger the throughput</a:t>
+            </a:r>
+            <a:endParaRPr lang="ko-KR" altLang="en-US" sz="1400" b="1" dirty="0"/>
+          </a:p>
+        </p:txBody>
+      </p:sp>
+      <p:cxnSp>
+        <p:nvCxnSpPr>
+          <p:cNvPr id="72" name="Straight Arrow Connector 71"/>
+          <p:cNvCxnSpPr/>
+          <p:nvPr/>
+        </p:nvCxnSpPr>
+        <p:spPr>
+          <a:xfrm flipV="1">
+            <a:off x="8846884" y="2847409"/>
+            <a:ext cx="1065127" cy="2365109"/>
+          </a:xfrm>
+          <a:prstGeom prst="straightConnector1">
+            <a:avLst/>
+          </a:prstGeom>
+          <a:ln w="38100">
+            <a:solidFill>
+              <a:schemeClr val="tx1"/>
+            </a:solidFill>
+            <a:tailEnd type="triangle" w="lg" len="lg"/>
+          </a:ln>
+        </p:spPr>
+        <p:style>
+          <a:lnRef idx="1">
+            <a:schemeClr val="accent1"/>
+          </a:lnRef>
+          <a:fillRef idx="0">
+            <a:schemeClr val="accent1"/>
+          </a:fillRef>
+          <a:effectRef idx="0">
+            <a:schemeClr val="accent1"/>
+          </a:effectRef>
+          <a:fontRef idx="minor">
+            <a:schemeClr val="tx1"/>
+          </a:fontRef>
+        </p:style>
+      </p:cxnSp>
+      <p:sp>
+        <p:nvSpPr>
+          <p:cNvPr id="59" name="TextBox 58"/>
+          <p:cNvSpPr txBox="1"/>
+          <p:nvPr/>
+        </p:nvSpPr>
+        <p:spPr>
+          <a:xfrm>
+            <a:off x="7395040" y="5212518"/>
+            <a:ext cx="2516971" cy="369332"/>
+          </a:xfrm>
+          <a:prstGeom prst="rect">
+            <a:avLst/>
+          </a:prstGeom>
+          <a:noFill/>
+        </p:spPr>
+        <p:txBody>
+          <a:bodyPr wrap="none" rtlCol="0">
+            <a:spAutoFit/>
+          </a:bodyPr>
+          <a:lstStyle/>
+          <a:p>
+            <a:r>
+              <a:rPr lang="en-US" altLang="ko-KR" dirty="0" smtClean="0"/>
+              <a:t>Best throughput point</a:t>
+            </a:r>
+            <a:endParaRPr lang="ko-KR" altLang="en-US" dirty="0"/>
+          </a:p>
+        </p:txBody>
+      </p:sp>
+      <p:sp>
+        <p:nvSpPr>
+          <p:cNvPr id="78" name="TextBox 77"/>
+          <p:cNvSpPr txBox="1"/>
+          <p:nvPr/>
+        </p:nvSpPr>
+        <p:spPr>
+          <a:xfrm>
+            <a:off x="1847036" y="985922"/>
+            <a:ext cx="1582934" cy="369332"/>
+          </a:xfrm>
+          <a:prstGeom prst="rect">
+            <a:avLst/>
+          </a:prstGeom>
+          <a:noFill/>
+        </p:spPr>
+        <p:txBody>
+          <a:bodyPr wrap="none" rtlCol="0">
+            <a:spAutoFit/>
+          </a:bodyPr>
+          <a:lstStyle/>
+          <a:p>
+            <a:pPr algn="ctr"/>
+            <a:r>
+              <a:rPr lang="en-US" altLang="ko-KR" b="1" dirty="0" smtClean="0"/>
+              <a:t>environment</a:t>
+            </a:r>
+            <a:endParaRPr lang="ko-KR" altLang="en-US" b="1" dirty="0"/>
+          </a:p>
+        </p:txBody>
+      </p:sp>
+    </p:spTree>
+    <p:extLst>
+      <p:ext uri="{BB962C8B-B14F-4D97-AF65-F5344CB8AC3E}">
+        <p14:creationId xmlns:p14="http://schemas.microsoft.com/office/powerpoint/2010/main" val="3033712449"/>
+      </p:ext>
+    </p:extLst>
+  </p:cSld>
+  <p:clrMapOvr>
+    <a:masterClrMapping/>
+  </p:clrMapOvr>
+</p:sld>
+</file>
+
+<file path=ppt/slides/slide3.xml><?xml version="1.0" encoding="utf-8"?>
+<p:sld xmlns:a="http://schemas.openxmlformats.org/drawingml/2006/main" xmlns:r="http://schemas.openxmlformats.org/officeDocument/2006/relationships" xmlns:p="http://schemas.openxmlformats.org/presentationml/2006/main">
+  <p:cSld>
+    <p:spTree>
+      <p:nvGrpSpPr>
+        <p:cNvPr id="1" name=""/>
+        <p:cNvGrpSpPr/>
+        <p:nvPr/>
+      </p:nvGrpSpPr>
+      <p:grpSpPr>
+        <a:xfrm>
+          <a:off x="0" y="0"/>
+          <a:ext cx="0" cy="0"/>
+          <a:chOff x="0" y="0"/>
+          <a:chExt cx="0" cy="0"/>
+        </a:xfrm>
+      </p:grpSpPr>
       <p:graphicFrame>
         <p:nvGraphicFramePr>
           <p:cNvPr id="4" name="Table 3"/>
@@ -5013,7 +7548,7 @@
 </p:sld>
 </file>
 
-<file path=ppt/slides/slide3.xml><?xml version="1.0" encoding="utf-8"?>
+<file path=ppt/slides/slide4.xml><?xml version="1.0" encoding="utf-8"?>
 <p:sld xmlns:a="http://schemas.openxmlformats.org/drawingml/2006/main" xmlns:r="http://schemas.openxmlformats.org/officeDocument/2006/relationships" xmlns:p="http://schemas.openxmlformats.org/presentationml/2006/main">
   <p:cSld>
     <p:spTree>
@@ -5332,7 +7867,7 @@
 </p:sld>
 </file>
 
-<file path=ppt/slides/slide4.xml><?xml version="1.0" encoding="utf-8"?>
+<file path=ppt/slides/slide5.xml><?xml version="1.0" encoding="utf-8"?>
 <p:sld xmlns:a="http://schemas.openxmlformats.org/drawingml/2006/main" xmlns:r="http://schemas.openxmlformats.org/officeDocument/2006/relationships" xmlns:p="http://schemas.openxmlformats.org/presentationml/2006/main">
   <p:cSld>
     <p:spTree>
@@ -6552,14 +9087,14 @@
                 <a:latin typeface="맑은 고딕" panose="020B0503020000020004" pitchFamily="50" charset="-127"/>
                 <a:cs typeface="Times New Roman" panose="02020603050405020304" pitchFamily="18" charset="0"/>
               </a:rPr>
-              <a:t>Figure </a:t>
+              <a:t>Figure 3</a:t>
             </a:r>
             <a:r>
               <a:rPr lang="en-US" altLang="ko-KR" b="1" dirty="0" smtClean="0">
                 <a:latin typeface="맑은 고딕" panose="020B0503020000020004" pitchFamily="50" charset="-127"/>
                 <a:cs typeface="Times New Roman" panose="02020603050405020304" pitchFamily="18" charset="0"/>
               </a:rPr>
-              <a:t>2. Architecture of Deep Learning Model for Common Throughput Maximization</a:t>
+              <a:t>. Architecture of Deep Learning Model for Common Throughput Maximization</a:t>
             </a:r>
             <a:endParaRPr lang="ko-KR" altLang="en-US" dirty="0"/>
           </a:p>
@@ -6578,7 +9113,7 @@
 </p:sld>
 </file>
 
-<file path=ppt/slides/slide5.xml><?xml version="1.0" encoding="utf-8"?>
+<file path=ppt/slides/slide6.xml><?xml version="1.0" encoding="utf-8"?>
 <p:sld xmlns:a="http://schemas.openxmlformats.org/drawingml/2006/main" xmlns:r="http://schemas.openxmlformats.org/officeDocument/2006/relationships" xmlns:p="http://schemas.openxmlformats.org/presentationml/2006/main">
   <p:cSld>
     <p:spTree>
@@ -10724,14 +13259,14 @@
                     <a:latin typeface="맑은 고딕" panose="020B0503020000020004" pitchFamily="50" charset="-127"/>
                     <a:cs typeface="Times New Roman" panose="02020603050405020304" pitchFamily="18" charset="0"/>
                   </a:rPr>
-                  <a:t>Figure </a:t>
+                  <a:t>Figure 4</a:t>
                 </a:r>
                 <a:r>
                   <a:rPr lang="en-US" altLang="ko-KR" b="1" dirty="0" smtClean="0">
                     <a:latin typeface="맑은 고딕" panose="020B0503020000020004" pitchFamily="50" charset="-127"/>
                     <a:cs typeface="Times New Roman" panose="02020603050405020304" pitchFamily="18" charset="0"/>
                   </a:rPr>
-                  <a:t>3. Decision algorithm for </a:t>
+                  <a:t>. Decision algorithm for </a:t>
                 </a:r>
                 <a14:m>
                   <m:oMath xmlns:m="http://schemas.openxmlformats.org/officeDocument/2006/math">
@@ -10993,7 +13528,7 @@
 </p:sld>
 </file>
 
-<file path=ppt/slides/slide6.xml><?xml version="1.0" encoding="utf-8"?>
+<file path=ppt/slides/slide7.xml><?xml version="1.0" encoding="utf-8"?>
 <p:sld xmlns:a="http://schemas.openxmlformats.org/drawingml/2006/main" xmlns:r="http://schemas.openxmlformats.org/officeDocument/2006/relationships" xmlns:p="http://schemas.openxmlformats.org/presentationml/2006/main">
   <p:cSld>
     <p:spTree>
@@ -11209,14 +13744,14 @@
                 <a:latin typeface="맑은 고딕" panose="020B0503020000020004" pitchFamily="50" charset="-127"/>
                 <a:cs typeface="Times New Roman" panose="02020603050405020304" pitchFamily="18" charset="0"/>
               </a:rPr>
-              <a:t>Figure </a:t>
+              <a:t>Figure 5</a:t>
             </a:r>
             <a:r>
               <a:rPr lang="en-US" altLang="ko-KR" b="1" dirty="0" smtClean="0">
                 <a:latin typeface="맑은 고딕" panose="020B0503020000020004" pitchFamily="50" charset="-127"/>
                 <a:cs typeface="Times New Roman" panose="02020603050405020304" pitchFamily="18" charset="0"/>
               </a:rPr>
-              <a:t>4. </a:t>
+              <a:t>. </a:t>
             </a:r>
             <a:r>
               <a:rPr lang="en-US" altLang="ko-KR" b="1" dirty="0">
@@ -11706,7 +14241,7 @@
 </p:sld>
 </file>
 
-<file path=ppt/slides/slide7.xml><?xml version="1.0" encoding="utf-8"?>
+<file path=ppt/slides/slide8.xml><?xml version="1.0" encoding="utf-8"?>
 <p:sld xmlns:a="http://schemas.openxmlformats.org/drawingml/2006/main" xmlns:r="http://schemas.openxmlformats.org/officeDocument/2006/relationships" xmlns:p="http://schemas.openxmlformats.org/presentationml/2006/main">
   <p:cSld>
     <p:spTree>
@@ -11750,14 +14285,14 @@
                 <a:latin typeface="맑은 고딕" panose="020B0503020000020004" pitchFamily="50" charset="-127"/>
                 <a:cs typeface="Times New Roman" panose="02020603050405020304" pitchFamily="18" charset="0"/>
               </a:rPr>
-              <a:t>Figure 5</a:t>
+              <a:t>Figure </a:t>
             </a:r>
             <a:r>
               <a:rPr lang="en-US" altLang="ko-KR" b="1" dirty="0" smtClean="0">
                 <a:latin typeface="맑은 고딕" panose="020B0503020000020004" pitchFamily="50" charset="-127"/>
                 <a:cs typeface="Times New Roman" panose="02020603050405020304" pitchFamily="18" charset="0"/>
               </a:rPr>
-              <a:t>. CT.RATE and CT.AVERAGE values of our methodology</a:t>
+              <a:t>6. CT.RATE and CT.AVERAGE values of our methodology</a:t>
             </a:r>
           </a:p>
           <a:p>
@@ -11781,7 +14316,7 @@
         </p:nvSpPr>
         <p:spPr>
           <a:xfrm>
-            <a:off x="7362713" y="3930681"/>
+            <a:off x="7443993" y="3910693"/>
             <a:ext cx="4184351" cy="369332"/>
           </a:xfrm>
           <a:prstGeom prst="rect">
@@ -11800,14 +14335,14 @@
                 <a:latin typeface="맑은 고딕" panose="020B0503020000020004" pitchFamily="50" charset="-127"/>
                 <a:cs typeface="Times New Roman" panose="02020603050405020304" pitchFamily="18" charset="0"/>
               </a:rPr>
-              <a:t>Figure </a:t>
+              <a:t>Figure 7</a:t>
             </a:r>
             <a:r>
               <a:rPr lang="en-US" altLang="ko-KR" b="1" dirty="0" smtClean="0">
                 <a:latin typeface="맑은 고딕" panose="020B0503020000020004" pitchFamily="50" charset="-127"/>
                 <a:cs typeface="Times New Roman" panose="02020603050405020304" pitchFamily="18" charset="0"/>
               </a:rPr>
-              <a:t>6. CT.AVGMAX and PR values</a:t>
+              <a:t>. CT.AVGMAX and PR values</a:t>
             </a:r>
             <a:endParaRPr lang="ko-KR" altLang="en-US" dirty="0"/>
           </a:p>
@@ -11815,7 +14350,7 @@
       </p:sp>
       <p:pic>
         <p:nvPicPr>
-          <p:cNvPr id="4" name="Picture 3"/>
+          <p:cNvPr id="8" name="Picture 7"/>
           <p:cNvPicPr>
             <a:picLocks noChangeAspect="1"/>
           </p:cNvPicPr>
@@ -11829,8 +14364,8 @@
         </p:blipFill>
         <p:spPr>
           <a:xfrm>
-            <a:off x="338666" y="687193"/>
-            <a:ext cx="6633633" cy="3158186"/>
+            <a:off x="254390" y="1099696"/>
+            <a:ext cx="6966713" cy="2810997"/>
           </a:xfrm>
           <a:prstGeom prst="rect">
             <a:avLst/>
@@ -11839,7 +14374,7 @@
       </p:pic>
       <p:pic>
         <p:nvPicPr>
-          <p:cNvPr id="6" name="Picture 5"/>
+          <p:cNvPr id="2" name="Picture 1"/>
           <p:cNvPicPr>
             <a:picLocks noChangeAspect="1"/>
           </p:cNvPicPr>
@@ -11853,8 +14388,8 @@
         </p:blipFill>
         <p:spPr>
           <a:xfrm>
-            <a:off x="7439417" y="667205"/>
-            <a:ext cx="4030944" cy="3198162"/>
+            <a:off x="7429284" y="1099695"/>
+            <a:ext cx="4220185" cy="2810997"/>
           </a:xfrm>
           <a:prstGeom prst="rect">
             <a:avLst/>
@@ -11864,7 +14399,290 @@
     </p:spTree>
     <p:extLst>
       <p:ext uri="{BB962C8B-B14F-4D97-AF65-F5344CB8AC3E}">
-        <p14:creationId xmlns:p14="http://schemas.microsoft.com/office/powerpoint/2010/main" val="2508721355"/>
+        <p14:creationId xmlns:p14="http://schemas.microsoft.com/office/powerpoint/2010/main" val="2900775202"/>
+      </p:ext>
+    </p:extLst>
+  </p:cSld>
+  <p:clrMapOvr>
+    <a:masterClrMapping/>
+  </p:clrMapOvr>
+</p:sld>
+</file>
+
+<file path=ppt/slides/slide9.xml><?xml version="1.0" encoding="utf-8"?>
+<p:sld xmlns:a="http://schemas.openxmlformats.org/drawingml/2006/main" xmlns:r="http://schemas.openxmlformats.org/officeDocument/2006/relationships" xmlns:p="http://schemas.openxmlformats.org/presentationml/2006/main">
+  <p:cSld>
+    <p:spTree>
+      <p:nvGrpSpPr>
+        <p:cNvPr id="1" name=""/>
+        <p:cNvGrpSpPr/>
+        <p:nvPr/>
+      </p:nvGrpSpPr>
+      <p:grpSpPr>
+        <a:xfrm>
+          <a:off x="0" y="0"/>
+          <a:ext cx="0" cy="0"/>
+          <a:chOff x="0" y="0"/>
+          <a:chExt cx="0" cy="0"/>
+        </a:xfrm>
+      </p:grpSpPr>
+      <p:pic>
+        <p:nvPicPr>
+          <p:cNvPr id="3" name="Picture 2"/>
+          <p:cNvPicPr>
+            <a:picLocks noChangeAspect="1"/>
+          </p:cNvPicPr>
+          <p:nvPr/>
+        </p:nvPicPr>
+        <p:blipFill>
+          <a:blip r:embed="rId2"/>
+          <a:stretch>
+            <a:fillRect/>
+          </a:stretch>
+        </p:blipFill>
+        <p:spPr>
+          <a:xfrm>
+            <a:off x="406399" y="460391"/>
+            <a:ext cx="3667889" cy="2397600"/>
+          </a:xfrm>
+          <a:prstGeom prst="rect">
+            <a:avLst/>
+          </a:prstGeom>
+        </p:spPr>
+      </p:pic>
+      <p:pic>
+        <p:nvPicPr>
+          <p:cNvPr id="4" name="Picture 3"/>
+          <p:cNvPicPr>
+            <a:picLocks noChangeAspect="1"/>
+          </p:cNvPicPr>
+          <p:nvPr/>
+        </p:nvPicPr>
+        <p:blipFill>
+          <a:blip r:embed="rId3"/>
+          <a:stretch>
+            <a:fillRect/>
+          </a:stretch>
+        </p:blipFill>
+        <p:spPr>
+          <a:xfrm>
+            <a:off x="4278709" y="3040228"/>
+            <a:ext cx="3662389" cy="2397600"/>
+          </a:xfrm>
+          <a:prstGeom prst="rect">
+            <a:avLst/>
+          </a:prstGeom>
+        </p:spPr>
+      </p:pic>
+      <p:pic>
+        <p:nvPicPr>
+          <p:cNvPr id="6" name="Picture 5"/>
+          <p:cNvPicPr>
+            <a:picLocks noChangeAspect="1"/>
+          </p:cNvPicPr>
+          <p:nvPr/>
+        </p:nvPicPr>
+        <p:blipFill>
+          <a:blip r:embed="rId4"/>
+          <a:stretch>
+            <a:fillRect/>
+          </a:stretch>
+        </p:blipFill>
+        <p:spPr>
+          <a:xfrm>
+            <a:off x="4284217" y="460391"/>
+            <a:ext cx="3615343" cy="2397600"/>
+          </a:xfrm>
+          <a:prstGeom prst="rect">
+            <a:avLst/>
+          </a:prstGeom>
+        </p:spPr>
+      </p:pic>
+      <p:pic>
+        <p:nvPicPr>
+          <p:cNvPr id="9" name="Picture 8"/>
+          <p:cNvPicPr>
+            <a:picLocks noChangeAspect="1"/>
+          </p:cNvPicPr>
+          <p:nvPr/>
+        </p:nvPicPr>
+        <p:blipFill>
+          <a:blip r:embed="rId5"/>
+          <a:stretch>
+            <a:fillRect/>
+          </a:stretch>
+        </p:blipFill>
+        <p:spPr>
+          <a:xfrm>
+            <a:off x="406399" y="3040228"/>
+            <a:ext cx="3651645" cy="2397600"/>
+          </a:xfrm>
+          <a:prstGeom prst="rect">
+            <a:avLst/>
+          </a:prstGeom>
+        </p:spPr>
+      </p:pic>
+      <p:pic>
+        <p:nvPicPr>
+          <p:cNvPr id="10" name="Picture 9"/>
+          <p:cNvPicPr>
+            <a:picLocks noChangeAspect="1"/>
+          </p:cNvPicPr>
+          <p:nvPr/>
+        </p:nvPicPr>
+        <p:blipFill>
+          <a:blip r:embed="rId6"/>
+          <a:stretch>
+            <a:fillRect/>
+          </a:stretch>
+        </p:blipFill>
+        <p:spPr>
+          <a:xfrm>
+            <a:off x="8343170" y="460391"/>
+            <a:ext cx="3662389" cy="2397600"/>
+          </a:xfrm>
+          <a:prstGeom prst="rect">
+            <a:avLst/>
+          </a:prstGeom>
+        </p:spPr>
+      </p:pic>
+      <p:pic>
+        <p:nvPicPr>
+          <p:cNvPr id="11" name="Picture 10"/>
+          <p:cNvPicPr>
+            <a:picLocks noChangeAspect="1"/>
+          </p:cNvPicPr>
+          <p:nvPr/>
+        </p:nvPicPr>
+        <p:blipFill>
+          <a:blip r:embed="rId7"/>
+          <a:stretch>
+            <a:fillRect/>
+          </a:stretch>
+        </p:blipFill>
+        <p:spPr>
+          <a:xfrm>
+            <a:off x="8395444" y="3040228"/>
+            <a:ext cx="3610115" cy="2397600"/>
+          </a:xfrm>
+          <a:prstGeom prst="rect">
+            <a:avLst/>
+          </a:prstGeom>
+        </p:spPr>
+      </p:pic>
+      <p:cxnSp>
+        <p:nvCxnSpPr>
+          <p:cNvPr id="13" name="Straight Connector 12"/>
+          <p:cNvCxnSpPr/>
+          <p:nvPr/>
+        </p:nvCxnSpPr>
+        <p:spPr>
+          <a:xfrm>
+            <a:off x="8133188" y="431816"/>
+            <a:ext cx="0" cy="5064109"/>
+          </a:xfrm>
+          <a:prstGeom prst="line">
+            <a:avLst/>
+          </a:prstGeom>
+          <a:ln w="38100">
+            <a:solidFill>
+              <a:schemeClr val="tx1"/>
+            </a:solidFill>
+          </a:ln>
+        </p:spPr>
+        <p:style>
+          <a:lnRef idx="1">
+            <a:schemeClr val="accent1"/>
+          </a:lnRef>
+          <a:fillRef idx="0">
+            <a:schemeClr val="accent1"/>
+          </a:fillRef>
+          <a:effectRef idx="0">
+            <a:schemeClr val="accent1"/>
+          </a:effectRef>
+          <a:fontRef idx="minor">
+            <a:schemeClr val="tx1"/>
+          </a:fontRef>
+        </p:style>
+      </p:cxnSp>
+      <p:cxnSp>
+        <p:nvCxnSpPr>
+          <p:cNvPr id="18" name="Straight Connector 17"/>
+          <p:cNvCxnSpPr/>
+          <p:nvPr/>
+        </p:nvCxnSpPr>
+        <p:spPr>
+          <a:xfrm>
+            <a:off x="8705850" y="4314825"/>
+            <a:ext cx="3248025" cy="0"/>
+          </a:xfrm>
+          <a:prstGeom prst="line">
+            <a:avLst/>
+          </a:prstGeom>
+          <a:ln>
+            <a:solidFill>
+              <a:schemeClr val="tx1"/>
+            </a:solidFill>
+          </a:ln>
+        </p:spPr>
+        <p:style>
+          <a:lnRef idx="1">
+            <a:schemeClr val="accent1"/>
+          </a:lnRef>
+          <a:fillRef idx="0">
+            <a:schemeClr val="accent1"/>
+          </a:fillRef>
+          <a:effectRef idx="0">
+            <a:schemeClr val="accent1"/>
+          </a:effectRef>
+          <a:fontRef idx="minor">
+            <a:schemeClr val="tx1"/>
+          </a:fontRef>
+        </p:style>
+      </p:cxnSp>
+      <p:sp>
+        <p:nvSpPr>
+          <p:cNvPr id="19" name="Rectangle 18"/>
+          <p:cNvSpPr/>
+          <p:nvPr/>
+        </p:nvSpPr>
+        <p:spPr>
+          <a:xfrm>
+            <a:off x="2900254" y="5688094"/>
+            <a:ext cx="6025496" cy="369332"/>
+          </a:xfrm>
+          <a:prstGeom prst="rect">
+            <a:avLst/>
+          </a:prstGeom>
+        </p:spPr>
+        <p:txBody>
+          <a:bodyPr wrap="none">
+            <a:spAutoFit/>
+          </a:bodyPr>
+          <a:lstStyle/>
+          <a:p>
+            <a:r>
+              <a:rPr lang="en-US" altLang="ko-KR" b="1" dirty="0">
+                <a:latin typeface="맑은 고딕" panose="020B0503020000020004" pitchFamily="50" charset="-127"/>
+                <a:cs typeface="Times New Roman" panose="02020603050405020304" pitchFamily="18" charset="0"/>
+              </a:rPr>
+              <a:t>Figure </a:t>
+            </a:r>
+            <a:r>
+              <a:rPr lang="en-US" altLang="ko-KR" b="1" dirty="0" smtClean="0">
+                <a:latin typeface="맑은 고딕" panose="020B0503020000020004" pitchFamily="50" charset="-127"/>
+                <a:cs typeface="Times New Roman" panose="02020603050405020304" pitchFamily="18" charset="0"/>
+              </a:rPr>
+              <a:t>8. Line Chart Version of Figure 6 and Figure 7</a:t>
+            </a:r>
+            <a:endParaRPr lang="ko-KR" altLang="en-US" dirty="0"/>
+          </a:p>
+        </p:txBody>
+      </p:sp>
+    </p:spTree>
+    <p:extLst>
+      <p:ext uri="{BB962C8B-B14F-4D97-AF65-F5344CB8AC3E}">
+        <p14:creationId xmlns:p14="http://schemas.microsoft.com/office/powerpoint/2010/main" val="7512396"/>
       </p:ext>
     </p:extLst>
   </p:cSld>

</xml_diff>

<commit_message>
update: revise the paper
</commit_message>
<xml_diff>
--- a/WPCN/for_final_paper.pptx
+++ b/WPCN/for_final_paper.pptx
@@ -251,7 +251,7 @@
           <a:p>
             <a:fld id="{7DEA4731-64EB-4CE7-B59A-17BBA9BDC1E6}" type="datetimeFigureOut">
               <a:rPr lang="ko-KR" altLang="en-US" smtClean="0"/>
-              <a:t>2020-07-01</a:t>
+              <a:t>2020-07-02</a:t>
             </a:fld>
             <a:endParaRPr lang="ko-KR" altLang="en-US"/>
           </a:p>
@@ -421,7 +421,7 @@
           <a:p>
             <a:fld id="{7DEA4731-64EB-4CE7-B59A-17BBA9BDC1E6}" type="datetimeFigureOut">
               <a:rPr lang="ko-KR" altLang="en-US" smtClean="0"/>
-              <a:t>2020-07-01</a:t>
+              <a:t>2020-07-02</a:t>
             </a:fld>
             <a:endParaRPr lang="ko-KR" altLang="en-US"/>
           </a:p>
@@ -601,7 +601,7 @@
           <a:p>
             <a:fld id="{7DEA4731-64EB-4CE7-B59A-17BBA9BDC1E6}" type="datetimeFigureOut">
               <a:rPr lang="ko-KR" altLang="en-US" smtClean="0"/>
-              <a:t>2020-07-01</a:t>
+              <a:t>2020-07-02</a:t>
             </a:fld>
             <a:endParaRPr lang="ko-KR" altLang="en-US"/>
           </a:p>
@@ -771,7 +771,7 @@
           <a:p>
             <a:fld id="{7DEA4731-64EB-4CE7-B59A-17BBA9BDC1E6}" type="datetimeFigureOut">
               <a:rPr lang="ko-KR" altLang="en-US" smtClean="0"/>
-              <a:t>2020-07-01</a:t>
+              <a:t>2020-07-02</a:t>
             </a:fld>
             <a:endParaRPr lang="ko-KR" altLang="en-US"/>
           </a:p>
@@ -1017,7 +1017,7 @@
           <a:p>
             <a:fld id="{7DEA4731-64EB-4CE7-B59A-17BBA9BDC1E6}" type="datetimeFigureOut">
               <a:rPr lang="ko-KR" altLang="en-US" smtClean="0"/>
-              <a:t>2020-07-01</a:t>
+              <a:t>2020-07-02</a:t>
             </a:fld>
             <a:endParaRPr lang="ko-KR" altLang="en-US"/>
           </a:p>
@@ -1249,7 +1249,7 @@
           <a:p>
             <a:fld id="{7DEA4731-64EB-4CE7-B59A-17BBA9BDC1E6}" type="datetimeFigureOut">
               <a:rPr lang="ko-KR" altLang="en-US" smtClean="0"/>
-              <a:t>2020-07-01</a:t>
+              <a:t>2020-07-02</a:t>
             </a:fld>
             <a:endParaRPr lang="ko-KR" altLang="en-US"/>
           </a:p>
@@ -1616,7 +1616,7 @@
           <a:p>
             <a:fld id="{7DEA4731-64EB-4CE7-B59A-17BBA9BDC1E6}" type="datetimeFigureOut">
               <a:rPr lang="ko-KR" altLang="en-US" smtClean="0"/>
-              <a:t>2020-07-01</a:t>
+              <a:t>2020-07-02</a:t>
             </a:fld>
             <a:endParaRPr lang="ko-KR" altLang="en-US"/>
           </a:p>
@@ -1734,7 +1734,7 @@
           <a:p>
             <a:fld id="{7DEA4731-64EB-4CE7-B59A-17BBA9BDC1E6}" type="datetimeFigureOut">
               <a:rPr lang="ko-KR" altLang="en-US" smtClean="0"/>
-              <a:t>2020-07-01</a:t>
+              <a:t>2020-07-02</a:t>
             </a:fld>
             <a:endParaRPr lang="ko-KR" altLang="en-US"/>
           </a:p>
@@ -1829,7 +1829,7 @@
           <a:p>
             <a:fld id="{7DEA4731-64EB-4CE7-B59A-17BBA9BDC1E6}" type="datetimeFigureOut">
               <a:rPr lang="ko-KR" altLang="en-US" smtClean="0"/>
-              <a:t>2020-07-01</a:t>
+              <a:t>2020-07-02</a:t>
             </a:fld>
             <a:endParaRPr lang="ko-KR" altLang="en-US"/>
           </a:p>
@@ -2106,7 +2106,7 @@
           <a:p>
             <a:fld id="{7DEA4731-64EB-4CE7-B59A-17BBA9BDC1E6}" type="datetimeFigureOut">
               <a:rPr lang="ko-KR" altLang="en-US" smtClean="0"/>
-              <a:t>2020-07-01</a:t>
+              <a:t>2020-07-02</a:t>
             </a:fld>
             <a:endParaRPr lang="ko-KR" altLang="en-US"/>
           </a:p>
@@ -2359,7 +2359,7 @@
           <a:p>
             <a:fld id="{7DEA4731-64EB-4CE7-B59A-17BBA9BDC1E6}" type="datetimeFigureOut">
               <a:rPr lang="ko-KR" altLang="en-US" smtClean="0"/>
-              <a:t>2020-07-01</a:t>
+              <a:t>2020-07-02</a:t>
             </a:fld>
             <a:endParaRPr lang="ko-KR" altLang="en-US"/>
           </a:p>
@@ -2572,7 +2572,7 @@
           <a:p>
             <a:fld id="{7DEA4731-64EB-4CE7-B59A-17BBA9BDC1E6}" type="datetimeFigureOut">
               <a:rPr lang="ko-KR" altLang="en-US" smtClean="0"/>
-              <a:t>2020-07-01</a:t>
+              <a:t>2020-07-02</a:t>
             </a:fld>
             <a:endParaRPr lang="ko-KR" altLang="en-US"/>
           </a:p>
@@ -7511,8 +7511,8 @@
         </p:nvSpPr>
         <p:spPr>
           <a:xfrm>
-            <a:off x="2031999" y="6255119"/>
-            <a:ext cx="8276112" cy="369332"/>
+            <a:off x="1857272" y="6267819"/>
+            <a:ext cx="8625566" cy="369332"/>
           </a:xfrm>
           <a:prstGeom prst="rect">
             <a:avLst/>
@@ -7529,7 +7529,42 @@
                 <a:latin typeface="맑은 고딕" panose="020B0503020000020004" pitchFamily="50" charset="-127"/>
                 <a:cs typeface="Times New Roman" panose="02020603050405020304" pitchFamily="18" charset="0"/>
               </a:rPr>
-              <a:t>Algorithm 1. Find throughput for a HAP location and each WD’s location</a:t>
+              <a:t>Algorithm 1</a:t>
+            </a:r>
+            <a:r>
+              <a:rPr lang="en-US" altLang="ko-KR" b="1" smtClean="0">
+                <a:latin typeface="맑은 고딕" panose="020B0503020000020004" pitchFamily="50" charset="-127"/>
+                <a:cs typeface="Times New Roman" panose="02020603050405020304" pitchFamily="18" charset="0"/>
+              </a:rPr>
+              <a:t>. </a:t>
+            </a:r>
+            <a:r>
+              <a:rPr lang="en-US" altLang="ko-KR" b="1" dirty="0" smtClean="0">
+                <a:latin typeface="맑은 고딕" panose="020B0503020000020004" pitchFamily="50" charset="-127"/>
+                <a:cs typeface="Times New Roman" panose="02020603050405020304" pitchFamily="18" charset="0"/>
+              </a:rPr>
+              <a:t>Find</a:t>
+            </a:r>
+            <a:r>
+              <a:rPr lang="en-US" altLang="ko-KR" b="1" dirty="0" smtClean="0">
+                <a:latin typeface="맑은 고딕" panose="020B0503020000020004" pitchFamily="50" charset="-127"/>
+                <a:cs typeface="Times New Roman" panose="02020603050405020304" pitchFamily="18" charset="0"/>
+              </a:rPr>
+              <a:t>ing</a:t>
+            </a:r>
+            <a:r>
+              <a:rPr lang="en-US" altLang="ko-KR" b="1" dirty="0" smtClean="0">
+                <a:latin typeface="맑은 고딕" panose="020B0503020000020004" pitchFamily="50" charset="-127"/>
+                <a:cs typeface="Times New Roman" panose="02020603050405020304" pitchFamily="18" charset="0"/>
+              </a:rPr>
+              <a:t> </a:t>
+            </a:r>
+            <a:r>
+              <a:rPr lang="en-US" altLang="ko-KR" b="1" dirty="0" smtClean="0">
+                <a:latin typeface="맑은 고딕" panose="020B0503020000020004" pitchFamily="50" charset="-127"/>
+                <a:cs typeface="Times New Roman" panose="02020603050405020304" pitchFamily="18" charset="0"/>
+              </a:rPr>
+              <a:t>throughput for a HAP location and each WD’s location</a:t>
             </a:r>
             <a:endParaRPr lang="ko-KR" altLang="en-US" dirty="0"/>
           </a:p>
@@ -7830,8 +7865,8 @@
         </p:nvSpPr>
         <p:spPr>
           <a:xfrm>
-            <a:off x="2032000" y="6074365"/>
-            <a:ext cx="8276112" cy="369332"/>
+            <a:off x="1857273" y="6074365"/>
+            <a:ext cx="8625567" cy="369332"/>
           </a:xfrm>
           <a:prstGeom prst="rect">
             <a:avLst/>
@@ -7843,12 +7878,27 @@
           </a:bodyPr>
           <a:lstStyle/>
           <a:p>
+            <a:pPr algn="ctr"/>
             <a:r>
               <a:rPr lang="en-US" altLang="ko-KR" b="1" dirty="0" smtClean="0">
                 <a:latin typeface="맑은 고딕" panose="020B0503020000020004" pitchFamily="50" charset="-127"/>
                 <a:cs typeface="Times New Roman" panose="02020603050405020304" pitchFamily="18" charset="0"/>
               </a:rPr>
-              <a:t>Algorithm 1. Find throughput for a HAP location and each WD’s location</a:t>
+              <a:t>Algorithm 1. </a:t>
+            </a:r>
+            <a:r>
+              <a:rPr lang="en-US" altLang="ko-KR" b="1" dirty="0" smtClean="0">
+                <a:latin typeface="맑은 고딕" panose="020B0503020000020004" pitchFamily="50" charset="-127"/>
+                <a:cs typeface="Times New Roman" panose="02020603050405020304" pitchFamily="18" charset="0"/>
+              </a:rPr>
+              <a:t>Finding </a:t>
+            </a:r>
+            <a:r>
+              <a:rPr lang="en-US" altLang="ko-KR" b="1" dirty="0" smtClean="0">
+                <a:latin typeface="맑은 고딕" panose="020B0503020000020004" pitchFamily="50" charset="-127"/>
+                <a:cs typeface="Times New Roman" panose="02020603050405020304" pitchFamily="18" charset="0"/>
+              </a:rPr>
+              <a:t>throughput for a HAP location and each WD’s location</a:t>
             </a:r>
             <a:endParaRPr lang="ko-KR" altLang="en-US" dirty="0"/>
           </a:p>

</xml_diff>

<commit_message>
update: add comparison graph (Figure 9)
</commit_message>
<xml_diff>
--- a/WPCN/for_final_paper.pptx
+++ b/WPCN/for_final_paper.pptx
@@ -14,6 +14,7 @@
     <p:sldId id="261" r:id="rId8"/>
     <p:sldId id="264" r:id="rId9"/>
     <p:sldId id="265" r:id="rId10"/>
+    <p:sldId id="266" r:id="rId11"/>
   </p:sldIdLst>
   <p:sldSz cx="12192000" cy="6858000"/>
   <p:notesSz cx="6858000" cy="9144000"/>
@@ -251,7 +252,7 @@
           <a:p>
             <a:fld id="{7DEA4731-64EB-4CE7-B59A-17BBA9BDC1E6}" type="datetimeFigureOut">
               <a:rPr lang="ko-KR" altLang="en-US" smtClean="0"/>
-              <a:t>2020-07-02</a:t>
+              <a:t>2020-07-07</a:t>
             </a:fld>
             <a:endParaRPr lang="ko-KR" altLang="en-US"/>
           </a:p>
@@ -421,7 +422,7 @@
           <a:p>
             <a:fld id="{7DEA4731-64EB-4CE7-B59A-17BBA9BDC1E6}" type="datetimeFigureOut">
               <a:rPr lang="ko-KR" altLang="en-US" smtClean="0"/>
-              <a:t>2020-07-02</a:t>
+              <a:t>2020-07-07</a:t>
             </a:fld>
             <a:endParaRPr lang="ko-KR" altLang="en-US"/>
           </a:p>
@@ -601,7 +602,7 @@
           <a:p>
             <a:fld id="{7DEA4731-64EB-4CE7-B59A-17BBA9BDC1E6}" type="datetimeFigureOut">
               <a:rPr lang="ko-KR" altLang="en-US" smtClean="0"/>
-              <a:t>2020-07-02</a:t>
+              <a:t>2020-07-07</a:t>
             </a:fld>
             <a:endParaRPr lang="ko-KR" altLang="en-US"/>
           </a:p>
@@ -771,7 +772,7 @@
           <a:p>
             <a:fld id="{7DEA4731-64EB-4CE7-B59A-17BBA9BDC1E6}" type="datetimeFigureOut">
               <a:rPr lang="ko-KR" altLang="en-US" smtClean="0"/>
-              <a:t>2020-07-02</a:t>
+              <a:t>2020-07-07</a:t>
             </a:fld>
             <a:endParaRPr lang="ko-KR" altLang="en-US"/>
           </a:p>
@@ -1017,7 +1018,7 @@
           <a:p>
             <a:fld id="{7DEA4731-64EB-4CE7-B59A-17BBA9BDC1E6}" type="datetimeFigureOut">
               <a:rPr lang="ko-KR" altLang="en-US" smtClean="0"/>
-              <a:t>2020-07-02</a:t>
+              <a:t>2020-07-07</a:t>
             </a:fld>
             <a:endParaRPr lang="ko-KR" altLang="en-US"/>
           </a:p>
@@ -1249,7 +1250,7 @@
           <a:p>
             <a:fld id="{7DEA4731-64EB-4CE7-B59A-17BBA9BDC1E6}" type="datetimeFigureOut">
               <a:rPr lang="ko-KR" altLang="en-US" smtClean="0"/>
-              <a:t>2020-07-02</a:t>
+              <a:t>2020-07-07</a:t>
             </a:fld>
             <a:endParaRPr lang="ko-KR" altLang="en-US"/>
           </a:p>
@@ -1616,7 +1617,7 @@
           <a:p>
             <a:fld id="{7DEA4731-64EB-4CE7-B59A-17BBA9BDC1E6}" type="datetimeFigureOut">
               <a:rPr lang="ko-KR" altLang="en-US" smtClean="0"/>
-              <a:t>2020-07-02</a:t>
+              <a:t>2020-07-07</a:t>
             </a:fld>
             <a:endParaRPr lang="ko-KR" altLang="en-US"/>
           </a:p>
@@ -1734,7 +1735,7 @@
           <a:p>
             <a:fld id="{7DEA4731-64EB-4CE7-B59A-17BBA9BDC1E6}" type="datetimeFigureOut">
               <a:rPr lang="ko-KR" altLang="en-US" smtClean="0"/>
-              <a:t>2020-07-02</a:t>
+              <a:t>2020-07-07</a:t>
             </a:fld>
             <a:endParaRPr lang="ko-KR" altLang="en-US"/>
           </a:p>
@@ -1829,7 +1830,7 @@
           <a:p>
             <a:fld id="{7DEA4731-64EB-4CE7-B59A-17BBA9BDC1E6}" type="datetimeFigureOut">
               <a:rPr lang="ko-KR" altLang="en-US" smtClean="0"/>
-              <a:t>2020-07-02</a:t>
+              <a:t>2020-07-07</a:t>
             </a:fld>
             <a:endParaRPr lang="ko-KR" altLang="en-US"/>
           </a:p>
@@ -2106,7 +2107,7 @@
           <a:p>
             <a:fld id="{7DEA4731-64EB-4CE7-B59A-17BBA9BDC1E6}" type="datetimeFigureOut">
               <a:rPr lang="ko-KR" altLang="en-US" smtClean="0"/>
-              <a:t>2020-07-02</a:t>
+              <a:t>2020-07-07</a:t>
             </a:fld>
             <a:endParaRPr lang="ko-KR" altLang="en-US"/>
           </a:p>
@@ -2359,7 +2360,7 @@
           <a:p>
             <a:fld id="{7DEA4731-64EB-4CE7-B59A-17BBA9BDC1E6}" type="datetimeFigureOut">
               <a:rPr lang="ko-KR" altLang="en-US" smtClean="0"/>
-              <a:t>2020-07-02</a:t>
+              <a:t>2020-07-07</a:t>
             </a:fld>
             <a:endParaRPr lang="ko-KR" altLang="en-US"/>
           </a:p>
@@ -2572,7 +2573,7 @@
           <a:p>
             <a:fld id="{7DEA4731-64EB-4CE7-B59A-17BBA9BDC1E6}" type="datetimeFigureOut">
               <a:rPr lang="ko-KR" altLang="en-US" smtClean="0"/>
-              <a:t>2020-07-02</a:t>
+              <a:t>2020-07-07</a:t>
             </a:fld>
             <a:endParaRPr lang="ko-KR" altLang="en-US"/>
           </a:p>
@@ -4652,6 +4653,121 @@
     <p:extLst>
       <p:ext uri="{BB962C8B-B14F-4D97-AF65-F5344CB8AC3E}">
         <p14:creationId xmlns:p14="http://schemas.microsoft.com/office/powerpoint/2010/main" val="1332739370"/>
+      </p:ext>
+    </p:extLst>
+  </p:cSld>
+  <p:clrMapOvr>
+    <a:masterClrMapping/>
+  </p:clrMapOvr>
+</p:sld>
+</file>
+
+<file path=ppt/slides/slide10.xml><?xml version="1.0" encoding="utf-8"?>
+<p:sld xmlns:a="http://schemas.openxmlformats.org/drawingml/2006/main" xmlns:r="http://schemas.openxmlformats.org/officeDocument/2006/relationships" xmlns:p="http://schemas.openxmlformats.org/presentationml/2006/main">
+  <p:cSld>
+    <p:spTree>
+      <p:nvGrpSpPr>
+        <p:cNvPr id="1" name=""/>
+        <p:cNvGrpSpPr/>
+        <p:nvPr/>
+      </p:nvGrpSpPr>
+      <p:grpSpPr>
+        <a:xfrm>
+          <a:off x="0" y="0"/>
+          <a:ext cx="0" cy="0"/>
+          <a:chOff x="0" y="0"/>
+          <a:chExt cx="0" cy="0"/>
+        </a:xfrm>
+      </p:grpSpPr>
+      <p:sp>
+        <p:nvSpPr>
+          <p:cNvPr id="19" name="Rectangle 18"/>
+          <p:cNvSpPr/>
+          <p:nvPr/>
+        </p:nvSpPr>
+        <p:spPr>
+          <a:xfrm>
+            <a:off x="323433" y="5143148"/>
+            <a:ext cx="10896124" cy="369332"/>
+          </a:xfrm>
+          <a:prstGeom prst="rect">
+            <a:avLst/>
+          </a:prstGeom>
+        </p:spPr>
+        <p:txBody>
+          <a:bodyPr wrap="none">
+            <a:spAutoFit/>
+          </a:bodyPr>
+          <a:lstStyle/>
+          <a:p>
+            <a:pPr algn="ctr"/>
+            <a:r>
+              <a:rPr lang="en-US" altLang="ko-KR" b="1" dirty="0">
+                <a:latin typeface="맑은 고딕" panose="020B0503020000020004" pitchFamily="50" charset="-127"/>
+                <a:cs typeface="Times New Roman" panose="02020603050405020304" pitchFamily="18" charset="0"/>
+              </a:rPr>
+              <a:t>Figure </a:t>
+            </a:r>
+            <a:r>
+              <a:rPr lang="en-US" altLang="ko-KR" b="1" dirty="0" smtClean="0">
+                <a:latin typeface="맑은 고딕" panose="020B0503020000020004" pitchFamily="50" charset="-127"/>
+                <a:cs typeface="Times New Roman" panose="02020603050405020304" pitchFamily="18" charset="0"/>
+              </a:rPr>
+              <a:t>9. Comparison of CT.RATE (%) of our methodology and </a:t>
+            </a:r>
+            <a:r>
+              <a:rPr lang="en-US" altLang="ko-KR" b="1" smtClean="0">
+                <a:latin typeface="맑은 고딕" panose="020B0503020000020004" pitchFamily="50" charset="-127"/>
+                <a:cs typeface="Times New Roman" panose="02020603050405020304" pitchFamily="18" charset="0"/>
+              </a:rPr>
+              <a:t>th</a:t>
+            </a:r>
+            <a:r>
+              <a:rPr lang="en-US" altLang="ko-KR" b="1" smtClean="0">
+                <a:latin typeface="맑은 고딕" panose="020B0503020000020004" pitchFamily="50" charset="-127"/>
+                <a:cs typeface="Times New Roman" panose="02020603050405020304" pitchFamily="18" charset="0"/>
+              </a:rPr>
+              <a:t>e methodology in </a:t>
+            </a:r>
+            <a:r>
+              <a:rPr lang="en-US" altLang="ko-KR" b="1" dirty="0" smtClean="0">
+                <a:latin typeface="맑은 고딕" panose="020B0503020000020004" pitchFamily="50" charset="-127"/>
+                <a:cs typeface="Times New Roman" panose="02020603050405020304" pitchFamily="18" charset="0"/>
+              </a:rPr>
+              <a:t>original paper</a:t>
+            </a:r>
+            <a:endParaRPr lang="ko-KR" altLang="en-US" dirty="0"/>
+          </a:p>
+        </p:txBody>
+      </p:sp>
+      <p:pic>
+        <p:nvPicPr>
+          <p:cNvPr id="2" name="Picture 1"/>
+          <p:cNvPicPr>
+            <a:picLocks noChangeAspect="1"/>
+          </p:cNvPicPr>
+          <p:nvPr/>
+        </p:nvPicPr>
+        <p:blipFill>
+          <a:blip r:embed="rId2"/>
+          <a:stretch>
+            <a:fillRect/>
+          </a:stretch>
+        </p:blipFill>
+        <p:spPr>
+          <a:xfrm>
+            <a:off x="1240991" y="675120"/>
+            <a:ext cx="9229725" cy="4362450"/>
+          </a:xfrm>
+          <a:prstGeom prst="rect">
+            <a:avLst/>
+          </a:prstGeom>
+        </p:spPr>
+      </p:pic>
+    </p:spTree>
+    <p:extLst>
+      <p:ext uri="{BB962C8B-B14F-4D97-AF65-F5344CB8AC3E}">
+        <p14:creationId xmlns:p14="http://schemas.microsoft.com/office/powerpoint/2010/main" val="3197094980"/>
       </p:ext>
     </p:extLst>
   </p:cSld>
@@ -7543,28 +7659,7 @@
                 <a:latin typeface="맑은 고딕" panose="020B0503020000020004" pitchFamily="50" charset="-127"/>
                 <a:cs typeface="Times New Roman" panose="02020603050405020304" pitchFamily="18" charset="0"/>
               </a:rPr>
-              <a:t>Find</a:t>
-            </a:r>
-            <a:r>
-              <a:rPr lang="en-US" altLang="ko-KR" b="1" dirty="0" smtClean="0">
-                <a:latin typeface="맑은 고딕" panose="020B0503020000020004" pitchFamily="50" charset="-127"/>
-                <a:cs typeface="Times New Roman" panose="02020603050405020304" pitchFamily="18" charset="0"/>
-              </a:rPr>
-              <a:t>ing</a:t>
-            </a:r>
-            <a:r>
-              <a:rPr lang="en-US" altLang="ko-KR" b="1" dirty="0" smtClean="0">
-                <a:latin typeface="맑은 고딕" panose="020B0503020000020004" pitchFamily="50" charset="-127"/>
-                <a:cs typeface="Times New Roman" panose="02020603050405020304" pitchFamily="18" charset="0"/>
-              </a:rPr>
-              <a:t> </a:t>
-            </a:r>
-            <a:r>
-              <a:rPr lang="en-US" altLang="ko-KR" b="1" dirty="0" smtClean="0">
-                <a:latin typeface="맑은 고딕" panose="020B0503020000020004" pitchFamily="50" charset="-127"/>
-                <a:cs typeface="Times New Roman" panose="02020603050405020304" pitchFamily="18" charset="0"/>
-              </a:rPr>
-              <a:t>throughput for a HAP location and each WD’s location</a:t>
+              <a:t>Finding throughput for a HAP location and each WD’s location</a:t>
             </a:r>
             <a:endParaRPr lang="ko-KR" altLang="en-US" dirty="0"/>
           </a:p>
@@ -7884,21 +7979,7 @@
                 <a:latin typeface="맑은 고딕" panose="020B0503020000020004" pitchFamily="50" charset="-127"/>
                 <a:cs typeface="Times New Roman" panose="02020603050405020304" pitchFamily="18" charset="0"/>
               </a:rPr>
-              <a:t>Algorithm 1. </a:t>
-            </a:r>
-            <a:r>
-              <a:rPr lang="en-US" altLang="ko-KR" b="1" dirty="0" smtClean="0">
-                <a:latin typeface="맑은 고딕" panose="020B0503020000020004" pitchFamily="50" charset="-127"/>
-                <a:cs typeface="Times New Roman" panose="02020603050405020304" pitchFamily="18" charset="0"/>
-              </a:rPr>
-              <a:t>Finding </a:t>
-            </a:r>
-            <a:r>
-              <a:rPr lang="en-US" altLang="ko-KR" b="1" dirty="0" smtClean="0">
-                <a:latin typeface="맑은 고딕" panose="020B0503020000020004" pitchFamily="50" charset="-127"/>
-                <a:cs typeface="Times New Roman" panose="02020603050405020304" pitchFamily="18" charset="0"/>
-              </a:rPr>
-              <a:t>throughput for a HAP location and each WD’s location</a:t>
+              <a:t>Algorithm 1. Finding throughput for a HAP location and each WD’s location</a:t>
             </a:r>
             <a:endParaRPr lang="ko-KR" altLang="en-US" dirty="0"/>
           </a:p>

</xml_diff>

<commit_message>
add: update paper (applied the issue)
</commit_message>
<xml_diff>
--- a/WPCN/for_final_paper.pptx
+++ b/WPCN/for_final_paper.pptx
@@ -15,6 +15,9 @@
     <p:sldId id="264" r:id="rId9"/>
     <p:sldId id="265" r:id="rId10"/>
     <p:sldId id="266" r:id="rId11"/>
+    <p:sldId id="267" r:id="rId12"/>
+    <p:sldId id="268" r:id="rId13"/>
+    <p:sldId id="269" r:id="rId14"/>
   </p:sldIdLst>
   <p:sldSz cx="12192000" cy="6858000"/>
   <p:notesSz cx="6858000" cy="9144000"/>
@@ -252,7 +255,7 @@
           <a:p>
             <a:fld id="{7DEA4731-64EB-4CE7-B59A-17BBA9BDC1E6}" type="datetimeFigureOut">
               <a:rPr lang="ko-KR" altLang="en-US" smtClean="0"/>
-              <a:t>2020-07-07</a:t>
+              <a:t>2020-07-10</a:t>
             </a:fld>
             <a:endParaRPr lang="ko-KR" altLang="en-US"/>
           </a:p>
@@ -422,7 +425,7 @@
           <a:p>
             <a:fld id="{7DEA4731-64EB-4CE7-B59A-17BBA9BDC1E6}" type="datetimeFigureOut">
               <a:rPr lang="ko-KR" altLang="en-US" smtClean="0"/>
-              <a:t>2020-07-07</a:t>
+              <a:t>2020-07-10</a:t>
             </a:fld>
             <a:endParaRPr lang="ko-KR" altLang="en-US"/>
           </a:p>
@@ -602,7 +605,7 @@
           <a:p>
             <a:fld id="{7DEA4731-64EB-4CE7-B59A-17BBA9BDC1E6}" type="datetimeFigureOut">
               <a:rPr lang="ko-KR" altLang="en-US" smtClean="0"/>
-              <a:t>2020-07-07</a:t>
+              <a:t>2020-07-10</a:t>
             </a:fld>
             <a:endParaRPr lang="ko-KR" altLang="en-US"/>
           </a:p>
@@ -772,7 +775,7 @@
           <a:p>
             <a:fld id="{7DEA4731-64EB-4CE7-B59A-17BBA9BDC1E6}" type="datetimeFigureOut">
               <a:rPr lang="ko-KR" altLang="en-US" smtClean="0"/>
-              <a:t>2020-07-07</a:t>
+              <a:t>2020-07-10</a:t>
             </a:fld>
             <a:endParaRPr lang="ko-KR" altLang="en-US"/>
           </a:p>
@@ -1018,7 +1021,7 @@
           <a:p>
             <a:fld id="{7DEA4731-64EB-4CE7-B59A-17BBA9BDC1E6}" type="datetimeFigureOut">
               <a:rPr lang="ko-KR" altLang="en-US" smtClean="0"/>
-              <a:t>2020-07-07</a:t>
+              <a:t>2020-07-10</a:t>
             </a:fld>
             <a:endParaRPr lang="ko-KR" altLang="en-US"/>
           </a:p>
@@ -1250,7 +1253,7 @@
           <a:p>
             <a:fld id="{7DEA4731-64EB-4CE7-B59A-17BBA9BDC1E6}" type="datetimeFigureOut">
               <a:rPr lang="ko-KR" altLang="en-US" smtClean="0"/>
-              <a:t>2020-07-07</a:t>
+              <a:t>2020-07-10</a:t>
             </a:fld>
             <a:endParaRPr lang="ko-KR" altLang="en-US"/>
           </a:p>
@@ -1617,7 +1620,7 @@
           <a:p>
             <a:fld id="{7DEA4731-64EB-4CE7-B59A-17BBA9BDC1E6}" type="datetimeFigureOut">
               <a:rPr lang="ko-KR" altLang="en-US" smtClean="0"/>
-              <a:t>2020-07-07</a:t>
+              <a:t>2020-07-10</a:t>
             </a:fld>
             <a:endParaRPr lang="ko-KR" altLang="en-US"/>
           </a:p>
@@ -1735,7 +1738,7 @@
           <a:p>
             <a:fld id="{7DEA4731-64EB-4CE7-B59A-17BBA9BDC1E6}" type="datetimeFigureOut">
               <a:rPr lang="ko-KR" altLang="en-US" smtClean="0"/>
-              <a:t>2020-07-07</a:t>
+              <a:t>2020-07-10</a:t>
             </a:fld>
             <a:endParaRPr lang="ko-KR" altLang="en-US"/>
           </a:p>
@@ -1830,7 +1833,7 @@
           <a:p>
             <a:fld id="{7DEA4731-64EB-4CE7-B59A-17BBA9BDC1E6}" type="datetimeFigureOut">
               <a:rPr lang="ko-KR" altLang="en-US" smtClean="0"/>
-              <a:t>2020-07-07</a:t>
+              <a:t>2020-07-10</a:t>
             </a:fld>
             <a:endParaRPr lang="ko-KR" altLang="en-US"/>
           </a:p>
@@ -2107,7 +2110,7 @@
           <a:p>
             <a:fld id="{7DEA4731-64EB-4CE7-B59A-17BBA9BDC1E6}" type="datetimeFigureOut">
               <a:rPr lang="ko-KR" altLang="en-US" smtClean="0"/>
-              <a:t>2020-07-07</a:t>
+              <a:t>2020-07-10</a:t>
             </a:fld>
             <a:endParaRPr lang="ko-KR" altLang="en-US"/>
           </a:p>
@@ -2360,7 +2363,7 @@
           <a:p>
             <a:fld id="{7DEA4731-64EB-4CE7-B59A-17BBA9BDC1E6}" type="datetimeFigureOut">
               <a:rPr lang="ko-KR" altLang="en-US" smtClean="0"/>
-              <a:t>2020-07-07</a:t>
+              <a:t>2020-07-10</a:t>
             </a:fld>
             <a:endParaRPr lang="ko-KR" altLang="en-US"/>
           </a:p>
@@ -2573,7 +2576,7 @@
           <a:p>
             <a:fld id="{7DEA4731-64EB-4CE7-B59A-17BBA9BDC1E6}" type="datetimeFigureOut">
               <a:rPr lang="ko-KR" altLang="en-US" smtClean="0"/>
-              <a:t>2020-07-07</a:t>
+              <a:t>2020-07-10</a:t>
             </a:fld>
             <a:endParaRPr lang="ko-KR" altLang="en-US"/>
           </a:p>
@@ -4720,14 +4723,7 @@
                 <a:latin typeface="맑은 고딕" panose="020B0503020000020004" pitchFamily="50" charset="-127"/>
                 <a:cs typeface="Times New Roman" panose="02020603050405020304" pitchFamily="18" charset="0"/>
               </a:rPr>
-              <a:t>th</a:t>
-            </a:r>
-            <a:r>
-              <a:rPr lang="en-US" altLang="ko-KR" b="1" smtClean="0">
-                <a:latin typeface="맑은 고딕" panose="020B0503020000020004" pitchFamily="50" charset="-127"/>
-                <a:cs typeface="Times New Roman" panose="02020603050405020304" pitchFamily="18" charset="0"/>
-              </a:rPr>
-              <a:t>e methodology in </a:t>
+              <a:t>the methodology in </a:t>
             </a:r>
             <a:r>
               <a:rPr lang="en-US" altLang="ko-KR" b="1" dirty="0" smtClean="0">
@@ -4768,6 +4764,565 @@
     <p:extLst>
       <p:ext uri="{BB962C8B-B14F-4D97-AF65-F5344CB8AC3E}">
         <p14:creationId xmlns:p14="http://schemas.microsoft.com/office/powerpoint/2010/main" val="3197094980"/>
+      </p:ext>
+    </p:extLst>
+  </p:cSld>
+  <p:clrMapOvr>
+    <a:masterClrMapping/>
+  </p:clrMapOvr>
+</p:sld>
+</file>
+
+<file path=ppt/slides/slide11.xml><?xml version="1.0" encoding="utf-8"?>
+<p:sld xmlns:a="http://schemas.openxmlformats.org/drawingml/2006/main" xmlns:r="http://schemas.openxmlformats.org/officeDocument/2006/relationships" xmlns:p="http://schemas.openxmlformats.org/presentationml/2006/main">
+  <p:cSld>
+    <p:spTree>
+      <p:nvGrpSpPr>
+        <p:cNvPr id="1" name=""/>
+        <p:cNvGrpSpPr/>
+        <p:nvPr/>
+      </p:nvGrpSpPr>
+      <p:grpSpPr>
+        <a:xfrm>
+          <a:off x="0" y="0"/>
+          <a:ext cx="0" cy="0"/>
+          <a:chOff x="0" y="0"/>
+          <a:chExt cx="0" cy="0"/>
+        </a:xfrm>
+      </p:grpSpPr>
+      <p:sp>
+        <p:nvSpPr>
+          <p:cNvPr id="5" name="Rectangle 4"/>
+          <p:cNvSpPr/>
+          <p:nvPr/>
+        </p:nvSpPr>
+        <p:spPr>
+          <a:xfrm>
+            <a:off x="181229" y="3910693"/>
+            <a:ext cx="7113037" cy="646331"/>
+          </a:xfrm>
+          <a:prstGeom prst="rect">
+            <a:avLst/>
+          </a:prstGeom>
+        </p:spPr>
+        <p:txBody>
+          <a:bodyPr wrap="none">
+            <a:spAutoFit/>
+          </a:bodyPr>
+          <a:lstStyle/>
+          <a:p>
+            <a:pPr algn="ctr"/>
+            <a:r>
+              <a:rPr lang="en-US" altLang="ko-KR" b="1" dirty="0">
+                <a:latin typeface="맑은 고딕" panose="020B0503020000020004" pitchFamily="50" charset="-127"/>
+                <a:cs typeface="Times New Roman" panose="02020603050405020304" pitchFamily="18" charset="0"/>
+              </a:rPr>
+              <a:t>Figure </a:t>
+            </a:r>
+            <a:r>
+              <a:rPr lang="en-US" altLang="ko-KR" b="1" dirty="0" smtClean="0">
+                <a:latin typeface="맑은 고딕" panose="020B0503020000020004" pitchFamily="50" charset="-127"/>
+                <a:cs typeface="Times New Roman" panose="02020603050405020304" pitchFamily="18" charset="0"/>
+              </a:rPr>
+              <a:t>6. CT.RATE and CT.AVERAGE values of our methodology</a:t>
+            </a:r>
+          </a:p>
+          <a:p>
+            <a:pPr algn="ctr"/>
+            <a:r>
+              <a:rPr lang="en-US" altLang="ko-KR" b="1" dirty="0" smtClean="0">
+                <a:latin typeface="맑은 고딕" panose="020B0503020000020004" pitchFamily="50" charset="-127"/>
+                <a:cs typeface="Times New Roman" panose="02020603050405020304" pitchFamily="18" charset="0"/>
+              </a:rPr>
+              <a:t>and methodology in the original paper</a:t>
+            </a:r>
+            <a:endParaRPr lang="ko-KR" altLang="en-US" dirty="0"/>
+          </a:p>
+        </p:txBody>
+      </p:sp>
+      <p:sp>
+        <p:nvSpPr>
+          <p:cNvPr id="7" name="Rectangle 6"/>
+          <p:cNvSpPr/>
+          <p:nvPr/>
+        </p:nvSpPr>
+        <p:spPr>
+          <a:xfrm>
+            <a:off x="7443993" y="3910693"/>
+            <a:ext cx="4184351" cy="369332"/>
+          </a:xfrm>
+          <a:prstGeom prst="rect">
+            <a:avLst/>
+          </a:prstGeom>
+        </p:spPr>
+        <p:txBody>
+          <a:bodyPr wrap="none">
+            <a:spAutoFit/>
+          </a:bodyPr>
+          <a:lstStyle/>
+          <a:p>
+            <a:pPr algn="ctr"/>
+            <a:r>
+              <a:rPr lang="en-US" altLang="ko-KR" b="1" dirty="0">
+                <a:latin typeface="맑은 고딕" panose="020B0503020000020004" pitchFamily="50" charset="-127"/>
+                <a:cs typeface="Times New Roman" panose="02020603050405020304" pitchFamily="18" charset="0"/>
+              </a:rPr>
+              <a:t>Figure 7</a:t>
+            </a:r>
+            <a:r>
+              <a:rPr lang="en-US" altLang="ko-KR" b="1" dirty="0" smtClean="0">
+                <a:latin typeface="맑은 고딕" panose="020B0503020000020004" pitchFamily="50" charset="-127"/>
+                <a:cs typeface="Times New Roman" panose="02020603050405020304" pitchFamily="18" charset="0"/>
+              </a:rPr>
+              <a:t>. CT.AVGMAX and PR values</a:t>
+            </a:r>
+            <a:endParaRPr lang="ko-KR" altLang="en-US" dirty="0"/>
+          </a:p>
+        </p:txBody>
+      </p:sp>
+      <p:pic>
+        <p:nvPicPr>
+          <p:cNvPr id="3" name="Picture 2"/>
+          <p:cNvPicPr>
+            <a:picLocks noChangeAspect="1"/>
+          </p:cNvPicPr>
+          <p:nvPr/>
+        </p:nvPicPr>
+        <p:blipFill>
+          <a:blip r:embed="rId2"/>
+          <a:stretch>
+            <a:fillRect/>
+          </a:stretch>
+        </p:blipFill>
+        <p:spPr>
+          <a:xfrm>
+            <a:off x="587149" y="1278895"/>
+            <a:ext cx="6301195" cy="2631797"/>
+          </a:xfrm>
+          <a:prstGeom prst="rect">
+            <a:avLst/>
+          </a:prstGeom>
+        </p:spPr>
+      </p:pic>
+      <p:pic>
+        <p:nvPicPr>
+          <p:cNvPr id="4" name="Picture 3"/>
+          <p:cNvPicPr>
+            <a:picLocks noChangeAspect="1"/>
+          </p:cNvPicPr>
+          <p:nvPr/>
+        </p:nvPicPr>
+        <p:blipFill>
+          <a:blip r:embed="rId3"/>
+          <a:stretch>
+            <a:fillRect/>
+          </a:stretch>
+        </p:blipFill>
+        <p:spPr>
+          <a:xfrm>
+            <a:off x="7555502" y="1278894"/>
+            <a:ext cx="3961332" cy="2631797"/>
+          </a:xfrm>
+          <a:prstGeom prst="rect">
+            <a:avLst/>
+          </a:prstGeom>
+        </p:spPr>
+      </p:pic>
+    </p:spTree>
+    <p:extLst>
+      <p:ext uri="{BB962C8B-B14F-4D97-AF65-F5344CB8AC3E}">
+        <p14:creationId xmlns:p14="http://schemas.microsoft.com/office/powerpoint/2010/main" val="2872527247"/>
+      </p:ext>
+    </p:extLst>
+  </p:cSld>
+  <p:clrMapOvr>
+    <a:masterClrMapping/>
+  </p:clrMapOvr>
+</p:sld>
+</file>
+
+<file path=ppt/slides/slide12.xml><?xml version="1.0" encoding="utf-8"?>
+<p:sld xmlns:a="http://schemas.openxmlformats.org/drawingml/2006/main" xmlns:r="http://schemas.openxmlformats.org/officeDocument/2006/relationships" xmlns:p="http://schemas.openxmlformats.org/presentationml/2006/main">
+  <p:cSld>
+    <p:spTree>
+      <p:nvGrpSpPr>
+        <p:cNvPr id="1" name=""/>
+        <p:cNvGrpSpPr/>
+        <p:nvPr/>
+      </p:nvGrpSpPr>
+      <p:grpSpPr>
+        <a:xfrm>
+          <a:off x="0" y="0"/>
+          <a:ext cx="0" cy="0"/>
+          <a:chOff x="0" y="0"/>
+          <a:chExt cx="0" cy="0"/>
+        </a:xfrm>
+      </p:grpSpPr>
+      <p:pic>
+        <p:nvPicPr>
+          <p:cNvPr id="7" name="Picture 6"/>
+          <p:cNvPicPr>
+            <a:picLocks noChangeAspect="1"/>
+          </p:cNvPicPr>
+          <p:nvPr/>
+        </p:nvPicPr>
+        <p:blipFill>
+          <a:blip r:embed="rId2"/>
+          <a:stretch>
+            <a:fillRect/>
+          </a:stretch>
+        </p:blipFill>
+        <p:spPr>
+          <a:xfrm>
+            <a:off x="8374269" y="3090133"/>
+            <a:ext cx="3621354" cy="2376000"/>
+          </a:xfrm>
+          <a:prstGeom prst="rect">
+            <a:avLst/>
+          </a:prstGeom>
+        </p:spPr>
+      </p:pic>
+      <p:pic>
+        <p:nvPicPr>
+          <p:cNvPr id="3" name="Picture 2"/>
+          <p:cNvPicPr>
+            <a:picLocks noChangeAspect="1"/>
+          </p:cNvPicPr>
+          <p:nvPr/>
+        </p:nvPicPr>
+        <p:blipFill>
+          <a:blip r:embed="rId3"/>
+          <a:stretch>
+            <a:fillRect/>
+          </a:stretch>
+        </p:blipFill>
+        <p:spPr>
+          <a:xfrm>
+            <a:off x="406366" y="460391"/>
+            <a:ext cx="3634818" cy="2376000"/>
+          </a:xfrm>
+          <a:prstGeom prst="rect">
+            <a:avLst/>
+          </a:prstGeom>
+        </p:spPr>
+      </p:pic>
+      <p:pic>
+        <p:nvPicPr>
+          <p:cNvPr id="6" name="Picture 5"/>
+          <p:cNvPicPr>
+            <a:picLocks noChangeAspect="1"/>
+          </p:cNvPicPr>
+          <p:nvPr/>
+        </p:nvPicPr>
+        <p:blipFill>
+          <a:blip r:embed="rId4"/>
+          <a:stretch>
+            <a:fillRect/>
+          </a:stretch>
+        </p:blipFill>
+        <p:spPr>
+          <a:xfrm>
+            <a:off x="4284217" y="460391"/>
+            <a:ext cx="3582744" cy="2376000"/>
+          </a:xfrm>
+          <a:prstGeom prst="rect">
+            <a:avLst/>
+          </a:prstGeom>
+        </p:spPr>
+      </p:pic>
+      <p:pic>
+        <p:nvPicPr>
+          <p:cNvPr id="10" name="Picture 9"/>
+          <p:cNvPicPr>
+            <a:picLocks noChangeAspect="1"/>
+          </p:cNvPicPr>
+          <p:nvPr/>
+        </p:nvPicPr>
+        <p:blipFill>
+          <a:blip r:embed="rId5"/>
+          <a:stretch>
+            <a:fillRect/>
+          </a:stretch>
+        </p:blipFill>
+        <p:spPr>
+          <a:xfrm>
+            <a:off x="8343137" y="460391"/>
+            <a:ext cx="3629406" cy="2376000"/>
+          </a:xfrm>
+          <a:prstGeom prst="rect">
+            <a:avLst/>
+          </a:prstGeom>
+        </p:spPr>
+      </p:pic>
+      <p:cxnSp>
+        <p:nvCxnSpPr>
+          <p:cNvPr id="13" name="Straight Connector 12"/>
+          <p:cNvCxnSpPr/>
+          <p:nvPr/>
+        </p:nvCxnSpPr>
+        <p:spPr>
+          <a:xfrm>
+            <a:off x="8133188" y="431816"/>
+            <a:ext cx="0" cy="5064109"/>
+          </a:xfrm>
+          <a:prstGeom prst="line">
+            <a:avLst/>
+          </a:prstGeom>
+          <a:ln w="38100">
+            <a:solidFill>
+              <a:schemeClr val="tx1"/>
+            </a:solidFill>
+          </a:ln>
+        </p:spPr>
+        <p:style>
+          <a:lnRef idx="1">
+            <a:schemeClr val="accent1"/>
+          </a:lnRef>
+          <a:fillRef idx="0">
+            <a:schemeClr val="accent1"/>
+          </a:fillRef>
+          <a:effectRef idx="0">
+            <a:schemeClr val="accent1"/>
+          </a:effectRef>
+          <a:fontRef idx="minor">
+            <a:schemeClr val="tx1"/>
+          </a:fontRef>
+        </p:style>
+      </p:cxnSp>
+      <p:cxnSp>
+        <p:nvCxnSpPr>
+          <p:cNvPr id="18" name="Straight Connector 17"/>
+          <p:cNvCxnSpPr/>
+          <p:nvPr/>
+        </p:nvCxnSpPr>
+        <p:spPr>
+          <a:xfrm>
+            <a:off x="8705850" y="4388715"/>
+            <a:ext cx="3248025" cy="0"/>
+          </a:xfrm>
+          <a:prstGeom prst="line">
+            <a:avLst/>
+          </a:prstGeom>
+          <a:ln>
+            <a:solidFill>
+              <a:schemeClr val="tx1"/>
+            </a:solidFill>
+          </a:ln>
+        </p:spPr>
+        <p:style>
+          <a:lnRef idx="1">
+            <a:schemeClr val="accent1"/>
+          </a:lnRef>
+          <a:fillRef idx="0">
+            <a:schemeClr val="accent1"/>
+          </a:fillRef>
+          <a:effectRef idx="0">
+            <a:schemeClr val="accent1"/>
+          </a:effectRef>
+          <a:fontRef idx="minor">
+            <a:schemeClr val="tx1"/>
+          </a:fontRef>
+        </p:style>
+      </p:cxnSp>
+      <p:sp>
+        <p:nvSpPr>
+          <p:cNvPr id="19" name="Rectangle 18"/>
+          <p:cNvSpPr/>
+          <p:nvPr/>
+        </p:nvSpPr>
+        <p:spPr>
+          <a:xfrm>
+            <a:off x="3140400" y="5706104"/>
+            <a:ext cx="6025496" cy="369332"/>
+          </a:xfrm>
+          <a:prstGeom prst="rect">
+            <a:avLst/>
+          </a:prstGeom>
+        </p:spPr>
+        <p:txBody>
+          <a:bodyPr wrap="none">
+            <a:spAutoFit/>
+          </a:bodyPr>
+          <a:lstStyle/>
+          <a:p>
+            <a:r>
+              <a:rPr lang="en-US" altLang="ko-KR" b="1" dirty="0">
+                <a:latin typeface="맑은 고딕" panose="020B0503020000020004" pitchFamily="50" charset="-127"/>
+                <a:cs typeface="Times New Roman" panose="02020603050405020304" pitchFamily="18" charset="0"/>
+              </a:rPr>
+              <a:t>Figure </a:t>
+            </a:r>
+            <a:r>
+              <a:rPr lang="en-US" altLang="ko-KR" b="1" dirty="0" smtClean="0">
+                <a:latin typeface="맑은 고딕" panose="020B0503020000020004" pitchFamily="50" charset="-127"/>
+                <a:cs typeface="Times New Roman" panose="02020603050405020304" pitchFamily="18" charset="0"/>
+              </a:rPr>
+              <a:t>8. Line Chart Version of Figure 6 and Figure 7</a:t>
+            </a:r>
+            <a:endParaRPr lang="ko-KR" altLang="en-US" dirty="0"/>
+          </a:p>
+        </p:txBody>
+      </p:sp>
+      <p:pic>
+        <p:nvPicPr>
+          <p:cNvPr id="2" name="Picture 1"/>
+          <p:cNvPicPr>
+            <a:picLocks noChangeAspect="1"/>
+          </p:cNvPicPr>
+          <p:nvPr/>
+        </p:nvPicPr>
+        <p:blipFill>
+          <a:blip r:embed="rId6"/>
+          <a:stretch>
+            <a:fillRect/>
+          </a:stretch>
+        </p:blipFill>
+        <p:spPr>
+          <a:xfrm>
+            <a:off x="388351" y="3050160"/>
+            <a:ext cx="3640296" cy="2376000"/>
+          </a:xfrm>
+          <a:prstGeom prst="rect">
+            <a:avLst/>
+          </a:prstGeom>
+        </p:spPr>
+      </p:pic>
+      <p:pic>
+        <p:nvPicPr>
+          <p:cNvPr id="5" name="Picture 4"/>
+          <p:cNvPicPr>
+            <a:picLocks noChangeAspect="1"/>
+          </p:cNvPicPr>
+          <p:nvPr/>
+        </p:nvPicPr>
+        <p:blipFill>
+          <a:blip r:embed="rId7"/>
+          <a:stretch>
+            <a:fillRect/>
+          </a:stretch>
+        </p:blipFill>
+        <p:spPr>
+          <a:xfrm>
+            <a:off x="4225411" y="3074242"/>
+            <a:ext cx="3700356" cy="2376000"/>
+          </a:xfrm>
+          <a:prstGeom prst="rect">
+            <a:avLst/>
+          </a:prstGeom>
+        </p:spPr>
+      </p:pic>
+    </p:spTree>
+    <p:extLst>
+      <p:ext uri="{BB962C8B-B14F-4D97-AF65-F5344CB8AC3E}">
+        <p14:creationId xmlns:p14="http://schemas.microsoft.com/office/powerpoint/2010/main" val="1604093391"/>
+      </p:ext>
+    </p:extLst>
+  </p:cSld>
+  <p:clrMapOvr>
+    <a:masterClrMapping/>
+  </p:clrMapOvr>
+</p:sld>
+</file>
+
+<file path=ppt/slides/slide13.xml><?xml version="1.0" encoding="utf-8"?>
+<p:sld xmlns:a="http://schemas.openxmlformats.org/drawingml/2006/main" xmlns:r="http://schemas.openxmlformats.org/officeDocument/2006/relationships" xmlns:p="http://schemas.openxmlformats.org/presentationml/2006/main">
+  <p:cSld>
+    <p:spTree>
+      <p:nvGrpSpPr>
+        <p:cNvPr id="1" name=""/>
+        <p:cNvGrpSpPr/>
+        <p:nvPr/>
+      </p:nvGrpSpPr>
+      <p:grpSpPr>
+        <a:xfrm>
+          <a:off x="0" y="0"/>
+          <a:ext cx="0" cy="0"/>
+          <a:chOff x="0" y="0"/>
+          <a:chExt cx="0" cy="0"/>
+        </a:xfrm>
+      </p:grpSpPr>
+      <p:sp>
+        <p:nvSpPr>
+          <p:cNvPr id="19" name="Rectangle 18"/>
+          <p:cNvSpPr/>
+          <p:nvPr/>
+        </p:nvSpPr>
+        <p:spPr>
+          <a:xfrm>
+            <a:off x="323433" y="5143148"/>
+            <a:ext cx="10896124" cy="369332"/>
+          </a:xfrm>
+          <a:prstGeom prst="rect">
+            <a:avLst/>
+          </a:prstGeom>
+        </p:spPr>
+        <p:txBody>
+          <a:bodyPr wrap="none">
+            <a:spAutoFit/>
+          </a:bodyPr>
+          <a:lstStyle/>
+          <a:p>
+            <a:pPr algn="ctr"/>
+            <a:r>
+              <a:rPr lang="en-US" altLang="ko-KR" b="1" dirty="0">
+                <a:latin typeface="맑은 고딕" panose="020B0503020000020004" pitchFamily="50" charset="-127"/>
+                <a:cs typeface="Times New Roman" panose="02020603050405020304" pitchFamily="18" charset="0"/>
+              </a:rPr>
+              <a:t>Figure </a:t>
+            </a:r>
+            <a:r>
+              <a:rPr lang="en-US" altLang="ko-KR" b="1" dirty="0" smtClean="0">
+                <a:latin typeface="맑은 고딕" panose="020B0503020000020004" pitchFamily="50" charset="-127"/>
+                <a:cs typeface="Times New Roman" panose="02020603050405020304" pitchFamily="18" charset="0"/>
+              </a:rPr>
+              <a:t>9. Comparison of CT.RATE (%) of our methodology and </a:t>
+            </a:r>
+            <a:r>
+              <a:rPr lang="en-US" altLang="ko-KR" b="1" smtClean="0">
+                <a:latin typeface="맑은 고딕" panose="020B0503020000020004" pitchFamily="50" charset="-127"/>
+                <a:cs typeface="Times New Roman" panose="02020603050405020304" pitchFamily="18" charset="0"/>
+              </a:rPr>
+              <a:t>the methodology in </a:t>
+            </a:r>
+            <a:r>
+              <a:rPr lang="en-US" altLang="ko-KR" b="1" dirty="0" smtClean="0">
+                <a:latin typeface="맑은 고딕" panose="020B0503020000020004" pitchFamily="50" charset="-127"/>
+                <a:cs typeface="Times New Roman" panose="02020603050405020304" pitchFamily="18" charset="0"/>
+              </a:rPr>
+              <a:t>original paper</a:t>
+            </a:r>
+            <a:endParaRPr lang="ko-KR" altLang="en-US" dirty="0"/>
+          </a:p>
+        </p:txBody>
+      </p:sp>
+      <p:pic>
+        <p:nvPicPr>
+          <p:cNvPr id="3" name="Picture 2"/>
+          <p:cNvPicPr>
+            <a:picLocks noChangeAspect="1"/>
+          </p:cNvPicPr>
+          <p:nvPr/>
+        </p:nvPicPr>
+        <p:blipFill>
+          <a:blip r:embed="rId2"/>
+          <a:stretch>
+            <a:fillRect/>
+          </a:stretch>
+        </p:blipFill>
+        <p:spPr>
+          <a:xfrm>
+            <a:off x="1293091" y="768928"/>
+            <a:ext cx="9144000" cy="4267200"/>
+          </a:xfrm>
+          <a:prstGeom prst="rect">
+            <a:avLst/>
+          </a:prstGeom>
+        </p:spPr>
+      </p:pic>
+    </p:spTree>
+    <p:extLst>
+      <p:ext uri="{BB962C8B-B14F-4D97-AF65-F5344CB8AC3E}">
+        <p14:creationId xmlns:p14="http://schemas.microsoft.com/office/powerpoint/2010/main" val="3030419403"/>
       </p:ext>
     </p:extLst>
   </p:cSld>

</xml_diff>

<commit_message>
modify: add findMaxV algorithm description
</commit_message>
<xml_diff>
--- a/WPCN/for_final_paper.pptx
+++ b/WPCN/for_final_paper.pptx
@@ -9,15 +9,16 @@
     <p:sldId id="263" r:id="rId3"/>
     <p:sldId id="257" r:id="rId4"/>
     <p:sldId id="258" r:id="rId5"/>
-    <p:sldId id="259" r:id="rId6"/>
-    <p:sldId id="260" r:id="rId7"/>
-    <p:sldId id="261" r:id="rId8"/>
-    <p:sldId id="264" r:id="rId9"/>
-    <p:sldId id="265" r:id="rId10"/>
-    <p:sldId id="266" r:id="rId11"/>
-    <p:sldId id="267" r:id="rId12"/>
-    <p:sldId id="268" r:id="rId13"/>
-    <p:sldId id="269" r:id="rId14"/>
+    <p:sldId id="270" r:id="rId6"/>
+    <p:sldId id="259" r:id="rId7"/>
+    <p:sldId id="260" r:id="rId8"/>
+    <p:sldId id="261" r:id="rId9"/>
+    <p:sldId id="264" r:id="rId10"/>
+    <p:sldId id="265" r:id="rId11"/>
+    <p:sldId id="266" r:id="rId12"/>
+    <p:sldId id="267" r:id="rId13"/>
+    <p:sldId id="268" r:id="rId14"/>
+    <p:sldId id="269" r:id="rId15"/>
   </p:sldIdLst>
   <p:sldSz cx="12192000" cy="6858000"/>
   <p:notesSz cx="6858000" cy="9144000"/>
@@ -4682,6 +4683,289 @@
           <a:chExt cx="0" cy="0"/>
         </a:xfrm>
       </p:grpSpPr>
+      <p:pic>
+        <p:nvPicPr>
+          <p:cNvPr id="3" name="Picture 2"/>
+          <p:cNvPicPr>
+            <a:picLocks noChangeAspect="1"/>
+          </p:cNvPicPr>
+          <p:nvPr/>
+        </p:nvPicPr>
+        <p:blipFill>
+          <a:blip r:embed="rId2"/>
+          <a:stretch>
+            <a:fillRect/>
+          </a:stretch>
+        </p:blipFill>
+        <p:spPr>
+          <a:xfrm>
+            <a:off x="406399" y="460391"/>
+            <a:ext cx="3667889" cy="2397600"/>
+          </a:xfrm>
+          <a:prstGeom prst="rect">
+            <a:avLst/>
+          </a:prstGeom>
+        </p:spPr>
+      </p:pic>
+      <p:pic>
+        <p:nvPicPr>
+          <p:cNvPr id="4" name="Picture 3"/>
+          <p:cNvPicPr>
+            <a:picLocks noChangeAspect="1"/>
+          </p:cNvPicPr>
+          <p:nvPr/>
+        </p:nvPicPr>
+        <p:blipFill>
+          <a:blip r:embed="rId3"/>
+          <a:stretch>
+            <a:fillRect/>
+          </a:stretch>
+        </p:blipFill>
+        <p:spPr>
+          <a:xfrm>
+            <a:off x="4278709" y="3040228"/>
+            <a:ext cx="3662389" cy="2397600"/>
+          </a:xfrm>
+          <a:prstGeom prst="rect">
+            <a:avLst/>
+          </a:prstGeom>
+        </p:spPr>
+      </p:pic>
+      <p:pic>
+        <p:nvPicPr>
+          <p:cNvPr id="6" name="Picture 5"/>
+          <p:cNvPicPr>
+            <a:picLocks noChangeAspect="1"/>
+          </p:cNvPicPr>
+          <p:nvPr/>
+        </p:nvPicPr>
+        <p:blipFill>
+          <a:blip r:embed="rId4"/>
+          <a:stretch>
+            <a:fillRect/>
+          </a:stretch>
+        </p:blipFill>
+        <p:spPr>
+          <a:xfrm>
+            <a:off x="4284217" y="460391"/>
+            <a:ext cx="3615343" cy="2397600"/>
+          </a:xfrm>
+          <a:prstGeom prst="rect">
+            <a:avLst/>
+          </a:prstGeom>
+        </p:spPr>
+      </p:pic>
+      <p:pic>
+        <p:nvPicPr>
+          <p:cNvPr id="9" name="Picture 8"/>
+          <p:cNvPicPr>
+            <a:picLocks noChangeAspect="1"/>
+          </p:cNvPicPr>
+          <p:nvPr/>
+        </p:nvPicPr>
+        <p:blipFill>
+          <a:blip r:embed="rId5"/>
+          <a:stretch>
+            <a:fillRect/>
+          </a:stretch>
+        </p:blipFill>
+        <p:spPr>
+          <a:xfrm>
+            <a:off x="406399" y="3040228"/>
+            <a:ext cx="3651645" cy="2397600"/>
+          </a:xfrm>
+          <a:prstGeom prst="rect">
+            <a:avLst/>
+          </a:prstGeom>
+        </p:spPr>
+      </p:pic>
+      <p:pic>
+        <p:nvPicPr>
+          <p:cNvPr id="10" name="Picture 9"/>
+          <p:cNvPicPr>
+            <a:picLocks noChangeAspect="1"/>
+          </p:cNvPicPr>
+          <p:nvPr/>
+        </p:nvPicPr>
+        <p:blipFill>
+          <a:blip r:embed="rId6"/>
+          <a:stretch>
+            <a:fillRect/>
+          </a:stretch>
+        </p:blipFill>
+        <p:spPr>
+          <a:xfrm>
+            <a:off x="8343170" y="460391"/>
+            <a:ext cx="3662389" cy="2397600"/>
+          </a:xfrm>
+          <a:prstGeom prst="rect">
+            <a:avLst/>
+          </a:prstGeom>
+        </p:spPr>
+      </p:pic>
+      <p:pic>
+        <p:nvPicPr>
+          <p:cNvPr id="11" name="Picture 10"/>
+          <p:cNvPicPr>
+            <a:picLocks noChangeAspect="1"/>
+          </p:cNvPicPr>
+          <p:nvPr/>
+        </p:nvPicPr>
+        <p:blipFill>
+          <a:blip r:embed="rId7"/>
+          <a:stretch>
+            <a:fillRect/>
+          </a:stretch>
+        </p:blipFill>
+        <p:spPr>
+          <a:xfrm>
+            <a:off x="8395444" y="3040228"/>
+            <a:ext cx="3610115" cy="2397600"/>
+          </a:xfrm>
+          <a:prstGeom prst="rect">
+            <a:avLst/>
+          </a:prstGeom>
+        </p:spPr>
+      </p:pic>
+      <p:cxnSp>
+        <p:nvCxnSpPr>
+          <p:cNvPr id="13" name="Straight Connector 12"/>
+          <p:cNvCxnSpPr/>
+          <p:nvPr/>
+        </p:nvCxnSpPr>
+        <p:spPr>
+          <a:xfrm>
+            <a:off x="8133188" y="431816"/>
+            <a:ext cx="0" cy="5064109"/>
+          </a:xfrm>
+          <a:prstGeom prst="line">
+            <a:avLst/>
+          </a:prstGeom>
+          <a:ln w="38100">
+            <a:solidFill>
+              <a:schemeClr val="tx1"/>
+            </a:solidFill>
+          </a:ln>
+        </p:spPr>
+        <p:style>
+          <a:lnRef idx="1">
+            <a:schemeClr val="accent1"/>
+          </a:lnRef>
+          <a:fillRef idx="0">
+            <a:schemeClr val="accent1"/>
+          </a:fillRef>
+          <a:effectRef idx="0">
+            <a:schemeClr val="accent1"/>
+          </a:effectRef>
+          <a:fontRef idx="minor">
+            <a:schemeClr val="tx1"/>
+          </a:fontRef>
+        </p:style>
+      </p:cxnSp>
+      <p:cxnSp>
+        <p:nvCxnSpPr>
+          <p:cNvPr id="18" name="Straight Connector 17"/>
+          <p:cNvCxnSpPr/>
+          <p:nvPr/>
+        </p:nvCxnSpPr>
+        <p:spPr>
+          <a:xfrm>
+            <a:off x="8705850" y="4314825"/>
+            <a:ext cx="3248025" cy="0"/>
+          </a:xfrm>
+          <a:prstGeom prst="line">
+            <a:avLst/>
+          </a:prstGeom>
+          <a:ln>
+            <a:solidFill>
+              <a:schemeClr val="tx1"/>
+            </a:solidFill>
+          </a:ln>
+        </p:spPr>
+        <p:style>
+          <a:lnRef idx="1">
+            <a:schemeClr val="accent1"/>
+          </a:lnRef>
+          <a:fillRef idx="0">
+            <a:schemeClr val="accent1"/>
+          </a:fillRef>
+          <a:effectRef idx="0">
+            <a:schemeClr val="accent1"/>
+          </a:effectRef>
+          <a:fontRef idx="minor">
+            <a:schemeClr val="tx1"/>
+          </a:fontRef>
+        </p:style>
+      </p:cxnSp>
+      <p:sp>
+        <p:nvSpPr>
+          <p:cNvPr id="19" name="Rectangle 18"/>
+          <p:cNvSpPr/>
+          <p:nvPr/>
+        </p:nvSpPr>
+        <p:spPr>
+          <a:xfrm>
+            <a:off x="2900254" y="5688094"/>
+            <a:ext cx="6025496" cy="369332"/>
+          </a:xfrm>
+          <a:prstGeom prst="rect">
+            <a:avLst/>
+          </a:prstGeom>
+        </p:spPr>
+        <p:txBody>
+          <a:bodyPr wrap="none">
+            <a:spAutoFit/>
+          </a:bodyPr>
+          <a:lstStyle/>
+          <a:p>
+            <a:r>
+              <a:rPr lang="en-US" altLang="ko-KR" b="1" dirty="0">
+                <a:latin typeface="맑은 고딕" panose="020B0503020000020004" pitchFamily="50" charset="-127"/>
+                <a:cs typeface="Times New Roman" panose="02020603050405020304" pitchFamily="18" charset="0"/>
+              </a:rPr>
+              <a:t>Figure </a:t>
+            </a:r>
+            <a:r>
+              <a:rPr lang="en-US" altLang="ko-KR" b="1" dirty="0" smtClean="0">
+                <a:latin typeface="맑은 고딕" panose="020B0503020000020004" pitchFamily="50" charset="-127"/>
+                <a:cs typeface="Times New Roman" panose="02020603050405020304" pitchFamily="18" charset="0"/>
+              </a:rPr>
+              <a:t>8. Line Chart Version of Figure 6 and Figure 7</a:t>
+            </a:r>
+            <a:endParaRPr lang="ko-KR" altLang="en-US" dirty="0"/>
+          </a:p>
+        </p:txBody>
+      </p:sp>
+    </p:spTree>
+    <p:extLst>
+      <p:ext uri="{BB962C8B-B14F-4D97-AF65-F5344CB8AC3E}">
+        <p14:creationId xmlns:p14="http://schemas.microsoft.com/office/powerpoint/2010/main" val="7512396"/>
+      </p:ext>
+    </p:extLst>
+  </p:cSld>
+  <p:clrMapOvr>
+    <a:masterClrMapping/>
+  </p:clrMapOvr>
+</p:sld>
+</file>
+
+<file path=ppt/slides/slide11.xml><?xml version="1.0" encoding="utf-8"?>
+<p:sld xmlns:a="http://schemas.openxmlformats.org/drawingml/2006/main" xmlns:r="http://schemas.openxmlformats.org/officeDocument/2006/relationships" xmlns:p="http://schemas.openxmlformats.org/presentationml/2006/main">
+  <p:cSld>
+    <p:spTree>
+      <p:nvGrpSpPr>
+        <p:cNvPr id="1" name=""/>
+        <p:cNvGrpSpPr/>
+        <p:nvPr/>
+      </p:nvGrpSpPr>
+      <p:grpSpPr>
+        <a:xfrm>
+          <a:off x="0" y="0"/>
+          <a:ext cx="0" cy="0"/>
+          <a:chOff x="0" y="0"/>
+          <a:chExt cx="0" cy="0"/>
+        </a:xfrm>
+      </p:grpSpPr>
       <p:sp>
         <p:nvSpPr>
           <p:cNvPr id="19" name="Rectangle 18"/>
@@ -4773,7 +5057,7 @@
 </p:sld>
 </file>
 
-<file path=ppt/slides/slide11.xml><?xml version="1.0" encoding="utf-8"?>
+<file path=ppt/slides/slide12.xml><?xml version="1.0" encoding="utf-8"?>
 <p:sld xmlns:a="http://schemas.openxmlformats.org/drawingml/2006/main" xmlns:r="http://schemas.openxmlformats.org/officeDocument/2006/relationships" xmlns:p="http://schemas.openxmlformats.org/presentationml/2006/main">
   <p:cSld>
     <p:spTree>
@@ -4941,7 +5225,7 @@
 </p:sld>
 </file>
 
-<file path=ppt/slides/slide12.xml><?xml version="1.0" encoding="utf-8"?>
+<file path=ppt/slides/slide13.xml><?xml version="1.0" encoding="utf-8"?>
 <p:sld xmlns:a="http://schemas.openxmlformats.org/drawingml/2006/main" xmlns:r="http://schemas.openxmlformats.org/officeDocument/2006/relationships" xmlns:p="http://schemas.openxmlformats.org/presentationml/2006/main">
   <p:cSld>
     <p:spTree>
@@ -5224,7 +5508,7 @@
 </p:sld>
 </file>
 
-<file path=ppt/slides/slide13.xml><?xml version="1.0" encoding="utf-8"?>
+<file path=ppt/slides/slide14.xml><?xml version="1.0" encoding="utf-8"?>
 <p:sld xmlns:a="http://schemas.openxmlformats.org/drawingml/2006/main" xmlns:r="http://schemas.openxmlformats.org/officeDocument/2006/relationships" xmlns:p="http://schemas.openxmlformats.org/presentationml/2006/main">
   <p:cSld>
     <p:spTree>
@@ -8570,6 +8854,2866 @@
           <a:chExt cx="0" cy="0"/>
         </a:xfrm>
       </p:grpSpPr>
+      <mc:AlternateContent xmlns:mc="http://schemas.openxmlformats.org/markup-compatibility/2006">
+        <mc:Choice xmlns:a14="http://schemas.microsoft.com/office/drawing/2010/main" Requires="a14">
+          <p:graphicFrame>
+            <p:nvGraphicFramePr>
+              <p:cNvPr id="4" name="Table 3"/>
+              <p:cNvGraphicFramePr>
+                <a:graphicFrameLocks noGrp="1"/>
+              </p:cNvGraphicFramePr>
+              <p:nvPr>
+                <p:extLst>
+                  <p:ext uri="{D42A27DB-BD31-4B8C-83A1-F6EECF244321}">
+                    <p14:modId xmlns:p14="http://schemas.microsoft.com/office/powerpoint/2010/main" val="4169524719"/>
+                  </p:ext>
+                </p:extLst>
+              </p:nvPr>
+            </p:nvGraphicFramePr>
+            <p:xfrm>
+              <a:off x="575761" y="971397"/>
+              <a:ext cx="10395394" cy="4233736"/>
+            </p:xfrm>
+            <a:graphic>
+              <a:graphicData uri="http://schemas.openxmlformats.org/drawingml/2006/table">
+                <a:tbl>
+                  <a:tblPr firstRow="1" bandRow="1">
+                    <a:tableStyleId>{5940675A-B579-460E-94D1-54222C63F5DA}</a:tableStyleId>
+                  </a:tblPr>
+                  <a:tblGrid>
+                    <a:gridCol w="10395394">
+                      <a:extLst>
+                        <a:ext uri="{9D8B030D-6E8A-4147-A177-3AD203B41FA5}">
+                          <a16:colId xmlns:a16="http://schemas.microsoft.com/office/drawing/2014/main" val="1406147732"/>
+                        </a:ext>
+                      </a:extLst>
+                    </a:gridCol>
+                  </a:tblGrid>
+                  <a:tr h="4168448">
+                    <a:tc>
+                      <a:txBody>
+                        <a:bodyPr/>
+                        <a:lstStyle/>
+                        <a:p>
+                          <a:pPr marL="0" indent="0" algn="l" latinLnBrk="1">
+                            <a:buNone/>
+                          </a:pPr>
+                          <a:r>
+                            <a:rPr lang="en-US" altLang="ko-KR" sz="1800" b="1" baseline="0" dirty="0" smtClean="0"/>
+                            <a:t>findMaxV(</a:t>
+                          </a:r>
+                          <a14:m>
+                            <m:oMath xmlns:m="http://schemas.openxmlformats.org/officeDocument/2006/math">
+                              <m:sSub>
+                                <m:sSubPr>
+                                  <m:ctrlPr>
+                                    <a:rPr lang="en-US" altLang="ko-KR" sz="1800" b="1" i="1" baseline="0" smtClean="0">
+                                      <a:latin typeface="Cambria Math" panose="02040503050406030204" pitchFamily="18" charset="0"/>
+                                    </a:rPr>
+                                  </m:ctrlPr>
+                                </m:sSubPr>
+                                <m:e>
+                                  <m:r>
+                                    <a:rPr lang="en-US" altLang="ko-KR" sz="1800" b="1" i="1" baseline="0" smtClean="0">
+                                      <a:latin typeface="Cambria Math" panose="02040503050406030204" pitchFamily="18" charset="0"/>
+                                    </a:rPr>
+                                    <m:t>𝝀</m:t>
+                                  </m:r>
+                                </m:e>
+                                <m:sub>
+                                  <m:r>
+                                    <a:rPr lang="en-US" altLang="ko-KR" sz="1800" b="1" i="1" baseline="0" smtClean="0">
+                                      <a:latin typeface="Cambria Math" panose="02040503050406030204" pitchFamily="18" charset="0"/>
+                                    </a:rPr>
+                                    <m:t>𝒌</m:t>
+                                  </m:r>
+                                </m:sub>
+                              </m:sSub>
+                              <m:r>
+                                <a:rPr lang="en-US" altLang="ko-KR" sz="1800" b="1" i="1" baseline="0" smtClean="0">
+                                  <a:latin typeface="Cambria Math" panose="02040503050406030204" pitchFamily="18" charset="0"/>
+                                </a:rPr>
+                                <m:t>, </m:t>
+                              </m:r>
+                              <m:sSub>
+                                <m:sSubPr>
+                                  <m:ctrlPr>
+                                    <a:rPr lang="en-US" altLang="ko-KR" sz="1800" b="1" i="1" baseline="0" smtClean="0">
+                                      <a:latin typeface="Cambria Math" panose="02040503050406030204" pitchFamily="18" charset="0"/>
+                                    </a:rPr>
+                                  </m:ctrlPr>
+                                </m:sSubPr>
+                                <m:e>
+                                  <m:r>
+                                    <a:rPr lang="en-US" altLang="ko-KR" sz="1800" b="1" i="1" baseline="0" smtClean="0">
+                                      <a:latin typeface="Cambria Math" panose="02040503050406030204" pitchFamily="18" charset="0"/>
+                                    </a:rPr>
+                                    <m:t>𝒂</m:t>
+                                  </m:r>
+                                </m:e>
+                                <m:sub>
+                                  <m:r>
+                                    <a:rPr lang="en-US" altLang="ko-KR" sz="1800" b="1" i="1" baseline="0" smtClean="0">
+                                      <a:latin typeface="Cambria Math" panose="02040503050406030204" pitchFamily="18" charset="0"/>
+                                    </a:rPr>
+                                    <m:t>𝟏</m:t>
+                                  </m:r>
+                                  <m:r>
+                                    <a:rPr lang="en-US" altLang="ko-KR" sz="1800" b="1" i="1" baseline="0" smtClean="0">
+                                      <a:latin typeface="Cambria Math" panose="02040503050406030204" pitchFamily="18" charset="0"/>
+                                    </a:rPr>
+                                    <m:t>,</m:t>
+                                  </m:r>
+                                  <m:r>
+                                    <a:rPr lang="en-US" altLang="ko-KR" sz="1800" b="1" i="1" baseline="0" smtClean="0">
+                                      <a:latin typeface="Cambria Math" panose="02040503050406030204" pitchFamily="18" charset="0"/>
+                                    </a:rPr>
+                                    <m:t>𝒌</m:t>
+                                  </m:r>
+                                </m:sub>
+                              </m:sSub>
+                              <m:r>
+                                <a:rPr lang="en-US" altLang="ko-KR" sz="1800" b="1" i="1" baseline="0" smtClean="0">
+                                  <a:latin typeface="Cambria Math" panose="02040503050406030204" pitchFamily="18" charset="0"/>
+                                </a:rPr>
+                                <m:t>, </m:t>
+                              </m:r>
+                              <m:sSub>
+                                <m:sSubPr>
+                                  <m:ctrlPr>
+                                    <a:rPr lang="en-US" altLang="ko-KR" sz="1800" b="1" i="1" baseline="0" smtClean="0">
+                                      <a:latin typeface="Cambria Math" panose="02040503050406030204" pitchFamily="18" charset="0"/>
+                                    </a:rPr>
+                                  </m:ctrlPr>
+                                </m:sSubPr>
+                                <m:e>
+                                  <m:r>
+                                    <a:rPr lang="en-US" altLang="ko-KR" sz="1800" b="1" i="1" baseline="0" smtClean="0">
+                                      <a:latin typeface="Cambria Math" panose="02040503050406030204" pitchFamily="18" charset="0"/>
+                                    </a:rPr>
+                                    <m:t>𝒂</m:t>
+                                  </m:r>
+                                </m:e>
+                                <m:sub>
+                                  <m:r>
+                                    <a:rPr lang="en-US" altLang="ko-KR" sz="1800" b="1" i="1" baseline="0" smtClean="0">
+                                      <a:latin typeface="Cambria Math" panose="02040503050406030204" pitchFamily="18" charset="0"/>
+                                    </a:rPr>
+                                    <m:t>𝟐</m:t>
+                                  </m:r>
+                                  <m:r>
+                                    <a:rPr lang="en-US" altLang="ko-KR" sz="1800" b="1" i="1" baseline="0" smtClean="0">
+                                      <a:latin typeface="Cambria Math" panose="02040503050406030204" pitchFamily="18" charset="0"/>
+                                    </a:rPr>
+                                    <m:t>,</m:t>
+                                  </m:r>
+                                  <m:r>
+                                    <a:rPr lang="en-US" altLang="ko-KR" sz="1800" b="1" i="1" baseline="0" smtClean="0">
+                                      <a:latin typeface="Cambria Math" panose="02040503050406030204" pitchFamily="18" charset="0"/>
+                                    </a:rPr>
+                                    <m:t>𝒌</m:t>
+                                  </m:r>
+                                </m:sub>
+                              </m:sSub>
+                              <m:r>
+                                <a:rPr lang="en-US" altLang="ko-KR" sz="1800" b="1" i="1" baseline="0" smtClean="0">
+                                  <a:latin typeface="Cambria Math" panose="02040503050406030204" pitchFamily="18" charset="0"/>
+                                </a:rPr>
+                                <m:t>, </m:t>
+                              </m:r>
+                              <m:sSub>
+                                <m:sSubPr>
+                                  <m:ctrlPr>
+                                    <a:rPr lang="en-US" altLang="ko-KR" sz="1800" b="1" i="1" baseline="0" smtClean="0">
+                                      <a:latin typeface="Cambria Math" panose="02040503050406030204" pitchFamily="18" charset="0"/>
+                                    </a:rPr>
+                                  </m:ctrlPr>
+                                </m:sSubPr>
+                                <m:e>
+                                  <m:r>
+                                    <a:rPr lang="en-US" altLang="ko-KR" sz="1800" b="1" i="1" baseline="0" smtClean="0">
+                                      <a:latin typeface="Cambria Math" panose="02040503050406030204" pitchFamily="18" charset="0"/>
+                                    </a:rPr>
+                                    <m:t>𝒘</m:t>
+                                  </m:r>
+                                </m:e>
+                                <m:sub>
+                                  <m:r>
+                                    <a:rPr lang="en-US" altLang="ko-KR" sz="1800" b="1" i="1" baseline="0" smtClean="0">
+                                      <a:latin typeface="Cambria Math" panose="02040503050406030204" pitchFamily="18" charset="0"/>
+                                    </a:rPr>
+                                    <m:t>𝒌</m:t>
+                                  </m:r>
+                                </m:sub>
+                              </m:sSub>
+                              <m:r>
+                                <a:rPr lang="en-US" altLang="ko-KR" sz="1800" b="1" i="1" baseline="0" smtClean="0">
+                                  <a:latin typeface="Cambria Math" panose="02040503050406030204" pitchFamily="18" charset="0"/>
+                                </a:rPr>
+                                <m:t>, </m:t>
+                              </m:r>
+                              <m:sSub>
+                                <m:sSubPr>
+                                  <m:ctrlPr>
+                                    <a:rPr lang="en-US" altLang="ko-KR" sz="1800" b="1" i="1" baseline="0" smtClean="0">
+                                      <a:latin typeface="Cambria Math" panose="02040503050406030204" pitchFamily="18" charset="0"/>
+                                    </a:rPr>
+                                  </m:ctrlPr>
+                                </m:sSubPr>
+                                <m:e>
+                                  <m:r>
+                                    <a:rPr lang="en-US" altLang="ko-KR" sz="1800" b="1" i="1" baseline="0" smtClean="0">
+                                      <a:latin typeface="Cambria Math" panose="02040503050406030204" pitchFamily="18" charset="0"/>
+                                    </a:rPr>
+                                    <m:t>𝒅</m:t>
+                                  </m:r>
+                                </m:e>
+                                <m:sub>
+                                  <m:r>
+                                    <a:rPr lang="en-US" altLang="ko-KR" sz="1800" b="1" i="1" baseline="0" smtClean="0">
+                                      <a:latin typeface="Cambria Math" panose="02040503050406030204" pitchFamily="18" charset="0"/>
+                                    </a:rPr>
+                                    <m:t>𝑼</m:t>
+                                  </m:r>
+                                </m:sub>
+                              </m:sSub>
+                              <m:r>
+                                <a:rPr lang="en-US" altLang="ko-KR" sz="1800" b="1" i="1" baseline="0" smtClean="0">
+                                  <a:latin typeface="Cambria Math" panose="02040503050406030204" pitchFamily="18" charset="0"/>
+                                </a:rPr>
+                                <m:t>, </m:t>
+                              </m:r>
+                              <m:sSub>
+                                <m:sSubPr>
+                                  <m:ctrlPr>
+                                    <a:rPr lang="en-US" altLang="ko-KR" sz="1800" b="1" i="1" baseline="0" smtClean="0">
+                                      <a:latin typeface="Cambria Math" panose="02040503050406030204" pitchFamily="18" charset="0"/>
+                                    </a:rPr>
+                                  </m:ctrlPr>
+                                </m:sSubPr>
+                                <m:e>
+                                  <m:r>
+                                    <a:rPr lang="en-US" altLang="ko-KR" sz="1800" b="1" i="1" baseline="0" smtClean="0">
+                                      <a:latin typeface="Cambria Math" panose="02040503050406030204" pitchFamily="18" charset="0"/>
+                                    </a:rPr>
+                                    <m:t>𝒗</m:t>
+                                  </m:r>
+                                </m:e>
+                                <m:sub>
+                                  <m:sSub>
+                                    <m:sSubPr>
+                                      <m:ctrlPr>
+                                        <a:rPr lang="en-US" altLang="ko-KR" sz="1800" b="1" i="1" baseline="0" smtClean="0">
+                                          <a:latin typeface="Cambria Math" panose="02040503050406030204" pitchFamily="18" charset="0"/>
+                                        </a:rPr>
+                                      </m:ctrlPr>
+                                    </m:sSubPr>
+                                    <m:e>
+                                      <m:r>
+                                        <a:rPr lang="en-US" altLang="ko-KR" sz="1800" b="1" i="1" baseline="0" smtClean="0">
+                                          <a:latin typeface="Cambria Math" panose="02040503050406030204" pitchFamily="18" charset="0"/>
+                                        </a:rPr>
+                                        <m:t>𝟏</m:t>
+                                      </m:r>
+                                    </m:e>
+                                    <m:sub>
+                                      <m:r>
+                                        <a:rPr lang="en-US" altLang="ko-KR" sz="1800" b="1" i="1" baseline="0" smtClean="0">
+                                          <a:latin typeface="Cambria Math" panose="02040503050406030204" pitchFamily="18" charset="0"/>
+                                        </a:rPr>
+                                        <m:t>𝒌</m:t>
+                                      </m:r>
+                                    </m:sub>
+                                  </m:sSub>
+                                </m:sub>
+                              </m:sSub>
+                            </m:oMath>
+                          </a14:m>
+                          <a:r>
+                            <a:rPr lang="en-US" altLang="ko-KR" sz="1800" b="1" baseline="0" dirty="0" smtClean="0"/>
+                            <a:t>):</a:t>
+                          </a:r>
+                        </a:p>
+                        <a:p>
+                          <a:pPr marL="0" indent="0" algn="l" latinLnBrk="1">
+                            <a:buNone/>
+                          </a:pPr>
+                          <a:r>
+                            <a:rPr lang="en-US" altLang="ko-KR" sz="1800" b="0" baseline="0" smtClean="0"/>
+                            <a:t>Lr </a:t>
+                          </a:r>
+                          <a:r>
+                            <a:rPr lang="en-US" altLang="ko-KR" sz="1800" b="0" baseline="0" smtClean="0"/>
+                            <a:t>:= </a:t>
+                          </a:r>
+                          <a:r>
+                            <a:rPr lang="en-US" altLang="ko-KR" sz="1800" b="0" baseline="0" dirty="0" smtClean="0"/>
+                            <a:t>300000000.0 </a:t>
+                          </a:r>
+                          <a:r>
+                            <a:rPr lang="en-US" altLang="ko-KR" sz="1400" b="0" baseline="0" dirty="0" smtClean="0"/>
+                            <a:t>// learning rate</a:t>
+                          </a:r>
+                          <a:endParaRPr lang="en-US" altLang="ko-KR" sz="1800" b="0" baseline="0" dirty="0" smtClean="0"/>
+                        </a:p>
+                        <a:p>
+                          <a:pPr marL="0" indent="0" algn="l" latinLnBrk="1">
+                            <a:buNone/>
+                          </a:pPr>
+                          <a:r>
+                            <a:rPr lang="en-US" altLang="ko-KR" sz="1800" b="0" baseline="0" dirty="0" smtClean="0"/>
+                            <a:t>Repeat 7000 times:</a:t>
+                          </a:r>
+                          <a:r>
+                            <a:rPr lang="en-US" altLang="ko-KR" sz="1400" b="0" baseline="0" dirty="0" smtClean="0"/>
+                            <a:t> // find optimal v1k using Gradient Descent Method</a:t>
+                          </a:r>
+                          <a:endParaRPr lang="en-US" altLang="ko-KR" sz="1800" b="0" baseline="0" dirty="0" smtClean="0"/>
+                        </a:p>
+                        <a:p>
+                          <a:pPr marL="0" indent="0" algn="l" latinLnBrk="1">
+                            <a:buNone/>
+                          </a:pPr>
+                          <a:r>
+                            <a:rPr lang="en-US" altLang="ko-KR" sz="1800" b="0" baseline="0" dirty="0" smtClean="0"/>
+                            <a:t>    </a:t>
+                          </a:r>
+                          <a14:m>
+                            <m:oMath xmlns:m="http://schemas.openxmlformats.org/officeDocument/2006/math">
+                              <m:sSubSup>
+                                <m:sSubSupPr>
+                                  <m:ctrlPr>
+                                    <a:rPr lang="en-US" altLang="ko-KR" sz="1800" b="0" i="1" baseline="0" smtClean="0">
+                                      <a:latin typeface="Cambria Math" panose="02040503050406030204" pitchFamily="18" charset="0"/>
+                                    </a:rPr>
+                                  </m:ctrlPr>
+                                </m:sSubSupPr>
+                                <m:e>
+                                  <m:r>
+                                    <a:rPr lang="en-US" altLang="ko-KR" sz="1800" b="0" i="1" baseline="0" smtClean="0">
+                                      <a:latin typeface="Cambria Math" panose="02040503050406030204" pitchFamily="18" charset="0"/>
+                                    </a:rPr>
+                                    <m:t>𝑡</m:t>
+                                  </m:r>
+                                </m:e>
+                                <m:sub>
+                                  <m:r>
+                                    <a:rPr lang="en-US" altLang="ko-KR" sz="1800" b="0" i="1" baseline="0" smtClean="0">
+                                      <a:latin typeface="Cambria Math" panose="02040503050406030204" pitchFamily="18" charset="0"/>
+                                    </a:rPr>
+                                    <m:t>𝑚𝑖𝑛</m:t>
+                                  </m:r>
+                                  <m:r>
+                                    <a:rPr lang="en-US" altLang="ko-KR" sz="1800" b="0" i="1" baseline="0" smtClean="0">
+                                      <a:latin typeface="Cambria Math" panose="02040503050406030204" pitchFamily="18" charset="0"/>
+                                    </a:rPr>
+                                    <m:t> </m:t>
+                                  </m:r>
+                                </m:sub>
+                                <m:sup>
+                                  <m:sSub>
+                                    <m:sSubPr>
+                                      <m:ctrlPr>
+                                        <a:rPr lang="en-US" altLang="ko-KR" sz="1800" b="0" i="1" baseline="0" smtClean="0">
+                                          <a:latin typeface="Cambria Math" panose="02040503050406030204" pitchFamily="18" charset="0"/>
+                                        </a:rPr>
+                                      </m:ctrlPr>
+                                    </m:sSubPr>
+                                    <m:e>
+                                      <m:r>
+                                        <a:rPr lang="en-US" altLang="ko-KR" sz="1800" b="0" i="1" baseline="0" smtClean="0">
+                                          <a:latin typeface="Cambria Math" panose="02040503050406030204" pitchFamily="18" charset="0"/>
+                                        </a:rPr>
+                                        <m:t>𝑣</m:t>
+                                      </m:r>
+                                    </m:e>
+                                    <m:sub>
+                                      <m:sSub>
+                                        <m:sSubPr>
+                                          <m:ctrlPr>
+                                            <a:rPr lang="en-US" altLang="ko-KR" sz="1800" b="0" i="1" baseline="0" smtClean="0">
+                                              <a:latin typeface="Cambria Math" panose="02040503050406030204" pitchFamily="18" charset="0"/>
+                                            </a:rPr>
+                                          </m:ctrlPr>
+                                        </m:sSubPr>
+                                        <m:e>
+                                          <m:r>
+                                            <a:rPr lang="en-US" altLang="ko-KR" sz="1800" b="0" i="1" baseline="0" smtClean="0">
+                                              <a:latin typeface="Cambria Math" panose="02040503050406030204" pitchFamily="18" charset="0"/>
+                                            </a:rPr>
+                                            <m:t>1</m:t>
+                                          </m:r>
+                                        </m:e>
+                                        <m:sub>
+                                          <m:r>
+                                            <a:rPr lang="en-US" altLang="ko-KR" sz="1800" b="0" i="1" baseline="0" smtClean="0">
+                                              <a:latin typeface="Cambria Math" panose="02040503050406030204" pitchFamily="18" charset="0"/>
+                                            </a:rPr>
+                                            <m:t>𝑘</m:t>
+                                          </m:r>
+                                        </m:sub>
+                                      </m:sSub>
+                                    </m:sub>
+                                  </m:sSub>
+                                </m:sup>
+                              </m:sSubSup>
+                              <m:r>
+                                <a:rPr lang="en-US" altLang="ko-KR" sz="1800" b="0" i="1" baseline="0" smtClean="0">
+                                  <a:latin typeface="Cambria Math" panose="02040503050406030204" pitchFamily="18" charset="0"/>
+                                </a:rPr>
+                                <m:t>≔</m:t>
+                              </m:r>
+                              <m:func>
+                                <m:funcPr>
+                                  <m:ctrlPr>
+                                    <a:rPr lang="en-US" altLang="ko-KR" sz="1800" b="0" i="1" baseline="0" smtClean="0">
+                                      <a:latin typeface="Cambria Math" panose="02040503050406030204" pitchFamily="18" charset="0"/>
+                                    </a:rPr>
+                                  </m:ctrlPr>
+                                </m:funcPr>
+                                <m:fName>
+                                  <m:r>
+                                    <m:rPr>
+                                      <m:sty m:val="p"/>
+                                    </m:rPr>
+                                    <a:rPr lang="en-US" altLang="ko-KR" sz="1800" b="0" i="0" baseline="0" smtClean="0">
+                                      <a:latin typeface="Cambria Math" panose="02040503050406030204" pitchFamily="18" charset="0"/>
+                                    </a:rPr>
+                                    <m:t>min</m:t>
+                                  </m:r>
+                                </m:fName>
+                                <m:e>
+                                  <m:d>
+                                    <m:dPr>
+                                      <m:ctrlPr>
+                                        <a:rPr lang="en-US" altLang="ko-KR" sz="1800" b="0" i="1" baseline="0" smtClean="0">
+                                          <a:latin typeface="Cambria Math" panose="02040503050406030204" pitchFamily="18" charset="0"/>
+                                        </a:rPr>
+                                      </m:ctrlPr>
+                                    </m:dPr>
+                                    <m:e>
+                                      <m:sSub>
+                                        <m:sSubPr>
+                                          <m:ctrlPr>
+                                            <a:rPr lang="en-US" altLang="ko-KR" sz="1800" b="0" i="1" baseline="0" smtClean="0">
+                                              <a:latin typeface="Cambria Math" panose="02040503050406030204" pitchFamily="18" charset="0"/>
+                                            </a:rPr>
+                                          </m:ctrlPr>
+                                        </m:sSubPr>
+                                        <m:e>
+                                          <m:r>
+                                            <a:rPr lang="en-US" altLang="ko-KR" sz="1800" b="0" i="1" baseline="0" smtClean="0">
+                                              <a:latin typeface="Cambria Math" panose="02040503050406030204" pitchFamily="18" charset="0"/>
+                                            </a:rPr>
+                                            <m:t>𝜆</m:t>
+                                          </m:r>
+                                        </m:e>
+                                        <m:sub>
+                                          <m:r>
+                                            <a:rPr lang="en-US" altLang="ko-KR" sz="1800" b="0" i="1" baseline="0" smtClean="0">
+                                              <a:latin typeface="Cambria Math" panose="02040503050406030204" pitchFamily="18" charset="0"/>
+                                            </a:rPr>
+                                            <m:t>𝑘</m:t>
+                                          </m:r>
+                                        </m:sub>
+                                      </m:sSub>
+                                      <m:r>
+                                        <a:rPr lang="en-US" altLang="ko-KR" sz="1800" b="0" i="1" baseline="0" smtClean="0">
+                                          <a:latin typeface="Cambria Math" panose="02040503050406030204" pitchFamily="18" charset="0"/>
+                                        </a:rPr>
+                                        <m:t>−</m:t>
+                                      </m:r>
+                                      <m:sSub>
+                                        <m:sSubPr>
+                                          <m:ctrlPr>
+                                            <a:rPr lang="en-US" altLang="ko-KR" sz="1800" b="0" i="1" baseline="0" smtClean="0">
+                                              <a:latin typeface="Cambria Math" panose="02040503050406030204" pitchFamily="18" charset="0"/>
+                                            </a:rPr>
+                                          </m:ctrlPr>
+                                        </m:sSubPr>
+                                        <m:e>
+                                          <m:r>
+                                            <a:rPr lang="en-US" altLang="ko-KR" sz="1800" b="0" i="1" baseline="0" smtClean="0">
+                                              <a:latin typeface="Cambria Math" panose="02040503050406030204" pitchFamily="18" charset="0"/>
+                                            </a:rPr>
+                                            <m:t>𝑎</m:t>
+                                          </m:r>
+                                        </m:e>
+                                        <m:sub>
+                                          <m:r>
+                                            <a:rPr lang="en-US" altLang="ko-KR" sz="1800" b="0" i="1" baseline="0" smtClean="0">
+                                              <a:latin typeface="Cambria Math" panose="02040503050406030204" pitchFamily="18" charset="0"/>
+                                            </a:rPr>
+                                            <m:t>1,</m:t>
+                                          </m:r>
+                                          <m:r>
+                                            <a:rPr lang="en-US" altLang="ko-KR" sz="1800" b="0" i="1" baseline="0" smtClean="0">
+                                              <a:latin typeface="Cambria Math" panose="02040503050406030204" pitchFamily="18" charset="0"/>
+                                            </a:rPr>
+                                            <m:t>𝑘</m:t>
+                                          </m:r>
+                                        </m:sub>
+                                      </m:sSub>
+                                      <m:r>
+                                        <a:rPr lang="en-US" altLang="ko-KR" sz="1800" b="0" i="1" baseline="0" smtClean="0">
+                                          <a:latin typeface="Cambria Math" panose="02040503050406030204" pitchFamily="18" charset="0"/>
+                                        </a:rPr>
+                                        <m:t>−</m:t>
+                                      </m:r>
+                                      <m:sSub>
+                                        <m:sSubPr>
+                                          <m:ctrlPr>
+                                            <a:rPr lang="en-US" altLang="ko-KR" sz="1800" b="0" i="1" baseline="0" smtClean="0">
+                                              <a:latin typeface="Cambria Math" panose="02040503050406030204" pitchFamily="18" charset="0"/>
+                                            </a:rPr>
+                                          </m:ctrlPr>
+                                        </m:sSubPr>
+                                        <m:e>
+                                          <m:r>
+                                            <a:rPr lang="en-US" altLang="ko-KR" sz="1800" b="0" i="1" baseline="0" smtClean="0">
+                                              <a:latin typeface="Cambria Math" panose="02040503050406030204" pitchFamily="18" charset="0"/>
+                                            </a:rPr>
+                                            <m:t>𝑎</m:t>
+                                          </m:r>
+                                        </m:e>
+                                        <m:sub>
+                                          <m:r>
+                                            <a:rPr lang="en-US" altLang="ko-KR" sz="1800" b="0" i="1" baseline="0" smtClean="0">
+                                              <a:latin typeface="Cambria Math" panose="02040503050406030204" pitchFamily="18" charset="0"/>
+                                            </a:rPr>
+                                            <m:t>2,</m:t>
+                                          </m:r>
+                                          <m:r>
+                                            <a:rPr lang="en-US" altLang="ko-KR" sz="1800" b="0" i="1" baseline="0" smtClean="0">
+                                              <a:latin typeface="Cambria Math" panose="02040503050406030204" pitchFamily="18" charset="0"/>
+                                            </a:rPr>
+                                            <m:t>𝑘</m:t>
+                                          </m:r>
+                                        </m:sub>
+                                      </m:sSub>
+                                      <m:sSup>
+                                        <m:sSupPr>
+                                          <m:ctrlPr>
+                                            <a:rPr lang="en-US" altLang="ko-KR" sz="1800" b="0" i="1" baseline="0" smtClean="0">
+                                              <a:latin typeface="Cambria Math" panose="02040503050406030204" pitchFamily="18" charset="0"/>
+                                            </a:rPr>
+                                          </m:ctrlPr>
+                                        </m:sSupPr>
+                                        <m:e>
+                                          <m:d>
+                                            <m:dPr>
+                                              <m:begChr m:val="‖"/>
+                                              <m:endChr m:val="‖"/>
+                                              <m:ctrlPr>
+                                                <a:rPr lang="en-US" altLang="ko-KR" sz="1800" b="0" i="1" baseline="0" smtClean="0">
+                                                  <a:latin typeface="Cambria Math" panose="02040503050406030204" pitchFamily="18" charset="0"/>
+                                                </a:rPr>
+                                              </m:ctrlPr>
+                                            </m:dPr>
+                                            <m:e>
+                                              <m:sSub>
+                                                <m:sSubPr>
+                                                  <m:ctrlPr>
+                                                    <a:rPr lang="en-US" altLang="ko-KR" sz="1800" b="0" i="1" baseline="0" smtClean="0">
+                                                      <a:latin typeface="Cambria Math" panose="02040503050406030204" pitchFamily="18" charset="0"/>
+                                                    </a:rPr>
+                                                  </m:ctrlPr>
+                                                </m:sSubPr>
+                                                <m:e>
+                                                  <m:r>
+                                                    <a:rPr lang="en-US" altLang="ko-KR" sz="1800" b="0" i="1" baseline="0" smtClean="0">
+                                                      <a:latin typeface="Cambria Math" panose="02040503050406030204" pitchFamily="18" charset="0"/>
+                                                    </a:rPr>
+                                                    <m:t>𝑣</m:t>
+                                                  </m:r>
+                                                </m:e>
+                                                <m:sub>
+                                                  <m:sSub>
+                                                    <m:sSubPr>
+                                                      <m:ctrlPr>
+                                                        <a:rPr lang="en-US" altLang="ko-KR" sz="1800" b="0" i="1" baseline="0" smtClean="0">
+                                                          <a:latin typeface="Cambria Math" panose="02040503050406030204" pitchFamily="18" charset="0"/>
+                                                        </a:rPr>
+                                                      </m:ctrlPr>
+                                                    </m:sSubPr>
+                                                    <m:e>
+                                                      <m:r>
+                                                        <a:rPr lang="en-US" altLang="ko-KR" sz="1800" b="0" i="1" baseline="0" smtClean="0">
+                                                          <a:latin typeface="Cambria Math" panose="02040503050406030204" pitchFamily="18" charset="0"/>
+                                                        </a:rPr>
+                                                        <m:t>1</m:t>
+                                                      </m:r>
+                                                    </m:e>
+                                                    <m:sub>
+                                                      <m:r>
+                                                        <a:rPr lang="en-US" altLang="ko-KR" sz="1800" b="0" i="1" baseline="0" smtClean="0">
+                                                          <a:latin typeface="Cambria Math" panose="02040503050406030204" pitchFamily="18" charset="0"/>
+                                                        </a:rPr>
+                                                        <m:t>𝑘</m:t>
+                                                      </m:r>
+                                                    </m:sub>
+                                                  </m:sSub>
+                                                </m:sub>
+                                              </m:sSub>
+                                              <m:r>
+                                                <a:rPr lang="en-US" altLang="ko-KR" sz="1800" b="0" i="1" baseline="0" smtClean="0">
+                                                  <a:latin typeface="Cambria Math" panose="02040503050406030204" pitchFamily="18" charset="0"/>
+                                                </a:rPr>
+                                                <m:t>−</m:t>
+                                              </m:r>
+                                              <m:sSub>
+                                                <m:sSubPr>
+                                                  <m:ctrlPr>
+                                                    <a:rPr lang="en-US" altLang="ko-KR" sz="1800" b="0" i="1" baseline="0" smtClean="0">
+                                                      <a:latin typeface="Cambria Math" panose="02040503050406030204" pitchFamily="18" charset="0"/>
+                                                    </a:rPr>
+                                                  </m:ctrlPr>
+                                                </m:sSubPr>
+                                                <m:e>
+                                                  <m:r>
+                                                    <a:rPr lang="en-US" altLang="ko-KR" sz="1800" b="0" i="1" baseline="0" smtClean="0">
+                                                      <a:latin typeface="Cambria Math" panose="02040503050406030204" pitchFamily="18" charset="0"/>
+                                                    </a:rPr>
+                                                    <m:t>𝑤</m:t>
+                                                  </m:r>
+                                                </m:e>
+                                                <m:sub>
+                                                  <m:r>
+                                                    <a:rPr lang="en-US" altLang="ko-KR" sz="1800" b="0" i="1" baseline="0" smtClean="0">
+                                                      <a:latin typeface="Cambria Math" panose="02040503050406030204" pitchFamily="18" charset="0"/>
+                                                    </a:rPr>
+                                                    <m:t>𝑘</m:t>
+                                                  </m:r>
+                                                </m:sub>
+                                              </m:sSub>
+                                            </m:e>
+                                          </m:d>
+                                        </m:e>
+                                        <m:sup>
+                                          <m:sSub>
+                                            <m:sSubPr>
+                                              <m:ctrlPr>
+                                                <a:rPr lang="en-US" altLang="ko-KR" sz="1800" b="0" i="1" baseline="0" smtClean="0">
+                                                  <a:latin typeface="Cambria Math" panose="02040503050406030204" pitchFamily="18" charset="0"/>
+                                                </a:rPr>
+                                              </m:ctrlPr>
+                                            </m:sSubPr>
+                                            <m:e>
+                                              <m:r>
+                                                <a:rPr lang="en-US" altLang="ko-KR" sz="1800" b="0" i="1" baseline="0" smtClean="0">
+                                                  <a:latin typeface="Cambria Math" panose="02040503050406030204" pitchFamily="18" charset="0"/>
+                                                </a:rPr>
+                                                <m:t>𝑑</m:t>
+                                              </m:r>
+                                            </m:e>
+                                            <m:sub>
+                                              <m:r>
+                                                <a:rPr lang="en-US" altLang="ko-KR" sz="1800" b="0" i="1" baseline="0" smtClean="0">
+                                                  <a:latin typeface="Cambria Math" panose="02040503050406030204" pitchFamily="18" charset="0"/>
+                                                </a:rPr>
+                                                <m:t>𝑈</m:t>
+                                              </m:r>
+                                            </m:sub>
+                                          </m:sSub>
+                                        </m:sup>
+                                      </m:sSup>
+                                    </m:e>
+                                  </m:d>
+                                </m:e>
+                              </m:func>
+                              <m:r>
+                                <a:rPr lang="en-US" altLang="ko-KR" sz="1800" b="0" i="1" baseline="0" smtClean="0">
+                                  <a:latin typeface="Cambria Math" panose="02040503050406030204" pitchFamily="18" charset="0"/>
+                                </a:rPr>
+                                <m:t>, </m:t>
+                              </m:r>
+                              <m:r>
+                                <a:rPr lang="en-US" altLang="ko-KR" sz="1800" b="0" i="1" baseline="0" smtClean="0">
+                                  <a:latin typeface="Cambria Math" panose="02040503050406030204" pitchFamily="18" charset="0"/>
+                                </a:rPr>
+                                <m:t>𝑘</m:t>
+                              </m:r>
+                              <m:r>
+                                <a:rPr lang="en-US" altLang="ko-KR" sz="1800" b="0" i="1" baseline="0" smtClean="0">
+                                  <a:latin typeface="Cambria Math" panose="02040503050406030204" pitchFamily="18" charset="0"/>
+                                </a:rPr>
+                                <m:t>=1,…,</m:t>
+                              </m:r>
+                              <m:r>
+                                <a:rPr lang="en-US" altLang="ko-KR" sz="1800" b="0" i="1" baseline="0" smtClean="0">
+                                  <a:latin typeface="Cambria Math" panose="02040503050406030204" pitchFamily="18" charset="0"/>
+                                </a:rPr>
+                                <m:t>𝐾</m:t>
+                              </m:r>
+                            </m:oMath>
+                          </a14:m>
+                          <a:endParaRPr lang="en-US" altLang="ko-KR" sz="1800" b="0" baseline="0" dirty="0" smtClean="0"/>
+                        </a:p>
+                        <a:p>
+                          <a:pPr marL="0" indent="0" algn="l" latinLnBrk="1">
+                            <a:buNone/>
+                          </a:pPr>
+                          <a:r>
+                            <a:rPr lang="en-US" altLang="ko-KR" sz="1800" b="0" baseline="0" dirty="0" smtClean="0"/>
+                            <a:t>    </a:t>
+                          </a:r>
+                          <a14:m>
+                            <m:oMath xmlns:m="http://schemas.openxmlformats.org/officeDocument/2006/math">
+                              <m:sSubSup>
+                                <m:sSubSupPr>
+                                  <m:ctrlPr>
+                                    <a:rPr lang="en-US" altLang="ko-KR" sz="1800" b="0" i="1" baseline="0" smtClean="0">
+                                      <a:latin typeface="Cambria Math" panose="02040503050406030204" pitchFamily="18" charset="0"/>
+                                    </a:rPr>
+                                  </m:ctrlPr>
+                                </m:sSubSupPr>
+                                <m:e>
+                                  <m:r>
+                                    <a:rPr lang="en-US" altLang="ko-KR" sz="1800" b="0" i="1" baseline="0" smtClean="0">
+                                      <a:latin typeface="Cambria Math" panose="02040503050406030204" pitchFamily="18" charset="0"/>
+                                    </a:rPr>
+                                    <m:t>𝑣</m:t>
+                                  </m:r>
+                                </m:e>
+                                <m:sub>
+                                  <m:sSub>
+                                    <m:sSubPr>
+                                      <m:ctrlPr>
+                                        <a:rPr lang="en-US" altLang="ko-KR" sz="1800" b="0" i="1" baseline="0" smtClean="0">
+                                          <a:latin typeface="Cambria Math" panose="02040503050406030204" pitchFamily="18" charset="0"/>
+                                        </a:rPr>
+                                      </m:ctrlPr>
+                                    </m:sSubPr>
+                                    <m:e>
+                                      <m:r>
+                                        <a:rPr lang="en-US" altLang="ko-KR" sz="1800" b="0" i="1" baseline="0" smtClean="0">
+                                          <a:latin typeface="Cambria Math" panose="02040503050406030204" pitchFamily="18" charset="0"/>
+                                        </a:rPr>
+                                        <m:t>1</m:t>
+                                      </m:r>
+                                    </m:e>
+                                    <m:sub>
+                                      <m:r>
+                                        <a:rPr lang="en-US" altLang="ko-KR" sz="1800" b="0" i="1" baseline="0" smtClean="0">
+                                          <a:latin typeface="Cambria Math" panose="02040503050406030204" pitchFamily="18" charset="0"/>
+                                        </a:rPr>
+                                        <m:t>𝑘</m:t>
+                                      </m:r>
+                                    </m:sub>
+                                  </m:sSub>
+                                </m:sub>
+                                <m:sup>
+                                  <m:r>
+                                    <a:rPr lang="en-US" altLang="ko-KR" sz="1800" b="0" i="1" baseline="0" smtClean="0">
+                                      <a:latin typeface="Cambria Math" panose="02040503050406030204" pitchFamily="18" charset="0"/>
+                                    </a:rPr>
+                                    <m:t>0</m:t>
+                                  </m:r>
+                                </m:sup>
+                              </m:sSubSup>
+                              <m:r>
+                                <a:rPr lang="en-US" altLang="ko-KR" sz="1800" b="0" i="1" baseline="0" smtClean="0">
+                                  <a:latin typeface="Cambria Math" panose="02040503050406030204" pitchFamily="18" charset="0"/>
+                                </a:rPr>
+                                <m:t>≔</m:t>
+                              </m:r>
+                              <m:d>
+                                <m:dPr>
+                                  <m:begChr m:val="["/>
+                                  <m:endChr m:val="]"/>
+                                  <m:ctrlPr>
+                                    <a:rPr lang="en-US" altLang="ko-KR" sz="1800" b="0" i="1" baseline="0" smtClean="0">
+                                      <a:latin typeface="Cambria Math" panose="02040503050406030204" pitchFamily="18" charset="0"/>
+                                    </a:rPr>
+                                  </m:ctrlPr>
+                                </m:dPr>
+                                <m:e>
+                                  <m:sSub>
+                                    <m:sSubPr>
+                                      <m:ctrlPr>
+                                        <a:rPr lang="en-US" altLang="ko-KR" sz="1800" b="0" i="1" baseline="0" smtClean="0">
+                                          <a:latin typeface="Cambria Math" panose="02040503050406030204" pitchFamily="18" charset="0"/>
+                                        </a:rPr>
+                                      </m:ctrlPr>
+                                    </m:sSubPr>
+                                    <m:e>
+                                      <m:r>
+                                        <a:rPr lang="en-US" altLang="ko-KR" sz="1800" b="0" i="1" baseline="0" smtClean="0">
+                                          <a:latin typeface="Cambria Math" panose="02040503050406030204" pitchFamily="18" charset="0"/>
+                                        </a:rPr>
+                                        <m:t>𝑣</m:t>
+                                      </m:r>
+                                    </m:e>
+                                    <m:sub>
+                                      <m:sSub>
+                                        <m:sSubPr>
+                                          <m:ctrlPr>
+                                            <a:rPr lang="en-US" altLang="ko-KR" sz="1800" b="0" i="1" baseline="0" smtClean="0">
+                                              <a:latin typeface="Cambria Math" panose="02040503050406030204" pitchFamily="18" charset="0"/>
+                                            </a:rPr>
+                                          </m:ctrlPr>
+                                        </m:sSubPr>
+                                        <m:e>
+                                          <m:r>
+                                            <a:rPr lang="en-US" altLang="ko-KR" sz="1800" b="0" i="1" baseline="0" smtClean="0">
+                                              <a:latin typeface="Cambria Math" panose="02040503050406030204" pitchFamily="18" charset="0"/>
+                                            </a:rPr>
+                                            <m:t>1</m:t>
+                                          </m:r>
+                                        </m:e>
+                                        <m:sub>
+                                          <m:r>
+                                            <a:rPr lang="en-US" altLang="ko-KR" sz="1800" b="0" i="1" baseline="0" smtClean="0">
+                                              <a:latin typeface="Cambria Math" panose="02040503050406030204" pitchFamily="18" charset="0"/>
+                                            </a:rPr>
+                                            <m:t>𝑘</m:t>
+                                          </m:r>
+                                        </m:sub>
+                                      </m:sSub>
+                                    </m:sub>
+                                  </m:sSub>
+                                  <m:d>
+                                    <m:dPr>
+                                      <m:begChr m:val="["/>
+                                      <m:endChr m:val="]"/>
+                                      <m:ctrlPr>
+                                        <a:rPr lang="en-US" altLang="ko-KR" sz="1800" b="0" i="1" baseline="0" smtClean="0">
+                                          <a:latin typeface="Cambria Math" panose="02040503050406030204" pitchFamily="18" charset="0"/>
+                                        </a:rPr>
+                                      </m:ctrlPr>
+                                    </m:dPr>
+                                    <m:e>
+                                      <m:r>
+                                        <a:rPr lang="en-US" altLang="ko-KR" sz="1800" b="0" i="1" baseline="0" smtClean="0">
+                                          <a:latin typeface="Cambria Math" panose="02040503050406030204" pitchFamily="18" charset="0"/>
+                                        </a:rPr>
+                                        <m:t>0</m:t>
+                                      </m:r>
+                                    </m:e>
+                                  </m:d>
+                                  <m:r>
+                                    <a:rPr lang="en-US" altLang="ko-KR" sz="1800" b="0" i="1" baseline="0" smtClean="0">
+                                      <a:latin typeface="Cambria Math" panose="02040503050406030204" pitchFamily="18" charset="0"/>
+                                    </a:rPr>
+                                    <m:t>+0.000001,</m:t>
+                                  </m:r>
+                                  <m:sSub>
+                                    <m:sSubPr>
+                                      <m:ctrlPr>
+                                        <a:rPr lang="en-US" altLang="ko-KR" sz="1800" b="0" i="1" baseline="0" smtClean="0">
+                                          <a:latin typeface="Cambria Math" panose="02040503050406030204" pitchFamily="18" charset="0"/>
+                                        </a:rPr>
+                                      </m:ctrlPr>
+                                    </m:sSubPr>
+                                    <m:e>
+                                      <m:r>
+                                        <a:rPr lang="en-US" altLang="ko-KR" sz="1800" b="0" i="1" baseline="0" smtClean="0">
+                                          <a:latin typeface="Cambria Math" panose="02040503050406030204" pitchFamily="18" charset="0"/>
+                                        </a:rPr>
+                                        <m:t>𝑣</m:t>
+                                      </m:r>
+                                    </m:e>
+                                    <m:sub>
+                                      <m:sSub>
+                                        <m:sSubPr>
+                                          <m:ctrlPr>
+                                            <a:rPr lang="en-US" altLang="ko-KR" sz="1800" b="0" i="1" baseline="0" smtClean="0">
+                                              <a:latin typeface="Cambria Math" panose="02040503050406030204" pitchFamily="18" charset="0"/>
+                                            </a:rPr>
+                                          </m:ctrlPr>
+                                        </m:sSubPr>
+                                        <m:e>
+                                          <m:r>
+                                            <a:rPr lang="en-US" altLang="ko-KR" sz="1800" b="0" i="1" baseline="0" smtClean="0">
+                                              <a:latin typeface="Cambria Math" panose="02040503050406030204" pitchFamily="18" charset="0"/>
+                                            </a:rPr>
+                                            <m:t>1</m:t>
+                                          </m:r>
+                                        </m:e>
+                                        <m:sub>
+                                          <m:r>
+                                            <a:rPr lang="en-US" altLang="ko-KR" sz="1800" b="0" i="1" baseline="0" smtClean="0">
+                                              <a:latin typeface="Cambria Math" panose="02040503050406030204" pitchFamily="18" charset="0"/>
+                                            </a:rPr>
+                                            <m:t>𝑘</m:t>
+                                          </m:r>
+                                        </m:sub>
+                                      </m:sSub>
+                                    </m:sub>
+                                  </m:sSub>
+                                  <m:d>
+                                    <m:dPr>
+                                      <m:begChr m:val="["/>
+                                      <m:endChr m:val="]"/>
+                                      <m:ctrlPr>
+                                        <a:rPr lang="en-US" altLang="ko-KR" sz="1800" b="0" i="1" baseline="0" smtClean="0">
+                                          <a:latin typeface="Cambria Math" panose="02040503050406030204" pitchFamily="18" charset="0"/>
+                                        </a:rPr>
+                                      </m:ctrlPr>
+                                    </m:dPr>
+                                    <m:e>
+                                      <m:r>
+                                        <a:rPr lang="en-US" altLang="ko-KR" sz="1800" b="0" i="1" baseline="0" smtClean="0">
+                                          <a:latin typeface="Cambria Math" panose="02040503050406030204" pitchFamily="18" charset="0"/>
+                                        </a:rPr>
+                                        <m:t>1</m:t>
+                                      </m:r>
+                                    </m:e>
+                                  </m:d>
+                                </m:e>
+                              </m:d>
+                            </m:oMath>
+                          </a14:m>
+                          <a:endParaRPr lang="en-US" altLang="ko-KR" sz="1800" b="0" baseline="0" dirty="0" smtClean="0"/>
+                        </a:p>
+                        <a:p>
+                          <a:pPr marL="0" indent="0" algn="l" latinLnBrk="1">
+                            <a:buNone/>
+                          </a:pPr>
+                          <a:r>
+                            <a:rPr lang="en-US" altLang="ko-KR" sz="1800" b="0" baseline="0" dirty="0" smtClean="0"/>
+                            <a:t>    </a:t>
+                          </a:r>
+                          <a14:m>
+                            <m:oMath xmlns:m="http://schemas.openxmlformats.org/officeDocument/2006/math">
+                              <m:sSubSup>
+                                <m:sSubSupPr>
+                                  <m:ctrlPr>
+                                    <a:rPr lang="en-US" altLang="ko-KR" sz="1800" b="0" i="1" baseline="0" smtClean="0">
+                                      <a:latin typeface="Cambria Math" panose="02040503050406030204" pitchFamily="18" charset="0"/>
+                                    </a:rPr>
+                                  </m:ctrlPr>
+                                </m:sSubSupPr>
+                                <m:e>
+                                  <m:r>
+                                    <a:rPr lang="en-US" altLang="ko-KR" sz="1800" b="0" i="1" baseline="0" smtClean="0">
+                                      <a:latin typeface="Cambria Math" panose="02040503050406030204" pitchFamily="18" charset="0"/>
+                                    </a:rPr>
+                                    <m:t>𝑣</m:t>
+                                  </m:r>
+                                </m:e>
+                                <m:sub>
+                                  <m:sSub>
+                                    <m:sSubPr>
+                                      <m:ctrlPr>
+                                        <a:rPr lang="en-US" altLang="ko-KR" sz="1800" b="0" i="1" baseline="0" smtClean="0">
+                                          <a:latin typeface="Cambria Math" panose="02040503050406030204" pitchFamily="18" charset="0"/>
+                                        </a:rPr>
+                                      </m:ctrlPr>
+                                    </m:sSubPr>
+                                    <m:e>
+                                      <m:r>
+                                        <a:rPr lang="en-US" altLang="ko-KR" sz="1800" b="0" i="1" baseline="0" smtClean="0">
+                                          <a:latin typeface="Cambria Math" panose="02040503050406030204" pitchFamily="18" charset="0"/>
+                                        </a:rPr>
+                                        <m:t>1</m:t>
+                                      </m:r>
+                                    </m:e>
+                                    <m:sub>
+                                      <m:r>
+                                        <a:rPr lang="en-US" altLang="ko-KR" sz="1800" b="0" i="1" baseline="0" smtClean="0">
+                                          <a:latin typeface="Cambria Math" panose="02040503050406030204" pitchFamily="18" charset="0"/>
+                                        </a:rPr>
+                                        <m:t>𝑘</m:t>
+                                      </m:r>
+                                    </m:sub>
+                                  </m:sSub>
+                                </m:sub>
+                                <m:sup>
+                                  <m:r>
+                                    <a:rPr lang="en-US" altLang="ko-KR" sz="1800" b="0" i="1" baseline="0" smtClean="0">
+                                      <a:latin typeface="Cambria Math" panose="02040503050406030204" pitchFamily="18" charset="0"/>
+                                    </a:rPr>
+                                    <m:t>1</m:t>
+                                  </m:r>
+                                </m:sup>
+                              </m:sSubSup>
+                              <m:r>
+                                <a:rPr lang="en-US" altLang="ko-KR" sz="1800" b="0" i="1" baseline="0" smtClean="0">
+                                  <a:latin typeface="Cambria Math" panose="02040503050406030204" pitchFamily="18" charset="0"/>
+                                </a:rPr>
+                                <m:t>≔</m:t>
+                              </m:r>
+                              <m:d>
+                                <m:dPr>
+                                  <m:begChr m:val="["/>
+                                  <m:endChr m:val="]"/>
+                                  <m:ctrlPr>
+                                    <a:rPr lang="en-US" altLang="ko-KR" sz="1800" b="0" i="1" baseline="0" smtClean="0">
+                                      <a:latin typeface="Cambria Math" panose="02040503050406030204" pitchFamily="18" charset="0"/>
+                                    </a:rPr>
+                                  </m:ctrlPr>
+                                </m:dPr>
+                                <m:e>
+                                  <m:sSub>
+                                    <m:sSubPr>
+                                      <m:ctrlPr>
+                                        <a:rPr lang="en-US" altLang="ko-KR" sz="1800" b="0" i="1" baseline="0" smtClean="0">
+                                          <a:latin typeface="Cambria Math" panose="02040503050406030204" pitchFamily="18" charset="0"/>
+                                        </a:rPr>
+                                      </m:ctrlPr>
+                                    </m:sSubPr>
+                                    <m:e>
+                                      <m:r>
+                                        <a:rPr lang="en-US" altLang="ko-KR" sz="1800" b="0" i="1" baseline="0" smtClean="0">
+                                          <a:latin typeface="Cambria Math" panose="02040503050406030204" pitchFamily="18" charset="0"/>
+                                        </a:rPr>
+                                        <m:t>𝑣</m:t>
+                                      </m:r>
+                                    </m:e>
+                                    <m:sub>
+                                      <m:sSub>
+                                        <m:sSubPr>
+                                          <m:ctrlPr>
+                                            <a:rPr lang="en-US" altLang="ko-KR" sz="1800" b="0" i="1" baseline="0" smtClean="0">
+                                              <a:latin typeface="Cambria Math" panose="02040503050406030204" pitchFamily="18" charset="0"/>
+                                            </a:rPr>
+                                          </m:ctrlPr>
+                                        </m:sSubPr>
+                                        <m:e>
+                                          <m:r>
+                                            <a:rPr lang="en-US" altLang="ko-KR" sz="1800" b="0" i="1" baseline="0" smtClean="0">
+                                              <a:latin typeface="Cambria Math" panose="02040503050406030204" pitchFamily="18" charset="0"/>
+                                            </a:rPr>
+                                            <m:t>1</m:t>
+                                          </m:r>
+                                        </m:e>
+                                        <m:sub>
+                                          <m:r>
+                                            <a:rPr lang="en-US" altLang="ko-KR" sz="1800" b="0" i="1" baseline="0" smtClean="0">
+                                              <a:latin typeface="Cambria Math" panose="02040503050406030204" pitchFamily="18" charset="0"/>
+                                            </a:rPr>
+                                            <m:t>𝑘</m:t>
+                                          </m:r>
+                                        </m:sub>
+                                      </m:sSub>
+                                    </m:sub>
+                                  </m:sSub>
+                                  <m:d>
+                                    <m:dPr>
+                                      <m:begChr m:val="["/>
+                                      <m:endChr m:val="]"/>
+                                      <m:ctrlPr>
+                                        <a:rPr lang="en-US" altLang="ko-KR" sz="1800" b="0" i="1" baseline="0" smtClean="0">
+                                          <a:latin typeface="Cambria Math" panose="02040503050406030204" pitchFamily="18" charset="0"/>
+                                        </a:rPr>
+                                      </m:ctrlPr>
+                                    </m:dPr>
+                                    <m:e>
+                                      <m:r>
+                                        <a:rPr lang="en-US" altLang="ko-KR" sz="1800" b="0" i="1" baseline="0" smtClean="0">
+                                          <a:latin typeface="Cambria Math" panose="02040503050406030204" pitchFamily="18" charset="0"/>
+                                        </a:rPr>
+                                        <m:t>0</m:t>
+                                      </m:r>
+                                    </m:e>
+                                  </m:d>
+                                  <m:r>
+                                    <a:rPr lang="en-US" altLang="ko-KR" sz="1800" b="0" i="1" baseline="0" smtClean="0">
+                                      <a:latin typeface="Cambria Math" panose="02040503050406030204" pitchFamily="18" charset="0"/>
+                                    </a:rPr>
+                                    <m:t>,</m:t>
+                                  </m:r>
+                                  <m:sSub>
+                                    <m:sSubPr>
+                                      <m:ctrlPr>
+                                        <a:rPr lang="en-US" altLang="ko-KR" sz="1800" b="0" i="1" baseline="0" smtClean="0">
+                                          <a:latin typeface="Cambria Math" panose="02040503050406030204" pitchFamily="18" charset="0"/>
+                                        </a:rPr>
+                                      </m:ctrlPr>
+                                    </m:sSubPr>
+                                    <m:e>
+                                      <m:r>
+                                        <a:rPr lang="en-US" altLang="ko-KR" sz="1800" b="0" i="1" baseline="0" smtClean="0">
+                                          <a:latin typeface="Cambria Math" panose="02040503050406030204" pitchFamily="18" charset="0"/>
+                                        </a:rPr>
+                                        <m:t>𝑣</m:t>
+                                      </m:r>
+                                    </m:e>
+                                    <m:sub>
+                                      <m:sSub>
+                                        <m:sSubPr>
+                                          <m:ctrlPr>
+                                            <a:rPr lang="en-US" altLang="ko-KR" sz="1800" b="0" i="1" baseline="0" smtClean="0">
+                                              <a:latin typeface="Cambria Math" panose="02040503050406030204" pitchFamily="18" charset="0"/>
+                                            </a:rPr>
+                                          </m:ctrlPr>
+                                        </m:sSubPr>
+                                        <m:e>
+                                          <m:r>
+                                            <a:rPr lang="en-US" altLang="ko-KR" sz="1800" b="0" i="1" baseline="0" smtClean="0">
+                                              <a:latin typeface="Cambria Math" panose="02040503050406030204" pitchFamily="18" charset="0"/>
+                                            </a:rPr>
+                                            <m:t>1</m:t>
+                                          </m:r>
+                                        </m:e>
+                                        <m:sub>
+                                          <m:r>
+                                            <a:rPr lang="en-US" altLang="ko-KR" sz="1800" b="0" i="1" baseline="0" smtClean="0">
+                                              <a:latin typeface="Cambria Math" panose="02040503050406030204" pitchFamily="18" charset="0"/>
+                                            </a:rPr>
+                                            <m:t>𝑘</m:t>
+                                          </m:r>
+                                        </m:sub>
+                                      </m:sSub>
+                                    </m:sub>
+                                  </m:sSub>
+                                  <m:d>
+                                    <m:dPr>
+                                      <m:begChr m:val="["/>
+                                      <m:endChr m:val="]"/>
+                                      <m:ctrlPr>
+                                        <a:rPr lang="en-US" altLang="ko-KR" sz="1800" b="0" i="1" baseline="0" smtClean="0">
+                                          <a:latin typeface="Cambria Math" panose="02040503050406030204" pitchFamily="18" charset="0"/>
+                                        </a:rPr>
+                                      </m:ctrlPr>
+                                    </m:dPr>
+                                    <m:e>
+                                      <m:r>
+                                        <a:rPr lang="en-US" altLang="ko-KR" sz="1800" b="0" i="1" baseline="0" smtClean="0">
+                                          <a:latin typeface="Cambria Math" panose="02040503050406030204" pitchFamily="18" charset="0"/>
+                                        </a:rPr>
+                                        <m:t>1</m:t>
+                                      </m:r>
+                                    </m:e>
+                                  </m:d>
+                                  <m:r>
+                                    <a:rPr lang="en-US" altLang="ko-KR" sz="1800" b="0" i="1" baseline="0" smtClean="0">
+                                      <a:latin typeface="Cambria Math" panose="02040503050406030204" pitchFamily="18" charset="0"/>
+                                    </a:rPr>
+                                    <m:t>+0.000001</m:t>
+                                  </m:r>
+                                </m:e>
+                              </m:d>
+                            </m:oMath>
+                          </a14:m>
+                          <a:endParaRPr lang="en-US" altLang="ko-KR" sz="1800" b="0" baseline="0" dirty="0" smtClean="0"/>
+                        </a:p>
+                        <a:p>
+                          <a:pPr marL="0" marR="0" lvl="0" indent="0" algn="l" defTabSz="914400" rtl="0" eaLnBrk="1" fontAlgn="auto" latinLnBrk="1" hangingPunct="1">
+                            <a:lnSpc>
+                              <a:spcPct val="100000"/>
+                            </a:lnSpc>
+                            <a:spcBef>
+                              <a:spcPts val="0"/>
+                            </a:spcBef>
+                            <a:spcAft>
+                              <a:spcPts val="0"/>
+                            </a:spcAft>
+                            <a:buClrTx/>
+                            <a:buSzTx/>
+                            <a:buFontTx/>
+                            <a:buNone/>
+                            <a:tabLst/>
+                            <a:defRPr/>
+                          </a:pPr>
+                          <a:r>
+                            <a:rPr lang="en-US" altLang="ko-KR" sz="1800" b="0" baseline="0" dirty="0" smtClean="0"/>
+                            <a:t>    </a:t>
+                          </a:r>
+                          <a14:m>
+                            <m:oMath xmlns:m="http://schemas.openxmlformats.org/officeDocument/2006/math">
+                              <m:sSubSup>
+                                <m:sSubSupPr>
+                                  <m:ctrlPr>
+                                    <a:rPr lang="en-US" altLang="ko-KR" sz="1800" b="0" i="1" baseline="0" smtClean="0">
+                                      <a:latin typeface="Cambria Math" panose="02040503050406030204" pitchFamily="18" charset="0"/>
+                                    </a:rPr>
+                                  </m:ctrlPr>
+                                </m:sSubSupPr>
+                                <m:e>
+                                  <m:r>
+                                    <a:rPr lang="en-US" altLang="ko-KR" sz="1800" b="0" i="1" baseline="0" smtClean="0">
+                                      <a:latin typeface="Cambria Math" panose="02040503050406030204" pitchFamily="18" charset="0"/>
+                                    </a:rPr>
+                                    <m:t>𝑡</m:t>
+                                  </m:r>
+                                </m:e>
+                                <m:sub>
+                                  <m:r>
+                                    <a:rPr lang="en-US" altLang="ko-KR" sz="1800" b="0" i="1" baseline="0" smtClean="0">
+                                      <a:latin typeface="Cambria Math" panose="02040503050406030204" pitchFamily="18" charset="0"/>
+                                    </a:rPr>
+                                    <m:t>𝑚𝑖𝑛</m:t>
+                                  </m:r>
+                                  <m:r>
+                                    <a:rPr lang="en-US" altLang="ko-KR" sz="1800" b="0" i="1" baseline="0" smtClean="0">
+                                      <a:latin typeface="Cambria Math" panose="02040503050406030204" pitchFamily="18" charset="0"/>
+                                    </a:rPr>
+                                    <m:t> </m:t>
+                                  </m:r>
+                                </m:sub>
+                                <m:sup>
+                                  <m:sSubSup>
+                                    <m:sSubSupPr>
+                                      <m:ctrlPr>
+                                        <a:rPr lang="en-US" altLang="ko-KR" sz="1800" b="0" i="1" baseline="0" smtClean="0">
+                                          <a:latin typeface="Cambria Math" panose="02040503050406030204" pitchFamily="18" charset="0"/>
+                                        </a:rPr>
+                                      </m:ctrlPr>
+                                    </m:sSubSupPr>
+                                    <m:e>
+                                      <m:r>
+                                        <a:rPr lang="en-US" altLang="ko-KR" sz="1800" b="0" i="1" baseline="0" smtClean="0">
+                                          <a:latin typeface="Cambria Math" panose="02040503050406030204" pitchFamily="18" charset="0"/>
+                                        </a:rPr>
+                                        <m:t>𝑣</m:t>
+                                      </m:r>
+                                    </m:e>
+                                    <m:sub>
+                                      <m:sSub>
+                                        <m:sSubPr>
+                                          <m:ctrlPr>
+                                            <a:rPr lang="en-US" altLang="ko-KR" sz="1800" b="0" i="1" baseline="0" smtClean="0">
+                                              <a:latin typeface="Cambria Math" panose="02040503050406030204" pitchFamily="18" charset="0"/>
+                                            </a:rPr>
+                                          </m:ctrlPr>
+                                        </m:sSubPr>
+                                        <m:e>
+                                          <m:r>
+                                            <a:rPr lang="en-US" altLang="ko-KR" sz="1800" b="0" i="1" baseline="0" smtClean="0">
+                                              <a:latin typeface="Cambria Math" panose="02040503050406030204" pitchFamily="18" charset="0"/>
+                                            </a:rPr>
+                                            <m:t>1</m:t>
+                                          </m:r>
+                                        </m:e>
+                                        <m:sub>
+                                          <m:r>
+                                            <a:rPr lang="en-US" altLang="ko-KR" sz="1800" b="0" i="1" baseline="0" smtClean="0">
+                                              <a:latin typeface="Cambria Math" panose="02040503050406030204" pitchFamily="18" charset="0"/>
+                                            </a:rPr>
+                                            <m:t>𝑘</m:t>
+                                          </m:r>
+                                        </m:sub>
+                                      </m:sSub>
+                                    </m:sub>
+                                    <m:sup>
+                                      <m:r>
+                                        <a:rPr lang="en-US" altLang="ko-KR" sz="1800" b="0" i="1" baseline="0" smtClean="0">
+                                          <a:latin typeface="Cambria Math" panose="02040503050406030204" pitchFamily="18" charset="0"/>
+                                        </a:rPr>
+                                        <m:t>0</m:t>
+                                      </m:r>
+                                    </m:sup>
+                                  </m:sSubSup>
+                                </m:sup>
+                              </m:sSubSup>
+                              <m:r>
+                                <a:rPr lang="en-US" altLang="ko-KR" sz="1800" b="0" i="1" baseline="0" smtClean="0">
+                                  <a:latin typeface="Cambria Math" panose="02040503050406030204" pitchFamily="18" charset="0"/>
+                                </a:rPr>
+                                <m:t>≔</m:t>
+                              </m:r>
+                              <m:func>
+                                <m:funcPr>
+                                  <m:ctrlPr>
+                                    <a:rPr lang="en-US" altLang="ko-KR" sz="1800" b="0" i="1" baseline="0" smtClean="0">
+                                      <a:latin typeface="Cambria Math" panose="02040503050406030204" pitchFamily="18" charset="0"/>
+                                    </a:rPr>
+                                  </m:ctrlPr>
+                                </m:funcPr>
+                                <m:fName>
+                                  <m:r>
+                                    <m:rPr>
+                                      <m:sty m:val="p"/>
+                                    </m:rPr>
+                                    <a:rPr lang="en-US" altLang="ko-KR" sz="1800" b="0" i="0" baseline="0" smtClean="0">
+                                      <a:latin typeface="Cambria Math" panose="02040503050406030204" pitchFamily="18" charset="0"/>
+                                    </a:rPr>
+                                    <m:t>min</m:t>
+                                  </m:r>
+                                </m:fName>
+                                <m:e>
+                                  <m:d>
+                                    <m:dPr>
+                                      <m:ctrlPr>
+                                        <a:rPr lang="en-US" altLang="ko-KR" sz="1800" b="0" i="1" baseline="0" smtClean="0">
+                                          <a:latin typeface="Cambria Math" panose="02040503050406030204" pitchFamily="18" charset="0"/>
+                                        </a:rPr>
+                                      </m:ctrlPr>
+                                    </m:dPr>
+                                    <m:e>
+                                      <m:sSub>
+                                        <m:sSubPr>
+                                          <m:ctrlPr>
+                                            <a:rPr lang="en-US" altLang="ko-KR" sz="1800" b="0" i="1" baseline="0" smtClean="0">
+                                              <a:latin typeface="Cambria Math" panose="02040503050406030204" pitchFamily="18" charset="0"/>
+                                            </a:rPr>
+                                          </m:ctrlPr>
+                                        </m:sSubPr>
+                                        <m:e>
+                                          <m:r>
+                                            <a:rPr lang="en-US" altLang="ko-KR" sz="1800" b="0" i="1" baseline="0" smtClean="0">
+                                              <a:latin typeface="Cambria Math" panose="02040503050406030204" pitchFamily="18" charset="0"/>
+                                            </a:rPr>
+                                            <m:t>𝜆</m:t>
+                                          </m:r>
+                                        </m:e>
+                                        <m:sub>
+                                          <m:r>
+                                            <a:rPr lang="en-US" altLang="ko-KR" sz="1800" b="0" i="1" baseline="0" smtClean="0">
+                                              <a:latin typeface="Cambria Math" panose="02040503050406030204" pitchFamily="18" charset="0"/>
+                                            </a:rPr>
+                                            <m:t>𝑘</m:t>
+                                          </m:r>
+                                        </m:sub>
+                                      </m:sSub>
+                                      <m:r>
+                                        <a:rPr lang="en-US" altLang="ko-KR" sz="1800" b="0" i="1" baseline="0" smtClean="0">
+                                          <a:latin typeface="Cambria Math" panose="02040503050406030204" pitchFamily="18" charset="0"/>
+                                        </a:rPr>
+                                        <m:t>−</m:t>
+                                      </m:r>
+                                      <m:sSub>
+                                        <m:sSubPr>
+                                          <m:ctrlPr>
+                                            <a:rPr lang="en-US" altLang="ko-KR" sz="1800" b="0" i="1" baseline="0" smtClean="0">
+                                              <a:latin typeface="Cambria Math" panose="02040503050406030204" pitchFamily="18" charset="0"/>
+                                            </a:rPr>
+                                          </m:ctrlPr>
+                                        </m:sSubPr>
+                                        <m:e>
+                                          <m:r>
+                                            <a:rPr lang="en-US" altLang="ko-KR" sz="1800" b="0" i="1" baseline="0" smtClean="0">
+                                              <a:latin typeface="Cambria Math" panose="02040503050406030204" pitchFamily="18" charset="0"/>
+                                            </a:rPr>
+                                            <m:t>𝑎</m:t>
+                                          </m:r>
+                                        </m:e>
+                                        <m:sub>
+                                          <m:r>
+                                            <a:rPr lang="en-US" altLang="ko-KR" sz="1800" b="0" i="1" baseline="0" smtClean="0">
+                                              <a:latin typeface="Cambria Math" panose="02040503050406030204" pitchFamily="18" charset="0"/>
+                                            </a:rPr>
+                                            <m:t>1,</m:t>
+                                          </m:r>
+                                          <m:r>
+                                            <a:rPr lang="en-US" altLang="ko-KR" sz="1800" b="0" i="1" baseline="0" smtClean="0">
+                                              <a:latin typeface="Cambria Math" panose="02040503050406030204" pitchFamily="18" charset="0"/>
+                                            </a:rPr>
+                                            <m:t>𝑘</m:t>
+                                          </m:r>
+                                        </m:sub>
+                                      </m:sSub>
+                                      <m:r>
+                                        <a:rPr lang="en-US" altLang="ko-KR" sz="1800" b="0" i="1" baseline="0" smtClean="0">
+                                          <a:latin typeface="Cambria Math" panose="02040503050406030204" pitchFamily="18" charset="0"/>
+                                        </a:rPr>
+                                        <m:t>−</m:t>
+                                      </m:r>
+                                      <m:sSub>
+                                        <m:sSubPr>
+                                          <m:ctrlPr>
+                                            <a:rPr lang="en-US" altLang="ko-KR" sz="1800" b="0" i="1" baseline="0" smtClean="0">
+                                              <a:latin typeface="Cambria Math" panose="02040503050406030204" pitchFamily="18" charset="0"/>
+                                            </a:rPr>
+                                          </m:ctrlPr>
+                                        </m:sSubPr>
+                                        <m:e>
+                                          <m:r>
+                                            <a:rPr lang="en-US" altLang="ko-KR" sz="1800" b="0" i="1" baseline="0" smtClean="0">
+                                              <a:latin typeface="Cambria Math" panose="02040503050406030204" pitchFamily="18" charset="0"/>
+                                            </a:rPr>
+                                            <m:t>𝑎</m:t>
+                                          </m:r>
+                                        </m:e>
+                                        <m:sub>
+                                          <m:r>
+                                            <a:rPr lang="en-US" altLang="ko-KR" sz="1800" b="0" i="1" baseline="0" smtClean="0">
+                                              <a:latin typeface="Cambria Math" panose="02040503050406030204" pitchFamily="18" charset="0"/>
+                                            </a:rPr>
+                                            <m:t>2,</m:t>
+                                          </m:r>
+                                          <m:r>
+                                            <a:rPr lang="en-US" altLang="ko-KR" sz="1800" b="0" i="1" baseline="0" smtClean="0">
+                                              <a:latin typeface="Cambria Math" panose="02040503050406030204" pitchFamily="18" charset="0"/>
+                                            </a:rPr>
+                                            <m:t>𝑘</m:t>
+                                          </m:r>
+                                        </m:sub>
+                                      </m:sSub>
+                                      <m:sSup>
+                                        <m:sSupPr>
+                                          <m:ctrlPr>
+                                            <a:rPr lang="en-US" altLang="ko-KR" sz="1800" b="0" i="1" baseline="0" smtClean="0">
+                                              <a:latin typeface="Cambria Math" panose="02040503050406030204" pitchFamily="18" charset="0"/>
+                                            </a:rPr>
+                                          </m:ctrlPr>
+                                        </m:sSupPr>
+                                        <m:e>
+                                          <m:d>
+                                            <m:dPr>
+                                              <m:begChr m:val="‖"/>
+                                              <m:endChr m:val="‖"/>
+                                              <m:ctrlPr>
+                                                <a:rPr lang="en-US" altLang="ko-KR" sz="1800" b="0" i="1" baseline="0" smtClean="0">
+                                                  <a:latin typeface="Cambria Math" panose="02040503050406030204" pitchFamily="18" charset="0"/>
+                                                </a:rPr>
+                                              </m:ctrlPr>
+                                            </m:dPr>
+                                            <m:e>
+                                              <m:sSubSup>
+                                                <m:sSubSupPr>
+                                                  <m:ctrlPr>
+                                                    <a:rPr lang="en-US" altLang="ko-KR" sz="1800" b="0" i="1" baseline="0" smtClean="0">
+                                                      <a:latin typeface="Cambria Math" panose="02040503050406030204" pitchFamily="18" charset="0"/>
+                                                    </a:rPr>
+                                                  </m:ctrlPr>
+                                                </m:sSubSupPr>
+                                                <m:e>
+                                                  <m:r>
+                                                    <a:rPr lang="en-US" altLang="ko-KR" sz="1800" b="0" i="1" baseline="0" smtClean="0">
+                                                      <a:latin typeface="Cambria Math" panose="02040503050406030204" pitchFamily="18" charset="0"/>
+                                                    </a:rPr>
+                                                    <m:t>𝑣</m:t>
+                                                  </m:r>
+                                                </m:e>
+                                                <m:sub>
+                                                  <m:sSub>
+                                                    <m:sSubPr>
+                                                      <m:ctrlPr>
+                                                        <a:rPr lang="en-US" altLang="ko-KR" sz="1800" b="0" i="1" baseline="0" smtClean="0">
+                                                          <a:latin typeface="Cambria Math" panose="02040503050406030204" pitchFamily="18" charset="0"/>
+                                                        </a:rPr>
+                                                      </m:ctrlPr>
+                                                    </m:sSubPr>
+                                                    <m:e>
+                                                      <m:r>
+                                                        <a:rPr lang="en-US" altLang="ko-KR" sz="1800" b="0" i="1" baseline="0" smtClean="0">
+                                                          <a:latin typeface="Cambria Math" panose="02040503050406030204" pitchFamily="18" charset="0"/>
+                                                        </a:rPr>
+                                                        <m:t>1</m:t>
+                                                      </m:r>
+                                                    </m:e>
+                                                    <m:sub>
+                                                      <m:r>
+                                                        <a:rPr lang="en-US" altLang="ko-KR" sz="1800" b="0" i="1" baseline="0" smtClean="0">
+                                                          <a:latin typeface="Cambria Math" panose="02040503050406030204" pitchFamily="18" charset="0"/>
+                                                        </a:rPr>
+                                                        <m:t>𝑘</m:t>
+                                                      </m:r>
+                                                    </m:sub>
+                                                  </m:sSub>
+                                                </m:sub>
+                                                <m:sup>
+                                                  <m:r>
+                                                    <a:rPr lang="en-US" altLang="ko-KR" sz="1800" b="0" i="1" baseline="0" smtClean="0">
+                                                      <a:latin typeface="Cambria Math" panose="02040503050406030204" pitchFamily="18" charset="0"/>
+                                                    </a:rPr>
+                                                    <m:t>0</m:t>
+                                                  </m:r>
+                                                </m:sup>
+                                              </m:sSubSup>
+                                              <m:r>
+                                                <a:rPr lang="en-US" altLang="ko-KR" sz="1800" b="0" i="1" baseline="0" smtClean="0">
+                                                  <a:latin typeface="Cambria Math" panose="02040503050406030204" pitchFamily="18" charset="0"/>
+                                                </a:rPr>
+                                                <m:t>−</m:t>
+                                              </m:r>
+                                              <m:sSub>
+                                                <m:sSubPr>
+                                                  <m:ctrlPr>
+                                                    <a:rPr lang="en-US" altLang="ko-KR" sz="1800" b="0" i="1" baseline="0" smtClean="0">
+                                                      <a:latin typeface="Cambria Math" panose="02040503050406030204" pitchFamily="18" charset="0"/>
+                                                    </a:rPr>
+                                                  </m:ctrlPr>
+                                                </m:sSubPr>
+                                                <m:e>
+                                                  <m:r>
+                                                    <a:rPr lang="en-US" altLang="ko-KR" sz="1800" b="0" i="1" baseline="0" smtClean="0">
+                                                      <a:latin typeface="Cambria Math" panose="02040503050406030204" pitchFamily="18" charset="0"/>
+                                                    </a:rPr>
+                                                    <m:t>𝑤</m:t>
+                                                  </m:r>
+                                                </m:e>
+                                                <m:sub>
+                                                  <m:r>
+                                                    <a:rPr lang="en-US" altLang="ko-KR" sz="1800" b="0" i="1" baseline="0" smtClean="0">
+                                                      <a:latin typeface="Cambria Math" panose="02040503050406030204" pitchFamily="18" charset="0"/>
+                                                    </a:rPr>
+                                                    <m:t>𝑘</m:t>
+                                                  </m:r>
+                                                </m:sub>
+                                              </m:sSub>
+                                            </m:e>
+                                          </m:d>
+                                        </m:e>
+                                        <m:sup>
+                                          <m:sSub>
+                                            <m:sSubPr>
+                                              <m:ctrlPr>
+                                                <a:rPr lang="en-US" altLang="ko-KR" sz="1800" b="0" i="1" baseline="0" smtClean="0">
+                                                  <a:latin typeface="Cambria Math" panose="02040503050406030204" pitchFamily="18" charset="0"/>
+                                                </a:rPr>
+                                              </m:ctrlPr>
+                                            </m:sSubPr>
+                                            <m:e>
+                                              <m:r>
+                                                <a:rPr lang="en-US" altLang="ko-KR" sz="1800" b="0" i="1" baseline="0" smtClean="0">
+                                                  <a:latin typeface="Cambria Math" panose="02040503050406030204" pitchFamily="18" charset="0"/>
+                                                </a:rPr>
+                                                <m:t>𝑑</m:t>
+                                              </m:r>
+                                            </m:e>
+                                            <m:sub>
+                                              <m:r>
+                                                <a:rPr lang="en-US" altLang="ko-KR" sz="1800" b="0" i="1" baseline="0" smtClean="0">
+                                                  <a:latin typeface="Cambria Math" panose="02040503050406030204" pitchFamily="18" charset="0"/>
+                                                </a:rPr>
+                                                <m:t>𝑈</m:t>
+                                              </m:r>
+                                            </m:sub>
+                                          </m:sSub>
+                                        </m:sup>
+                                      </m:sSup>
+                                    </m:e>
+                                  </m:d>
+                                </m:e>
+                              </m:func>
+                              <m:r>
+                                <a:rPr lang="en-US" altLang="ko-KR" sz="1800" b="0" i="1" baseline="0" smtClean="0">
+                                  <a:latin typeface="Cambria Math" panose="02040503050406030204" pitchFamily="18" charset="0"/>
+                                </a:rPr>
+                                <m:t>, </m:t>
+                              </m:r>
+                              <m:r>
+                                <a:rPr lang="en-US" altLang="ko-KR" sz="1800" b="0" i="1" baseline="0" smtClean="0">
+                                  <a:latin typeface="Cambria Math" panose="02040503050406030204" pitchFamily="18" charset="0"/>
+                                </a:rPr>
+                                <m:t>𝑘</m:t>
+                              </m:r>
+                              <m:r>
+                                <a:rPr lang="en-US" altLang="ko-KR" sz="1800" b="0" i="1" baseline="0" smtClean="0">
+                                  <a:latin typeface="Cambria Math" panose="02040503050406030204" pitchFamily="18" charset="0"/>
+                                </a:rPr>
+                                <m:t>=1,…,</m:t>
+                              </m:r>
+                              <m:r>
+                                <a:rPr lang="en-US" altLang="ko-KR" sz="1800" b="0" i="1" baseline="0" smtClean="0">
+                                  <a:latin typeface="Cambria Math" panose="02040503050406030204" pitchFamily="18" charset="0"/>
+                                </a:rPr>
+                                <m:t>𝐾</m:t>
+                              </m:r>
+                            </m:oMath>
+                          </a14:m>
+                          <a:endParaRPr lang="en-US" altLang="ko-KR" sz="1800" b="0" baseline="0" dirty="0" smtClean="0"/>
+                        </a:p>
+                        <a:p>
+                          <a:pPr marL="0" marR="0" lvl="0" indent="0" algn="l" defTabSz="914400" rtl="0" eaLnBrk="1" fontAlgn="auto" latinLnBrk="1" hangingPunct="1">
+                            <a:lnSpc>
+                              <a:spcPct val="100000"/>
+                            </a:lnSpc>
+                            <a:spcBef>
+                              <a:spcPts val="0"/>
+                            </a:spcBef>
+                            <a:spcAft>
+                              <a:spcPts val="0"/>
+                            </a:spcAft>
+                            <a:buClrTx/>
+                            <a:buSzTx/>
+                            <a:buFontTx/>
+                            <a:buNone/>
+                            <a:tabLst/>
+                            <a:defRPr/>
+                          </a:pPr>
+                          <a:r>
+                            <a:rPr lang="en-US" altLang="ko-KR" sz="1800" b="0" baseline="0" dirty="0" smtClean="0"/>
+                            <a:t>    </a:t>
+                          </a:r>
+                          <a14:m>
+                            <m:oMath xmlns:m="http://schemas.openxmlformats.org/officeDocument/2006/math">
+                              <m:sSubSup>
+                                <m:sSubSupPr>
+                                  <m:ctrlPr>
+                                    <a:rPr lang="en-US" altLang="ko-KR" sz="1800" b="0" i="1" baseline="0" smtClean="0">
+                                      <a:latin typeface="Cambria Math" panose="02040503050406030204" pitchFamily="18" charset="0"/>
+                                    </a:rPr>
+                                  </m:ctrlPr>
+                                </m:sSubSupPr>
+                                <m:e>
+                                  <m:r>
+                                    <a:rPr lang="en-US" altLang="ko-KR" sz="1800" b="0" i="1" baseline="0" smtClean="0">
+                                      <a:latin typeface="Cambria Math" panose="02040503050406030204" pitchFamily="18" charset="0"/>
+                                    </a:rPr>
+                                    <m:t>𝑡</m:t>
+                                  </m:r>
+                                </m:e>
+                                <m:sub>
+                                  <m:r>
+                                    <a:rPr lang="en-US" altLang="ko-KR" sz="1800" b="0" i="1" baseline="0" smtClean="0">
+                                      <a:latin typeface="Cambria Math" panose="02040503050406030204" pitchFamily="18" charset="0"/>
+                                    </a:rPr>
+                                    <m:t>𝑚𝑖𝑛</m:t>
+                                  </m:r>
+                                  <m:r>
+                                    <a:rPr lang="en-US" altLang="ko-KR" sz="1800" b="0" i="1" baseline="0" smtClean="0">
+                                      <a:latin typeface="Cambria Math" panose="02040503050406030204" pitchFamily="18" charset="0"/>
+                                    </a:rPr>
+                                    <m:t> </m:t>
+                                  </m:r>
+                                </m:sub>
+                                <m:sup>
+                                  <m:sSubSup>
+                                    <m:sSubSupPr>
+                                      <m:ctrlPr>
+                                        <a:rPr lang="en-US" altLang="ko-KR" sz="1800" b="0" i="1" baseline="0" smtClean="0">
+                                          <a:latin typeface="Cambria Math" panose="02040503050406030204" pitchFamily="18" charset="0"/>
+                                        </a:rPr>
+                                      </m:ctrlPr>
+                                    </m:sSubSupPr>
+                                    <m:e>
+                                      <m:r>
+                                        <a:rPr lang="en-US" altLang="ko-KR" sz="1800" b="0" i="1" baseline="0" smtClean="0">
+                                          <a:latin typeface="Cambria Math" panose="02040503050406030204" pitchFamily="18" charset="0"/>
+                                        </a:rPr>
+                                        <m:t>𝑣</m:t>
+                                      </m:r>
+                                    </m:e>
+                                    <m:sub>
+                                      <m:sSub>
+                                        <m:sSubPr>
+                                          <m:ctrlPr>
+                                            <a:rPr lang="en-US" altLang="ko-KR" sz="1800" b="0" i="1" baseline="0" smtClean="0">
+                                              <a:latin typeface="Cambria Math" panose="02040503050406030204" pitchFamily="18" charset="0"/>
+                                            </a:rPr>
+                                          </m:ctrlPr>
+                                        </m:sSubPr>
+                                        <m:e>
+                                          <m:r>
+                                            <a:rPr lang="en-US" altLang="ko-KR" sz="1800" b="0" i="1" baseline="0" smtClean="0">
+                                              <a:latin typeface="Cambria Math" panose="02040503050406030204" pitchFamily="18" charset="0"/>
+                                            </a:rPr>
+                                            <m:t>1</m:t>
+                                          </m:r>
+                                        </m:e>
+                                        <m:sub>
+                                          <m:r>
+                                            <a:rPr lang="en-US" altLang="ko-KR" sz="1800" b="0" i="1" baseline="0" smtClean="0">
+                                              <a:latin typeface="Cambria Math" panose="02040503050406030204" pitchFamily="18" charset="0"/>
+                                            </a:rPr>
+                                            <m:t>𝑘</m:t>
+                                          </m:r>
+                                        </m:sub>
+                                      </m:sSub>
+                                    </m:sub>
+                                    <m:sup>
+                                      <m:r>
+                                        <a:rPr lang="en-US" altLang="ko-KR" sz="1800" b="0" i="1" baseline="0" smtClean="0">
+                                          <a:latin typeface="Cambria Math" panose="02040503050406030204" pitchFamily="18" charset="0"/>
+                                        </a:rPr>
+                                        <m:t>1</m:t>
+                                      </m:r>
+                                    </m:sup>
+                                  </m:sSubSup>
+                                </m:sup>
+                              </m:sSubSup>
+                              <m:r>
+                                <a:rPr lang="en-US" altLang="ko-KR" sz="1800" b="0" i="1" baseline="0" smtClean="0">
+                                  <a:latin typeface="Cambria Math" panose="02040503050406030204" pitchFamily="18" charset="0"/>
+                                </a:rPr>
+                                <m:t>≔</m:t>
+                              </m:r>
+                              <m:func>
+                                <m:funcPr>
+                                  <m:ctrlPr>
+                                    <a:rPr lang="en-US" altLang="ko-KR" sz="1800" b="0" i="1" baseline="0" smtClean="0">
+                                      <a:latin typeface="Cambria Math" panose="02040503050406030204" pitchFamily="18" charset="0"/>
+                                    </a:rPr>
+                                  </m:ctrlPr>
+                                </m:funcPr>
+                                <m:fName>
+                                  <m:r>
+                                    <m:rPr>
+                                      <m:sty m:val="p"/>
+                                    </m:rPr>
+                                    <a:rPr lang="en-US" altLang="ko-KR" sz="1800" b="0" i="0" baseline="0" smtClean="0">
+                                      <a:latin typeface="Cambria Math" panose="02040503050406030204" pitchFamily="18" charset="0"/>
+                                    </a:rPr>
+                                    <m:t>min</m:t>
+                                  </m:r>
+                                </m:fName>
+                                <m:e>
+                                  <m:d>
+                                    <m:dPr>
+                                      <m:ctrlPr>
+                                        <a:rPr lang="en-US" altLang="ko-KR" sz="1800" b="0" i="1" baseline="0" smtClean="0">
+                                          <a:latin typeface="Cambria Math" panose="02040503050406030204" pitchFamily="18" charset="0"/>
+                                        </a:rPr>
+                                      </m:ctrlPr>
+                                    </m:dPr>
+                                    <m:e>
+                                      <m:sSub>
+                                        <m:sSubPr>
+                                          <m:ctrlPr>
+                                            <a:rPr lang="en-US" altLang="ko-KR" sz="1800" b="0" i="1" baseline="0" smtClean="0">
+                                              <a:latin typeface="Cambria Math" panose="02040503050406030204" pitchFamily="18" charset="0"/>
+                                            </a:rPr>
+                                          </m:ctrlPr>
+                                        </m:sSubPr>
+                                        <m:e>
+                                          <m:r>
+                                            <a:rPr lang="en-US" altLang="ko-KR" sz="1800" b="0" i="1" baseline="0" smtClean="0">
+                                              <a:latin typeface="Cambria Math" panose="02040503050406030204" pitchFamily="18" charset="0"/>
+                                            </a:rPr>
+                                            <m:t>𝜆</m:t>
+                                          </m:r>
+                                        </m:e>
+                                        <m:sub>
+                                          <m:r>
+                                            <a:rPr lang="en-US" altLang="ko-KR" sz="1800" b="0" i="1" baseline="0" smtClean="0">
+                                              <a:latin typeface="Cambria Math" panose="02040503050406030204" pitchFamily="18" charset="0"/>
+                                            </a:rPr>
+                                            <m:t>𝑘</m:t>
+                                          </m:r>
+                                        </m:sub>
+                                      </m:sSub>
+                                      <m:r>
+                                        <a:rPr lang="en-US" altLang="ko-KR" sz="1800" b="0" i="1" baseline="0" smtClean="0">
+                                          <a:latin typeface="Cambria Math" panose="02040503050406030204" pitchFamily="18" charset="0"/>
+                                        </a:rPr>
+                                        <m:t>−</m:t>
+                                      </m:r>
+                                      <m:sSub>
+                                        <m:sSubPr>
+                                          <m:ctrlPr>
+                                            <a:rPr lang="en-US" altLang="ko-KR" sz="1800" b="0" i="1" baseline="0" smtClean="0">
+                                              <a:latin typeface="Cambria Math" panose="02040503050406030204" pitchFamily="18" charset="0"/>
+                                            </a:rPr>
+                                          </m:ctrlPr>
+                                        </m:sSubPr>
+                                        <m:e>
+                                          <m:r>
+                                            <a:rPr lang="en-US" altLang="ko-KR" sz="1800" b="0" i="1" baseline="0" smtClean="0">
+                                              <a:latin typeface="Cambria Math" panose="02040503050406030204" pitchFamily="18" charset="0"/>
+                                            </a:rPr>
+                                            <m:t>𝑎</m:t>
+                                          </m:r>
+                                        </m:e>
+                                        <m:sub>
+                                          <m:r>
+                                            <a:rPr lang="en-US" altLang="ko-KR" sz="1800" b="0" i="1" baseline="0" smtClean="0">
+                                              <a:latin typeface="Cambria Math" panose="02040503050406030204" pitchFamily="18" charset="0"/>
+                                            </a:rPr>
+                                            <m:t>1,</m:t>
+                                          </m:r>
+                                          <m:r>
+                                            <a:rPr lang="en-US" altLang="ko-KR" sz="1800" b="0" i="1" baseline="0" smtClean="0">
+                                              <a:latin typeface="Cambria Math" panose="02040503050406030204" pitchFamily="18" charset="0"/>
+                                            </a:rPr>
+                                            <m:t>𝑘</m:t>
+                                          </m:r>
+                                        </m:sub>
+                                      </m:sSub>
+                                      <m:r>
+                                        <a:rPr lang="en-US" altLang="ko-KR" sz="1800" b="0" i="1" baseline="0" smtClean="0">
+                                          <a:latin typeface="Cambria Math" panose="02040503050406030204" pitchFamily="18" charset="0"/>
+                                        </a:rPr>
+                                        <m:t>−</m:t>
+                                      </m:r>
+                                      <m:sSub>
+                                        <m:sSubPr>
+                                          <m:ctrlPr>
+                                            <a:rPr lang="en-US" altLang="ko-KR" sz="1800" b="0" i="1" baseline="0" smtClean="0">
+                                              <a:latin typeface="Cambria Math" panose="02040503050406030204" pitchFamily="18" charset="0"/>
+                                            </a:rPr>
+                                          </m:ctrlPr>
+                                        </m:sSubPr>
+                                        <m:e>
+                                          <m:r>
+                                            <a:rPr lang="en-US" altLang="ko-KR" sz="1800" b="0" i="1" baseline="0" smtClean="0">
+                                              <a:latin typeface="Cambria Math" panose="02040503050406030204" pitchFamily="18" charset="0"/>
+                                            </a:rPr>
+                                            <m:t>𝑎</m:t>
+                                          </m:r>
+                                        </m:e>
+                                        <m:sub>
+                                          <m:r>
+                                            <a:rPr lang="en-US" altLang="ko-KR" sz="1800" b="0" i="1" baseline="0" smtClean="0">
+                                              <a:latin typeface="Cambria Math" panose="02040503050406030204" pitchFamily="18" charset="0"/>
+                                            </a:rPr>
+                                            <m:t>2,</m:t>
+                                          </m:r>
+                                          <m:r>
+                                            <a:rPr lang="en-US" altLang="ko-KR" sz="1800" b="0" i="1" baseline="0" smtClean="0">
+                                              <a:latin typeface="Cambria Math" panose="02040503050406030204" pitchFamily="18" charset="0"/>
+                                            </a:rPr>
+                                            <m:t>𝑘</m:t>
+                                          </m:r>
+                                        </m:sub>
+                                      </m:sSub>
+                                      <m:sSup>
+                                        <m:sSupPr>
+                                          <m:ctrlPr>
+                                            <a:rPr lang="en-US" altLang="ko-KR" sz="1800" b="0" i="1" baseline="0" smtClean="0">
+                                              <a:latin typeface="Cambria Math" panose="02040503050406030204" pitchFamily="18" charset="0"/>
+                                            </a:rPr>
+                                          </m:ctrlPr>
+                                        </m:sSupPr>
+                                        <m:e>
+                                          <m:d>
+                                            <m:dPr>
+                                              <m:begChr m:val="‖"/>
+                                              <m:endChr m:val="‖"/>
+                                              <m:ctrlPr>
+                                                <a:rPr lang="en-US" altLang="ko-KR" sz="1800" b="0" i="1" baseline="0" smtClean="0">
+                                                  <a:latin typeface="Cambria Math" panose="02040503050406030204" pitchFamily="18" charset="0"/>
+                                                </a:rPr>
+                                              </m:ctrlPr>
+                                            </m:dPr>
+                                            <m:e>
+                                              <m:sSubSup>
+                                                <m:sSubSupPr>
+                                                  <m:ctrlPr>
+                                                    <a:rPr lang="en-US" altLang="ko-KR" sz="1800" b="0" i="1" baseline="0" smtClean="0">
+                                                      <a:latin typeface="Cambria Math" panose="02040503050406030204" pitchFamily="18" charset="0"/>
+                                                    </a:rPr>
+                                                  </m:ctrlPr>
+                                                </m:sSubSupPr>
+                                                <m:e>
+                                                  <m:r>
+                                                    <a:rPr lang="en-US" altLang="ko-KR" sz="1800" b="0" i="1" baseline="0" smtClean="0">
+                                                      <a:latin typeface="Cambria Math" panose="02040503050406030204" pitchFamily="18" charset="0"/>
+                                                    </a:rPr>
+                                                    <m:t>𝑣</m:t>
+                                                  </m:r>
+                                                </m:e>
+                                                <m:sub>
+                                                  <m:sSub>
+                                                    <m:sSubPr>
+                                                      <m:ctrlPr>
+                                                        <a:rPr lang="en-US" altLang="ko-KR" sz="1800" b="0" i="1" baseline="0" smtClean="0">
+                                                          <a:latin typeface="Cambria Math" panose="02040503050406030204" pitchFamily="18" charset="0"/>
+                                                        </a:rPr>
+                                                      </m:ctrlPr>
+                                                    </m:sSubPr>
+                                                    <m:e>
+                                                      <m:r>
+                                                        <a:rPr lang="en-US" altLang="ko-KR" sz="1800" b="0" i="1" baseline="0" smtClean="0">
+                                                          <a:latin typeface="Cambria Math" panose="02040503050406030204" pitchFamily="18" charset="0"/>
+                                                        </a:rPr>
+                                                        <m:t>1</m:t>
+                                                      </m:r>
+                                                    </m:e>
+                                                    <m:sub>
+                                                      <m:r>
+                                                        <a:rPr lang="en-US" altLang="ko-KR" sz="1800" b="0" i="1" baseline="0" smtClean="0">
+                                                          <a:latin typeface="Cambria Math" panose="02040503050406030204" pitchFamily="18" charset="0"/>
+                                                        </a:rPr>
+                                                        <m:t>𝑘</m:t>
+                                                      </m:r>
+                                                    </m:sub>
+                                                  </m:sSub>
+                                                </m:sub>
+                                                <m:sup>
+                                                  <m:r>
+                                                    <a:rPr lang="en-US" altLang="ko-KR" sz="1800" b="0" i="1" baseline="0" smtClean="0">
+                                                      <a:latin typeface="Cambria Math" panose="02040503050406030204" pitchFamily="18" charset="0"/>
+                                                    </a:rPr>
+                                                    <m:t>1</m:t>
+                                                  </m:r>
+                                                </m:sup>
+                                              </m:sSubSup>
+                                              <m:r>
+                                                <a:rPr lang="en-US" altLang="ko-KR" sz="1800" b="0" i="1" baseline="0" smtClean="0">
+                                                  <a:latin typeface="Cambria Math" panose="02040503050406030204" pitchFamily="18" charset="0"/>
+                                                </a:rPr>
+                                                <m:t>−</m:t>
+                                              </m:r>
+                                              <m:sSub>
+                                                <m:sSubPr>
+                                                  <m:ctrlPr>
+                                                    <a:rPr lang="en-US" altLang="ko-KR" sz="1800" b="0" i="1" baseline="0" smtClean="0">
+                                                      <a:latin typeface="Cambria Math" panose="02040503050406030204" pitchFamily="18" charset="0"/>
+                                                    </a:rPr>
+                                                  </m:ctrlPr>
+                                                </m:sSubPr>
+                                                <m:e>
+                                                  <m:r>
+                                                    <a:rPr lang="en-US" altLang="ko-KR" sz="1800" b="0" i="1" baseline="0" smtClean="0">
+                                                      <a:latin typeface="Cambria Math" panose="02040503050406030204" pitchFamily="18" charset="0"/>
+                                                    </a:rPr>
+                                                    <m:t>𝑤</m:t>
+                                                  </m:r>
+                                                </m:e>
+                                                <m:sub>
+                                                  <m:r>
+                                                    <a:rPr lang="en-US" altLang="ko-KR" sz="1800" b="0" i="1" baseline="0" smtClean="0">
+                                                      <a:latin typeface="Cambria Math" panose="02040503050406030204" pitchFamily="18" charset="0"/>
+                                                    </a:rPr>
+                                                    <m:t>𝑘</m:t>
+                                                  </m:r>
+                                                </m:sub>
+                                              </m:sSub>
+                                            </m:e>
+                                          </m:d>
+                                        </m:e>
+                                        <m:sup>
+                                          <m:sSub>
+                                            <m:sSubPr>
+                                              <m:ctrlPr>
+                                                <a:rPr lang="en-US" altLang="ko-KR" sz="1800" b="0" i="1" baseline="0" smtClean="0">
+                                                  <a:latin typeface="Cambria Math" panose="02040503050406030204" pitchFamily="18" charset="0"/>
+                                                </a:rPr>
+                                              </m:ctrlPr>
+                                            </m:sSubPr>
+                                            <m:e>
+                                              <m:r>
+                                                <a:rPr lang="en-US" altLang="ko-KR" sz="1800" b="0" i="1" baseline="0" smtClean="0">
+                                                  <a:latin typeface="Cambria Math" panose="02040503050406030204" pitchFamily="18" charset="0"/>
+                                                </a:rPr>
+                                                <m:t>𝑑</m:t>
+                                              </m:r>
+                                            </m:e>
+                                            <m:sub>
+                                              <m:r>
+                                                <a:rPr lang="en-US" altLang="ko-KR" sz="1800" b="0" i="1" baseline="0" smtClean="0">
+                                                  <a:latin typeface="Cambria Math" panose="02040503050406030204" pitchFamily="18" charset="0"/>
+                                                </a:rPr>
+                                                <m:t>𝑈</m:t>
+                                              </m:r>
+                                            </m:sub>
+                                          </m:sSub>
+                                        </m:sup>
+                                      </m:sSup>
+                                    </m:e>
+                                  </m:d>
+                                </m:e>
+                              </m:func>
+                              <m:r>
+                                <a:rPr lang="en-US" altLang="ko-KR" sz="1800" b="0" i="1" baseline="0" smtClean="0">
+                                  <a:latin typeface="Cambria Math" panose="02040503050406030204" pitchFamily="18" charset="0"/>
+                                </a:rPr>
+                                <m:t>, </m:t>
+                              </m:r>
+                              <m:r>
+                                <a:rPr lang="en-US" altLang="ko-KR" sz="1800" b="0" i="1" baseline="0" smtClean="0">
+                                  <a:latin typeface="Cambria Math" panose="02040503050406030204" pitchFamily="18" charset="0"/>
+                                </a:rPr>
+                                <m:t>𝑘</m:t>
+                              </m:r>
+                              <m:r>
+                                <a:rPr lang="en-US" altLang="ko-KR" sz="1800" b="0" i="1" baseline="0" smtClean="0">
+                                  <a:latin typeface="Cambria Math" panose="02040503050406030204" pitchFamily="18" charset="0"/>
+                                </a:rPr>
+                                <m:t>=1,…,</m:t>
+                              </m:r>
+                              <m:r>
+                                <a:rPr lang="en-US" altLang="ko-KR" sz="1800" b="0" i="1" baseline="0" smtClean="0">
+                                  <a:latin typeface="Cambria Math" panose="02040503050406030204" pitchFamily="18" charset="0"/>
+                                </a:rPr>
+                                <m:t>𝐾</m:t>
+                              </m:r>
+                            </m:oMath>
+                          </a14:m>
+                          <a:endParaRPr lang="en-US" altLang="ko-KR" sz="1800" b="0" baseline="0" dirty="0" smtClean="0"/>
+                        </a:p>
+                        <a:p>
+                          <a:pPr marL="0" marR="0" lvl="0" indent="0" algn="l" defTabSz="914400" rtl="0" eaLnBrk="1" fontAlgn="auto" latinLnBrk="1" hangingPunct="1">
+                            <a:lnSpc>
+                              <a:spcPct val="100000"/>
+                            </a:lnSpc>
+                            <a:spcBef>
+                              <a:spcPts val="0"/>
+                            </a:spcBef>
+                            <a:spcAft>
+                              <a:spcPts val="0"/>
+                            </a:spcAft>
+                            <a:buClrTx/>
+                            <a:buSzTx/>
+                            <a:buFontTx/>
+                            <a:buNone/>
+                            <a:tabLst/>
+                            <a:defRPr/>
+                          </a:pPr>
+                          <a:r>
+                            <a:rPr lang="en-US" altLang="ko-KR" sz="1800" b="0" baseline="0" dirty="0" smtClean="0"/>
+                            <a:t>    </a:t>
+                          </a:r>
+                          <a14:m>
+                            <m:oMath xmlns:m="http://schemas.openxmlformats.org/officeDocument/2006/math">
+                              <m:sSub>
+                                <m:sSubPr>
+                                  <m:ctrlPr>
+                                    <a:rPr lang="en-US" altLang="ko-KR" sz="1800" b="0" i="1" baseline="0" smtClean="0">
+                                      <a:latin typeface="Cambria Math" panose="02040503050406030204" pitchFamily="18" charset="0"/>
+                                    </a:rPr>
+                                  </m:ctrlPr>
+                                </m:sSubPr>
+                                <m:e>
+                                  <m:r>
+                                    <a:rPr lang="en-US" altLang="ko-KR" sz="1800" b="0" i="1" baseline="0" smtClean="0">
+                                      <a:latin typeface="Cambria Math" panose="02040503050406030204" pitchFamily="18" charset="0"/>
+                                    </a:rPr>
+                                    <m:t>𝑣</m:t>
+                                  </m:r>
+                                </m:e>
+                                <m:sub>
+                                  <m:sSub>
+                                    <m:sSubPr>
+                                      <m:ctrlPr>
+                                        <a:rPr lang="en-US" altLang="ko-KR" sz="1800" b="0" i="1" baseline="0" smtClean="0">
+                                          <a:latin typeface="Cambria Math" panose="02040503050406030204" pitchFamily="18" charset="0"/>
+                                        </a:rPr>
+                                      </m:ctrlPr>
+                                    </m:sSubPr>
+                                    <m:e>
+                                      <m:r>
+                                        <a:rPr lang="en-US" altLang="ko-KR" sz="1800" b="0" i="1" baseline="0" smtClean="0">
+                                          <a:latin typeface="Cambria Math" panose="02040503050406030204" pitchFamily="18" charset="0"/>
+                                        </a:rPr>
+                                        <m:t>1</m:t>
+                                      </m:r>
+                                    </m:e>
+                                    <m:sub>
+                                      <m:r>
+                                        <a:rPr lang="en-US" altLang="ko-KR" sz="1800" b="0" i="1" baseline="0" smtClean="0">
+                                          <a:latin typeface="Cambria Math" panose="02040503050406030204" pitchFamily="18" charset="0"/>
+                                        </a:rPr>
+                                        <m:t>𝑘</m:t>
+                                      </m:r>
+                                    </m:sub>
+                                  </m:sSub>
+                                </m:sub>
+                              </m:sSub>
+                              <m:d>
+                                <m:dPr>
+                                  <m:begChr m:val="["/>
+                                  <m:endChr m:val="]"/>
+                                  <m:ctrlPr>
+                                    <a:rPr lang="en-US" altLang="ko-KR" sz="1800" b="0" i="1" baseline="0" smtClean="0">
+                                      <a:latin typeface="Cambria Math" panose="02040503050406030204" pitchFamily="18" charset="0"/>
+                                    </a:rPr>
+                                  </m:ctrlPr>
+                                </m:dPr>
+                                <m:e>
+                                  <m:r>
+                                    <a:rPr lang="en-US" altLang="ko-KR" sz="1800" b="0" i="1" baseline="0" smtClean="0">
+                                      <a:latin typeface="Cambria Math" panose="02040503050406030204" pitchFamily="18" charset="0"/>
+                                    </a:rPr>
+                                    <m:t>0</m:t>
+                                  </m:r>
+                                </m:e>
+                              </m:d>
+                              <m:r>
+                                <a:rPr lang="en-US" altLang="ko-KR" sz="1800" b="0" i="1" baseline="0" smtClean="0">
+                                  <a:latin typeface="Cambria Math" panose="02040503050406030204" pitchFamily="18" charset="0"/>
+                                </a:rPr>
+                                <m:t>≔</m:t>
+                              </m:r>
+                              <m:sSub>
+                                <m:sSubPr>
+                                  <m:ctrlPr>
+                                    <a:rPr lang="en-US" altLang="ko-KR" sz="1800" b="0" i="1" baseline="0" smtClean="0">
+                                      <a:latin typeface="Cambria Math" panose="02040503050406030204" pitchFamily="18" charset="0"/>
+                                    </a:rPr>
+                                  </m:ctrlPr>
+                                </m:sSubPr>
+                                <m:e>
+                                  <m:r>
+                                    <a:rPr lang="en-US" altLang="ko-KR" sz="1800" b="0" i="1" baseline="0" smtClean="0">
+                                      <a:latin typeface="Cambria Math" panose="02040503050406030204" pitchFamily="18" charset="0"/>
+                                    </a:rPr>
+                                    <m:t>𝑣</m:t>
+                                  </m:r>
+                                </m:e>
+                                <m:sub>
+                                  <m:sSub>
+                                    <m:sSubPr>
+                                      <m:ctrlPr>
+                                        <a:rPr lang="en-US" altLang="ko-KR" sz="1800" b="0" i="1" baseline="0" smtClean="0">
+                                          <a:latin typeface="Cambria Math" panose="02040503050406030204" pitchFamily="18" charset="0"/>
+                                        </a:rPr>
+                                      </m:ctrlPr>
+                                    </m:sSubPr>
+                                    <m:e>
+                                      <m:r>
+                                        <a:rPr lang="en-US" altLang="ko-KR" sz="1800" b="0" i="1" baseline="0" smtClean="0">
+                                          <a:latin typeface="Cambria Math" panose="02040503050406030204" pitchFamily="18" charset="0"/>
+                                        </a:rPr>
+                                        <m:t>1</m:t>
+                                      </m:r>
+                                    </m:e>
+                                    <m:sub>
+                                      <m:r>
+                                        <a:rPr lang="en-US" altLang="ko-KR" sz="1800" b="0" i="1" baseline="0" smtClean="0">
+                                          <a:latin typeface="Cambria Math" panose="02040503050406030204" pitchFamily="18" charset="0"/>
+                                        </a:rPr>
+                                        <m:t>𝑘</m:t>
+                                      </m:r>
+                                    </m:sub>
+                                  </m:sSub>
+                                </m:sub>
+                              </m:sSub>
+                              <m:d>
+                                <m:dPr>
+                                  <m:begChr m:val="["/>
+                                  <m:endChr m:val="]"/>
+                                  <m:ctrlPr>
+                                    <a:rPr lang="en-US" altLang="ko-KR" sz="1800" b="0" i="1" baseline="0" smtClean="0">
+                                      <a:latin typeface="Cambria Math" panose="02040503050406030204" pitchFamily="18" charset="0"/>
+                                    </a:rPr>
+                                  </m:ctrlPr>
+                                </m:dPr>
+                                <m:e>
+                                  <m:r>
+                                    <a:rPr lang="en-US" altLang="ko-KR" sz="1800" b="0" i="1" baseline="0" smtClean="0">
+                                      <a:latin typeface="Cambria Math" panose="02040503050406030204" pitchFamily="18" charset="0"/>
+                                    </a:rPr>
+                                    <m:t>0</m:t>
+                                  </m:r>
+                                </m:e>
+                              </m:d>
+                            </m:oMath>
+                          </a14:m>
+                          <a:r>
+                            <a:rPr lang="en-US" altLang="ko-KR" sz="1800" b="0" baseline="0" dirty="0" smtClean="0"/>
+                            <a:t>+ Lr*</a:t>
+                          </a:r>
+                          <a14:m>
+                            <m:oMath xmlns:m="http://schemas.openxmlformats.org/officeDocument/2006/math">
+                              <m:d>
+                                <m:dPr>
+                                  <m:ctrlPr>
+                                    <a:rPr lang="en-US" altLang="ko-KR" sz="1800" b="0" i="1" baseline="0" smtClean="0">
+                                      <a:latin typeface="Cambria Math" panose="02040503050406030204" pitchFamily="18" charset="0"/>
+                                    </a:rPr>
+                                  </m:ctrlPr>
+                                </m:dPr>
+                                <m:e>
+                                  <m:sSubSup>
+                                    <m:sSubSupPr>
+                                      <m:ctrlPr>
+                                        <a:rPr lang="en-US" altLang="ko-KR" sz="1800" b="0" i="1" baseline="0" smtClean="0">
+                                          <a:latin typeface="Cambria Math" panose="02040503050406030204" pitchFamily="18" charset="0"/>
+                                        </a:rPr>
+                                      </m:ctrlPr>
+                                    </m:sSubSupPr>
+                                    <m:e>
+                                      <m:r>
+                                        <a:rPr lang="en-US" altLang="ko-KR" sz="1800" b="0" i="1" baseline="0" smtClean="0">
+                                          <a:latin typeface="Cambria Math" panose="02040503050406030204" pitchFamily="18" charset="0"/>
+                                        </a:rPr>
+                                        <m:t>𝑡</m:t>
+                                      </m:r>
+                                    </m:e>
+                                    <m:sub>
+                                      <m:r>
+                                        <a:rPr lang="en-US" altLang="ko-KR" sz="1800" b="0" i="1" baseline="0" smtClean="0">
+                                          <a:latin typeface="Cambria Math" panose="02040503050406030204" pitchFamily="18" charset="0"/>
+                                        </a:rPr>
+                                        <m:t>𝑚𝑖𝑛</m:t>
+                                      </m:r>
+                                      <m:r>
+                                        <a:rPr lang="en-US" altLang="ko-KR" sz="1800" b="0" i="1" baseline="0" smtClean="0">
+                                          <a:latin typeface="Cambria Math" panose="02040503050406030204" pitchFamily="18" charset="0"/>
+                                        </a:rPr>
+                                        <m:t> </m:t>
+                                      </m:r>
+                                    </m:sub>
+                                    <m:sup>
+                                      <m:sSubSup>
+                                        <m:sSubSupPr>
+                                          <m:ctrlPr>
+                                            <a:rPr lang="en-US" altLang="ko-KR" sz="1800" b="0" i="1" baseline="0" smtClean="0">
+                                              <a:latin typeface="Cambria Math" panose="02040503050406030204" pitchFamily="18" charset="0"/>
+                                            </a:rPr>
+                                          </m:ctrlPr>
+                                        </m:sSubSupPr>
+                                        <m:e>
+                                          <m:r>
+                                            <a:rPr lang="en-US" altLang="ko-KR" sz="1800" b="0" i="1" baseline="0" smtClean="0">
+                                              <a:latin typeface="Cambria Math" panose="02040503050406030204" pitchFamily="18" charset="0"/>
+                                            </a:rPr>
+                                            <m:t>𝑣</m:t>
+                                          </m:r>
+                                        </m:e>
+                                        <m:sub>
+                                          <m:sSub>
+                                            <m:sSubPr>
+                                              <m:ctrlPr>
+                                                <a:rPr lang="en-US" altLang="ko-KR" sz="1800" b="0" i="1" baseline="0" smtClean="0">
+                                                  <a:latin typeface="Cambria Math" panose="02040503050406030204" pitchFamily="18" charset="0"/>
+                                                </a:rPr>
+                                              </m:ctrlPr>
+                                            </m:sSubPr>
+                                            <m:e>
+                                              <m:r>
+                                                <a:rPr lang="en-US" altLang="ko-KR" sz="1800" b="0" i="1" baseline="0" smtClean="0">
+                                                  <a:latin typeface="Cambria Math" panose="02040503050406030204" pitchFamily="18" charset="0"/>
+                                                </a:rPr>
+                                                <m:t>1</m:t>
+                                              </m:r>
+                                            </m:e>
+                                            <m:sub>
+                                              <m:r>
+                                                <a:rPr lang="en-US" altLang="ko-KR" sz="1800" b="0" i="1" baseline="0" smtClean="0">
+                                                  <a:latin typeface="Cambria Math" panose="02040503050406030204" pitchFamily="18" charset="0"/>
+                                                </a:rPr>
+                                                <m:t>𝑘</m:t>
+                                              </m:r>
+                                            </m:sub>
+                                          </m:sSub>
+                                        </m:sub>
+                                        <m:sup>
+                                          <m:r>
+                                            <a:rPr lang="en-US" altLang="ko-KR" sz="1800" b="0" i="1" baseline="0" smtClean="0">
+                                              <a:latin typeface="Cambria Math" panose="02040503050406030204" pitchFamily="18" charset="0"/>
+                                            </a:rPr>
+                                            <m:t>0</m:t>
+                                          </m:r>
+                                        </m:sup>
+                                      </m:sSubSup>
+                                    </m:sup>
+                                  </m:sSubSup>
+                                  <m:r>
+                                    <a:rPr lang="en-US" altLang="ko-KR" sz="1800" b="0" i="1" baseline="0" smtClean="0">
+                                      <a:latin typeface="Cambria Math" panose="02040503050406030204" pitchFamily="18" charset="0"/>
+                                    </a:rPr>
+                                    <m:t>−</m:t>
+                                  </m:r>
+                                  <m:sSubSup>
+                                    <m:sSubSupPr>
+                                      <m:ctrlPr>
+                                        <a:rPr lang="en-US" altLang="ko-KR" sz="1800" b="0" i="1" baseline="0" smtClean="0">
+                                          <a:latin typeface="Cambria Math" panose="02040503050406030204" pitchFamily="18" charset="0"/>
+                                        </a:rPr>
+                                      </m:ctrlPr>
+                                    </m:sSubSupPr>
+                                    <m:e>
+                                      <m:r>
+                                        <a:rPr lang="en-US" altLang="ko-KR" sz="1800" b="0" i="1" baseline="0" smtClean="0">
+                                          <a:latin typeface="Cambria Math" panose="02040503050406030204" pitchFamily="18" charset="0"/>
+                                        </a:rPr>
+                                        <m:t>𝑡</m:t>
+                                      </m:r>
+                                    </m:e>
+                                    <m:sub>
+                                      <m:r>
+                                        <a:rPr lang="en-US" altLang="ko-KR" sz="1800" b="0" i="1" baseline="0" smtClean="0">
+                                          <a:latin typeface="Cambria Math" panose="02040503050406030204" pitchFamily="18" charset="0"/>
+                                        </a:rPr>
+                                        <m:t>𝑚𝑖𝑛</m:t>
+                                      </m:r>
+                                      <m:r>
+                                        <a:rPr lang="en-US" altLang="ko-KR" sz="1800" b="0" i="1" baseline="0" smtClean="0">
+                                          <a:latin typeface="Cambria Math" panose="02040503050406030204" pitchFamily="18" charset="0"/>
+                                        </a:rPr>
+                                        <m:t> </m:t>
+                                      </m:r>
+                                    </m:sub>
+                                    <m:sup>
+                                      <m:sSub>
+                                        <m:sSubPr>
+                                          <m:ctrlPr>
+                                            <a:rPr lang="en-US" altLang="ko-KR" sz="1800" b="0" i="1" baseline="0" smtClean="0">
+                                              <a:latin typeface="Cambria Math" panose="02040503050406030204" pitchFamily="18" charset="0"/>
+                                            </a:rPr>
+                                          </m:ctrlPr>
+                                        </m:sSubPr>
+                                        <m:e>
+                                          <m:r>
+                                            <a:rPr lang="en-US" altLang="ko-KR" sz="1800" b="0" i="1" baseline="0" smtClean="0">
+                                              <a:latin typeface="Cambria Math" panose="02040503050406030204" pitchFamily="18" charset="0"/>
+                                            </a:rPr>
+                                            <m:t>𝑣</m:t>
+                                          </m:r>
+                                        </m:e>
+                                        <m:sub>
+                                          <m:sSub>
+                                            <m:sSubPr>
+                                              <m:ctrlPr>
+                                                <a:rPr lang="en-US" altLang="ko-KR" sz="1800" b="0" i="1" baseline="0" smtClean="0">
+                                                  <a:latin typeface="Cambria Math" panose="02040503050406030204" pitchFamily="18" charset="0"/>
+                                                </a:rPr>
+                                              </m:ctrlPr>
+                                            </m:sSubPr>
+                                            <m:e>
+                                              <m:r>
+                                                <a:rPr lang="en-US" altLang="ko-KR" sz="1800" b="0" i="1" baseline="0" smtClean="0">
+                                                  <a:latin typeface="Cambria Math" panose="02040503050406030204" pitchFamily="18" charset="0"/>
+                                                </a:rPr>
+                                                <m:t>1</m:t>
+                                              </m:r>
+                                            </m:e>
+                                            <m:sub>
+                                              <m:r>
+                                                <a:rPr lang="en-US" altLang="ko-KR" sz="1800" b="0" i="1" baseline="0" smtClean="0">
+                                                  <a:latin typeface="Cambria Math" panose="02040503050406030204" pitchFamily="18" charset="0"/>
+                                                </a:rPr>
+                                                <m:t>𝑘</m:t>
+                                              </m:r>
+                                            </m:sub>
+                                          </m:sSub>
+                                        </m:sub>
+                                      </m:sSub>
+                                    </m:sup>
+                                  </m:sSubSup>
+                                </m:e>
+                              </m:d>
+                            </m:oMath>
+                          </a14:m>
+                          <a:endParaRPr lang="en-US" altLang="ko-KR" sz="1800" b="0" baseline="0" dirty="0" smtClean="0"/>
+                        </a:p>
+                        <a:p>
+                          <a:pPr marL="0" marR="0" lvl="0" indent="0" algn="l" defTabSz="914400" rtl="0" eaLnBrk="1" fontAlgn="auto" latinLnBrk="1" hangingPunct="1">
+                            <a:lnSpc>
+                              <a:spcPct val="100000"/>
+                            </a:lnSpc>
+                            <a:spcBef>
+                              <a:spcPts val="0"/>
+                            </a:spcBef>
+                            <a:spcAft>
+                              <a:spcPts val="0"/>
+                            </a:spcAft>
+                            <a:buClrTx/>
+                            <a:buSzTx/>
+                            <a:buFontTx/>
+                            <a:buNone/>
+                            <a:tabLst/>
+                            <a:defRPr/>
+                          </a:pPr>
+                          <a:r>
+                            <a:rPr lang="en-US" altLang="ko-KR" sz="1800" b="0" baseline="0" dirty="0" smtClean="0"/>
+                            <a:t>    </a:t>
+                          </a:r>
+                          <a14:m>
+                            <m:oMath xmlns:m="http://schemas.openxmlformats.org/officeDocument/2006/math">
+                              <m:sSub>
+                                <m:sSubPr>
+                                  <m:ctrlPr>
+                                    <a:rPr lang="en-US" altLang="ko-KR" sz="1800" b="0" i="1" baseline="0" smtClean="0">
+                                      <a:latin typeface="Cambria Math" panose="02040503050406030204" pitchFamily="18" charset="0"/>
+                                    </a:rPr>
+                                  </m:ctrlPr>
+                                </m:sSubPr>
+                                <m:e>
+                                  <m:r>
+                                    <a:rPr lang="en-US" altLang="ko-KR" sz="1800" b="0" i="1" baseline="0" smtClean="0">
+                                      <a:latin typeface="Cambria Math" panose="02040503050406030204" pitchFamily="18" charset="0"/>
+                                    </a:rPr>
+                                    <m:t>𝑣</m:t>
+                                  </m:r>
+                                </m:e>
+                                <m:sub>
+                                  <m:sSub>
+                                    <m:sSubPr>
+                                      <m:ctrlPr>
+                                        <a:rPr lang="en-US" altLang="ko-KR" sz="1800" b="0" i="1" baseline="0" smtClean="0">
+                                          <a:latin typeface="Cambria Math" panose="02040503050406030204" pitchFamily="18" charset="0"/>
+                                        </a:rPr>
+                                      </m:ctrlPr>
+                                    </m:sSubPr>
+                                    <m:e>
+                                      <m:r>
+                                        <a:rPr lang="en-US" altLang="ko-KR" sz="1800" b="0" i="1" baseline="0" smtClean="0">
+                                          <a:latin typeface="Cambria Math" panose="02040503050406030204" pitchFamily="18" charset="0"/>
+                                        </a:rPr>
+                                        <m:t>1</m:t>
+                                      </m:r>
+                                    </m:e>
+                                    <m:sub>
+                                      <m:r>
+                                        <a:rPr lang="en-US" altLang="ko-KR" sz="1800" b="0" i="1" baseline="0" smtClean="0">
+                                          <a:latin typeface="Cambria Math" panose="02040503050406030204" pitchFamily="18" charset="0"/>
+                                        </a:rPr>
+                                        <m:t>𝑘</m:t>
+                                      </m:r>
+                                    </m:sub>
+                                  </m:sSub>
+                                </m:sub>
+                              </m:sSub>
+                              <m:d>
+                                <m:dPr>
+                                  <m:begChr m:val="["/>
+                                  <m:endChr m:val="]"/>
+                                  <m:ctrlPr>
+                                    <a:rPr lang="en-US" altLang="ko-KR" sz="1800" b="0" i="1" baseline="0" smtClean="0">
+                                      <a:latin typeface="Cambria Math" panose="02040503050406030204" pitchFamily="18" charset="0"/>
+                                    </a:rPr>
+                                  </m:ctrlPr>
+                                </m:dPr>
+                                <m:e>
+                                  <m:r>
+                                    <a:rPr lang="en-US" altLang="ko-KR" sz="1800" b="0" i="1" baseline="0" smtClean="0">
+                                      <a:latin typeface="Cambria Math" panose="02040503050406030204" pitchFamily="18" charset="0"/>
+                                    </a:rPr>
+                                    <m:t>1</m:t>
+                                  </m:r>
+                                </m:e>
+                              </m:d>
+                              <m:r>
+                                <a:rPr lang="en-US" altLang="ko-KR" sz="1800" b="0" i="1" baseline="0" smtClean="0">
+                                  <a:latin typeface="Cambria Math" panose="02040503050406030204" pitchFamily="18" charset="0"/>
+                                </a:rPr>
+                                <m:t>≔</m:t>
+                              </m:r>
+                              <m:sSub>
+                                <m:sSubPr>
+                                  <m:ctrlPr>
+                                    <a:rPr lang="en-US" altLang="ko-KR" sz="1800" b="0" i="1" baseline="0" smtClean="0">
+                                      <a:latin typeface="Cambria Math" panose="02040503050406030204" pitchFamily="18" charset="0"/>
+                                    </a:rPr>
+                                  </m:ctrlPr>
+                                </m:sSubPr>
+                                <m:e>
+                                  <m:r>
+                                    <a:rPr lang="en-US" altLang="ko-KR" sz="1800" b="0" i="1" baseline="0" smtClean="0">
+                                      <a:latin typeface="Cambria Math" panose="02040503050406030204" pitchFamily="18" charset="0"/>
+                                    </a:rPr>
+                                    <m:t>𝑣</m:t>
+                                  </m:r>
+                                </m:e>
+                                <m:sub>
+                                  <m:sSub>
+                                    <m:sSubPr>
+                                      <m:ctrlPr>
+                                        <a:rPr lang="en-US" altLang="ko-KR" sz="1800" b="0" i="1" baseline="0" smtClean="0">
+                                          <a:latin typeface="Cambria Math" panose="02040503050406030204" pitchFamily="18" charset="0"/>
+                                        </a:rPr>
+                                      </m:ctrlPr>
+                                    </m:sSubPr>
+                                    <m:e>
+                                      <m:r>
+                                        <a:rPr lang="en-US" altLang="ko-KR" sz="1800" b="0" i="1" baseline="0" smtClean="0">
+                                          <a:latin typeface="Cambria Math" panose="02040503050406030204" pitchFamily="18" charset="0"/>
+                                        </a:rPr>
+                                        <m:t>1</m:t>
+                                      </m:r>
+                                    </m:e>
+                                    <m:sub>
+                                      <m:r>
+                                        <a:rPr lang="en-US" altLang="ko-KR" sz="1800" b="0" i="1" baseline="0" smtClean="0">
+                                          <a:latin typeface="Cambria Math" panose="02040503050406030204" pitchFamily="18" charset="0"/>
+                                        </a:rPr>
+                                        <m:t>𝑘</m:t>
+                                      </m:r>
+                                    </m:sub>
+                                  </m:sSub>
+                                </m:sub>
+                              </m:sSub>
+                              <m:d>
+                                <m:dPr>
+                                  <m:begChr m:val="["/>
+                                  <m:endChr m:val="]"/>
+                                  <m:ctrlPr>
+                                    <a:rPr lang="en-US" altLang="ko-KR" sz="1800" b="0" i="1" baseline="0" smtClean="0">
+                                      <a:latin typeface="Cambria Math" panose="02040503050406030204" pitchFamily="18" charset="0"/>
+                                    </a:rPr>
+                                  </m:ctrlPr>
+                                </m:dPr>
+                                <m:e>
+                                  <m:r>
+                                    <a:rPr lang="en-US" altLang="ko-KR" sz="1800" b="0" i="1" baseline="0" smtClean="0">
+                                      <a:latin typeface="Cambria Math" panose="02040503050406030204" pitchFamily="18" charset="0"/>
+                                    </a:rPr>
+                                    <m:t>1</m:t>
+                                  </m:r>
+                                </m:e>
+                              </m:d>
+                            </m:oMath>
+                          </a14:m>
+                          <a:r>
+                            <a:rPr lang="en-US" altLang="ko-KR" sz="1800" b="0" baseline="0" dirty="0" smtClean="0"/>
+                            <a:t>+ Lr*</a:t>
+                          </a:r>
+                          <a14:m>
+                            <m:oMath xmlns:m="http://schemas.openxmlformats.org/officeDocument/2006/math">
+                              <m:d>
+                                <m:dPr>
+                                  <m:ctrlPr>
+                                    <a:rPr lang="en-US" altLang="ko-KR" sz="1800" b="0" i="1" baseline="0" smtClean="0">
+                                      <a:latin typeface="Cambria Math" panose="02040503050406030204" pitchFamily="18" charset="0"/>
+                                    </a:rPr>
+                                  </m:ctrlPr>
+                                </m:dPr>
+                                <m:e>
+                                  <m:sSubSup>
+                                    <m:sSubSupPr>
+                                      <m:ctrlPr>
+                                        <a:rPr lang="en-US" altLang="ko-KR" sz="1800" b="0" i="1" baseline="0" smtClean="0">
+                                          <a:latin typeface="Cambria Math" panose="02040503050406030204" pitchFamily="18" charset="0"/>
+                                        </a:rPr>
+                                      </m:ctrlPr>
+                                    </m:sSubSupPr>
+                                    <m:e>
+                                      <m:r>
+                                        <a:rPr lang="en-US" altLang="ko-KR" sz="1800" b="0" i="1" baseline="0" smtClean="0">
+                                          <a:latin typeface="Cambria Math" panose="02040503050406030204" pitchFamily="18" charset="0"/>
+                                        </a:rPr>
+                                        <m:t>𝑡</m:t>
+                                      </m:r>
+                                    </m:e>
+                                    <m:sub>
+                                      <m:r>
+                                        <a:rPr lang="en-US" altLang="ko-KR" sz="1800" b="0" i="1" baseline="0" smtClean="0">
+                                          <a:latin typeface="Cambria Math" panose="02040503050406030204" pitchFamily="18" charset="0"/>
+                                        </a:rPr>
+                                        <m:t>𝑚𝑖𝑛</m:t>
+                                      </m:r>
+                                      <m:r>
+                                        <a:rPr lang="en-US" altLang="ko-KR" sz="1800" b="0" i="1" baseline="0" smtClean="0">
+                                          <a:latin typeface="Cambria Math" panose="02040503050406030204" pitchFamily="18" charset="0"/>
+                                        </a:rPr>
+                                        <m:t> </m:t>
+                                      </m:r>
+                                    </m:sub>
+                                    <m:sup>
+                                      <m:sSubSup>
+                                        <m:sSubSupPr>
+                                          <m:ctrlPr>
+                                            <a:rPr lang="en-US" altLang="ko-KR" sz="1800" b="0" i="1" baseline="0" smtClean="0">
+                                              <a:latin typeface="Cambria Math" panose="02040503050406030204" pitchFamily="18" charset="0"/>
+                                            </a:rPr>
+                                          </m:ctrlPr>
+                                        </m:sSubSupPr>
+                                        <m:e>
+                                          <m:r>
+                                            <a:rPr lang="en-US" altLang="ko-KR" sz="1800" b="0" i="1" baseline="0" smtClean="0">
+                                              <a:latin typeface="Cambria Math" panose="02040503050406030204" pitchFamily="18" charset="0"/>
+                                            </a:rPr>
+                                            <m:t>𝑣</m:t>
+                                          </m:r>
+                                        </m:e>
+                                        <m:sub>
+                                          <m:sSub>
+                                            <m:sSubPr>
+                                              <m:ctrlPr>
+                                                <a:rPr lang="en-US" altLang="ko-KR" sz="1800" b="0" i="1" baseline="0" smtClean="0">
+                                                  <a:latin typeface="Cambria Math" panose="02040503050406030204" pitchFamily="18" charset="0"/>
+                                                </a:rPr>
+                                              </m:ctrlPr>
+                                            </m:sSubPr>
+                                            <m:e>
+                                              <m:r>
+                                                <a:rPr lang="en-US" altLang="ko-KR" sz="1800" b="0" i="1" baseline="0" smtClean="0">
+                                                  <a:latin typeface="Cambria Math" panose="02040503050406030204" pitchFamily="18" charset="0"/>
+                                                </a:rPr>
+                                                <m:t>1</m:t>
+                                              </m:r>
+                                            </m:e>
+                                            <m:sub>
+                                              <m:r>
+                                                <a:rPr lang="en-US" altLang="ko-KR" sz="1800" b="0" i="1" baseline="0" smtClean="0">
+                                                  <a:latin typeface="Cambria Math" panose="02040503050406030204" pitchFamily="18" charset="0"/>
+                                                </a:rPr>
+                                                <m:t>𝑘</m:t>
+                                              </m:r>
+                                            </m:sub>
+                                          </m:sSub>
+                                        </m:sub>
+                                        <m:sup>
+                                          <m:r>
+                                            <a:rPr lang="en-US" altLang="ko-KR" sz="1800" b="0" i="1" baseline="0" smtClean="0">
+                                              <a:latin typeface="Cambria Math" panose="02040503050406030204" pitchFamily="18" charset="0"/>
+                                            </a:rPr>
+                                            <m:t>1</m:t>
+                                          </m:r>
+                                        </m:sup>
+                                      </m:sSubSup>
+                                    </m:sup>
+                                  </m:sSubSup>
+                                  <m:r>
+                                    <a:rPr lang="en-US" altLang="ko-KR" sz="1800" b="0" i="1" baseline="0" smtClean="0">
+                                      <a:latin typeface="Cambria Math" panose="02040503050406030204" pitchFamily="18" charset="0"/>
+                                    </a:rPr>
+                                    <m:t>−</m:t>
+                                  </m:r>
+                                  <m:sSubSup>
+                                    <m:sSubSupPr>
+                                      <m:ctrlPr>
+                                        <a:rPr lang="en-US" altLang="ko-KR" sz="1800" b="0" i="1" baseline="0" smtClean="0">
+                                          <a:latin typeface="Cambria Math" panose="02040503050406030204" pitchFamily="18" charset="0"/>
+                                        </a:rPr>
+                                      </m:ctrlPr>
+                                    </m:sSubSupPr>
+                                    <m:e>
+                                      <m:r>
+                                        <a:rPr lang="en-US" altLang="ko-KR" sz="1800" b="0" i="1" baseline="0" smtClean="0">
+                                          <a:latin typeface="Cambria Math" panose="02040503050406030204" pitchFamily="18" charset="0"/>
+                                        </a:rPr>
+                                        <m:t>𝑡</m:t>
+                                      </m:r>
+                                    </m:e>
+                                    <m:sub>
+                                      <m:r>
+                                        <a:rPr lang="en-US" altLang="ko-KR" sz="1800" b="0" i="1" baseline="0" smtClean="0">
+                                          <a:latin typeface="Cambria Math" panose="02040503050406030204" pitchFamily="18" charset="0"/>
+                                        </a:rPr>
+                                        <m:t>𝑚𝑖𝑛</m:t>
+                                      </m:r>
+                                      <m:r>
+                                        <a:rPr lang="en-US" altLang="ko-KR" sz="1800" b="0" i="1" baseline="0" smtClean="0">
+                                          <a:latin typeface="Cambria Math" panose="02040503050406030204" pitchFamily="18" charset="0"/>
+                                        </a:rPr>
+                                        <m:t> </m:t>
+                                      </m:r>
+                                    </m:sub>
+                                    <m:sup>
+                                      <m:sSub>
+                                        <m:sSubPr>
+                                          <m:ctrlPr>
+                                            <a:rPr lang="en-US" altLang="ko-KR" sz="1800" b="0" i="1" baseline="0" smtClean="0">
+                                              <a:latin typeface="Cambria Math" panose="02040503050406030204" pitchFamily="18" charset="0"/>
+                                            </a:rPr>
+                                          </m:ctrlPr>
+                                        </m:sSubPr>
+                                        <m:e>
+                                          <m:r>
+                                            <a:rPr lang="en-US" altLang="ko-KR" sz="1800" b="0" i="1" baseline="0" smtClean="0">
+                                              <a:latin typeface="Cambria Math" panose="02040503050406030204" pitchFamily="18" charset="0"/>
+                                            </a:rPr>
+                                            <m:t>𝑣</m:t>
+                                          </m:r>
+                                        </m:e>
+                                        <m:sub>
+                                          <m:sSub>
+                                            <m:sSubPr>
+                                              <m:ctrlPr>
+                                                <a:rPr lang="en-US" altLang="ko-KR" sz="1800" b="0" i="1" baseline="0" smtClean="0">
+                                                  <a:latin typeface="Cambria Math" panose="02040503050406030204" pitchFamily="18" charset="0"/>
+                                                </a:rPr>
+                                              </m:ctrlPr>
+                                            </m:sSubPr>
+                                            <m:e>
+                                              <m:r>
+                                                <a:rPr lang="en-US" altLang="ko-KR" sz="1800" b="0" i="1" baseline="0" smtClean="0">
+                                                  <a:latin typeface="Cambria Math" panose="02040503050406030204" pitchFamily="18" charset="0"/>
+                                                </a:rPr>
+                                                <m:t>1</m:t>
+                                              </m:r>
+                                            </m:e>
+                                            <m:sub>
+                                              <m:r>
+                                                <a:rPr lang="en-US" altLang="ko-KR" sz="1800" b="0" i="1" baseline="0" smtClean="0">
+                                                  <a:latin typeface="Cambria Math" panose="02040503050406030204" pitchFamily="18" charset="0"/>
+                                                </a:rPr>
+                                                <m:t>𝑘</m:t>
+                                              </m:r>
+                                            </m:sub>
+                                          </m:sSub>
+                                        </m:sub>
+                                      </m:sSub>
+                                    </m:sup>
+                                  </m:sSubSup>
+                                </m:e>
+                              </m:d>
+                            </m:oMath>
+                          </a14:m>
+                          <a:endParaRPr lang="en-US" altLang="ko-KR" sz="1800" b="0" baseline="0" dirty="0" smtClean="0"/>
+                        </a:p>
+                        <a:p>
+                          <a:pPr marL="0" marR="0" lvl="0" indent="0" algn="l" defTabSz="914400" rtl="0" eaLnBrk="1" fontAlgn="auto" latinLnBrk="1" hangingPunct="1">
+                            <a:lnSpc>
+                              <a:spcPct val="100000"/>
+                            </a:lnSpc>
+                            <a:spcBef>
+                              <a:spcPts val="0"/>
+                            </a:spcBef>
+                            <a:spcAft>
+                              <a:spcPts val="0"/>
+                            </a:spcAft>
+                            <a:buClrTx/>
+                            <a:buSzTx/>
+                            <a:buFontTx/>
+                            <a:buNone/>
+                            <a:tabLst/>
+                            <a:defRPr/>
+                          </a:pPr>
+                          <a:r>
+                            <a:rPr lang="en-US" altLang="ko-KR" sz="1800" b="0" baseline="0" dirty="0" smtClean="0"/>
+                            <a:t>Return </a:t>
+                          </a:r>
+                          <a14:m>
+                            <m:oMath xmlns:m="http://schemas.openxmlformats.org/officeDocument/2006/math">
+                              <m:sSub>
+                                <m:sSubPr>
+                                  <m:ctrlPr>
+                                    <a:rPr lang="en-US" altLang="ko-KR" sz="1800" b="0" i="1" baseline="0" smtClean="0">
+                                      <a:latin typeface="Cambria Math" panose="02040503050406030204" pitchFamily="18" charset="0"/>
+                                    </a:rPr>
+                                  </m:ctrlPr>
+                                </m:sSubPr>
+                                <m:e>
+                                  <m:r>
+                                    <a:rPr lang="en-US" altLang="ko-KR" sz="1800" b="0" i="1" baseline="0" smtClean="0">
+                                      <a:latin typeface="Cambria Math" panose="02040503050406030204" pitchFamily="18" charset="0"/>
+                                    </a:rPr>
+                                    <m:t>𝑣</m:t>
+                                  </m:r>
+                                </m:e>
+                                <m:sub>
+                                  <m:sSub>
+                                    <m:sSubPr>
+                                      <m:ctrlPr>
+                                        <a:rPr lang="en-US" altLang="ko-KR" sz="1800" b="0" i="1" baseline="0" smtClean="0">
+                                          <a:latin typeface="Cambria Math" panose="02040503050406030204" pitchFamily="18" charset="0"/>
+                                        </a:rPr>
+                                      </m:ctrlPr>
+                                    </m:sSubPr>
+                                    <m:e>
+                                      <m:r>
+                                        <a:rPr lang="en-US" altLang="ko-KR" sz="1800" b="0" i="1" baseline="0" smtClean="0">
+                                          <a:latin typeface="Cambria Math" panose="02040503050406030204" pitchFamily="18" charset="0"/>
+                                        </a:rPr>
+                                        <m:t>1</m:t>
+                                      </m:r>
+                                    </m:e>
+                                    <m:sub>
+                                      <m:r>
+                                        <a:rPr lang="en-US" altLang="ko-KR" sz="1800" b="0" i="1" baseline="0" smtClean="0">
+                                          <a:latin typeface="Cambria Math" panose="02040503050406030204" pitchFamily="18" charset="0"/>
+                                        </a:rPr>
+                                        <m:t>𝑘</m:t>
+                                      </m:r>
+                                    </m:sub>
+                                  </m:sSub>
+                                </m:sub>
+                              </m:sSub>
+                            </m:oMath>
+                          </a14:m>
+                          <a:endParaRPr lang="en-US" altLang="ko-KR" sz="1800" b="0" baseline="0" dirty="0" smtClean="0"/>
+                        </a:p>
+                      </a:txBody>
+                      <a:tcPr anchor="ctr"/>
+                    </a:tc>
+                    <a:extLst>
+                      <a:ext uri="{0D108BD9-81ED-4DB2-BD59-A6C34878D82A}">
+                        <a16:rowId xmlns:a16="http://schemas.microsoft.com/office/drawing/2014/main" val="1063988946"/>
+                      </a:ext>
+                    </a:extLst>
+                  </a:tr>
+                </a:tbl>
+              </a:graphicData>
+            </a:graphic>
+          </p:graphicFrame>
+        </mc:Choice>
+        <mc:Fallback>
+          <p:graphicFrame>
+            <p:nvGraphicFramePr>
+              <p:cNvPr id="4" name="Table 3"/>
+              <p:cNvGraphicFramePr>
+                <a:graphicFrameLocks noGrp="1"/>
+              </p:cNvGraphicFramePr>
+              <p:nvPr>
+                <p:extLst>
+                  <p:ext uri="{D42A27DB-BD31-4B8C-83A1-F6EECF244321}">
+                    <p14:modId xmlns:p14="http://schemas.microsoft.com/office/powerpoint/2010/main" val="4169524719"/>
+                  </p:ext>
+                </p:extLst>
+              </p:nvPr>
+            </p:nvGraphicFramePr>
+            <p:xfrm>
+              <a:off x="575761" y="971397"/>
+              <a:ext cx="10395394" cy="4233736"/>
+            </p:xfrm>
+            <a:graphic>
+              <a:graphicData uri="http://schemas.openxmlformats.org/drawingml/2006/table">
+                <a:tbl>
+                  <a:tblPr firstRow="1" bandRow="1">
+                    <a:tableStyleId>{5940675A-B579-460E-94D1-54222C63F5DA}</a:tableStyleId>
+                  </a:tblPr>
+                  <a:tblGrid>
+                    <a:gridCol w="10395394">
+                      <a:extLst>
+                        <a:ext uri="{9D8B030D-6E8A-4147-A177-3AD203B41FA5}">
+                          <a16:colId xmlns:a16="http://schemas.microsoft.com/office/drawing/2014/main" val="1406147732"/>
+                        </a:ext>
+                      </a:extLst>
+                    </a:gridCol>
+                  </a:tblGrid>
+                  <a:tr h="4233736">
+                    <a:tc>
+                      <a:txBody>
+                        <a:bodyPr/>
+                        <a:lstStyle/>
+                        <a:p>
+                          <a:endParaRPr lang="ko-KR"/>
+                        </a:p>
+                      </a:txBody>
+                      <a:tcPr anchor="ctr">
+                        <a:blipFill>
+                          <a:blip r:embed="rId2"/>
+                          <a:stretch>
+                            <a:fillRect l="-59" t="-863" r="-117" b="-1439"/>
+                          </a:stretch>
+                        </a:blipFill>
+                      </a:tcPr>
+                    </a:tc>
+                    <a:extLst>
+                      <a:ext uri="{0D108BD9-81ED-4DB2-BD59-A6C34878D82A}">
+                        <a16:rowId xmlns:a16="http://schemas.microsoft.com/office/drawing/2014/main" val="1063988946"/>
+                      </a:ext>
+                    </a:extLst>
+                  </a:tr>
+                </a:tbl>
+              </a:graphicData>
+            </a:graphic>
+          </p:graphicFrame>
+        </mc:Fallback>
+      </mc:AlternateContent>
+      <p:sp>
+        <p:nvSpPr>
+          <p:cNvPr id="5" name="Rectangle 4"/>
+          <p:cNvSpPr/>
+          <p:nvPr/>
+        </p:nvSpPr>
+        <p:spPr>
+          <a:xfrm>
+            <a:off x="3108883" y="5369285"/>
+            <a:ext cx="5329151" cy="369332"/>
+          </a:xfrm>
+          <a:prstGeom prst="rect">
+            <a:avLst/>
+          </a:prstGeom>
+        </p:spPr>
+        <p:txBody>
+          <a:bodyPr wrap="none">
+            <a:spAutoFit/>
+          </a:bodyPr>
+          <a:lstStyle/>
+          <a:p>
+            <a:pPr algn="ctr"/>
+            <a:r>
+              <a:rPr lang="en-US" altLang="ko-KR" b="1" dirty="0" smtClean="0">
+                <a:latin typeface="맑은 고딕" panose="020B0503020000020004" pitchFamily="50" charset="-127"/>
+                <a:cs typeface="Times New Roman" panose="02020603050405020304" pitchFamily="18" charset="0"/>
+              </a:rPr>
+              <a:t>Algorithm 2. Solving (20) in the original paper</a:t>
+            </a:r>
+            <a:endParaRPr lang="ko-KR" altLang="en-US" dirty="0"/>
+          </a:p>
+        </p:txBody>
+      </p:sp>
+    </p:spTree>
+    <p:extLst>
+      <p:ext uri="{BB962C8B-B14F-4D97-AF65-F5344CB8AC3E}">
+        <p14:creationId xmlns:p14="http://schemas.microsoft.com/office/powerpoint/2010/main" val="661006171"/>
+      </p:ext>
+    </p:extLst>
+  </p:cSld>
+  <p:clrMapOvr>
+    <a:masterClrMapping/>
+  </p:clrMapOvr>
+</p:sld>
+</file>
+
+<file path=ppt/slides/slide6.xml><?xml version="1.0" encoding="utf-8"?>
+<p:sld xmlns:a="http://schemas.openxmlformats.org/drawingml/2006/main" xmlns:r="http://schemas.openxmlformats.org/officeDocument/2006/relationships" xmlns:p="http://schemas.openxmlformats.org/presentationml/2006/main">
+  <p:cSld>
+    <p:spTree>
+      <p:nvGrpSpPr>
+        <p:cNvPr id="1" name=""/>
+        <p:cNvGrpSpPr/>
+        <p:nvPr/>
+      </p:nvGrpSpPr>
+      <p:grpSpPr>
+        <a:xfrm>
+          <a:off x="0" y="0"/>
+          <a:ext cx="0" cy="0"/>
+          <a:chOff x="0" y="0"/>
+          <a:chExt cx="0" cy="0"/>
+        </a:xfrm>
+      </p:grpSpPr>
       <p:sp>
         <p:nvSpPr>
           <p:cNvPr id="4" name="Rectangle 3"/>
@@ -9799,7 +12943,7 @@
 </p:sld>
 </file>
 
-<file path=ppt/slides/slide6.xml><?xml version="1.0" encoding="utf-8"?>
+<file path=ppt/slides/slide7.xml><?xml version="1.0" encoding="utf-8"?>
 <p:sld xmlns:a="http://schemas.openxmlformats.org/drawingml/2006/main" xmlns:r="http://schemas.openxmlformats.org/officeDocument/2006/relationships" xmlns:p="http://schemas.openxmlformats.org/presentationml/2006/main">
   <p:cSld>
     <p:spTree>
@@ -14214,7 +17358,7 @@
 </p:sld>
 </file>
 
-<file path=ppt/slides/slide7.xml><?xml version="1.0" encoding="utf-8"?>
+<file path=ppt/slides/slide8.xml><?xml version="1.0" encoding="utf-8"?>
 <p:sld xmlns:a="http://schemas.openxmlformats.org/drawingml/2006/main" xmlns:r="http://schemas.openxmlformats.org/officeDocument/2006/relationships" xmlns:p="http://schemas.openxmlformats.org/presentationml/2006/main">
   <p:cSld>
     <p:spTree>
@@ -14927,7 +18071,7 @@
 </p:sld>
 </file>
 
-<file path=ppt/slides/slide8.xml><?xml version="1.0" encoding="utf-8"?>
+<file path=ppt/slides/slide9.xml><?xml version="1.0" encoding="utf-8"?>
 <p:sld xmlns:a="http://schemas.openxmlformats.org/drawingml/2006/main" xmlns:r="http://schemas.openxmlformats.org/officeDocument/2006/relationships" xmlns:p="http://schemas.openxmlformats.org/presentationml/2006/main">
   <p:cSld>
     <p:spTree>
@@ -15086,289 +18230,6 @@
     <p:extLst>
       <p:ext uri="{BB962C8B-B14F-4D97-AF65-F5344CB8AC3E}">
         <p14:creationId xmlns:p14="http://schemas.microsoft.com/office/powerpoint/2010/main" val="2900775202"/>
-      </p:ext>
-    </p:extLst>
-  </p:cSld>
-  <p:clrMapOvr>
-    <a:masterClrMapping/>
-  </p:clrMapOvr>
-</p:sld>
-</file>
-
-<file path=ppt/slides/slide9.xml><?xml version="1.0" encoding="utf-8"?>
-<p:sld xmlns:a="http://schemas.openxmlformats.org/drawingml/2006/main" xmlns:r="http://schemas.openxmlformats.org/officeDocument/2006/relationships" xmlns:p="http://schemas.openxmlformats.org/presentationml/2006/main">
-  <p:cSld>
-    <p:spTree>
-      <p:nvGrpSpPr>
-        <p:cNvPr id="1" name=""/>
-        <p:cNvGrpSpPr/>
-        <p:nvPr/>
-      </p:nvGrpSpPr>
-      <p:grpSpPr>
-        <a:xfrm>
-          <a:off x="0" y="0"/>
-          <a:ext cx="0" cy="0"/>
-          <a:chOff x="0" y="0"/>
-          <a:chExt cx="0" cy="0"/>
-        </a:xfrm>
-      </p:grpSpPr>
-      <p:pic>
-        <p:nvPicPr>
-          <p:cNvPr id="3" name="Picture 2"/>
-          <p:cNvPicPr>
-            <a:picLocks noChangeAspect="1"/>
-          </p:cNvPicPr>
-          <p:nvPr/>
-        </p:nvPicPr>
-        <p:blipFill>
-          <a:blip r:embed="rId2"/>
-          <a:stretch>
-            <a:fillRect/>
-          </a:stretch>
-        </p:blipFill>
-        <p:spPr>
-          <a:xfrm>
-            <a:off x="406399" y="460391"/>
-            <a:ext cx="3667889" cy="2397600"/>
-          </a:xfrm>
-          <a:prstGeom prst="rect">
-            <a:avLst/>
-          </a:prstGeom>
-        </p:spPr>
-      </p:pic>
-      <p:pic>
-        <p:nvPicPr>
-          <p:cNvPr id="4" name="Picture 3"/>
-          <p:cNvPicPr>
-            <a:picLocks noChangeAspect="1"/>
-          </p:cNvPicPr>
-          <p:nvPr/>
-        </p:nvPicPr>
-        <p:blipFill>
-          <a:blip r:embed="rId3"/>
-          <a:stretch>
-            <a:fillRect/>
-          </a:stretch>
-        </p:blipFill>
-        <p:spPr>
-          <a:xfrm>
-            <a:off x="4278709" y="3040228"/>
-            <a:ext cx="3662389" cy="2397600"/>
-          </a:xfrm>
-          <a:prstGeom prst="rect">
-            <a:avLst/>
-          </a:prstGeom>
-        </p:spPr>
-      </p:pic>
-      <p:pic>
-        <p:nvPicPr>
-          <p:cNvPr id="6" name="Picture 5"/>
-          <p:cNvPicPr>
-            <a:picLocks noChangeAspect="1"/>
-          </p:cNvPicPr>
-          <p:nvPr/>
-        </p:nvPicPr>
-        <p:blipFill>
-          <a:blip r:embed="rId4"/>
-          <a:stretch>
-            <a:fillRect/>
-          </a:stretch>
-        </p:blipFill>
-        <p:spPr>
-          <a:xfrm>
-            <a:off x="4284217" y="460391"/>
-            <a:ext cx="3615343" cy="2397600"/>
-          </a:xfrm>
-          <a:prstGeom prst="rect">
-            <a:avLst/>
-          </a:prstGeom>
-        </p:spPr>
-      </p:pic>
-      <p:pic>
-        <p:nvPicPr>
-          <p:cNvPr id="9" name="Picture 8"/>
-          <p:cNvPicPr>
-            <a:picLocks noChangeAspect="1"/>
-          </p:cNvPicPr>
-          <p:nvPr/>
-        </p:nvPicPr>
-        <p:blipFill>
-          <a:blip r:embed="rId5"/>
-          <a:stretch>
-            <a:fillRect/>
-          </a:stretch>
-        </p:blipFill>
-        <p:spPr>
-          <a:xfrm>
-            <a:off x="406399" y="3040228"/>
-            <a:ext cx="3651645" cy="2397600"/>
-          </a:xfrm>
-          <a:prstGeom prst="rect">
-            <a:avLst/>
-          </a:prstGeom>
-        </p:spPr>
-      </p:pic>
-      <p:pic>
-        <p:nvPicPr>
-          <p:cNvPr id="10" name="Picture 9"/>
-          <p:cNvPicPr>
-            <a:picLocks noChangeAspect="1"/>
-          </p:cNvPicPr>
-          <p:nvPr/>
-        </p:nvPicPr>
-        <p:blipFill>
-          <a:blip r:embed="rId6"/>
-          <a:stretch>
-            <a:fillRect/>
-          </a:stretch>
-        </p:blipFill>
-        <p:spPr>
-          <a:xfrm>
-            <a:off x="8343170" y="460391"/>
-            <a:ext cx="3662389" cy="2397600"/>
-          </a:xfrm>
-          <a:prstGeom prst="rect">
-            <a:avLst/>
-          </a:prstGeom>
-        </p:spPr>
-      </p:pic>
-      <p:pic>
-        <p:nvPicPr>
-          <p:cNvPr id="11" name="Picture 10"/>
-          <p:cNvPicPr>
-            <a:picLocks noChangeAspect="1"/>
-          </p:cNvPicPr>
-          <p:nvPr/>
-        </p:nvPicPr>
-        <p:blipFill>
-          <a:blip r:embed="rId7"/>
-          <a:stretch>
-            <a:fillRect/>
-          </a:stretch>
-        </p:blipFill>
-        <p:spPr>
-          <a:xfrm>
-            <a:off x="8395444" y="3040228"/>
-            <a:ext cx="3610115" cy="2397600"/>
-          </a:xfrm>
-          <a:prstGeom prst="rect">
-            <a:avLst/>
-          </a:prstGeom>
-        </p:spPr>
-      </p:pic>
-      <p:cxnSp>
-        <p:nvCxnSpPr>
-          <p:cNvPr id="13" name="Straight Connector 12"/>
-          <p:cNvCxnSpPr/>
-          <p:nvPr/>
-        </p:nvCxnSpPr>
-        <p:spPr>
-          <a:xfrm>
-            <a:off x="8133188" y="431816"/>
-            <a:ext cx="0" cy="5064109"/>
-          </a:xfrm>
-          <a:prstGeom prst="line">
-            <a:avLst/>
-          </a:prstGeom>
-          <a:ln w="38100">
-            <a:solidFill>
-              <a:schemeClr val="tx1"/>
-            </a:solidFill>
-          </a:ln>
-        </p:spPr>
-        <p:style>
-          <a:lnRef idx="1">
-            <a:schemeClr val="accent1"/>
-          </a:lnRef>
-          <a:fillRef idx="0">
-            <a:schemeClr val="accent1"/>
-          </a:fillRef>
-          <a:effectRef idx="0">
-            <a:schemeClr val="accent1"/>
-          </a:effectRef>
-          <a:fontRef idx="minor">
-            <a:schemeClr val="tx1"/>
-          </a:fontRef>
-        </p:style>
-      </p:cxnSp>
-      <p:cxnSp>
-        <p:nvCxnSpPr>
-          <p:cNvPr id="18" name="Straight Connector 17"/>
-          <p:cNvCxnSpPr/>
-          <p:nvPr/>
-        </p:nvCxnSpPr>
-        <p:spPr>
-          <a:xfrm>
-            <a:off x="8705850" y="4314825"/>
-            <a:ext cx="3248025" cy="0"/>
-          </a:xfrm>
-          <a:prstGeom prst="line">
-            <a:avLst/>
-          </a:prstGeom>
-          <a:ln>
-            <a:solidFill>
-              <a:schemeClr val="tx1"/>
-            </a:solidFill>
-          </a:ln>
-        </p:spPr>
-        <p:style>
-          <a:lnRef idx="1">
-            <a:schemeClr val="accent1"/>
-          </a:lnRef>
-          <a:fillRef idx="0">
-            <a:schemeClr val="accent1"/>
-          </a:fillRef>
-          <a:effectRef idx="0">
-            <a:schemeClr val="accent1"/>
-          </a:effectRef>
-          <a:fontRef idx="minor">
-            <a:schemeClr val="tx1"/>
-          </a:fontRef>
-        </p:style>
-      </p:cxnSp>
-      <p:sp>
-        <p:nvSpPr>
-          <p:cNvPr id="19" name="Rectangle 18"/>
-          <p:cNvSpPr/>
-          <p:nvPr/>
-        </p:nvSpPr>
-        <p:spPr>
-          <a:xfrm>
-            <a:off x="2900254" y="5688094"/>
-            <a:ext cx="6025496" cy="369332"/>
-          </a:xfrm>
-          <a:prstGeom prst="rect">
-            <a:avLst/>
-          </a:prstGeom>
-        </p:spPr>
-        <p:txBody>
-          <a:bodyPr wrap="none">
-            <a:spAutoFit/>
-          </a:bodyPr>
-          <a:lstStyle/>
-          <a:p>
-            <a:r>
-              <a:rPr lang="en-US" altLang="ko-KR" b="1" dirty="0">
-                <a:latin typeface="맑은 고딕" panose="020B0503020000020004" pitchFamily="50" charset="-127"/>
-                <a:cs typeface="Times New Roman" panose="02020603050405020304" pitchFamily="18" charset="0"/>
-              </a:rPr>
-              <a:t>Figure </a:t>
-            </a:r>
-            <a:r>
-              <a:rPr lang="en-US" altLang="ko-KR" b="1" dirty="0" smtClean="0">
-                <a:latin typeface="맑은 고딕" panose="020B0503020000020004" pitchFamily="50" charset="-127"/>
-                <a:cs typeface="Times New Roman" panose="02020603050405020304" pitchFamily="18" charset="0"/>
-              </a:rPr>
-              <a:t>8. Line Chart Version of Figure 6 and Figure 7</a:t>
-            </a:r>
-            <a:endParaRPr lang="ko-KR" altLang="en-US" dirty="0"/>
-          </a:p>
-        </p:txBody>
-      </p:sp>
-    </p:spTree>
-    <p:extLst>
-      <p:ext uri="{BB962C8B-B14F-4D97-AF65-F5344CB8AC3E}">
-        <p14:creationId xmlns:p14="http://schemas.microsoft.com/office/powerpoint/2010/main" val="7512396"/>
       </p:ext>
     </p:extLst>
   </p:cSld>

</xml_diff>

<commit_message>
modify: minor revision of paper
</commit_message>
<xml_diff>
--- a/WPCN/for_final_paper.pptx
+++ b/WPCN/for_final_paper.pptx
@@ -256,7 +256,7 @@
           <a:p>
             <a:fld id="{7DEA4731-64EB-4CE7-B59A-17BBA9BDC1E6}" type="datetimeFigureOut">
               <a:rPr lang="ko-KR" altLang="en-US" smtClean="0"/>
-              <a:t>2020-07-10</a:t>
+              <a:t>2020-07-13</a:t>
             </a:fld>
             <a:endParaRPr lang="ko-KR" altLang="en-US"/>
           </a:p>
@@ -426,7 +426,7 @@
           <a:p>
             <a:fld id="{7DEA4731-64EB-4CE7-B59A-17BBA9BDC1E6}" type="datetimeFigureOut">
               <a:rPr lang="ko-KR" altLang="en-US" smtClean="0"/>
-              <a:t>2020-07-10</a:t>
+              <a:t>2020-07-13</a:t>
             </a:fld>
             <a:endParaRPr lang="ko-KR" altLang="en-US"/>
           </a:p>
@@ -606,7 +606,7 @@
           <a:p>
             <a:fld id="{7DEA4731-64EB-4CE7-B59A-17BBA9BDC1E6}" type="datetimeFigureOut">
               <a:rPr lang="ko-KR" altLang="en-US" smtClean="0"/>
-              <a:t>2020-07-10</a:t>
+              <a:t>2020-07-13</a:t>
             </a:fld>
             <a:endParaRPr lang="ko-KR" altLang="en-US"/>
           </a:p>
@@ -776,7 +776,7 @@
           <a:p>
             <a:fld id="{7DEA4731-64EB-4CE7-B59A-17BBA9BDC1E6}" type="datetimeFigureOut">
               <a:rPr lang="ko-KR" altLang="en-US" smtClean="0"/>
-              <a:t>2020-07-10</a:t>
+              <a:t>2020-07-13</a:t>
             </a:fld>
             <a:endParaRPr lang="ko-KR" altLang="en-US"/>
           </a:p>
@@ -1022,7 +1022,7 @@
           <a:p>
             <a:fld id="{7DEA4731-64EB-4CE7-B59A-17BBA9BDC1E6}" type="datetimeFigureOut">
               <a:rPr lang="ko-KR" altLang="en-US" smtClean="0"/>
-              <a:t>2020-07-10</a:t>
+              <a:t>2020-07-13</a:t>
             </a:fld>
             <a:endParaRPr lang="ko-KR" altLang="en-US"/>
           </a:p>
@@ -1254,7 +1254,7 @@
           <a:p>
             <a:fld id="{7DEA4731-64EB-4CE7-B59A-17BBA9BDC1E6}" type="datetimeFigureOut">
               <a:rPr lang="ko-KR" altLang="en-US" smtClean="0"/>
-              <a:t>2020-07-10</a:t>
+              <a:t>2020-07-13</a:t>
             </a:fld>
             <a:endParaRPr lang="ko-KR" altLang="en-US"/>
           </a:p>
@@ -1621,7 +1621,7 @@
           <a:p>
             <a:fld id="{7DEA4731-64EB-4CE7-B59A-17BBA9BDC1E6}" type="datetimeFigureOut">
               <a:rPr lang="ko-KR" altLang="en-US" smtClean="0"/>
-              <a:t>2020-07-10</a:t>
+              <a:t>2020-07-13</a:t>
             </a:fld>
             <a:endParaRPr lang="ko-KR" altLang="en-US"/>
           </a:p>
@@ -1739,7 +1739,7 @@
           <a:p>
             <a:fld id="{7DEA4731-64EB-4CE7-B59A-17BBA9BDC1E6}" type="datetimeFigureOut">
               <a:rPr lang="ko-KR" altLang="en-US" smtClean="0"/>
-              <a:t>2020-07-10</a:t>
+              <a:t>2020-07-13</a:t>
             </a:fld>
             <a:endParaRPr lang="ko-KR" altLang="en-US"/>
           </a:p>
@@ -1834,7 +1834,7 @@
           <a:p>
             <a:fld id="{7DEA4731-64EB-4CE7-B59A-17BBA9BDC1E6}" type="datetimeFigureOut">
               <a:rPr lang="ko-KR" altLang="en-US" smtClean="0"/>
-              <a:t>2020-07-10</a:t>
+              <a:t>2020-07-13</a:t>
             </a:fld>
             <a:endParaRPr lang="ko-KR" altLang="en-US"/>
           </a:p>
@@ -2111,7 +2111,7 @@
           <a:p>
             <a:fld id="{7DEA4731-64EB-4CE7-B59A-17BBA9BDC1E6}" type="datetimeFigureOut">
               <a:rPr lang="ko-KR" altLang="en-US" smtClean="0"/>
-              <a:t>2020-07-10</a:t>
+              <a:t>2020-07-13</a:t>
             </a:fld>
             <a:endParaRPr lang="ko-KR" altLang="en-US"/>
           </a:p>
@@ -2364,7 +2364,7 @@
           <a:p>
             <a:fld id="{7DEA4731-64EB-4CE7-B59A-17BBA9BDC1E6}" type="datetimeFigureOut">
               <a:rPr lang="ko-KR" altLang="en-US" smtClean="0"/>
-              <a:t>2020-07-10</a:t>
+              <a:t>2020-07-13</a:t>
             </a:fld>
             <a:endParaRPr lang="ko-KR" altLang="en-US"/>
           </a:p>
@@ -2577,7 +2577,7 @@
           <a:p>
             <a:fld id="{7DEA4731-64EB-4CE7-B59A-17BBA9BDC1E6}" type="datetimeFigureOut">
               <a:rPr lang="ko-KR" altLang="en-US" smtClean="0"/>
-              <a:t>2020-07-10</a:t>
+              <a:t>2020-07-13</a:t>
             </a:fld>
             <a:endParaRPr lang="ko-KR" altLang="en-US"/>
           </a:p>
@@ -8854,8 +8854,8 @@
           <a:chExt cx="0" cy="0"/>
         </a:xfrm>
       </p:grpSpPr>
-      <mc:AlternateContent xmlns:mc="http://schemas.openxmlformats.org/markup-compatibility/2006">
-        <mc:Choice xmlns:a14="http://schemas.microsoft.com/office/drawing/2010/main" Requires="a14">
+      <mc:AlternateContent xmlns:mc="http://schemas.openxmlformats.org/markup-compatibility/2006" xmlns:a14="http://schemas.microsoft.com/office/drawing/2010/main">
+        <mc:Choice Requires="a14">
           <p:graphicFrame>
             <p:nvGraphicFramePr>
               <p:cNvPr id="4" name="Table 3"/>
@@ -9140,11 +9140,7 @@
                           </a:pPr>
                           <a:r>
                             <a:rPr lang="en-US" altLang="ko-KR" sz="1800" b="0" baseline="0" smtClean="0"/>
-                            <a:t>Lr </a:t>
-                          </a:r>
-                          <a:r>
-                            <a:rPr lang="en-US" altLang="ko-KR" sz="1800" b="0" baseline="0" smtClean="0"/>
-                            <a:t>:= </a:t>
+                            <a:t>Lr := </a:t>
                           </a:r>
                           <a:r>
                             <a:rPr lang="en-US" altLang="ko-KR" sz="1800" b="0" baseline="0" dirty="0" smtClean="0"/>
@@ -11587,7 +11583,7 @@
             </a:graphic>
           </p:graphicFrame>
         </mc:Choice>
-        <mc:Fallback>
+        <mc:Fallback xmlns="">
           <p:graphicFrame>
             <p:nvGraphicFramePr>
               <p:cNvPr id="4" name="Table 3"/>
@@ -12332,7 +12328,7 @@
         <p:spPr>
           <a:xfrm>
             <a:off x="6963269" y="4215698"/>
-            <a:ext cx="938655" cy="646331"/>
+            <a:ext cx="938655" cy="369332"/>
           </a:xfrm>
           <a:prstGeom prst="rect">
             <a:avLst/>
@@ -12350,22 +12346,7 @@
               <a:rPr lang="en-US" altLang="ko-KR" b="1" dirty="0" smtClean="0"/>
               <a:t>Flatten</a:t>
             </a:r>
-          </a:p>
-          <a:p>
-            <a:pPr algn="ctr"/>
-            <a:r>
-              <a:rPr lang="en-US" altLang="ko-KR" b="1" dirty="0" smtClean="0">
-                <a:solidFill>
-                  <a:srgbClr val="0000FF"/>
-                </a:solidFill>
-              </a:rPr>
-              <a:t>(288)</a:t>
-            </a:r>
-            <a:endParaRPr lang="ko-KR" altLang="en-US" dirty="0">
-              <a:solidFill>
-                <a:srgbClr val="0000FF"/>
-              </a:solidFill>
-            </a:endParaRPr>
+            <a:endParaRPr lang="en-US" altLang="ko-KR" b="1" dirty="0" smtClean="0"/>
           </a:p>
         </p:txBody>
       </p:sp>

</xml_diff>

<commit_message>
add: revise the paper
</commit_message>
<xml_diff>
--- a/WPCN/for_final_paper.pptx
+++ b/WPCN/for_final_paper.pptx
@@ -19,6 +19,7 @@
     <p:sldId id="267" r:id="rId13"/>
     <p:sldId id="268" r:id="rId14"/>
     <p:sldId id="269" r:id="rId15"/>
+    <p:sldId id="271" r:id="rId16"/>
   </p:sldIdLst>
   <p:sldSz cx="12192000" cy="6858000"/>
   <p:notesSz cx="6858000" cy="9144000"/>
@@ -256,7 +257,7 @@
           <a:p>
             <a:fld id="{7DEA4731-64EB-4CE7-B59A-17BBA9BDC1E6}" type="datetimeFigureOut">
               <a:rPr lang="ko-KR" altLang="en-US" smtClean="0"/>
-              <a:t>2020-07-13</a:t>
+              <a:t>2020-07-14</a:t>
             </a:fld>
             <a:endParaRPr lang="ko-KR" altLang="en-US"/>
           </a:p>
@@ -426,7 +427,7 @@
           <a:p>
             <a:fld id="{7DEA4731-64EB-4CE7-B59A-17BBA9BDC1E6}" type="datetimeFigureOut">
               <a:rPr lang="ko-KR" altLang="en-US" smtClean="0"/>
-              <a:t>2020-07-13</a:t>
+              <a:t>2020-07-14</a:t>
             </a:fld>
             <a:endParaRPr lang="ko-KR" altLang="en-US"/>
           </a:p>
@@ -606,7 +607,7 @@
           <a:p>
             <a:fld id="{7DEA4731-64EB-4CE7-B59A-17BBA9BDC1E6}" type="datetimeFigureOut">
               <a:rPr lang="ko-KR" altLang="en-US" smtClean="0"/>
-              <a:t>2020-07-13</a:t>
+              <a:t>2020-07-14</a:t>
             </a:fld>
             <a:endParaRPr lang="ko-KR" altLang="en-US"/>
           </a:p>
@@ -776,7 +777,7 @@
           <a:p>
             <a:fld id="{7DEA4731-64EB-4CE7-B59A-17BBA9BDC1E6}" type="datetimeFigureOut">
               <a:rPr lang="ko-KR" altLang="en-US" smtClean="0"/>
-              <a:t>2020-07-13</a:t>
+              <a:t>2020-07-14</a:t>
             </a:fld>
             <a:endParaRPr lang="ko-KR" altLang="en-US"/>
           </a:p>
@@ -1022,7 +1023,7 @@
           <a:p>
             <a:fld id="{7DEA4731-64EB-4CE7-B59A-17BBA9BDC1E6}" type="datetimeFigureOut">
               <a:rPr lang="ko-KR" altLang="en-US" smtClean="0"/>
-              <a:t>2020-07-13</a:t>
+              <a:t>2020-07-14</a:t>
             </a:fld>
             <a:endParaRPr lang="ko-KR" altLang="en-US"/>
           </a:p>
@@ -1254,7 +1255,7 @@
           <a:p>
             <a:fld id="{7DEA4731-64EB-4CE7-B59A-17BBA9BDC1E6}" type="datetimeFigureOut">
               <a:rPr lang="ko-KR" altLang="en-US" smtClean="0"/>
-              <a:t>2020-07-13</a:t>
+              <a:t>2020-07-14</a:t>
             </a:fld>
             <a:endParaRPr lang="ko-KR" altLang="en-US"/>
           </a:p>
@@ -1621,7 +1622,7 @@
           <a:p>
             <a:fld id="{7DEA4731-64EB-4CE7-B59A-17BBA9BDC1E6}" type="datetimeFigureOut">
               <a:rPr lang="ko-KR" altLang="en-US" smtClean="0"/>
-              <a:t>2020-07-13</a:t>
+              <a:t>2020-07-14</a:t>
             </a:fld>
             <a:endParaRPr lang="ko-KR" altLang="en-US"/>
           </a:p>
@@ -1739,7 +1740,7 @@
           <a:p>
             <a:fld id="{7DEA4731-64EB-4CE7-B59A-17BBA9BDC1E6}" type="datetimeFigureOut">
               <a:rPr lang="ko-KR" altLang="en-US" smtClean="0"/>
-              <a:t>2020-07-13</a:t>
+              <a:t>2020-07-14</a:t>
             </a:fld>
             <a:endParaRPr lang="ko-KR" altLang="en-US"/>
           </a:p>
@@ -1834,7 +1835,7 @@
           <a:p>
             <a:fld id="{7DEA4731-64EB-4CE7-B59A-17BBA9BDC1E6}" type="datetimeFigureOut">
               <a:rPr lang="ko-KR" altLang="en-US" smtClean="0"/>
-              <a:t>2020-07-13</a:t>
+              <a:t>2020-07-14</a:t>
             </a:fld>
             <a:endParaRPr lang="ko-KR" altLang="en-US"/>
           </a:p>
@@ -2111,7 +2112,7 @@
           <a:p>
             <a:fld id="{7DEA4731-64EB-4CE7-B59A-17BBA9BDC1E6}" type="datetimeFigureOut">
               <a:rPr lang="ko-KR" altLang="en-US" smtClean="0"/>
-              <a:t>2020-07-13</a:t>
+              <a:t>2020-07-14</a:t>
             </a:fld>
             <a:endParaRPr lang="ko-KR" altLang="en-US"/>
           </a:p>
@@ -2364,7 +2365,7 @@
           <a:p>
             <a:fld id="{7DEA4731-64EB-4CE7-B59A-17BBA9BDC1E6}" type="datetimeFigureOut">
               <a:rPr lang="ko-KR" altLang="en-US" smtClean="0"/>
-              <a:t>2020-07-13</a:t>
+              <a:t>2020-07-14</a:t>
             </a:fld>
             <a:endParaRPr lang="ko-KR" altLang="en-US"/>
           </a:p>
@@ -2577,7 +2578,7 @@
           <a:p>
             <a:fld id="{7DEA4731-64EB-4CE7-B59A-17BBA9BDC1E6}" type="datetimeFigureOut">
               <a:rPr lang="ko-KR" altLang="en-US" smtClean="0"/>
-              <a:t>2020-07-13</a:t>
+              <a:t>2020-07-14</a:t>
             </a:fld>
             <a:endParaRPr lang="ko-KR" altLang="en-US"/>
           </a:p>
@@ -5607,6 +5608,265 @@
     <p:extLst>
       <p:ext uri="{BB962C8B-B14F-4D97-AF65-F5344CB8AC3E}">
         <p14:creationId xmlns:p14="http://schemas.microsoft.com/office/powerpoint/2010/main" val="3030419403"/>
+      </p:ext>
+    </p:extLst>
+  </p:cSld>
+  <p:clrMapOvr>
+    <a:masterClrMapping/>
+  </p:clrMapOvr>
+</p:sld>
+</file>
+
+<file path=ppt/slides/slide15.xml><?xml version="1.0" encoding="utf-8"?>
+<p:sld xmlns:a="http://schemas.openxmlformats.org/drawingml/2006/main" xmlns:r="http://schemas.openxmlformats.org/officeDocument/2006/relationships" xmlns:p="http://schemas.openxmlformats.org/presentationml/2006/main">
+  <p:cSld>
+    <p:spTree>
+      <p:nvGrpSpPr>
+        <p:cNvPr id="1" name=""/>
+        <p:cNvGrpSpPr/>
+        <p:nvPr/>
+      </p:nvGrpSpPr>
+      <p:grpSpPr>
+        <a:xfrm>
+          <a:off x="0" y="0"/>
+          <a:ext cx="0" cy="0"/>
+          <a:chOff x="0" y="0"/>
+          <a:chExt cx="0" cy="0"/>
+        </a:xfrm>
+      </p:grpSpPr>
+      <p:sp>
+        <p:nvSpPr>
+          <p:cNvPr id="19" name="Rectangle 18"/>
+          <p:cNvSpPr/>
+          <p:nvPr/>
+        </p:nvSpPr>
+        <p:spPr>
+          <a:xfrm>
+            <a:off x="323433" y="5143148"/>
+            <a:ext cx="10896124" cy="369332"/>
+          </a:xfrm>
+          <a:prstGeom prst="rect">
+            <a:avLst/>
+          </a:prstGeom>
+        </p:spPr>
+        <p:txBody>
+          <a:bodyPr wrap="none">
+            <a:spAutoFit/>
+          </a:bodyPr>
+          <a:lstStyle/>
+          <a:p>
+            <a:pPr algn="ctr"/>
+            <a:r>
+              <a:rPr lang="en-US" altLang="ko-KR" b="1" dirty="0">
+                <a:latin typeface="맑은 고딕" panose="020B0503020000020004" pitchFamily="50" charset="-127"/>
+                <a:cs typeface="Times New Roman" panose="02020603050405020304" pitchFamily="18" charset="0"/>
+              </a:rPr>
+              <a:t>Figure </a:t>
+            </a:r>
+            <a:r>
+              <a:rPr lang="en-US" altLang="ko-KR" b="1" dirty="0" smtClean="0">
+                <a:latin typeface="맑은 고딕" panose="020B0503020000020004" pitchFamily="50" charset="-127"/>
+                <a:cs typeface="Times New Roman" panose="02020603050405020304" pitchFamily="18" charset="0"/>
+              </a:rPr>
+              <a:t>9. Comparison of CT.RATE (%) of our methodology and </a:t>
+            </a:r>
+            <a:r>
+              <a:rPr lang="en-US" altLang="ko-KR" b="1" smtClean="0">
+                <a:latin typeface="맑은 고딕" panose="020B0503020000020004" pitchFamily="50" charset="-127"/>
+                <a:cs typeface="Times New Roman" panose="02020603050405020304" pitchFamily="18" charset="0"/>
+              </a:rPr>
+              <a:t>the methodology in </a:t>
+            </a:r>
+            <a:r>
+              <a:rPr lang="en-US" altLang="ko-KR" b="1" dirty="0" smtClean="0">
+                <a:latin typeface="맑은 고딕" panose="020B0503020000020004" pitchFamily="50" charset="-127"/>
+                <a:cs typeface="Times New Roman" panose="02020603050405020304" pitchFamily="18" charset="0"/>
+              </a:rPr>
+              <a:t>original paper</a:t>
+            </a:r>
+            <a:endParaRPr lang="ko-KR" altLang="en-US" dirty="0"/>
+          </a:p>
+        </p:txBody>
+      </p:sp>
+      <p:pic>
+        <p:nvPicPr>
+          <p:cNvPr id="2" name="Picture 1"/>
+          <p:cNvPicPr>
+            <a:picLocks noChangeAspect="1"/>
+          </p:cNvPicPr>
+          <p:nvPr/>
+        </p:nvPicPr>
+        <p:blipFill rotWithShape="1">
+          <a:blip r:embed="rId2"/>
+          <a:srcRect b="90995"/>
+          <a:stretch/>
+        </p:blipFill>
+        <p:spPr>
+          <a:xfrm>
+            <a:off x="737532" y="518363"/>
+            <a:ext cx="10067925" cy="439141"/>
+          </a:xfrm>
+          <a:prstGeom prst="rect">
+            <a:avLst/>
+          </a:prstGeom>
+        </p:spPr>
+      </p:pic>
+      <p:pic>
+        <p:nvPicPr>
+          <p:cNvPr id="9" name="Picture 8"/>
+          <p:cNvPicPr>
+            <a:picLocks noChangeAspect="1"/>
+          </p:cNvPicPr>
+          <p:nvPr/>
+        </p:nvPicPr>
+        <p:blipFill rotWithShape="1">
+          <a:blip r:embed="rId2"/>
+          <a:srcRect t="9587" r="47643" b="10232"/>
+          <a:stretch/>
+        </p:blipFill>
+        <p:spPr>
+          <a:xfrm>
+            <a:off x="1086645" y="1443790"/>
+            <a:ext cx="4096241" cy="3038630"/>
+          </a:xfrm>
+          <a:prstGeom prst="rect">
+            <a:avLst/>
+          </a:prstGeom>
+        </p:spPr>
+      </p:pic>
+      <p:pic>
+        <p:nvPicPr>
+          <p:cNvPr id="10" name="Picture 9"/>
+          <p:cNvPicPr>
+            <a:picLocks noChangeAspect="1"/>
+          </p:cNvPicPr>
+          <p:nvPr/>
+        </p:nvPicPr>
+        <p:blipFill rotWithShape="1">
+          <a:blip r:embed="rId2"/>
+          <a:srcRect l="33018" t="90625" r="31370" b="493"/>
+          <a:stretch/>
+        </p:blipFill>
+        <p:spPr>
+          <a:xfrm>
+            <a:off x="1342059" y="4596215"/>
+            <a:ext cx="3585411" cy="433137"/>
+          </a:xfrm>
+          <a:prstGeom prst="rect">
+            <a:avLst/>
+          </a:prstGeom>
+        </p:spPr>
+      </p:pic>
+      <p:pic>
+        <p:nvPicPr>
+          <p:cNvPr id="11" name="Picture 10"/>
+          <p:cNvPicPr>
+            <a:picLocks noChangeAspect="1"/>
+          </p:cNvPicPr>
+          <p:nvPr/>
+        </p:nvPicPr>
+        <p:blipFill rotWithShape="1">
+          <a:blip r:embed="rId2"/>
+          <a:srcRect l="53459" t="9995" b="9331"/>
+          <a:stretch/>
+        </p:blipFill>
+        <p:spPr>
+          <a:xfrm>
+            <a:off x="6882063" y="1443791"/>
+            <a:ext cx="3663725" cy="3038630"/>
+          </a:xfrm>
+          <a:prstGeom prst="rect">
+            <a:avLst/>
+          </a:prstGeom>
+        </p:spPr>
+      </p:pic>
+      <p:pic>
+        <p:nvPicPr>
+          <p:cNvPr id="12" name="Picture 11"/>
+          <p:cNvPicPr>
+            <a:picLocks noChangeAspect="1"/>
+          </p:cNvPicPr>
+          <p:nvPr/>
+        </p:nvPicPr>
+        <p:blipFill rotWithShape="1">
+          <a:blip r:embed="rId2"/>
+          <a:srcRect l="33018" t="90625" r="31370" b="493"/>
+          <a:stretch/>
+        </p:blipFill>
+        <p:spPr>
+          <a:xfrm>
+            <a:off x="6884612" y="4596215"/>
+            <a:ext cx="3585411" cy="433137"/>
+          </a:xfrm>
+          <a:prstGeom prst="rect">
+            <a:avLst/>
+          </a:prstGeom>
+        </p:spPr>
+      </p:pic>
+      <p:sp>
+        <p:nvSpPr>
+          <p:cNvPr id="8" name="TextBox 7"/>
+          <p:cNvSpPr txBox="1"/>
+          <p:nvPr/>
+        </p:nvSpPr>
+        <p:spPr>
+          <a:xfrm>
+            <a:off x="2696182" y="1071299"/>
+            <a:ext cx="877163" cy="369332"/>
+          </a:xfrm>
+          <a:prstGeom prst="rect">
+            <a:avLst/>
+          </a:prstGeom>
+          <a:noFill/>
+        </p:spPr>
+        <p:txBody>
+          <a:bodyPr wrap="none" rtlCol="0">
+            <a:spAutoFit/>
+          </a:bodyPr>
+          <a:lstStyle/>
+          <a:p>
+            <a:r>
+              <a:rPr lang="en-US" altLang="ko-KR" dirty="0" smtClean="0"/>
+              <a:t>6 WDs</a:t>
+            </a:r>
+            <a:endParaRPr lang="ko-KR" altLang="en-US" dirty="0"/>
+          </a:p>
+        </p:txBody>
+      </p:sp>
+      <p:sp>
+        <p:nvSpPr>
+          <p:cNvPr id="14" name="TextBox 13"/>
+          <p:cNvSpPr txBox="1"/>
+          <p:nvPr/>
+        </p:nvSpPr>
+        <p:spPr>
+          <a:xfrm>
+            <a:off x="8118413" y="1071299"/>
+            <a:ext cx="1003801" cy="369332"/>
+          </a:xfrm>
+          <a:prstGeom prst="rect">
+            <a:avLst/>
+          </a:prstGeom>
+          <a:noFill/>
+        </p:spPr>
+        <p:txBody>
+          <a:bodyPr wrap="none" rtlCol="0">
+            <a:spAutoFit/>
+          </a:bodyPr>
+          <a:lstStyle/>
+          <a:p>
+            <a:r>
+              <a:rPr lang="en-US" altLang="ko-KR" dirty="0" smtClean="0"/>
+              <a:t>10 WDs</a:t>
+            </a:r>
+            <a:endParaRPr lang="ko-KR" altLang="en-US" dirty="0"/>
+          </a:p>
+        </p:txBody>
+      </p:sp>
+    </p:spTree>
+    <p:extLst>
+      <p:ext uri="{BB962C8B-B14F-4D97-AF65-F5344CB8AC3E}">
+        <p14:creationId xmlns:p14="http://schemas.microsoft.com/office/powerpoint/2010/main" val="2269225350"/>
       </p:ext>
     </p:extLst>
   </p:cSld>
@@ -12346,7 +12606,6 @@
               <a:rPr lang="en-US" altLang="ko-KR" b="1" dirty="0" smtClean="0"/>
               <a:t>Flatten</a:t>
             </a:r>
-            <a:endParaRPr lang="en-US" altLang="ko-KR" b="1" dirty="0" smtClean="0"/>
           </a:p>
         </p:txBody>
       </p:sp>

</xml_diff>

<commit_message>
modify: FINAL REVISION OF PAPER FOR WPCN
</commit_message>
<xml_diff>
--- a/WPCN/for_final_paper.pptx
+++ b/WPCN/for_final_paper.pptx
@@ -257,7 +257,7 @@
           <a:p>
             <a:fld id="{7DEA4731-64EB-4CE7-B59A-17BBA9BDC1E6}" type="datetimeFigureOut">
               <a:rPr lang="ko-KR" altLang="en-US" smtClean="0"/>
-              <a:t>2020-07-14</a:t>
+              <a:t>2020-07-16</a:t>
             </a:fld>
             <a:endParaRPr lang="ko-KR" altLang="en-US"/>
           </a:p>
@@ -427,7 +427,7 @@
           <a:p>
             <a:fld id="{7DEA4731-64EB-4CE7-B59A-17BBA9BDC1E6}" type="datetimeFigureOut">
               <a:rPr lang="ko-KR" altLang="en-US" smtClean="0"/>
-              <a:t>2020-07-14</a:t>
+              <a:t>2020-07-16</a:t>
             </a:fld>
             <a:endParaRPr lang="ko-KR" altLang="en-US"/>
           </a:p>
@@ -607,7 +607,7 @@
           <a:p>
             <a:fld id="{7DEA4731-64EB-4CE7-B59A-17BBA9BDC1E6}" type="datetimeFigureOut">
               <a:rPr lang="ko-KR" altLang="en-US" smtClean="0"/>
-              <a:t>2020-07-14</a:t>
+              <a:t>2020-07-16</a:t>
             </a:fld>
             <a:endParaRPr lang="ko-KR" altLang="en-US"/>
           </a:p>
@@ -777,7 +777,7 @@
           <a:p>
             <a:fld id="{7DEA4731-64EB-4CE7-B59A-17BBA9BDC1E6}" type="datetimeFigureOut">
               <a:rPr lang="ko-KR" altLang="en-US" smtClean="0"/>
-              <a:t>2020-07-14</a:t>
+              <a:t>2020-07-16</a:t>
             </a:fld>
             <a:endParaRPr lang="ko-KR" altLang="en-US"/>
           </a:p>
@@ -1023,7 +1023,7 @@
           <a:p>
             <a:fld id="{7DEA4731-64EB-4CE7-B59A-17BBA9BDC1E6}" type="datetimeFigureOut">
               <a:rPr lang="ko-KR" altLang="en-US" smtClean="0"/>
-              <a:t>2020-07-14</a:t>
+              <a:t>2020-07-16</a:t>
             </a:fld>
             <a:endParaRPr lang="ko-KR" altLang="en-US"/>
           </a:p>
@@ -1255,7 +1255,7 @@
           <a:p>
             <a:fld id="{7DEA4731-64EB-4CE7-B59A-17BBA9BDC1E6}" type="datetimeFigureOut">
               <a:rPr lang="ko-KR" altLang="en-US" smtClean="0"/>
-              <a:t>2020-07-14</a:t>
+              <a:t>2020-07-16</a:t>
             </a:fld>
             <a:endParaRPr lang="ko-KR" altLang="en-US"/>
           </a:p>
@@ -1622,7 +1622,7 @@
           <a:p>
             <a:fld id="{7DEA4731-64EB-4CE7-B59A-17BBA9BDC1E6}" type="datetimeFigureOut">
               <a:rPr lang="ko-KR" altLang="en-US" smtClean="0"/>
-              <a:t>2020-07-14</a:t>
+              <a:t>2020-07-16</a:t>
             </a:fld>
             <a:endParaRPr lang="ko-KR" altLang="en-US"/>
           </a:p>
@@ -1740,7 +1740,7 @@
           <a:p>
             <a:fld id="{7DEA4731-64EB-4CE7-B59A-17BBA9BDC1E6}" type="datetimeFigureOut">
               <a:rPr lang="ko-KR" altLang="en-US" smtClean="0"/>
-              <a:t>2020-07-14</a:t>
+              <a:t>2020-07-16</a:t>
             </a:fld>
             <a:endParaRPr lang="ko-KR" altLang="en-US"/>
           </a:p>
@@ -1835,7 +1835,7 @@
           <a:p>
             <a:fld id="{7DEA4731-64EB-4CE7-B59A-17BBA9BDC1E6}" type="datetimeFigureOut">
               <a:rPr lang="ko-KR" altLang="en-US" smtClean="0"/>
-              <a:t>2020-07-14</a:t>
+              <a:t>2020-07-16</a:t>
             </a:fld>
             <a:endParaRPr lang="ko-KR" altLang="en-US"/>
           </a:p>
@@ -2112,7 +2112,7 @@
           <a:p>
             <a:fld id="{7DEA4731-64EB-4CE7-B59A-17BBA9BDC1E6}" type="datetimeFigureOut">
               <a:rPr lang="ko-KR" altLang="en-US" smtClean="0"/>
-              <a:t>2020-07-14</a:t>
+              <a:t>2020-07-16</a:t>
             </a:fld>
             <a:endParaRPr lang="ko-KR" altLang="en-US"/>
           </a:p>
@@ -2365,7 +2365,7 @@
           <a:p>
             <a:fld id="{7DEA4731-64EB-4CE7-B59A-17BBA9BDC1E6}" type="datetimeFigureOut">
               <a:rPr lang="ko-KR" altLang="en-US" smtClean="0"/>
-              <a:t>2020-07-14</a:t>
+              <a:t>2020-07-16</a:t>
             </a:fld>
             <a:endParaRPr lang="ko-KR" altLang="en-US"/>
           </a:p>
@@ -2578,7 +2578,7 @@
           <a:p>
             <a:fld id="{7DEA4731-64EB-4CE7-B59A-17BBA9BDC1E6}" type="datetimeFigureOut">
               <a:rPr lang="ko-KR" altLang="en-US" smtClean="0"/>
-              <a:t>2020-07-14</a:t>
+              <a:t>2020-07-16</a:t>
             </a:fld>
             <a:endParaRPr lang="ko-KR" altLang="en-US"/>
           </a:p>
@@ -13170,6 +13170,475 @@
           </a:p>
         </p:txBody>
       </p:sp>
+      <p:sp>
+        <p:nvSpPr>
+          <p:cNvPr id="2" name="TextBox 1"/>
+          <p:cNvSpPr txBox="1"/>
+          <p:nvPr/>
+        </p:nvSpPr>
+        <p:spPr>
+          <a:xfrm>
+            <a:off x="660606" y="1262105"/>
+            <a:ext cx="1154419" cy="369332"/>
+          </a:xfrm>
+          <a:prstGeom prst="rect">
+            <a:avLst/>
+          </a:prstGeom>
+          <a:noFill/>
+        </p:spPr>
+        <p:txBody>
+          <a:bodyPr wrap="none" rtlCol="0">
+            <a:spAutoFit/>
+          </a:bodyPr>
+          <a:lstStyle/>
+          <a:p>
+            <a:r>
+              <a:rPr lang="en-US" altLang="ko-KR" dirty="0"/>
+              <a:t>b</a:t>
+            </a:r>
+            <a:r>
+              <a:rPr lang="en-US" altLang="ko-KR" dirty="0" smtClean="0"/>
+              <a:t>ased on</a:t>
+            </a:r>
+            <a:endParaRPr lang="ko-KR" altLang="en-US" dirty="0"/>
+          </a:p>
+        </p:txBody>
+      </p:sp>
+      <mc:AlternateContent xmlns:mc="http://schemas.openxmlformats.org/markup-compatibility/2006">
+        <mc:Choice xmlns:a14="http://schemas.microsoft.com/office/drawing/2010/main" Requires="a14">
+          <p:sp>
+            <p:nvSpPr>
+              <p:cNvPr id="3" name="Rectangle 2"/>
+              <p:cNvSpPr/>
+              <p:nvPr/>
+            </p:nvSpPr>
+            <p:spPr>
+              <a:xfrm>
+                <a:off x="212629" y="1589552"/>
+                <a:ext cx="1956433" cy="634789"/>
+              </a:xfrm>
+              <a:prstGeom prst="rect">
+                <a:avLst/>
+              </a:prstGeom>
+            </p:spPr>
+            <p:txBody>
+              <a:bodyPr wrap="none">
+                <a:spAutoFit/>
+              </a:bodyPr>
+              <a:lstStyle/>
+              <a:p>
+                <a14:m>
+                  <m:oMathPara xmlns:m="http://schemas.openxmlformats.org/officeDocument/2006/math">
+                    <m:oMathParaPr>
+                      <m:jc m:val="centerGroup"/>
+                    </m:oMathParaPr>
+                    <m:oMath xmlns:m="http://schemas.openxmlformats.org/officeDocument/2006/math">
+                      <m:eqArr>
+                        <m:eqArrPr>
+                          <m:ctrlPr>
+                            <a:rPr lang="ko-KR" altLang="en-US" i="1" smtClean="0">
+                              <a:latin typeface="Cambria Math" panose="02040503050406030204" pitchFamily="18" charset="0"/>
+                            </a:rPr>
+                          </m:ctrlPr>
+                        </m:eqArrPr>
+                        <m:e>
+                          <m:r>
+                            <a:rPr lang="en-US" altLang="ko-KR" i="1"/>
+                            <m:t>𝑊𝐷𝑃</m:t>
+                          </m:r>
+                          <m:sSub>
+                            <m:sSubPr>
+                              <m:ctrlPr>
+                                <a:rPr lang="ko-KR" altLang="en-US" i="1"/>
+                              </m:ctrlPr>
+                            </m:sSubPr>
+                            <m:e>
+                              <m:r>
+                                <a:rPr lang="en-US" altLang="ko-KR" i="1"/>
+                                <m:t>𝑀</m:t>
+                              </m:r>
+                            </m:e>
+                            <m:sub>
+                              <m:r>
+                                <a:rPr lang="en-US" altLang="ko-KR" i="1"/>
+                                <m:t>𝑖</m:t>
+                              </m:r>
+                            </m:sub>
+                          </m:sSub>
+                          <m:d>
+                            <m:dPr>
+                              <m:ctrlPr>
+                                <a:rPr lang="ko-KR" altLang="en-US" i="1"/>
+                              </m:ctrlPr>
+                            </m:dPr>
+                            <m:e>
+                              <m:r>
+                                <a:rPr lang="en-US" altLang="ko-KR" i="1"/>
+                                <m:t>𝑁</m:t>
+                              </m:r>
+                              <m:r>
+                                <a:rPr lang="en-US" altLang="ko-KR" i="1"/>
+                                <m:t>, </m:t>
+                              </m:r>
+                              <m:r>
+                                <a:rPr lang="en-US" altLang="ko-KR" i="1"/>
+                                <m:t>𝑀</m:t>
+                              </m:r>
+                              <m:r>
+                                <a:rPr lang="en-US" altLang="ko-KR" i="1"/>
+                                <m:t>, </m:t>
+                              </m:r>
+                              <m:r>
+                                <a:rPr lang="en-US" altLang="ko-KR" i="1"/>
+                                <m:t>𝐾</m:t>
+                              </m:r>
+                            </m:e>
+                          </m:d>
+                        </m:e>
+                        <m:e>
+                          <m:r>
+                            <a:rPr lang="en-US" altLang="ko-KR" b="0" i="0" smtClean="0">
+                              <a:latin typeface="Cambria Math" panose="02040503050406030204" pitchFamily="18" charset="0"/>
+                            </a:rPr>
+                            <m:t>(</m:t>
+                          </m:r>
+                          <m:r>
+                            <a:rPr lang="ko-KR" altLang="en-US">
+                              <a:latin typeface="Cambria Math" panose="02040503050406030204" pitchFamily="18" charset="0"/>
+                            </a:rPr>
+                            <m:t>0≤</m:t>
+                          </m:r>
+                          <m:r>
+                            <a:rPr lang="ko-KR" altLang="en-US" i="1">
+                              <a:latin typeface="Cambria Math" panose="02040503050406030204" pitchFamily="18" charset="0"/>
+                            </a:rPr>
+                            <m:t>𝑖</m:t>
+                          </m:r>
+                          <m:r>
+                            <a:rPr lang="ko-KR" altLang="en-US">
+                              <a:latin typeface="Cambria Math" panose="02040503050406030204" pitchFamily="18" charset="0"/>
+                            </a:rPr>
+                            <m:t>&lt;</m:t>
+                          </m:r>
+                          <m:sSub>
+                            <m:sSubPr>
+                              <m:ctrlPr>
+                                <a:rPr lang="ko-KR" altLang="en-US" i="1">
+                                  <a:latin typeface="Cambria Math" panose="02040503050406030204" pitchFamily="18" charset="0"/>
+                                </a:rPr>
+                              </m:ctrlPr>
+                            </m:sSubPr>
+                            <m:e>
+                              <m:r>
+                                <a:rPr lang="ko-KR" altLang="en-US" i="1">
+                                  <a:latin typeface="Cambria Math" panose="02040503050406030204" pitchFamily="18" charset="0"/>
+                                </a:rPr>
+                                <m:t>𝑚</m:t>
+                              </m:r>
+                            </m:e>
+                            <m:sub>
+                              <m:r>
+                                <a:rPr lang="ko-KR" altLang="en-US">
+                                  <a:latin typeface="Cambria Math" panose="02040503050406030204" pitchFamily="18" charset="0"/>
+                                </a:rPr>
+                                <m:t>1</m:t>
+                              </m:r>
+                            </m:sub>
+                          </m:sSub>
+                          <m:r>
+                            <a:rPr lang="en-US" altLang="ko-KR" b="0" i="1" smtClean="0">
+                              <a:latin typeface="Cambria Math" panose="02040503050406030204" pitchFamily="18" charset="0"/>
+                            </a:rPr>
+                            <m:t>)</m:t>
+                          </m:r>
+                        </m:e>
+                      </m:eqArr>
+                    </m:oMath>
+                  </m:oMathPara>
+                </a14:m>
+                <a:endParaRPr lang="ko-KR" altLang="en-US" dirty="0"/>
+              </a:p>
+            </p:txBody>
+          </p:sp>
+        </mc:Choice>
+        <mc:Fallback>
+          <p:sp>
+            <p:nvSpPr>
+              <p:cNvPr id="3" name="Rectangle 2"/>
+              <p:cNvSpPr>
+                <a:spLocks noRot="1" noChangeAspect="1" noMove="1" noResize="1" noEditPoints="1" noAdjustHandles="1" noChangeArrowheads="1" noChangeShapeType="1" noTextEdit="1"/>
+              </p:cNvSpPr>
+              <p:nvPr/>
+            </p:nvSpPr>
+            <p:spPr>
+              <a:xfrm>
+                <a:off x="212629" y="1589552"/>
+                <a:ext cx="1956433" cy="634789"/>
+              </a:xfrm>
+              <a:prstGeom prst="rect">
+                <a:avLst/>
+              </a:prstGeom>
+              <a:blipFill>
+                <a:blip r:embed="rId2"/>
+                <a:stretch>
+                  <a:fillRect/>
+                </a:stretch>
+              </a:blipFill>
+            </p:spPr>
+            <p:txBody>
+              <a:bodyPr/>
+              <a:lstStyle/>
+              <a:p>
+                <a:r>
+                  <a:rPr lang="ko-KR" altLang="en-US">
+                    <a:noFill/>
+                  </a:rPr>
+                  <a:t> </a:t>
+                </a:r>
+              </a:p>
+            </p:txBody>
+          </p:sp>
+        </mc:Fallback>
+      </mc:AlternateContent>
+      <p:sp>
+        <p:nvSpPr>
+          <p:cNvPr id="33" name="TextBox 32"/>
+          <p:cNvSpPr txBox="1"/>
+          <p:nvPr/>
+        </p:nvSpPr>
+        <p:spPr>
+          <a:xfrm>
+            <a:off x="10619799" y="1235324"/>
+            <a:ext cx="1154419" cy="369332"/>
+          </a:xfrm>
+          <a:prstGeom prst="rect">
+            <a:avLst/>
+          </a:prstGeom>
+          <a:noFill/>
+        </p:spPr>
+        <p:txBody>
+          <a:bodyPr wrap="none" rtlCol="0">
+            <a:spAutoFit/>
+          </a:bodyPr>
+          <a:lstStyle/>
+          <a:p>
+            <a:r>
+              <a:rPr lang="en-US" altLang="ko-KR" dirty="0"/>
+              <a:t>b</a:t>
+            </a:r>
+            <a:r>
+              <a:rPr lang="en-US" altLang="ko-KR" dirty="0" smtClean="0"/>
+              <a:t>ased on</a:t>
+            </a:r>
+            <a:endParaRPr lang="ko-KR" altLang="en-US" dirty="0"/>
+          </a:p>
+        </p:txBody>
+      </p:sp>
+      <mc:AlternateContent xmlns:mc="http://schemas.openxmlformats.org/markup-compatibility/2006">
+        <mc:Choice xmlns:a14="http://schemas.microsoft.com/office/drawing/2010/main" Requires="a14">
+          <p:sp>
+            <p:nvSpPr>
+              <p:cNvPr id="37" name="Rectangle 36"/>
+              <p:cNvSpPr/>
+              <p:nvPr/>
+            </p:nvSpPr>
+            <p:spPr>
+              <a:xfrm>
+                <a:off x="10448039" y="1589552"/>
+                <a:ext cx="1566776" cy="627416"/>
+              </a:xfrm>
+              <a:prstGeom prst="rect">
+                <a:avLst/>
+              </a:prstGeom>
+            </p:spPr>
+            <p:txBody>
+              <a:bodyPr wrap="none">
+                <a:spAutoFit/>
+              </a:bodyPr>
+              <a:lstStyle/>
+              <a:p>
+                <a14:m>
+                  <m:oMathPara xmlns:m="http://schemas.openxmlformats.org/officeDocument/2006/math">
+                    <m:oMathParaPr>
+                      <m:jc m:val="centerGroup"/>
+                    </m:oMathParaPr>
+                    <m:oMath xmlns:m="http://schemas.openxmlformats.org/officeDocument/2006/math">
+                      <m:eqArr>
+                        <m:eqArrPr>
+                          <m:ctrlPr>
+                            <a:rPr lang="ko-KR" altLang="en-US" i="1" smtClean="0">
+                              <a:latin typeface="Cambria Math" panose="02040503050406030204" pitchFamily="18" charset="0"/>
+                            </a:rPr>
+                          </m:ctrlPr>
+                        </m:eqArrPr>
+                        <m:e>
+                          <m:r>
+                            <a:rPr lang="ko-KR" altLang="en-US" i="1">
+                              <a:latin typeface="Cambria Math" panose="02040503050406030204" pitchFamily="18" charset="0"/>
+                            </a:rPr>
+                            <m:t>𝑇</m:t>
+                          </m:r>
+                          <m:sSub>
+                            <m:sSubPr>
+                              <m:ctrlPr>
+                                <a:rPr lang="ko-KR" altLang="en-US" i="1">
+                                  <a:latin typeface="Cambria Math" panose="02040503050406030204" pitchFamily="18" charset="0"/>
+                                </a:rPr>
+                              </m:ctrlPr>
+                            </m:sSubPr>
+                            <m:e>
+                              <m:r>
+                                <a:rPr lang="ko-KR" altLang="en-US" i="1">
+                                  <a:latin typeface="Cambria Math" panose="02040503050406030204" pitchFamily="18" charset="0"/>
+                                </a:rPr>
+                                <m:t>𝑀</m:t>
+                              </m:r>
+                            </m:e>
+                            <m:sub>
+                              <m:r>
+                                <a:rPr lang="ko-KR" altLang="en-US" i="1">
+                                  <a:latin typeface="Cambria Math" panose="02040503050406030204" pitchFamily="18" charset="0"/>
+                                </a:rPr>
+                                <m:t>𝑖</m:t>
+                              </m:r>
+                            </m:sub>
+                          </m:sSub>
+                          <m:r>
+                            <a:rPr lang="ko-KR" altLang="en-US">
+                              <a:latin typeface="Cambria Math" panose="02040503050406030204" pitchFamily="18" charset="0"/>
+                            </a:rPr>
+                            <m:t>(</m:t>
+                          </m:r>
+                          <m:r>
+                            <a:rPr lang="ko-KR" altLang="en-US" i="1">
+                              <a:latin typeface="Cambria Math" panose="02040503050406030204" pitchFamily="18" charset="0"/>
+                            </a:rPr>
+                            <m:t>𝑁</m:t>
+                          </m:r>
+                          <m:r>
+                            <a:rPr lang="ko-KR" altLang="en-US">
+                              <a:latin typeface="Cambria Math" panose="02040503050406030204" pitchFamily="18" charset="0"/>
+                            </a:rPr>
+                            <m:t>, </m:t>
+                          </m:r>
+                          <m:r>
+                            <a:rPr lang="ko-KR" altLang="en-US" i="1">
+                              <a:latin typeface="Cambria Math" panose="02040503050406030204" pitchFamily="18" charset="0"/>
+                            </a:rPr>
+                            <m:t>𝑀</m:t>
+                          </m:r>
+                          <m:r>
+                            <a:rPr lang="ko-KR" altLang="en-US">
+                              <a:latin typeface="Cambria Math" panose="02040503050406030204" pitchFamily="18" charset="0"/>
+                            </a:rPr>
+                            <m:t>)</m:t>
+                          </m:r>
+                        </m:e>
+                        <m:e>
+                          <m:r>
+                            <a:rPr lang="en-US" altLang="ko-KR" b="0" i="0" smtClean="0">
+                              <a:latin typeface="Cambria Math" panose="02040503050406030204" pitchFamily="18" charset="0"/>
+                            </a:rPr>
+                            <m:t>(</m:t>
+                          </m:r>
+                          <m:r>
+                            <a:rPr lang="ko-KR" altLang="en-US">
+                              <a:latin typeface="Cambria Math" panose="02040503050406030204" pitchFamily="18" charset="0"/>
+                            </a:rPr>
+                            <m:t>0≤</m:t>
+                          </m:r>
+                          <m:r>
+                            <a:rPr lang="ko-KR" altLang="en-US" i="1">
+                              <a:latin typeface="Cambria Math" panose="02040503050406030204" pitchFamily="18" charset="0"/>
+                            </a:rPr>
+                            <m:t>𝑖</m:t>
+                          </m:r>
+                          <m:r>
+                            <a:rPr lang="ko-KR" altLang="en-US">
+                              <a:latin typeface="Cambria Math" panose="02040503050406030204" pitchFamily="18" charset="0"/>
+                            </a:rPr>
+                            <m:t>&lt;</m:t>
+                          </m:r>
+                          <m:sSub>
+                            <m:sSubPr>
+                              <m:ctrlPr>
+                                <a:rPr lang="ko-KR" altLang="en-US" i="1">
+                                  <a:latin typeface="Cambria Math" panose="02040503050406030204" pitchFamily="18" charset="0"/>
+                                </a:rPr>
+                              </m:ctrlPr>
+                            </m:sSubPr>
+                            <m:e>
+                              <m:r>
+                                <a:rPr lang="ko-KR" altLang="en-US" i="1">
+                                  <a:latin typeface="Cambria Math" panose="02040503050406030204" pitchFamily="18" charset="0"/>
+                                </a:rPr>
+                                <m:t>𝑚</m:t>
+                              </m:r>
+                            </m:e>
+                            <m:sub>
+                              <m:r>
+                                <a:rPr lang="ko-KR" altLang="en-US">
+                                  <a:latin typeface="Cambria Math" panose="02040503050406030204" pitchFamily="18" charset="0"/>
+                                </a:rPr>
+                                <m:t>1</m:t>
+                              </m:r>
+                            </m:sub>
+                          </m:sSub>
+                          <m:r>
+                            <a:rPr lang="en-US" altLang="ko-KR" b="0" i="1" smtClean="0">
+                              <a:latin typeface="Cambria Math" panose="02040503050406030204" pitchFamily="18" charset="0"/>
+                            </a:rPr>
+                            <m:t>)</m:t>
+                          </m:r>
+                        </m:e>
+                      </m:eqArr>
+                    </m:oMath>
+                  </m:oMathPara>
+                </a14:m>
+                <a:endParaRPr lang="ko-KR" altLang="en-US" dirty="0"/>
+              </a:p>
+            </p:txBody>
+          </p:sp>
+        </mc:Choice>
+        <mc:Fallback>
+          <p:sp>
+            <p:nvSpPr>
+              <p:cNvPr id="37" name="Rectangle 36"/>
+              <p:cNvSpPr>
+                <a:spLocks noRot="1" noChangeAspect="1" noMove="1" noResize="1" noEditPoints="1" noAdjustHandles="1" noChangeArrowheads="1" noChangeShapeType="1" noTextEdit="1"/>
+              </p:cNvSpPr>
+              <p:nvPr/>
+            </p:nvSpPr>
+            <p:spPr>
+              <a:xfrm>
+                <a:off x="10448039" y="1589552"/>
+                <a:ext cx="1566776" cy="627416"/>
+              </a:xfrm>
+              <a:prstGeom prst="rect">
+                <a:avLst/>
+              </a:prstGeom>
+              <a:blipFill>
+                <a:blip r:embed="rId3"/>
+                <a:stretch>
+                  <a:fillRect/>
+                </a:stretch>
+              </a:blipFill>
+            </p:spPr>
+            <p:txBody>
+              <a:bodyPr/>
+              <a:lstStyle/>
+              <a:p>
+                <a:r>
+                  <a:rPr lang="ko-KR" altLang="en-US">
+                    <a:noFill/>
+                  </a:rPr>
+                  <a:t> </a:t>
+                </a:r>
+              </a:p>
+            </p:txBody>
+          </p:sp>
+        </mc:Fallback>
+      </mc:AlternateContent>
     </p:spTree>
     <p:extLst>
       <p:ext uri="{BB962C8B-B14F-4D97-AF65-F5344CB8AC3E}">

</xml_diff>

<commit_message>
modify: revise final paper
</commit_message>
<xml_diff>
--- a/WPCN/for_final_paper.pptx
+++ b/WPCN/for_final_paper.pptx
@@ -21,6 +21,8 @@
     <p:sldId id="268" r:id="rId15"/>
     <p:sldId id="269" r:id="rId16"/>
     <p:sldId id="271" r:id="rId17"/>
+    <p:sldId id="273" r:id="rId18"/>
+    <p:sldId id="274" r:id="rId19"/>
   </p:sldIdLst>
   <p:sldSz cx="12192000" cy="6858000"/>
   <p:notesSz cx="6858000" cy="9144000"/>
@@ -258,7 +260,7 @@
           <a:p>
             <a:fld id="{7DEA4731-64EB-4CE7-B59A-17BBA9BDC1E6}" type="datetimeFigureOut">
               <a:rPr lang="ko-KR" altLang="en-US" smtClean="0"/>
-              <a:t>2020-07-17</a:t>
+              <a:t>2020-07-22</a:t>
             </a:fld>
             <a:endParaRPr lang="ko-KR" altLang="en-US"/>
           </a:p>
@@ -428,7 +430,7 @@
           <a:p>
             <a:fld id="{7DEA4731-64EB-4CE7-B59A-17BBA9BDC1E6}" type="datetimeFigureOut">
               <a:rPr lang="ko-KR" altLang="en-US" smtClean="0"/>
-              <a:t>2020-07-17</a:t>
+              <a:t>2020-07-22</a:t>
             </a:fld>
             <a:endParaRPr lang="ko-KR" altLang="en-US"/>
           </a:p>
@@ -608,7 +610,7 @@
           <a:p>
             <a:fld id="{7DEA4731-64EB-4CE7-B59A-17BBA9BDC1E6}" type="datetimeFigureOut">
               <a:rPr lang="ko-KR" altLang="en-US" smtClean="0"/>
-              <a:t>2020-07-17</a:t>
+              <a:t>2020-07-22</a:t>
             </a:fld>
             <a:endParaRPr lang="ko-KR" altLang="en-US"/>
           </a:p>
@@ -778,7 +780,7 @@
           <a:p>
             <a:fld id="{7DEA4731-64EB-4CE7-B59A-17BBA9BDC1E6}" type="datetimeFigureOut">
               <a:rPr lang="ko-KR" altLang="en-US" smtClean="0"/>
-              <a:t>2020-07-17</a:t>
+              <a:t>2020-07-22</a:t>
             </a:fld>
             <a:endParaRPr lang="ko-KR" altLang="en-US"/>
           </a:p>
@@ -1024,7 +1026,7 @@
           <a:p>
             <a:fld id="{7DEA4731-64EB-4CE7-B59A-17BBA9BDC1E6}" type="datetimeFigureOut">
               <a:rPr lang="ko-KR" altLang="en-US" smtClean="0"/>
-              <a:t>2020-07-17</a:t>
+              <a:t>2020-07-22</a:t>
             </a:fld>
             <a:endParaRPr lang="ko-KR" altLang="en-US"/>
           </a:p>
@@ -1256,7 +1258,7 @@
           <a:p>
             <a:fld id="{7DEA4731-64EB-4CE7-B59A-17BBA9BDC1E6}" type="datetimeFigureOut">
               <a:rPr lang="ko-KR" altLang="en-US" smtClean="0"/>
-              <a:t>2020-07-17</a:t>
+              <a:t>2020-07-22</a:t>
             </a:fld>
             <a:endParaRPr lang="ko-KR" altLang="en-US"/>
           </a:p>
@@ -1623,7 +1625,7 @@
           <a:p>
             <a:fld id="{7DEA4731-64EB-4CE7-B59A-17BBA9BDC1E6}" type="datetimeFigureOut">
               <a:rPr lang="ko-KR" altLang="en-US" smtClean="0"/>
-              <a:t>2020-07-17</a:t>
+              <a:t>2020-07-22</a:t>
             </a:fld>
             <a:endParaRPr lang="ko-KR" altLang="en-US"/>
           </a:p>
@@ -1741,7 +1743,7 @@
           <a:p>
             <a:fld id="{7DEA4731-64EB-4CE7-B59A-17BBA9BDC1E6}" type="datetimeFigureOut">
               <a:rPr lang="ko-KR" altLang="en-US" smtClean="0"/>
-              <a:t>2020-07-17</a:t>
+              <a:t>2020-07-22</a:t>
             </a:fld>
             <a:endParaRPr lang="ko-KR" altLang="en-US"/>
           </a:p>
@@ -1836,7 +1838,7 @@
           <a:p>
             <a:fld id="{7DEA4731-64EB-4CE7-B59A-17BBA9BDC1E6}" type="datetimeFigureOut">
               <a:rPr lang="ko-KR" altLang="en-US" smtClean="0"/>
-              <a:t>2020-07-17</a:t>
+              <a:t>2020-07-22</a:t>
             </a:fld>
             <a:endParaRPr lang="ko-KR" altLang="en-US"/>
           </a:p>
@@ -2113,7 +2115,7 @@
           <a:p>
             <a:fld id="{7DEA4731-64EB-4CE7-B59A-17BBA9BDC1E6}" type="datetimeFigureOut">
               <a:rPr lang="ko-KR" altLang="en-US" smtClean="0"/>
-              <a:t>2020-07-17</a:t>
+              <a:t>2020-07-22</a:t>
             </a:fld>
             <a:endParaRPr lang="ko-KR" altLang="en-US"/>
           </a:p>
@@ -2366,7 +2368,7 @@
           <a:p>
             <a:fld id="{7DEA4731-64EB-4CE7-B59A-17BBA9BDC1E6}" type="datetimeFigureOut">
               <a:rPr lang="ko-KR" altLang="en-US" smtClean="0"/>
-              <a:t>2020-07-17</a:t>
+              <a:t>2020-07-22</a:t>
             </a:fld>
             <a:endParaRPr lang="ko-KR" altLang="en-US"/>
           </a:p>
@@ -2579,7 +2581,7 @@
           <a:p>
             <a:fld id="{7DEA4731-64EB-4CE7-B59A-17BBA9BDC1E6}" type="datetimeFigureOut">
               <a:rPr lang="ko-KR" altLang="en-US" smtClean="0"/>
-              <a:t>2020-07-17</a:t>
+              <a:t>2020-07-22</a:t>
             </a:fld>
             <a:endParaRPr lang="ko-KR" altLang="en-US"/>
           </a:p>
@@ -6036,6 +6038,552 @@
     <p:extLst>
       <p:ext uri="{BB962C8B-B14F-4D97-AF65-F5344CB8AC3E}">
         <p14:creationId xmlns:p14="http://schemas.microsoft.com/office/powerpoint/2010/main" val="2269225350"/>
+      </p:ext>
+    </p:extLst>
+  </p:cSld>
+  <p:clrMapOvr>
+    <a:masterClrMapping/>
+  </p:clrMapOvr>
+</p:sld>
+</file>
+
+<file path=ppt/slides/slide17.xml><?xml version="1.0" encoding="utf-8"?>
+<p:sld xmlns:a="http://schemas.openxmlformats.org/drawingml/2006/main" xmlns:r="http://schemas.openxmlformats.org/officeDocument/2006/relationships" xmlns:p="http://schemas.openxmlformats.org/presentationml/2006/main">
+  <p:cSld>
+    <p:spTree>
+      <p:nvGrpSpPr>
+        <p:cNvPr id="1" name=""/>
+        <p:cNvGrpSpPr/>
+        <p:nvPr/>
+      </p:nvGrpSpPr>
+      <p:grpSpPr>
+        <a:xfrm>
+          <a:off x="0" y="0"/>
+          <a:ext cx="0" cy="0"/>
+          <a:chOff x="0" y="0"/>
+          <a:chExt cx="0" cy="0"/>
+        </a:xfrm>
+      </p:grpSpPr>
+      <p:cxnSp>
+        <p:nvCxnSpPr>
+          <p:cNvPr id="13" name="Straight Connector 12"/>
+          <p:cNvCxnSpPr/>
+          <p:nvPr/>
+        </p:nvCxnSpPr>
+        <p:spPr>
+          <a:xfrm>
+            <a:off x="8133188" y="431816"/>
+            <a:ext cx="0" cy="5064109"/>
+          </a:xfrm>
+          <a:prstGeom prst="line">
+            <a:avLst/>
+          </a:prstGeom>
+          <a:ln w="38100">
+            <a:solidFill>
+              <a:schemeClr val="tx1"/>
+            </a:solidFill>
+          </a:ln>
+        </p:spPr>
+        <p:style>
+          <a:lnRef idx="1">
+            <a:schemeClr val="accent1"/>
+          </a:lnRef>
+          <a:fillRef idx="0">
+            <a:schemeClr val="accent1"/>
+          </a:fillRef>
+          <a:effectRef idx="0">
+            <a:schemeClr val="accent1"/>
+          </a:effectRef>
+          <a:fontRef idx="minor">
+            <a:schemeClr val="tx1"/>
+          </a:fontRef>
+        </p:style>
+      </p:cxnSp>
+      <p:sp>
+        <p:nvSpPr>
+          <p:cNvPr id="19" name="Rectangle 18"/>
+          <p:cNvSpPr/>
+          <p:nvPr/>
+        </p:nvSpPr>
+        <p:spPr>
+          <a:xfrm>
+            <a:off x="3140400" y="5706104"/>
+            <a:ext cx="6025496" cy="369332"/>
+          </a:xfrm>
+          <a:prstGeom prst="rect">
+            <a:avLst/>
+          </a:prstGeom>
+        </p:spPr>
+        <p:txBody>
+          <a:bodyPr wrap="none">
+            <a:spAutoFit/>
+          </a:bodyPr>
+          <a:lstStyle/>
+          <a:p>
+            <a:r>
+              <a:rPr lang="en-US" altLang="ko-KR" b="1" dirty="0">
+                <a:latin typeface="맑은 고딕" panose="020B0503020000020004" pitchFamily="50" charset="-127"/>
+                <a:cs typeface="Times New Roman" panose="02020603050405020304" pitchFamily="18" charset="0"/>
+              </a:rPr>
+              <a:t>Figure </a:t>
+            </a:r>
+            <a:r>
+              <a:rPr lang="en-US" altLang="ko-KR" b="1" dirty="0" smtClean="0">
+                <a:latin typeface="맑은 고딕" panose="020B0503020000020004" pitchFamily="50" charset="-127"/>
+                <a:cs typeface="Times New Roman" panose="02020603050405020304" pitchFamily="18" charset="0"/>
+              </a:rPr>
+              <a:t>8. Line Chart Version of Figure 6 and Figure 7</a:t>
+            </a:r>
+            <a:endParaRPr lang="ko-KR" altLang="en-US" dirty="0"/>
+          </a:p>
+        </p:txBody>
+      </p:sp>
+      <p:pic>
+        <p:nvPicPr>
+          <p:cNvPr id="4" name="Picture 3"/>
+          <p:cNvPicPr>
+            <a:picLocks noChangeAspect="1"/>
+          </p:cNvPicPr>
+          <p:nvPr/>
+        </p:nvPicPr>
+        <p:blipFill>
+          <a:blip r:embed="rId2"/>
+          <a:stretch>
+            <a:fillRect/>
+          </a:stretch>
+        </p:blipFill>
+        <p:spPr>
+          <a:xfrm>
+            <a:off x="544571" y="571217"/>
+            <a:ext cx="3456000" cy="2250298"/>
+          </a:xfrm>
+          <a:prstGeom prst="rect">
+            <a:avLst/>
+          </a:prstGeom>
+        </p:spPr>
+      </p:pic>
+      <p:pic>
+        <p:nvPicPr>
+          <p:cNvPr id="8" name="Picture 7"/>
+          <p:cNvPicPr>
+            <a:picLocks noChangeAspect="1"/>
+          </p:cNvPicPr>
+          <p:nvPr/>
+        </p:nvPicPr>
+        <p:blipFill>
+          <a:blip r:embed="rId3"/>
+          <a:stretch>
+            <a:fillRect/>
+          </a:stretch>
+        </p:blipFill>
+        <p:spPr>
+          <a:xfrm>
+            <a:off x="4382268" y="581611"/>
+            <a:ext cx="3456000" cy="2229510"/>
+          </a:xfrm>
+          <a:prstGeom prst="rect">
+            <a:avLst/>
+          </a:prstGeom>
+        </p:spPr>
+      </p:pic>
+      <p:pic>
+        <p:nvPicPr>
+          <p:cNvPr id="9" name="Picture 8"/>
+          <p:cNvPicPr>
+            <a:picLocks noChangeAspect="1"/>
+          </p:cNvPicPr>
+          <p:nvPr/>
+        </p:nvPicPr>
+        <p:blipFill>
+          <a:blip r:embed="rId4"/>
+          <a:stretch>
+            <a:fillRect/>
+          </a:stretch>
+        </p:blipFill>
+        <p:spPr>
+          <a:xfrm>
+            <a:off x="544571" y="3219996"/>
+            <a:ext cx="3456000" cy="2281581"/>
+          </a:xfrm>
+          <a:prstGeom prst="rect">
+            <a:avLst/>
+          </a:prstGeom>
+        </p:spPr>
+      </p:pic>
+      <p:pic>
+        <p:nvPicPr>
+          <p:cNvPr id="11" name="Picture 10"/>
+          <p:cNvPicPr>
+            <a:picLocks noChangeAspect="1"/>
+          </p:cNvPicPr>
+          <p:nvPr/>
+        </p:nvPicPr>
+        <p:blipFill>
+          <a:blip r:embed="rId5"/>
+          <a:stretch>
+            <a:fillRect/>
+          </a:stretch>
+        </p:blipFill>
+        <p:spPr>
+          <a:xfrm>
+            <a:off x="4382268" y="3224424"/>
+            <a:ext cx="3456000" cy="2272724"/>
+          </a:xfrm>
+          <a:prstGeom prst="rect">
+            <a:avLst/>
+          </a:prstGeom>
+        </p:spPr>
+      </p:pic>
+      <p:pic>
+        <p:nvPicPr>
+          <p:cNvPr id="12" name="Picture 11"/>
+          <p:cNvPicPr>
+            <a:picLocks noChangeAspect="1"/>
+          </p:cNvPicPr>
+          <p:nvPr/>
+        </p:nvPicPr>
+        <p:blipFill>
+          <a:blip r:embed="rId6"/>
+          <a:stretch>
+            <a:fillRect/>
+          </a:stretch>
+        </p:blipFill>
+        <p:spPr>
+          <a:xfrm>
+            <a:off x="8428109" y="558225"/>
+            <a:ext cx="3456000" cy="2276282"/>
+          </a:xfrm>
+          <a:prstGeom prst="rect">
+            <a:avLst/>
+          </a:prstGeom>
+        </p:spPr>
+      </p:pic>
+      <p:pic>
+        <p:nvPicPr>
+          <p:cNvPr id="14" name="Picture 13"/>
+          <p:cNvPicPr>
+            <a:picLocks noChangeAspect="1"/>
+          </p:cNvPicPr>
+          <p:nvPr/>
+        </p:nvPicPr>
+        <p:blipFill>
+          <a:blip r:embed="rId7"/>
+          <a:stretch>
+            <a:fillRect/>
+          </a:stretch>
+        </p:blipFill>
+        <p:spPr>
+          <a:xfrm>
+            <a:off x="8428109" y="3228920"/>
+            <a:ext cx="3456000" cy="2263733"/>
+          </a:xfrm>
+          <a:prstGeom prst="rect">
+            <a:avLst/>
+          </a:prstGeom>
+        </p:spPr>
+      </p:pic>
+      <p:cxnSp>
+        <p:nvCxnSpPr>
+          <p:cNvPr id="17" name="Straight Connector 16"/>
+          <p:cNvCxnSpPr/>
+          <p:nvPr/>
+        </p:nvCxnSpPr>
+        <p:spPr>
+          <a:xfrm>
+            <a:off x="8727688" y="4438186"/>
+            <a:ext cx="3098225" cy="246"/>
+          </a:xfrm>
+          <a:prstGeom prst="line">
+            <a:avLst/>
+          </a:prstGeom>
+          <a:ln>
+            <a:solidFill>
+              <a:schemeClr val="tx1"/>
+            </a:solidFill>
+          </a:ln>
+        </p:spPr>
+        <p:style>
+          <a:lnRef idx="1">
+            <a:schemeClr val="accent1"/>
+          </a:lnRef>
+          <a:fillRef idx="0">
+            <a:schemeClr val="accent1"/>
+          </a:fillRef>
+          <a:effectRef idx="0">
+            <a:schemeClr val="accent1"/>
+          </a:effectRef>
+          <a:fontRef idx="minor">
+            <a:schemeClr val="tx1"/>
+          </a:fontRef>
+        </p:style>
+      </p:cxnSp>
+    </p:spTree>
+    <p:extLst>
+      <p:ext uri="{BB962C8B-B14F-4D97-AF65-F5344CB8AC3E}">
+        <p14:creationId xmlns:p14="http://schemas.microsoft.com/office/powerpoint/2010/main" val="1874744961"/>
+      </p:ext>
+    </p:extLst>
+  </p:cSld>
+  <p:clrMapOvr>
+    <a:masterClrMapping/>
+  </p:clrMapOvr>
+</p:sld>
+</file>
+
+<file path=ppt/slides/slide18.xml><?xml version="1.0" encoding="utf-8"?>
+<p:sld xmlns:a="http://schemas.openxmlformats.org/drawingml/2006/main" xmlns:r="http://schemas.openxmlformats.org/officeDocument/2006/relationships" xmlns:p="http://schemas.openxmlformats.org/presentationml/2006/main">
+  <p:cSld>
+    <p:spTree>
+      <p:nvGrpSpPr>
+        <p:cNvPr id="1" name=""/>
+        <p:cNvGrpSpPr/>
+        <p:nvPr/>
+      </p:nvGrpSpPr>
+      <p:grpSpPr>
+        <a:xfrm>
+          <a:off x="0" y="0"/>
+          <a:ext cx="0" cy="0"/>
+          <a:chOff x="0" y="0"/>
+          <a:chExt cx="0" cy="0"/>
+        </a:xfrm>
+      </p:grpSpPr>
+      <p:sp>
+        <p:nvSpPr>
+          <p:cNvPr id="19" name="Rectangle 18"/>
+          <p:cNvSpPr/>
+          <p:nvPr/>
+        </p:nvSpPr>
+        <p:spPr>
+          <a:xfrm>
+            <a:off x="323433" y="5143148"/>
+            <a:ext cx="10896124" cy="369332"/>
+          </a:xfrm>
+          <a:prstGeom prst="rect">
+            <a:avLst/>
+          </a:prstGeom>
+        </p:spPr>
+        <p:txBody>
+          <a:bodyPr wrap="none">
+            <a:spAutoFit/>
+          </a:bodyPr>
+          <a:lstStyle/>
+          <a:p>
+            <a:pPr algn="ctr"/>
+            <a:r>
+              <a:rPr lang="en-US" altLang="ko-KR" b="1" dirty="0">
+                <a:latin typeface="맑은 고딕" panose="020B0503020000020004" pitchFamily="50" charset="-127"/>
+                <a:cs typeface="Times New Roman" panose="02020603050405020304" pitchFamily="18" charset="0"/>
+              </a:rPr>
+              <a:t>Figure </a:t>
+            </a:r>
+            <a:r>
+              <a:rPr lang="en-US" altLang="ko-KR" b="1" dirty="0" smtClean="0">
+                <a:latin typeface="맑은 고딕" panose="020B0503020000020004" pitchFamily="50" charset="-127"/>
+                <a:cs typeface="Times New Roman" panose="02020603050405020304" pitchFamily="18" charset="0"/>
+              </a:rPr>
+              <a:t>9. Comparison of CT.RATE (%) of our methodology and </a:t>
+            </a:r>
+            <a:r>
+              <a:rPr lang="en-US" altLang="ko-KR" b="1" smtClean="0">
+                <a:latin typeface="맑은 고딕" panose="020B0503020000020004" pitchFamily="50" charset="-127"/>
+                <a:cs typeface="Times New Roman" panose="02020603050405020304" pitchFamily="18" charset="0"/>
+              </a:rPr>
+              <a:t>the methodology in </a:t>
+            </a:r>
+            <a:r>
+              <a:rPr lang="en-US" altLang="ko-KR" b="1" dirty="0" smtClean="0">
+                <a:latin typeface="맑은 고딕" panose="020B0503020000020004" pitchFamily="50" charset="-127"/>
+                <a:cs typeface="Times New Roman" panose="02020603050405020304" pitchFamily="18" charset="0"/>
+              </a:rPr>
+              <a:t>original paper</a:t>
+            </a:r>
+            <a:endParaRPr lang="ko-KR" altLang="en-US" dirty="0"/>
+          </a:p>
+        </p:txBody>
+      </p:sp>
+      <p:pic>
+        <p:nvPicPr>
+          <p:cNvPr id="2" name="Picture 1"/>
+          <p:cNvPicPr>
+            <a:picLocks noChangeAspect="1"/>
+          </p:cNvPicPr>
+          <p:nvPr/>
+        </p:nvPicPr>
+        <p:blipFill rotWithShape="1">
+          <a:blip r:embed="rId2"/>
+          <a:srcRect b="90995"/>
+          <a:stretch/>
+        </p:blipFill>
+        <p:spPr>
+          <a:xfrm>
+            <a:off x="737532" y="518363"/>
+            <a:ext cx="10067925" cy="439141"/>
+          </a:xfrm>
+          <a:prstGeom prst="rect">
+            <a:avLst/>
+          </a:prstGeom>
+        </p:spPr>
+      </p:pic>
+      <p:sp>
+        <p:nvSpPr>
+          <p:cNvPr id="8" name="TextBox 7"/>
+          <p:cNvSpPr txBox="1"/>
+          <p:nvPr/>
+        </p:nvSpPr>
+        <p:spPr>
+          <a:xfrm>
+            <a:off x="2696182" y="1071299"/>
+            <a:ext cx="877163" cy="369332"/>
+          </a:xfrm>
+          <a:prstGeom prst="rect">
+            <a:avLst/>
+          </a:prstGeom>
+          <a:noFill/>
+        </p:spPr>
+        <p:txBody>
+          <a:bodyPr wrap="none" rtlCol="0">
+            <a:spAutoFit/>
+          </a:bodyPr>
+          <a:lstStyle/>
+          <a:p>
+            <a:r>
+              <a:rPr lang="en-US" altLang="ko-KR" dirty="0" smtClean="0"/>
+              <a:t>6 WDs</a:t>
+            </a:r>
+            <a:endParaRPr lang="ko-KR" altLang="en-US" dirty="0"/>
+          </a:p>
+        </p:txBody>
+      </p:sp>
+      <p:sp>
+        <p:nvSpPr>
+          <p:cNvPr id="14" name="TextBox 13"/>
+          <p:cNvSpPr txBox="1"/>
+          <p:nvPr/>
+        </p:nvSpPr>
+        <p:spPr>
+          <a:xfrm>
+            <a:off x="8118413" y="1071299"/>
+            <a:ext cx="1003801" cy="369332"/>
+          </a:xfrm>
+          <a:prstGeom prst="rect">
+            <a:avLst/>
+          </a:prstGeom>
+          <a:noFill/>
+        </p:spPr>
+        <p:txBody>
+          <a:bodyPr wrap="none" rtlCol="0">
+            <a:spAutoFit/>
+          </a:bodyPr>
+          <a:lstStyle/>
+          <a:p>
+            <a:r>
+              <a:rPr lang="en-US" altLang="ko-KR" dirty="0" smtClean="0"/>
+              <a:t>10 WDs</a:t>
+            </a:r>
+            <a:endParaRPr lang="ko-KR" altLang="en-US" dirty="0"/>
+          </a:p>
+        </p:txBody>
+      </p:sp>
+      <p:pic>
+        <p:nvPicPr>
+          <p:cNvPr id="3" name="Picture 2"/>
+          <p:cNvPicPr>
+            <a:picLocks noChangeAspect="1"/>
+          </p:cNvPicPr>
+          <p:nvPr/>
+        </p:nvPicPr>
+        <p:blipFill>
+          <a:blip r:embed="rId3"/>
+          <a:stretch>
+            <a:fillRect/>
+          </a:stretch>
+        </p:blipFill>
+        <p:spPr>
+          <a:xfrm>
+            <a:off x="1114646" y="1564699"/>
+            <a:ext cx="3863983" cy="2982385"/>
+          </a:xfrm>
+          <a:prstGeom prst="rect">
+            <a:avLst/>
+          </a:prstGeom>
+        </p:spPr>
+      </p:pic>
+      <p:pic>
+        <p:nvPicPr>
+          <p:cNvPr id="4" name="Picture 3"/>
+          <p:cNvPicPr>
+            <a:picLocks noChangeAspect="1"/>
+          </p:cNvPicPr>
+          <p:nvPr/>
+        </p:nvPicPr>
+        <p:blipFill>
+          <a:blip r:embed="rId4"/>
+          <a:stretch>
+            <a:fillRect/>
+          </a:stretch>
+        </p:blipFill>
+        <p:spPr>
+          <a:xfrm>
+            <a:off x="6892882" y="1613153"/>
+            <a:ext cx="3577141" cy="2922800"/>
+          </a:xfrm>
+          <a:prstGeom prst="rect">
+            <a:avLst/>
+          </a:prstGeom>
+        </p:spPr>
+      </p:pic>
+      <p:pic>
+        <p:nvPicPr>
+          <p:cNvPr id="5" name="Picture 4"/>
+          <p:cNvPicPr>
+            <a:picLocks noChangeAspect="1"/>
+          </p:cNvPicPr>
+          <p:nvPr/>
+        </p:nvPicPr>
+        <p:blipFill>
+          <a:blip r:embed="rId5"/>
+          <a:stretch>
+            <a:fillRect/>
+          </a:stretch>
+        </p:blipFill>
+        <p:spPr>
+          <a:xfrm>
+            <a:off x="1472650" y="4671152"/>
+            <a:ext cx="3324225" cy="333375"/>
+          </a:xfrm>
+          <a:prstGeom prst="rect">
+            <a:avLst/>
+          </a:prstGeom>
+        </p:spPr>
+      </p:pic>
+      <p:pic>
+        <p:nvPicPr>
+          <p:cNvPr id="6" name="Picture 5"/>
+          <p:cNvPicPr>
+            <a:picLocks noChangeAspect="1"/>
+          </p:cNvPicPr>
+          <p:nvPr/>
+        </p:nvPicPr>
+        <p:blipFill>
+          <a:blip r:embed="rId5"/>
+          <a:stretch>
+            <a:fillRect/>
+          </a:stretch>
+        </p:blipFill>
+        <p:spPr>
+          <a:xfrm>
+            <a:off x="7035556" y="4671151"/>
+            <a:ext cx="3324225" cy="333375"/>
+          </a:xfrm>
+          <a:prstGeom prst="rect">
+            <a:avLst/>
+          </a:prstGeom>
+        </p:spPr>
+      </p:pic>
+    </p:spTree>
+    <p:extLst>
+      <p:ext uri="{BB962C8B-B14F-4D97-AF65-F5344CB8AC3E}">
+        <p14:creationId xmlns:p14="http://schemas.microsoft.com/office/powerpoint/2010/main" val="3162398665"/>
       </p:ext>
     </p:extLst>
   </p:cSld>
@@ -19385,31 +19933,17 @@
                 <a:latin typeface="맑은 고딕" panose="020B0503020000020004" pitchFamily="50" charset="-127"/>
                 <a:cs typeface="Times New Roman" panose="02020603050405020304" pitchFamily="18" charset="0"/>
               </a:rPr>
-              <a:t>For each test </a:t>
-            </a:r>
+              <a:t>For each test output</a:t>
+            </a:r>
+          </a:p>
+          <a:p>
+            <a:pPr algn="ctr"/>
             <a:r>
               <a:rPr lang="en-US" altLang="ko-KR" b="1" dirty="0" smtClean="0">
                 <a:latin typeface="맑은 고딕" panose="020B0503020000020004" pitchFamily="50" charset="-127"/>
                 <a:cs typeface="Times New Roman" panose="02020603050405020304" pitchFamily="18" charset="0"/>
               </a:rPr>
-              <a:t>output</a:t>
-            </a:r>
-          </a:p>
-          <a:p>
-            <a:pPr algn="ctr"/>
-            <a:r>
-              <a:rPr lang="en-US" altLang="ko-KR" b="1" dirty="0" smtClean="0">
-                <a:latin typeface="맑은 고딕" panose="020B0503020000020004" pitchFamily="50" charset="-127"/>
-                <a:cs typeface="Times New Roman" panose="02020603050405020304" pitchFamily="18" charset="0"/>
-              </a:rPr>
-              <a:t>throughput </a:t>
-            </a:r>
-            <a:r>
-              <a:rPr lang="en-US" altLang="ko-KR" b="1" dirty="0" smtClean="0">
-                <a:latin typeface="맑은 고딕" panose="020B0503020000020004" pitchFamily="50" charset="-127"/>
-                <a:cs typeface="Times New Roman" panose="02020603050405020304" pitchFamily="18" charset="0"/>
-              </a:rPr>
-              <a:t>map</a:t>
+              <a:t>throughput map</a:t>
             </a:r>
             <a:endParaRPr lang="ko-KR" altLang="en-US" b="1" dirty="0"/>
           </a:p>

</xml_diff>